<commit_message>
TTM4 - Update read me to open draw.io with model preloaded, also update powerpoint
</commit_message>
<xml_diff>
--- a/powerpoint/Team Topologies Template for modelling - PowerPoint.pptx
+++ b/powerpoint/Team Topologies Template for modelling - PowerPoint.pptx
@@ -5468,8 +5468,70 @@
         </p:nvSpPr>
         <p:spPr>
           <a:xfrm>
-            <a:off x="852925" y="4255420"/>
-            <a:ext cx="3281700" cy="576600"/>
+            <a:off x="1117400" y="1303200"/>
+            <a:ext cx="3001500" cy="326400"/>
+          </a:xfrm>
+          <a:prstGeom prst="roundRect">
+            <a:avLst>
+              <a:gd fmla="val 16667" name="adj"/>
+            </a:avLst>
+          </a:prstGeom>
+          <a:solidFill>
+            <a:srgbClr val="FFEDB8"/>
+          </a:solidFill>
+          <a:ln cap="flat" cmpd="sng" w="38100">
+            <a:solidFill>
+              <a:srgbClr val="FFD966"/>
+            </a:solidFill>
+            <a:prstDash val="solid"/>
+            <a:round/>
+            <a:headEnd len="sm" w="sm" type="none"/>
+            <a:tailEnd len="sm" w="sm" type="none"/>
+          </a:ln>
+        </p:spPr>
+        <p:txBody>
+          <a:bodyPr anchorCtr="0" anchor="ctr" bIns="91425" lIns="91425" spcFirstLastPara="1" rIns="91425" wrap="square" tIns="91425">
+            <a:noAutofit/>
+          </a:bodyPr>
+          <a:lstStyle/>
+          <a:p>
+            <a:pPr indent="0" lvl="0" marL="0" rtl="0" algn="ctr">
+              <a:spcBef>
+                <a:spcPts val="0"/>
+              </a:spcBef>
+              <a:spcAft>
+                <a:spcPts val="0"/>
+              </a:spcAft>
+              <a:buNone/>
+            </a:pPr>
+            <a:r>
+              <a:rPr lang="en-GB" sz="800">
+                <a:latin typeface="Open Sans"/>
+                <a:ea typeface="Open Sans"/>
+                <a:cs typeface="Open Sans"/>
+                <a:sym typeface="Open Sans"/>
+              </a:rPr>
+              <a:t>Stream-aligned team</a:t>
+            </a:r>
+            <a:endParaRPr sz="800">
+              <a:latin typeface="Open Sans"/>
+              <a:ea typeface="Open Sans"/>
+              <a:cs typeface="Open Sans"/>
+              <a:sym typeface="Open Sans"/>
+            </a:endParaRPr>
+          </a:p>
+        </p:txBody>
+      </p:sp>
+      <p:sp>
+        <p:nvSpPr>
+          <p:cNvPr id="55" name="Google Shape;55;p13"/>
+          <p:cNvSpPr/>
+          <p:nvPr/>
+        </p:nvSpPr>
+        <p:spPr>
+          <a:xfrm>
+            <a:off x="987800" y="3768849"/>
+            <a:ext cx="3260700" cy="480300"/>
           </a:xfrm>
           <a:prstGeom prst="roundRect">
             <a:avLst>
@@ -5524,14 +5586,14 @@
       </p:sp>
       <p:sp>
         <p:nvSpPr>
-          <p:cNvPr id="55" name="Google Shape;55;p13"/>
+          <p:cNvPr id="56" name="Google Shape;56;p13"/>
           <p:cNvSpPr/>
           <p:nvPr/>
         </p:nvSpPr>
         <p:spPr>
           <a:xfrm>
-            <a:off x="852925" y="1580775"/>
-            <a:ext cx="2995500" cy="369000"/>
+            <a:off x="2275850" y="1794901"/>
+            <a:ext cx="684600" cy="878100"/>
           </a:xfrm>
           <a:prstGeom prst="roundRect">
             <a:avLst>
@@ -5539,11 +5601,11 @@
             </a:avLst>
           </a:prstGeom>
           <a:solidFill>
-            <a:srgbClr val="FFEDB8"/>
+            <a:srgbClr val="DFBDCF"/>
           </a:solidFill>
           <a:ln cap="flat" cmpd="sng" w="38100">
             <a:solidFill>
-              <a:srgbClr val="FFD966"/>
+              <a:srgbClr val="D09CB7"/>
             </a:solidFill>
             <a:prstDash val="solid"/>
             <a:round/>
@@ -5573,7 +5635,7 @@
                 <a:cs typeface="Open Sans"/>
                 <a:sym typeface="Open Sans"/>
               </a:rPr>
-              <a:t>Stream-aligned team</a:t>
+              <a:t>Enabling team</a:t>
             </a:r>
             <a:endParaRPr sz="800">
               <a:latin typeface="Open Sans"/>
@@ -5586,14 +5648,14 @@
       </p:sp>
       <p:sp>
         <p:nvSpPr>
-          <p:cNvPr id="56" name="Google Shape;56;p13"/>
+          <p:cNvPr id="57" name="Google Shape;57;p13"/>
           <p:cNvSpPr/>
           <p:nvPr/>
         </p:nvSpPr>
         <p:spPr>
           <a:xfrm>
-            <a:off x="1769894" y="3297192"/>
-            <a:ext cx="1272600" cy="747600"/>
+            <a:off x="2024249" y="2871113"/>
+            <a:ext cx="1161600" cy="699600"/>
           </a:xfrm>
           <a:prstGeom prst="octagon">
             <a:avLst>
@@ -5648,104 +5710,14 @@
       </p:sp>
       <p:sp>
         <p:nvSpPr>
-          <p:cNvPr id="57" name="Google Shape;57;p13"/>
-          <p:cNvSpPr/>
-          <p:nvPr/>
-        </p:nvSpPr>
-        <p:spPr>
-          <a:xfrm>
-            <a:off x="2025032" y="2160927"/>
-            <a:ext cx="717900" cy="943500"/>
-          </a:xfrm>
-          <a:prstGeom prst="roundRect">
-            <a:avLst>
-              <a:gd fmla="val 16667" name="adj"/>
-            </a:avLst>
-          </a:prstGeom>
-          <a:solidFill>
-            <a:srgbClr val="DFBDCF"/>
-          </a:solidFill>
-          <a:ln cap="flat" cmpd="sng" w="38100">
-            <a:solidFill>
-              <a:srgbClr val="D09CB7"/>
-            </a:solidFill>
-            <a:prstDash val="solid"/>
-            <a:round/>
-            <a:headEnd len="sm" w="sm" type="none"/>
-            <a:tailEnd len="sm" w="sm" type="none"/>
-          </a:ln>
-        </p:spPr>
-        <p:txBody>
-          <a:bodyPr anchorCtr="0" anchor="ctr" bIns="91425" lIns="91425" spcFirstLastPara="1" rIns="91425" wrap="square" tIns="91425">
-            <a:noAutofit/>
-          </a:bodyPr>
-          <a:lstStyle/>
-          <a:p>
-            <a:pPr indent="0" lvl="0" marL="0" rtl="0" algn="ctr">
-              <a:spcBef>
-                <a:spcPts val="0"/>
-              </a:spcBef>
-              <a:spcAft>
-                <a:spcPts val="0"/>
-              </a:spcAft>
-              <a:buNone/>
-            </a:pPr>
-            <a:r>
-              <a:rPr lang="en-GB" sz="800">
-                <a:latin typeface="Open Sans"/>
-                <a:ea typeface="Open Sans"/>
-                <a:cs typeface="Open Sans"/>
-                <a:sym typeface="Open Sans"/>
-              </a:rPr>
-              <a:t>Enabling team</a:t>
-            </a:r>
-            <a:endParaRPr sz="800">
-              <a:latin typeface="Open Sans"/>
-              <a:ea typeface="Open Sans"/>
-              <a:cs typeface="Open Sans"/>
-              <a:sym typeface="Open Sans"/>
-            </a:endParaRPr>
-          </a:p>
-        </p:txBody>
-      </p:sp>
-      <p:pic>
-        <p:nvPicPr>
           <p:cNvPr id="58" name="Google Shape;58;p13"/>
-          <p:cNvPicPr preferRelativeResize="0"/>
-          <p:nvPr/>
-        </p:nvPicPr>
-        <p:blipFill>
-          <a:blip r:embed="rId3">
-            <a:alphaModFix/>
-          </a:blip>
-          <a:stretch>
-            <a:fillRect/>
-          </a:stretch>
-        </p:blipFill>
-        <p:spPr>
-          <a:xfrm>
-            <a:off x="243325" y="266956"/>
-            <a:ext cx="1721070" cy="467701"/>
-          </a:xfrm>
-          <a:prstGeom prst="rect">
-            <a:avLst/>
-          </a:prstGeom>
-          <a:noFill/>
-          <a:ln>
-            <a:noFill/>
-          </a:ln>
-        </p:spPr>
-      </p:pic>
-      <p:sp>
-        <p:nvSpPr>
-          <p:cNvPr id="59" name="Google Shape;59;p13"/>
           <p:cNvSpPr txBox="1"/>
           <p:nvPr/>
         </p:nvSpPr>
         <p:spPr>
           <a:xfrm>
-            <a:off x="2033550" y="136000"/>
-            <a:ext cx="5913900" cy="943500"/>
+            <a:off x="2294600" y="136000"/>
+            <a:ext cx="6539100" cy="943500"/>
           </a:xfrm>
           <a:prstGeom prst="rect">
             <a:avLst/>
@@ -5797,7 +5769,7 @@
                 <a:ea typeface="Open Sans"/>
                 <a:cs typeface="Open Sans"/>
                 <a:sym typeface="Open Sans"/>
-                <a:hlinkClick r:id="rId4">
+                <a:hlinkClick r:id="rId3">
                   <a:extLst>
                     <a:ext uri="{A12FA001-AC4F-418D-AE19-62706E023703}">
                       <ahyp:hlinkClr val="tx"/>
@@ -5816,7 +5788,7 @@
                 <a:ea typeface="Open Sans"/>
                 <a:cs typeface="Open Sans"/>
                 <a:sym typeface="Open Sans"/>
-                <a:hlinkClick r:id="rId5">
+                <a:hlinkClick r:id="rId4">
                   <a:extLst>
                     <a:ext uri="{A12FA001-AC4F-418D-AE19-62706E023703}">
                       <ahyp:hlinkClr val="tx"/>
@@ -5852,14 +5824,14 @@
       </p:sp>
       <p:sp>
         <p:nvSpPr>
-          <p:cNvPr id="60" name="Google Shape;60;p13"/>
+          <p:cNvPr id="59" name="Google Shape;59;p13"/>
           <p:cNvSpPr/>
           <p:nvPr/>
         </p:nvSpPr>
         <p:spPr>
           <a:xfrm>
-            <a:off x="5359122" y="1644981"/>
-            <a:ext cx="1551253" cy="517521"/>
+            <a:off x="5664338" y="1379850"/>
+            <a:ext cx="1403825" cy="515013"/>
           </a:xfrm>
           <a:prstGeom prst="flowChartInputOutput">
             <a:avLst/>
@@ -5908,13 +5880,13 @@
       </p:sp>
       <p:sp>
         <p:nvSpPr>
-          <p:cNvPr id="61" name="Google Shape;61;p13"/>
+          <p:cNvPr id="60" name="Google Shape;60;p13"/>
           <p:cNvSpPr txBox="1"/>
           <p:nvPr/>
         </p:nvSpPr>
         <p:spPr>
           <a:xfrm>
-            <a:off x="1386325" y="1109675"/>
+            <a:off x="1499600" y="861300"/>
             <a:ext cx="2237100" cy="276600"/>
           </a:xfrm>
           <a:prstGeom prst="rect">
@@ -5931,7 +5903,7 @@
           </a:bodyPr>
           <a:lstStyle/>
           <a:p>
-            <a:pPr indent="0" lvl="0" marL="0" rtl="0" algn="l">
+            <a:pPr indent="0" lvl="0" marL="0" rtl="0" algn="ctr">
               <a:spcBef>
                 <a:spcPts val="0"/>
               </a:spcBef>
@@ -5963,13 +5935,13 @@
       </p:sp>
       <p:sp>
         <p:nvSpPr>
-          <p:cNvPr id="62" name="Google Shape;62;p13"/>
+          <p:cNvPr id="61" name="Google Shape;61;p13"/>
           <p:cNvSpPr txBox="1"/>
           <p:nvPr/>
         </p:nvSpPr>
         <p:spPr>
           <a:xfrm>
-            <a:off x="5285851" y="1109675"/>
+            <a:off x="5146876" y="881650"/>
             <a:ext cx="2433000" cy="276600"/>
           </a:xfrm>
           <a:prstGeom prst="rect">
@@ -5986,7 +5958,7 @@
           </a:bodyPr>
           <a:lstStyle/>
           <a:p>
-            <a:pPr indent="0" lvl="0" marL="0" rtl="0" algn="l">
+            <a:pPr indent="0" lvl="0" marL="0" rtl="0" algn="ctr">
               <a:spcBef>
                 <a:spcPts val="0"/>
               </a:spcBef>
@@ -6018,13 +5990,13 @@
       </p:sp>
       <p:sp>
         <p:nvSpPr>
-          <p:cNvPr id="63" name="Google Shape;63;p13"/>
+          <p:cNvPr id="62" name="Google Shape;62;p13"/>
           <p:cNvSpPr/>
           <p:nvPr/>
         </p:nvSpPr>
         <p:spPr>
           <a:xfrm>
-            <a:off x="5602279" y="2482497"/>
+            <a:off x="5830879" y="2116470"/>
             <a:ext cx="1065000" cy="796200"/>
           </a:xfrm>
           <a:prstGeom prst="triangle">
@@ -6074,14 +6046,14 @@
       </p:sp>
       <p:sp>
         <p:nvSpPr>
-          <p:cNvPr id="64" name="Google Shape;64;p13"/>
+          <p:cNvPr id="63" name="Google Shape;63;p13"/>
           <p:cNvSpPr/>
           <p:nvPr/>
         </p:nvSpPr>
         <p:spPr>
           <a:xfrm>
-            <a:off x="5546640" y="3626482"/>
-            <a:ext cx="1176300" cy="1020900"/>
+            <a:off x="5865075" y="3160250"/>
+            <a:ext cx="996600" cy="1008000"/>
           </a:xfrm>
           <a:prstGeom prst="ellipse">
             <a:avLst/>
@@ -6128,6 +6100,118 @@
           </a:p>
         </p:txBody>
       </p:sp>
+      <p:sp>
+        <p:nvSpPr>
+          <p:cNvPr id="64" name="Google Shape;64;p13"/>
+          <p:cNvSpPr txBox="1"/>
+          <p:nvPr/>
+        </p:nvSpPr>
+        <p:spPr>
+          <a:xfrm>
+            <a:off x="262700" y="171275"/>
+            <a:ext cx="2031900" cy="615600"/>
+          </a:xfrm>
+          <a:prstGeom prst="rect">
+            <a:avLst/>
+          </a:prstGeom>
+          <a:noFill/>
+          <a:ln>
+            <a:noFill/>
+          </a:ln>
+        </p:spPr>
+        <p:txBody>
+          <a:bodyPr anchorCtr="0" anchor="t" bIns="91425" lIns="91425" spcFirstLastPara="1" rIns="91425" wrap="square" tIns="91425">
+            <a:spAutoFit/>
+          </a:bodyPr>
+          <a:lstStyle/>
+          <a:p>
+            <a:pPr indent="0" lvl="0" marL="0" rtl="0" algn="l">
+              <a:spcBef>
+                <a:spcPts val="0"/>
+              </a:spcBef>
+              <a:spcAft>
+                <a:spcPts val="0"/>
+              </a:spcAft>
+              <a:buNone/>
+            </a:pPr>
+            <a:r>
+              <a:rPr b="1" lang="en-GB">
+                <a:latin typeface="Open Sans"/>
+                <a:ea typeface="Open Sans"/>
+                <a:cs typeface="Open Sans"/>
+                <a:sym typeface="Open Sans"/>
+              </a:rPr>
+              <a:t>Team Topologies </a:t>
+            </a:r>
+            <a:r>
+              <a:rPr lang="en-GB">
+                <a:latin typeface="Open Sans"/>
+                <a:ea typeface="Open Sans"/>
+                <a:cs typeface="Open Sans"/>
+                <a:sym typeface="Open Sans"/>
+              </a:rPr>
+              <a:t>team shapes template</a:t>
+            </a:r>
+            <a:endParaRPr>
+              <a:latin typeface="Open Sans"/>
+              <a:ea typeface="Open Sans"/>
+              <a:cs typeface="Open Sans"/>
+              <a:sym typeface="Open Sans"/>
+            </a:endParaRPr>
+          </a:p>
+        </p:txBody>
+      </p:sp>
+      <p:sp>
+        <p:nvSpPr>
+          <p:cNvPr id="65" name="Google Shape;65;p13"/>
+          <p:cNvSpPr/>
+          <p:nvPr/>
+        </p:nvSpPr>
+        <p:spPr>
+          <a:xfrm>
+            <a:off x="784750" y="4363437"/>
+            <a:ext cx="6971700" cy="576600"/>
+          </a:xfrm>
+          <a:prstGeom prst="rightArrow">
+            <a:avLst>
+              <a:gd fmla="val 57171" name="adj1"/>
+              <a:gd fmla="val 70330" name="adj2"/>
+            </a:avLst>
+          </a:prstGeom>
+          <a:noFill/>
+          <a:ln cap="flat" cmpd="sng" w="9525">
+            <a:solidFill>
+              <a:schemeClr val="dk2"/>
+            </a:solidFill>
+            <a:prstDash val="dash"/>
+            <a:round/>
+            <a:headEnd len="sm" w="sm" type="none"/>
+            <a:tailEnd len="sm" w="sm" type="none"/>
+          </a:ln>
+        </p:spPr>
+        <p:txBody>
+          <a:bodyPr anchorCtr="0" anchor="ctr" bIns="91425" lIns="91425" spcFirstLastPara="1" rIns="91425" wrap="square" tIns="91425">
+            <a:noAutofit/>
+          </a:bodyPr>
+          <a:lstStyle/>
+          <a:p>
+            <a:pPr indent="0" lvl="0" marL="0" rtl="0" algn="ctr">
+              <a:spcBef>
+                <a:spcPts val="0"/>
+              </a:spcBef>
+              <a:spcAft>
+                <a:spcPts val="0"/>
+              </a:spcAft>
+              <a:buNone/>
+            </a:pPr>
+            <a:r>
+              <a:rPr lang="en-GB" sz="800"/>
+              <a:t>Flow of change</a:t>
+            </a:r>
+            <a:endParaRPr sz="800"/>
+          </a:p>
+        </p:txBody>
+      </p:sp>
     </p:spTree>
   </p:cSld>
   <p:clrMapOvr>
@@ -6137,6 +6221,285 @@
 </file>
 
 <file path=ppt/theme/theme1.xml><?xml version="1.0" encoding="utf-8"?>
+<a:theme xmlns:a="http://schemas.openxmlformats.org/drawingml/2006/main" xmlns:r="http://schemas.openxmlformats.org/officeDocument/2006/relationships">
+  <a:themeElements>
+    <a:clrScheme name="Default">
+      <a:dk1>
+        <a:srgbClr val="000000"/>
+      </a:dk1>
+      <a:lt1>
+        <a:srgbClr val="FFFFFF"/>
+      </a:lt1>
+      <a:dk2>
+        <a:srgbClr val="158158"/>
+      </a:dk2>
+      <a:lt2>
+        <a:srgbClr val="F3F3F3"/>
+      </a:lt2>
+      <a:accent1>
+        <a:srgbClr val="058DC7"/>
+      </a:accent1>
+      <a:accent2>
+        <a:srgbClr val="50B432"/>
+      </a:accent2>
+      <a:accent3>
+        <a:srgbClr val="ED561B"/>
+      </a:accent3>
+      <a:accent4>
+        <a:srgbClr val="EDEF00"/>
+      </a:accent4>
+      <a:accent5>
+        <a:srgbClr val="24CBE5"/>
+      </a:accent5>
+      <a:accent6>
+        <a:srgbClr val="64E572"/>
+      </a:accent6>
+      <a:hlink>
+        <a:srgbClr val="2200CC"/>
+      </a:hlink>
+      <a:folHlink>
+        <a:srgbClr val="551A8B"/>
+      </a:folHlink>
+    </a:clrScheme>
+    <a:fontScheme name="Office">
+      <a:majorFont>
+        <a:latin typeface="Arial"/>
+        <a:ea typeface=""/>
+        <a:cs typeface=""/>
+        <a:font script="Jpan" typeface="ＭＳ Ｐゴシック"/>
+        <a:font script="Hang" typeface="맑은 고딕"/>
+        <a:font script="Hans" typeface="宋体"/>
+        <a:font script="Hant" typeface="新細明體"/>
+        <a:font script="Arab" typeface="Times New Roman"/>
+        <a:font script="Hebr" typeface="Times New Roman"/>
+        <a:font script="Thai" typeface="Angsana New"/>
+        <a:font script="Ethi" typeface="Nyala"/>
+        <a:font script="Beng" typeface="Vrinda"/>
+        <a:font script="Gujr" typeface="Shruti"/>
+        <a:font script="Khmr" typeface="MoolBoran"/>
+        <a:font script="Knda" typeface="Tunga"/>
+        <a:font script="Guru" typeface="Raavi"/>
+        <a:font script="Cans" typeface="Euphemia"/>
+        <a:font script="Cher" typeface="Plantagenet Cherokee"/>
+        <a:font script="Yiii" typeface="Microsoft Yi Baiti"/>
+        <a:font script="Tibt" typeface="Microsoft Himalaya"/>
+        <a:font script="Thaa" typeface="MV Boli"/>
+        <a:font script="Deva" typeface="Mangal"/>
+        <a:font script="Telu" typeface="Gautami"/>
+        <a:font script="Taml" typeface="Latha"/>
+        <a:font script="Syrc" typeface="Estrangelo Edessa"/>
+        <a:font script="Orya" typeface="Kalinga"/>
+        <a:font script="Mlym" typeface="Kartika"/>
+        <a:font script="Laoo" typeface="DokChampa"/>
+        <a:font script="Sinh" typeface="Iskoola Pota"/>
+        <a:font script="Mong" typeface="Mongolian Baiti"/>
+        <a:font script="Viet" typeface="Times New Roman"/>
+        <a:font script="Uigh" typeface="Microsoft Uighur"/>
+        <a:font script="Geor" typeface="Sylfaen"/>
+      </a:majorFont>
+      <a:minorFont>
+        <a:latin typeface="Arial"/>
+        <a:ea typeface=""/>
+        <a:cs typeface=""/>
+        <a:font script="Jpan" typeface="ＭＳ Ｐゴシック"/>
+        <a:font script="Hang" typeface="맑은 고딕"/>
+        <a:font script="Hans" typeface="宋体"/>
+        <a:font script="Hant" typeface="新細明體"/>
+        <a:font script="Arab" typeface="Arial"/>
+        <a:font script="Hebr" typeface="Arial"/>
+        <a:font script="Thai" typeface="Cordia New"/>
+        <a:font script="Ethi" typeface="Nyala"/>
+        <a:font script="Beng" typeface="Vrinda"/>
+        <a:font script="Gujr" typeface="Shruti"/>
+        <a:font script="Khmr" typeface="DaunPenh"/>
+        <a:font script="Knda" typeface="Tunga"/>
+        <a:font script="Guru" typeface="Raavi"/>
+        <a:font script="Cans" typeface="Euphemia"/>
+        <a:font script="Cher" typeface="Plantagenet Cherokee"/>
+        <a:font script="Yiii" typeface="Microsoft Yi Baiti"/>
+        <a:font script="Tibt" typeface="Microsoft Himalaya"/>
+        <a:font script="Thaa" typeface="MV Boli"/>
+        <a:font script="Deva" typeface="Mangal"/>
+        <a:font script="Telu" typeface="Gautami"/>
+        <a:font script="Taml" typeface="Latha"/>
+        <a:font script="Syrc" typeface="Estrangelo Edessa"/>
+        <a:font script="Orya" typeface="Kalinga"/>
+        <a:font script="Mlym" typeface="Kartika"/>
+        <a:font script="Laoo" typeface="DokChampa"/>
+        <a:font script="Sinh" typeface="Iskoola Pota"/>
+        <a:font script="Mong" typeface="Mongolian Baiti"/>
+        <a:font script="Viet" typeface="Arial"/>
+        <a:font script="Uigh" typeface="Microsoft Uighur"/>
+        <a:font script="Geor" typeface="Sylfaen"/>
+      </a:minorFont>
+    </a:fontScheme>
+    <a:fmtScheme name="Office">
+      <a:fillStyleLst>
+        <a:solidFill>
+          <a:schemeClr val="phClr"/>
+        </a:solidFill>
+        <a:gradFill rotWithShape="1">
+          <a:gsLst>
+            <a:gs pos="0">
+              <a:schemeClr val="phClr">
+                <a:tint val="50000"/>
+                <a:satMod val="300000"/>
+              </a:schemeClr>
+            </a:gs>
+            <a:gs pos="35000">
+              <a:schemeClr val="phClr">
+                <a:tint val="37000"/>
+                <a:satMod val="300000"/>
+              </a:schemeClr>
+            </a:gs>
+            <a:gs pos="100000">
+              <a:schemeClr val="phClr">
+                <a:tint val="15000"/>
+                <a:satMod val="350000"/>
+              </a:schemeClr>
+            </a:gs>
+          </a:gsLst>
+          <a:lin ang="16200000" scaled="1"/>
+        </a:gradFill>
+        <a:gradFill rotWithShape="1">
+          <a:gsLst>
+            <a:gs pos="0">
+              <a:schemeClr val="phClr">
+                <a:tint val="100000"/>
+                <a:shade val="100000"/>
+                <a:satMod val="130000"/>
+              </a:schemeClr>
+            </a:gs>
+            <a:gs pos="100000">
+              <a:schemeClr val="phClr">
+                <a:tint val="50000"/>
+                <a:shade val="100000"/>
+                <a:satMod val="350000"/>
+              </a:schemeClr>
+            </a:gs>
+          </a:gsLst>
+          <a:lin ang="16200000" scaled="0"/>
+        </a:gradFill>
+      </a:fillStyleLst>
+      <a:lnStyleLst>
+        <a:ln w="9525" cap="flat" cmpd="sng" algn="ctr">
+          <a:solidFill>
+            <a:schemeClr val="phClr">
+              <a:shade val="95000"/>
+              <a:satMod val="105000"/>
+            </a:schemeClr>
+          </a:solidFill>
+          <a:prstDash val="solid"/>
+        </a:ln>
+        <a:ln w="25400" cap="flat" cmpd="sng" algn="ctr">
+          <a:solidFill>
+            <a:schemeClr val="phClr"/>
+          </a:solidFill>
+          <a:prstDash val="solid"/>
+        </a:ln>
+        <a:ln w="38100" cap="flat" cmpd="sng" algn="ctr">
+          <a:solidFill>
+            <a:schemeClr val="phClr"/>
+          </a:solidFill>
+          <a:prstDash val="solid"/>
+        </a:ln>
+      </a:lnStyleLst>
+      <a:effectStyleLst>
+        <a:effectStyle>
+          <a:effectLst>
+            <a:outerShdw blurRad="40000" dist="20000" dir="5400000" rotWithShape="0">
+              <a:srgbClr val="000000">
+                <a:alpha val="38000"/>
+              </a:srgbClr>
+            </a:outerShdw>
+          </a:effectLst>
+        </a:effectStyle>
+        <a:effectStyle>
+          <a:effectLst>
+            <a:outerShdw blurRad="40000" dist="23000" dir="5400000" rotWithShape="0">
+              <a:srgbClr val="000000">
+                <a:alpha val="35000"/>
+              </a:srgbClr>
+            </a:outerShdw>
+          </a:effectLst>
+        </a:effectStyle>
+        <a:effectStyle>
+          <a:effectLst>
+            <a:outerShdw blurRad="40000" dist="23000" dir="5400000" rotWithShape="0">
+              <a:srgbClr val="000000">
+                <a:alpha val="35000"/>
+              </a:srgbClr>
+            </a:outerShdw>
+          </a:effectLst>
+          <a:scene3d>
+            <a:camera prst="orthographicFront">
+              <a:rot lat="0" lon="0" rev="0"/>
+            </a:camera>
+            <a:lightRig rig="threePt" dir="t">
+              <a:rot lat="0" lon="0" rev="1200000"/>
+            </a:lightRig>
+          </a:scene3d>
+          <a:sp3d>
+            <a:bevelT w="63500" h="25400"/>
+          </a:sp3d>
+        </a:effectStyle>
+      </a:effectStyleLst>
+      <a:bgFillStyleLst>
+        <a:solidFill>
+          <a:schemeClr val="phClr"/>
+        </a:solidFill>
+        <a:gradFill rotWithShape="1">
+          <a:gsLst>
+            <a:gs pos="0">
+              <a:schemeClr val="phClr">
+                <a:tint val="40000"/>
+                <a:satMod val="350000"/>
+              </a:schemeClr>
+            </a:gs>
+            <a:gs pos="40000">
+              <a:schemeClr val="phClr">
+                <a:tint val="45000"/>
+                <a:shade val="99000"/>
+                <a:satMod val="350000"/>
+              </a:schemeClr>
+            </a:gs>
+            <a:gs pos="100000">
+              <a:schemeClr val="phClr">
+                <a:shade val="20000"/>
+                <a:satMod val="255000"/>
+              </a:schemeClr>
+            </a:gs>
+          </a:gsLst>
+          <a:path path="circle">
+            <a:fillToRect l="50000" t="-80000" r="50000" b="180000"/>
+          </a:path>
+        </a:gradFill>
+        <a:gradFill rotWithShape="1">
+          <a:gsLst>
+            <a:gs pos="0">
+              <a:schemeClr val="phClr">
+                <a:tint val="80000"/>
+                <a:satMod val="300000"/>
+              </a:schemeClr>
+            </a:gs>
+            <a:gs pos="100000">
+              <a:schemeClr val="phClr">
+                <a:shade val="30000"/>
+                <a:satMod val="200000"/>
+              </a:schemeClr>
+            </a:gs>
+          </a:gsLst>
+          <a:path path="circle">
+            <a:fillToRect l="50000" t="50000" r="50000" b="50000"/>
+          </a:path>
+        </a:gradFill>
+      </a:bgFillStyleLst>
+    </a:fmtScheme>
+  </a:themeElements>
+</a:theme>
+</file>
+
+<file path=ppt/theme/theme2.xml><?xml version="1.0" encoding="utf-8"?>
 <a:theme xmlns:a="http://schemas.openxmlformats.org/drawingml/2006/main" xmlns:r="http://schemas.openxmlformats.org/officeDocument/2006/relationships" name="Simple Light">
   <a:themeElements>
     <a:clrScheme name="Simple Light">
@@ -6413,283 +6776,4 @@
     </a:fmtScheme>
   </a:themeElements>
 </a:theme>
-</file>
-
-<file path=ppt/theme/theme2.xml><?xml version="1.0" encoding="utf-8"?>
-<a:theme xmlns:a="http://schemas.openxmlformats.org/drawingml/2006/main" xmlns:r="http://schemas.openxmlformats.org/officeDocument/2006/relationships">
-  <a:themeElements>
-    <a:clrScheme name="Default">
-      <a:dk1>
-        <a:srgbClr val="000000"/>
-      </a:dk1>
-      <a:lt1>
-        <a:srgbClr val="FFFFFF"/>
-      </a:lt1>
-      <a:dk2>
-        <a:srgbClr val="158158"/>
-      </a:dk2>
-      <a:lt2>
-        <a:srgbClr val="F3F3F3"/>
-      </a:lt2>
-      <a:accent1>
-        <a:srgbClr val="058DC7"/>
-      </a:accent1>
-      <a:accent2>
-        <a:srgbClr val="50B432"/>
-      </a:accent2>
-      <a:accent3>
-        <a:srgbClr val="ED561B"/>
-      </a:accent3>
-      <a:accent4>
-        <a:srgbClr val="EDEF00"/>
-      </a:accent4>
-      <a:accent5>
-        <a:srgbClr val="24CBE5"/>
-      </a:accent5>
-      <a:accent6>
-        <a:srgbClr val="64E572"/>
-      </a:accent6>
-      <a:hlink>
-        <a:srgbClr val="2200CC"/>
-      </a:hlink>
-      <a:folHlink>
-        <a:srgbClr val="551A8B"/>
-      </a:folHlink>
-    </a:clrScheme>
-    <a:fontScheme name="Office">
-      <a:majorFont>
-        <a:latin typeface="Arial"/>
-        <a:ea typeface=""/>
-        <a:cs typeface=""/>
-        <a:font script="Jpan" typeface="ＭＳ Ｐゴシック"/>
-        <a:font script="Hang" typeface="맑은 고딕"/>
-        <a:font script="Hans" typeface="宋体"/>
-        <a:font script="Hant" typeface="新細明體"/>
-        <a:font script="Arab" typeface="Times New Roman"/>
-        <a:font script="Hebr" typeface="Times New Roman"/>
-        <a:font script="Thai" typeface="Angsana New"/>
-        <a:font script="Ethi" typeface="Nyala"/>
-        <a:font script="Beng" typeface="Vrinda"/>
-        <a:font script="Gujr" typeface="Shruti"/>
-        <a:font script="Khmr" typeface="MoolBoran"/>
-        <a:font script="Knda" typeface="Tunga"/>
-        <a:font script="Guru" typeface="Raavi"/>
-        <a:font script="Cans" typeface="Euphemia"/>
-        <a:font script="Cher" typeface="Plantagenet Cherokee"/>
-        <a:font script="Yiii" typeface="Microsoft Yi Baiti"/>
-        <a:font script="Tibt" typeface="Microsoft Himalaya"/>
-        <a:font script="Thaa" typeface="MV Boli"/>
-        <a:font script="Deva" typeface="Mangal"/>
-        <a:font script="Telu" typeface="Gautami"/>
-        <a:font script="Taml" typeface="Latha"/>
-        <a:font script="Syrc" typeface="Estrangelo Edessa"/>
-        <a:font script="Orya" typeface="Kalinga"/>
-        <a:font script="Mlym" typeface="Kartika"/>
-        <a:font script="Laoo" typeface="DokChampa"/>
-        <a:font script="Sinh" typeface="Iskoola Pota"/>
-        <a:font script="Mong" typeface="Mongolian Baiti"/>
-        <a:font script="Viet" typeface="Times New Roman"/>
-        <a:font script="Uigh" typeface="Microsoft Uighur"/>
-        <a:font script="Geor" typeface="Sylfaen"/>
-      </a:majorFont>
-      <a:minorFont>
-        <a:latin typeface="Arial"/>
-        <a:ea typeface=""/>
-        <a:cs typeface=""/>
-        <a:font script="Jpan" typeface="ＭＳ Ｐゴシック"/>
-        <a:font script="Hang" typeface="맑은 고딕"/>
-        <a:font script="Hans" typeface="宋体"/>
-        <a:font script="Hant" typeface="新細明體"/>
-        <a:font script="Arab" typeface="Arial"/>
-        <a:font script="Hebr" typeface="Arial"/>
-        <a:font script="Thai" typeface="Cordia New"/>
-        <a:font script="Ethi" typeface="Nyala"/>
-        <a:font script="Beng" typeface="Vrinda"/>
-        <a:font script="Gujr" typeface="Shruti"/>
-        <a:font script="Khmr" typeface="DaunPenh"/>
-        <a:font script="Knda" typeface="Tunga"/>
-        <a:font script="Guru" typeface="Raavi"/>
-        <a:font script="Cans" typeface="Euphemia"/>
-        <a:font script="Cher" typeface="Plantagenet Cherokee"/>
-        <a:font script="Yiii" typeface="Microsoft Yi Baiti"/>
-        <a:font script="Tibt" typeface="Microsoft Himalaya"/>
-        <a:font script="Thaa" typeface="MV Boli"/>
-        <a:font script="Deva" typeface="Mangal"/>
-        <a:font script="Telu" typeface="Gautami"/>
-        <a:font script="Taml" typeface="Latha"/>
-        <a:font script="Syrc" typeface="Estrangelo Edessa"/>
-        <a:font script="Orya" typeface="Kalinga"/>
-        <a:font script="Mlym" typeface="Kartika"/>
-        <a:font script="Laoo" typeface="DokChampa"/>
-        <a:font script="Sinh" typeface="Iskoola Pota"/>
-        <a:font script="Mong" typeface="Mongolian Baiti"/>
-        <a:font script="Viet" typeface="Arial"/>
-        <a:font script="Uigh" typeface="Microsoft Uighur"/>
-        <a:font script="Geor" typeface="Sylfaen"/>
-      </a:minorFont>
-    </a:fontScheme>
-    <a:fmtScheme name="Office">
-      <a:fillStyleLst>
-        <a:solidFill>
-          <a:schemeClr val="phClr"/>
-        </a:solidFill>
-        <a:gradFill rotWithShape="1">
-          <a:gsLst>
-            <a:gs pos="0">
-              <a:schemeClr val="phClr">
-                <a:tint val="50000"/>
-                <a:satMod val="300000"/>
-              </a:schemeClr>
-            </a:gs>
-            <a:gs pos="35000">
-              <a:schemeClr val="phClr">
-                <a:tint val="37000"/>
-                <a:satMod val="300000"/>
-              </a:schemeClr>
-            </a:gs>
-            <a:gs pos="100000">
-              <a:schemeClr val="phClr">
-                <a:tint val="15000"/>
-                <a:satMod val="350000"/>
-              </a:schemeClr>
-            </a:gs>
-          </a:gsLst>
-          <a:lin ang="16200000" scaled="1"/>
-        </a:gradFill>
-        <a:gradFill rotWithShape="1">
-          <a:gsLst>
-            <a:gs pos="0">
-              <a:schemeClr val="phClr">
-                <a:tint val="100000"/>
-                <a:shade val="100000"/>
-                <a:satMod val="130000"/>
-              </a:schemeClr>
-            </a:gs>
-            <a:gs pos="100000">
-              <a:schemeClr val="phClr">
-                <a:tint val="50000"/>
-                <a:shade val="100000"/>
-                <a:satMod val="350000"/>
-              </a:schemeClr>
-            </a:gs>
-          </a:gsLst>
-          <a:lin ang="16200000" scaled="0"/>
-        </a:gradFill>
-      </a:fillStyleLst>
-      <a:lnStyleLst>
-        <a:ln w="9525" cap="flat" cmpd="sng" algn="ctr">
-          <a:solidFill>
-            <a:schemeClr val="phClr">
-              <a:shade val="95000"/>
-              <a:satMod val="105000"/>
-            </a:schemeClr>
-          </a:solidFill>
-          <a:prstDash val="solid"/>
-        </a:ln>
-        <a:ln w="25400" cap="flat" cmpd="sng" algn="ctr">
-          <a:solidFill>
-            <a:schemeClr val="phClr"/>
-          </a:solidFill>
-          <a:prstDash val="solid"/>
-        </a:ln>
-        <a:ln w="38100" cap="flat" cmpd="sng" algn="ctr">
-          <a:solidFill>
-            <a:schemeClr val="phClr"/>
-          </a:solidFill>
-          <a:prstDash val="solid"/>
-        </a:ln>
-      </a:lnStyleLst>
-      <a:effectStyleLst>
-        <a:effectStyle>
-          <a:effectLst>
-            <a:outerShdw blurRad="40000" dist="20000" dir="5400000" rotWithShape="0">
-              <a:srgbClr val="000000">
-                <a:alpha val="38000"/>
-              </a:srgbClr>
-            </a:outerShdw>
-          </a:effectLst>
-        </a:effectStyle>
-        <a:effectStyle>
-          <a:effectLst>
-            <a:outerShdw blurRad="40000" dist="23000" dir="5400000" rotWithShape="0">
-              <a:srgbClr val="000000">
-                <a:alpha val="35000"/>
-              </a:srgbClr>
-            </a:outerShdw>
-          </a:effectLst>
-        </a:effectStyle>
-        <a:effectStyle>
-          <a:effectLst>
-            <a:outerShdw blurRad="40000" dist="23000" dir="5400000" rotWithShape="0">
-              <a:srgbClr val="000000">
-                <a:alpha val="35000"/>
-              </a:srgbClr>
-            </a:outerShdw>
-          </a:effectLst>
-          <a:scene3d>
-            <a:camera prst="orthographicFront">
-              <a:rot lat="0" lon="0" rev="0"/>
-            </a:camera>
-            <a:lightRig rig="threePt" dir="t">
-              <a:rot lat="0" lon="0" rev="1200000"/>
-            </a:lightRig>
-          </a:scene3d>
-          <a:sp3d>
-            <a:bevelT w="63500" h="25400"/>
-          </a:sp3d>
-        </a:effectStyle>
-      </a:effectStyleLst>
-      <a:bgFillStyleLst>
-        <a:solidFill>
-          <a:schemeClr val="phClr"/>
-        </a:solidFill>
-        <a:gradFill rotWithShape="1">
-          <a:gsLst>
-            <a:gs pos="0">
-              <a:schemeClr val="phClr">
-                <a:tint val="40000"/>
-                <a:satMod val="350000"/>
-              </a:schemeClr>
-            </a:gs>
-            <a:gs pos="40000">
-              <a:schemeClr val="phClr">
-                <a:tint val="45000"/>
-                <a:shade val="99000"/>
-                <a:satMod val="350000"/>
-              </a:schemeClr>
-            </a:gs>
-            <a:gs pos="100000">
-              <a:schemeClr val="phClr">
-                <a:shade val="20000"/>
-                <a:satMod val="255000"/>
-              </a:schemeClr>
-            </a:gs>
-          </a:gsLst>
-          <a:path path="circle">
-            <a:fillToRect l="50000" t="-80000" r="50000" b="180000"/>
-          </a:path>
-        </a:gradFill>
-        <a:gradFill rotWithShape="1">
-          <a:gsLst>
-            <a:gs pos="0">
-              <a:schemeClr val="phClr">
-                <a:tint val="80000"/>
-                <a:satMod val="300000"/>
-              </a:schemeClr>
-            </a:gs>
-            <a:gs pos="100000">
-              <a:schemeClr val="phClr">
-                <a:shade val="30000"/>
-                <a:satMod val="200000"/>
-              </a:schemeClr>
-            </a:gs>
-          </a:gsLst>
-          <a:path path="circle">
-            <a:fillToRect l="50000" t="50000" r="50000" b="50000"/>
-          </a:path>
-        </a:gradFill>
-      </a:bgFillStyleLst>
-    </a:fmtScheme>
-  </a:themeElements>
-</a:theme>
 </file>
</xml_diff>

<commit_message>
TTM4 - Minor tweak to title in powerpoint
</commit_message>
<xml_diff>
--- a/powerpoint/Team Topologies Template for modelling - PowerPoint.pptx
+++ b/powerpoint/Team Topologies Template for modelling - PowerPoint.pptx
@@ -1,28 +1,28 @@
 
 <file path=ppt/presentation.xml><?xml version="1.0" encoding="utf-8"?>
-<p:presentation xmlns:a="http://schemas.openxmlformats.org/drawingml/2006/main" xmlns:r="http://schemas.openxmlformats.org/officeDocument/2006/relationships" xmlns:mc="http://schemas.openxmlformats.org/markup-compatibility/2006" xmlns:mv="urn:schemas-microsoft-com:mac:vml" xmlns:p="http://schemas.openxmlformats.org/presentationml/2006/main" xmlns:c="http://schemas.openxmlformats.org/drawingml/2006/chart" xmlns:dgm="http://schemas.openxmlformats.org/drawingml/2006/diagram" xmlns:o="urn:schemas-microsoft-com:office:office" xmlns:v="urn:schemas-microsoft-com:vml" xmlns:pvml="urn:schemas-microsoft-com:office:powerpoint" xmlns:com="http://schemas.openxmlformats.org/drawingml/2006/compatibility" xmlns:p14="http://schemas.microsoft.com/office/powerpoint/2010/main" xmlns:p15="http://schemas.microsoft.com/office/powerpoint/2012/main" xmlns:ahyp="http://schemas.microsoft.com/office/drawing/2018/hyperlinkcolor" autoCompressPictures="0" embedTrueTypeFonts="1" strictFirstAndLastChars="0" saveSubsetFonts="1">
+<p:presentation xmlns:a="http://schemas.openxmlformats.org/drawingml/2006/main" xmlns:r="http://schemas.openxmlformats.org/officeDocument/2006/relationships" xmlns:p="http://schemas.openxmlformats.org/presentationml/2006/main" strictFirstAndLastChars="0" embedTrueTypeFonts="1" saveSubsetFonts="1" autoCompressPictures="0">
   <p:sldMasterIdLst>
-    <p:sldMasterId id="2147483659" r:id="rId4"/>
+    <p:sldMasterId id="2147483659" r:id="rId1"/>
   </p:sldMasterIdLst>
   <p:notesMasterIdLst>
-    <p:notesMasterId r:id="rId5"/>
+    <p:notesMasterId r:id="rId3"/>
   </p:notesMasterIdLst>
   <p:sldIdLst>
-    <p:sldId id="256" r:id="rId6"/>
+    <p:sldId id="256" r:id="rId2"/>
   </p:sldIdLst>
-  <p:sldSz cy="5143500" cx="9144000"/>
+  <p:sldSz cx="9144000" cy="5143500" type="screen16x9"/>
   <p:notesSz cx="6858000" cy="9144000"/>
   <p:embeddedFontLst>
     <p:embeddedFont>
-      <p:font typeface="Open Sans"/>
-      <p:regular r:id="rId7"/>
-      <p:bold r:id="rId8"/>
-      <p:italic r:id="rId9"/>
-      <p:boldItalic r:id="rId10"/>
+      <p:font typeface="Open Sans" panose="020B0604020202020204" charset="0"/>
+      <p:regular r:id="rId4"/>
+      <p:bold r:id="rId5"/>
+      <p:italic r:id="rId6"/>
+      <p:boldItalic r:id="rId7"/>
     </p:embeddedFont>
   </p:embeddedFontLst>
   <p:defaultTextStyle>
-    <a:defPPr lvl="0" marR="0" rtl="0" algn="l">
+    <a:defPPr marR="0" lvl="0" algn="l" rtl="0">
       <a:lnSpc>
         <a:spcPct val="100000"/>
       </a:lnSpc>
@@ -33,7 +33,7 @@
         <a:spcPts val="0"/>
       </a:spcAft>
     </a:defPPr>
-    <a:lvl1pPr lvl="0" marR="0" rtl="0" algn="l">
+    <a:lvl1pPr marR="0" lvl="0" algn="l" rtl="0">
       <a:lnSpc>
         <a:spcPct val="100000"/>
       </a:lnSpc>
@@ -47,7 +47,7 @@
         <a:srgbClr val="000000"/>
       </a:buClr>
       <a:buFont typeface="Arial"/>
-      <a:defRPr b="0" i="0" sz="1400" u="none" cap="none" strike="noStrike">
+      <a:defRPr sz="1400" b="0" i="0" u="none" strike="noStrike" cap="none">
         <a:solidFill>
           <a:srgbClr val="000000"/>
         </a:solidFill>
@@ -57,7 +57,7 @@
         <a:sym typeface="Arial"/>
       </a:defRPr>
     </a:lvl1pPr>
-    <a:lvl2pPr lvl="1" marR="0" rtl="0" algn="l">
+    <a:lvl2pPr marR="0" lvl="1" algn="l" rtl="0">
       <a:lnSpc>
         <a:spcPct val="100000"/>
       </a:lnSpc>
@@ -71,7 +71,7 @@
         <a:srgbClr val="000000"/>
       </a:buClr>
       <a:buFont typeface="Arial"/>
-      <a:defRPr b="0" i="0" sz="1400" u="none" cap="none" strike="noStrike">
+      <a:defRPr sz="1400" b="0" i="0" u="none" strike="noStrike" cap="none">
         <a:solidFill>
           <a:srgbClr val="000000"/>
         </a:solidFill>
@@ -81,7 +81,7 @@
         <a:sym typeface="Arial"/>
       </a:defRPr>
     </a:lvl2pPr>
-    <a:lvl3pPr lvl="2" marR="0" rtl="0" algn="l">
+    <a:lvl3pPr marR="0" lvl="2" algn="l" rtl="0">
       <a:lnSpc>
         <a:spcPct val="100000"/>
       </a:lnSpc>
@@ -95,7 +95,7 @@
         <a:srgbClr val="000000"/>
       </a:buClr>
       <a:buFont typeface="Arial"/>
-      <a:defRPr b="0" i="0" sz="1400" u="none" cap="none" strike="noStrike">
+      <a:defRPr sz="1400" b="0" i="0" u="none" strike="noStrike" cap="none">
         <a:solidFill>
           <a:srgbClr val="000000"/>
         </a:solidFill>
@@ -105,7 +105,7 @@
         <a:sym typeface="Arial"/>
       </a:defRPr>
     </a:lvl3pPr>
-    <a:lvl4pPr lvl="3" marR="0" rtl="0" algn="l">
+    <a:lvl4pPr marR="0" lvl="3" algn="l" rtl="0">
       <a:lnSpc>
         <a:spcPct val="100000"/>
       </a:lnSpc>
@@ -119,7 +119,7 @@
         <a:srgbClr val="000000"/>
       </a:buClr>
       <a:buFont typeface="Arial"/>
-      <a:defRPr b="0" i="0" sz="1400" u="none" cap="none" strike="noStrike">
+      <a:defRPr sz="1400" b="0" i="0" u="none" strike="noStrike" cap="none">
         <a:solidFill>
           <a:srgbClr val="000000"/>
         </a:solidFill>
@@ -129,7 +129,7 @@
         <a:sym typeface="Arial"/>
       </a:defRPr>
     </a:lvl4pPr>
-    <a:lvl5pPr lvl="4" marR="0" rtl="0" algn="l">
+    <a:lvl5pPr marR="0" lvl="4" algn="l" rtl="0">
       <a:lnSpc>
         <a:spcPct val="100000"/>
       </a:lnSpc>
@@ -143,7 +143,7 @@
         <a:srgbClr val="000000"/>
       </a:buClr>
       <a:buFont typeface="Arial"/>
-      <a:defRPr b="0" i="0" sz="1400" u="none" cap="none" strike="noStrike">
+      <a:defRPr sz="1400" b="0" i="0" u="none" strike="noStrike" cap="none">
         <a:solidFill>
           <a:srgbClr val="000000"/>
         </a:solidFill>
@@ -153,7 +153,7 @@
         <a:sym typeface="Arial"/>
       </a:defRPr>
     </a:lvl5pPr>
-    <a:lvl6pPr lvl="5" marR="0" rtl="0" algn="l">
+    <a:lvl6pPr marR="0" lvl="5" algn="l" rtl="0">
       <a:lnSpc>
         <a:spcPct val="100000"/>
       </a:lnSpc>
@@ -167,7 +167,7 @@
         <a:srgbClr val="000000"/>
       </a:buClr>
       <a:buFont typeface="Arial"/>
-      <a:defRPr b="0" i="0" sz="1400" u="none" cap="none" strike="noStrike">
+      <a:defRPr sz="1400" b="0" i="0" u="none" strike="noStrike" cap="none">
         <a:solidFill>
           <a:srgbClr val="000000"/>
         </a:solidFill>
@@ -177,7 +177,7 @@
         <a:sym typeface="Arial"/>
       </a:defRPr>
     </a:lvl6pPr>
-    <a:lvl7pPr lvl="6" marR="0" rtl="0" algn="l">
+    <a:lvl7pPr marR="0" lvl="6" algn="l" rtl="0">
       <a:lnSpc>
         <a:spcPct val="100000"/>
       </a:lnSpc>
@@ -191,7 +191,7 @@
         <a:srgbClr val="000000"/>
       </a:buClr>
       <a:buFont typeface="Arial"/>
-      <a:defRPr b="0" i="0" sz="1400" u="none" cap="none" strike="noStrike">
+      <a:defRPr sz="1400" b="0" i="0" u="none" strike="noStrike" cap="none">
         <a:solidFill>
           <a:srgbClr val="000000"/>
         </a:solidFill>
@@ -201,7 +201,7 @@
         <a:sym typeface="Arial"/>
       </a:defRPr>
     </a:lvl7pPr>
-    <a:lvl8pPr lvl="7" marR="0" rtl="0" algn="l">
+    <a:lvl8pPr marR="0" lvl="7" algn="l" rtl="0">
       <a:lnSpc>
         <a:spcPct val="100000"/>
       </a:lnSpc>
@@ -215,7 +215,7 @@
         <a:srgbClr val="000000"/>
       </a:buClr>
       <a:buFont typeface="Arial"/>
-      <a:defRPr b="0" i="0" sz="1400" u="none" cap="none" strike="noStrike">
+      <a:defRPr sz="1400" b="0" i="0" u="none" strike="noStrike" cap="none">
         <a:solidFill>
           <a:srgbClr val="000000"/>
         </a:solidFill>
@@ -225,7 +225,7 @@
         <a:sym typeface="Arial"/>
       </a:defRPr>
     </a:lvl8pPr>
-    <a:lvl9pPr lvl="8" marR="0" rtl="0" algn="l">
+    <a:lvl9pPr marR="0" lvl="8" algn="l" rtl="0">
       <a:lnSpc>
         <a:spcPct val="100000"/>
       </a:lnSpc>
@@ -239,7 +239,7 @@
         <a:srgbClr val="000000"/>
       </a:buClr>
       <a:buFont typeface="Arial"/>
-      <a:defRPr b="0" i="0" sz="1400" u="none" cap="none" strike="noStrike">
+      <a:defRPr sz="1400" b="0" i="0" u="none" strike="noStrike" cap="none">
         <a:solidFill>
           <a:srgbClr val="000000"/>
         </a:solidFill>
@@ -252,7 +252,7 @@
   </p:defaultTextStyle>
   <p:extLst>
     <p:ext uri="{EFAFB233-063F-42B5-8137-9DF3F51BA10A}">
-      <p15:sldGuideLst>
+      <p15:sldGuideLst xmlns:p15="http://schemas.microsoft.com/office/powerpoint/2012/main">
         <p15:guide id="1" orient="horz" pos="1620">
           <p15:clr>
             <a:srgbClr val="A4A3A4"/>
@@ -270,11 +270,16 @@
 </file>
 
 <file path=ppt/notesMasters/notesMaster1.xml><?xml version="1.0" encoding="utf-8"?>
-<p:notesMaster xmlns:a="http://schemas.openxmlformats.org/drawingml/2006/main" xmlns:r="http://schemas.openxmlformats.org/officeDocument/2006/relationships" xmlns:mc="http://schemas.openxmlformats.org/markup-compatibility/2006" xmlns:mv="urn:schemas-microsoft-com:mac:vml" xmlns:p="http://schemas.openxmlformats.org/presentationml/2006/main" xmlns:c="http://schemas.openxmlformats.org/drawingml/2006/chart" xmlns:dgm="http://schemas.openxmlformats.org/drawingml/2006/diagram" xmlns:o="urn:schemas-microsoft-com:office:office" xmlns:v="urn:schemas-microsoft-com:vml" xmlns:pvml="urn:schemas-microsoft-com:office:powerpoint" xmlns:com="http://schemas.openxmlformats.org/drawingml/2006/compatibility" xmlns:p14="http://schemas.microsoft.com/office/powerpoint/2010/main" xmlns:p15="http://schemas.microsoft.com/office/powerpoint/2012/main" xmlns:ahyp="http://schemas.microsoft.com/office/drawing/2018/hyperlinkcolor">
+<p:notesMaster xmlns:a="http://schemas.openxmlformats.org/drawingml/2006/main" xmlns:r="http://schemas.openxmlformats.org/officeDocument/2006/relationships" xmlns:p="http://schemas.openxmlformats.org/presentationml/2006/main">
   <p:cSld>
+    <p:bg>
+      <p:bgRef idx="1001">
+        <a:schemeClr val="bg1"/>
+      </p:bgRef>
+    </p:bg>
     <p:spTree>
       <p:nvGrpSpPr>
-        <p:cNvPr id="2" name="Shape 2"/>
+        <p:cNvPr id="1" name="Shape 2"/>
         <p:cNvGrpSpPr/>
         <p:nvPr/>
       </p:nvGrpSpPr>
@@ -289,9 +294,11 @@
       <p:sp>
         <p:nvSpPr>
           <p:cNvPr id="3" name="Google Shape;3;n"/>
-          <p:cNvSpPr/>
+          <p:cNvSpPr>
+            <a:spLocks noGrp="1" noRot="1" noChangeAspect="1"/>
+          </p:cNvSpPr>
           <p:nvPr>
-            <p:ph idx="2" type="sldImg"/>
+            <p:ph type="sldImg" idx="2"/>
           </p:nvPr>
         </p:nvSpPr>
         <p:spPr>
@@ -300,9 +307,13 @@
             <a:ext cx="6096075" cy="3429000"/>
           </a:xfrm>
           <a:custGeom>
-            <a:rect b="b" l="l" r="r" t="t"/>
+            <a:avLst/>
+            <a:gdLst/>
+            <a:ahLst/>
+            <a:cxnLst/>
+            <a:rect l="l" t="t" r="r" b="b"/>
             <a:pathLst>
-              <a:path extrusionOk="0" h="120000" w="120000">
+              <a:path w="120000" h="120000" extrusionOk="0">
                 <a:moveTo>
                   <a:pt x="0" y="0"/>
                 </a:moveTo>
@@ -320,23 +331,25 @@
             </a:pathLst>
           </a:custGeom>
           <a:noFill/>
-          <a:ln cap="flat" cmpd="sng" w="9525">
+          <a:ln w="9525" cap="flat" cmpd="sng">
             <a:solidFill>
               <a:srgbClr val="000000"/>
             </a:solidFill>
             <a:prstDash val="solid"/>
             <a:round/>
-            <a:headEnd len="sm" w="sm" type="none"/>
-            <a:tailEnd len="sm" w="sm" type="none"/>
+            <a:headEnd type="none" w="sm" len="sm"/>
+            <a:tailEnd type="none" w="sm" len="sm"/>
           </a:ln>
         </p:spPr>
       </p:sp>
       <p:sp>
         <p:nvSpPr>
           <p:cNvPr id="4" name="Google Shape;4;n"/>
-          <p:cNvSpPr txBox="1"/>
+          <p:cNvSpPr txBox="1">
+            <a:spLocks noGrp="1"/>
+          </p:cNvSpPr>
           <p:nvPr>
-            <p:ph idx="1" type="body"/>
+            <p:ph type="body" idx="1"/>
           </p:nvPr>
         </p:nvSpPr>
         <p:spPr>
@@ -353,11 +366,11 @@
           </a:ln>
         </p:spPr>
         <p:txBody>
-          <a:bodyPr anchorCtr="0" anchor="t" bIns="91425" lIns="91425" spcFirstLastPara="1" rIns="91425" wrap="square" tIns="91425">
+          <a:bodyPr spcFirstLastPara="1" wrap="square" lIns="91425" tIns="91425" rIns="91425" bIns="91425" anchor="t" anchorCtr="0">
             <a:noAutofit/>
           </a:bodyPr>
           <a:lstStyle>
-            <a:lvl1pPr indent="-298450" lvl="0" marL="457200">
+            <a:lvl1pPr marL="457200" lvl="0" indent="-298450">
               <a:spcBef>
                 <a:spcPts val="0"/>
               </a:spcBef>
@@ -368,7 +381,7 @@
               <a:buChar char="●"/>
               <a:defRPr sz="1100"/>
             </a:lvl1pPr>
-            <a:lvl2pPr indent="-298450" lvl="1" marL="914400">
+            <a:lvl2pPr marL="914400" lvl="1" indent="-298450">
               <a:spcBef>
                 <a:spcPts val="0"/>
               </a:spcBef>
@@ -379,7 +392,7 @@
               <a:buChar char="○"/>
               <a:defRPr sz="1100"/>
             </a:lvl2pPr>
-            <a:lvl3pPr indent="-298450" lvl="2" marL="1371600">
+            <a:lvl3pPr marL="1371600" lvl="2" indent="-298450">
               <a:spcBef>
                 <a:spcPts val="0"/>
               </a:spcBef>
@@ -390,7 +403,7 @@
               <a:buChar char="■"/>
               <a:defRPr sz="1100"/>
             </a:lvl3pPr>
-            <a:lvl4pPr indent="-298450" lvl="3" marL="1828800">
+            <a:lvl4pPr marL="1828800" lvl="3" indent="-298450">
               <a:spcBef>
                 <a:spcPts val="0"/>
               </a:spcBef>
@@ -401,7 +414,7 @@
               <a:buChar char="●"/>
               <a:defRPr sz="1100"/>
             </a:lvl4pPr>
-            <a:lvl5pPr indent="-298450" lvl="4" marL="2286000">
+            <a:lvl5pPr marL="2286000" lvl="4" indent="-298450">
               <a:spcBef>
                 <a:spcPts val="0"/>
               </a:spcBef>
@@ -412,7 +425,7 @@
               <a:buChar char="○"/>
               <a:defRPr sz="1100"/>
             </a:lvl5pPr>
-            <a:lvl6pPr indent="-298450" lvl="5" marL="2743200">
+            <a:lvl6pPr marL="2743200" lvl="5" indent="-298450">
               <a:spcBef>
                 <a:spcPts val="0"/>
               </a:spcBef>
@@ -423,7 +436,7 @@
               <a:buChar char="■"/>
               <a:defRPr sz="1100"/>
             </a:lvl6pPr>
-            <a:lvl7pPr indent="-298450" lvl="6" marL="3200400">
+            <a:lvl7pPr marL="3200400" lvl="6" indent="-298450">
               <a:spcBef>
                 <a:spcPts val="0"/>
               </a:spcBef>
@@ -434,7 +447,7 @@
               <a:buChar char="●"/>
               <a:defRPr sz="1100"/>
             </a:lvl7pPr>
-            <a:lvl8pPr indent="-298450" lvl="7" marL="3657600">
+            <a:lvl8pPr marL="3657600" lvl="7" indent="-298450">
               <a:spcBef>
                 <a:spcPts val="0"/>
               </a:spcBef>
@@ -445,7 +458,7 @@
               <a:buChar char="○"/>
               <a:defRPr sz="1100"/>
             </a:lvl8pPr>
-            <a:lvl9pPr indent="-298450" lvl="8" marL="4114800">
+            <a:lvl9pPr marL="4114800" lvl="8" indent="-298450">
               <a:spcBef>
                 <a:spcPts val="0"/>
               </a:spcBef>
@@ -457,14 +470,16 @@
               <a:defRPr sz="1100"/>
             </a:lvl9pPr>
           </a:lstStyle>
-          <a:p/>
+          <a:p>
+            <a:endParaRPr/>
+          </a:p>
         </p:txBody>
       </p:sp>
     </p:spTree>
   </p:cSld>
-  <p:clrMap accent1="accent1" accent2="accent2" accent3="accent3" accent4="accent4" accent5="accent5" accent6="accent6" bg1="lt1" bg2="dk2" tx1="dk1" tx2="lt2" folHlink="folHlink" hlink="hlink"/>
+  <p:clrMap bg1="lt1" tx1="dk1" bg2="dk2" tx2="lt2" accent1="accent1" accent2="accent2" accent3="accent3" accent4="accent4" accent5="accent5" accent6="accent6" hlink="hlink" folHlink="folHlink"/>
   <p:notesStyle>
-    <a:defPPr lvl="0" marR="0" rtl="0" algn="l">
+    <a:defPPr marR="0" lvl="0" algn="l" rtl="0">
       <a:lnSpc>
         <a:spcPct val="100000"/>
       </a:lnSpc>
@@ -475,7 +490,7 @@
         <a:spcPts val="0"/>
       </a:spcAft>
     </a:defPPr>
-    <a:lvl1pPr lvl="0" marR="0" rtl="0" algn="l">
+    <a:lvl1pPr marR="0" lvl="0" algn="l" rtl="0">
       <a:lnSpc>
         <a:spcPct val="100000"/>
       </a:lnSpc>
@@ -489,7 +504,7 @@
         <a:srgbClr val="000000"/>
       </a:buClr>
       <a:buFont typeface="Arial"/>
-      <a:defRPr b="0" i="0" sz="1400" u="none" cap="none" strike="noStrike">
+      <a:defRPr sz="1400" b="0" i="0" u="none" strike="noStrike" cap="none">
         <a:solidFill>
           <a:srgbClr val="000000"/>
         </a:solidFill>
@@ -499,7 +514,7 @@
         <a:sym typeface="Arial"/>
       </a:defRPr>
     </a:lvl1pPr>
-    <a:lvl2pPr lvl="1" marR="0" rtl="0" algn="l">
+    <a:lvl2pPr marR="0" lvl="1" algn="l" rtl="0">
       <a:lnSpc>
         <a:spcPct val="100000"/>
       </a:lnSpc>
@@ -513,7 +528,7 @@
         <a:srgbClr val="000000"/>
       </a:buClr>
       <a:buFont typeface="Arial"/>
-      <a:defRPr b="0" i="0" sz="1400" u="none" cap="none" strike="noStrike">
+      <a:defRPr sz="1400" b="0" i="0" u="none" strike="noStrike" cap="none">
         <a:solidFill>
           <a:srgbClr val="000000"/>
         </a:solidFill>
@@ -523,7 +538,7 @@
         <a:sym typeface="Arial"/>
       </a:defRPr>
     </a:lvl2pPr>
-    <a:lvl3pPr lvl="2" marR="0" rtl="0" algn="l">
+    <a:lvl3pPr marR="0" lvl="2" algn="l" rtl="0">
       <a:lnSpc>
         <a:spcPct val="100000"/>
       </a:lnSpc>
@@ -537,7 +552,7 @@
         <a:srgbClr val="000000"/>
       </a:buClr>
       <a:buFont typeface="Arial"/>
-      <a:defRPr b="0" i="0" sz="1400" u="none" cap="none" strike="noStrike">
+      <a:defRPr sz="1400" b="0" i="0" u="none" strike="noStrike" cap="none">
         <a:solidFill>
           <a:srgbClr val="000000"/>
         </a:solidFill>
@@ -547,7 +562,7 @@
         <a:sym typeface="Arial"/>
       </a:defRPr>
     </a:lvl3pPr>
-    <a:lvl4pPr lvl="3" marR="0" rtl="0" algn="l">
+    <a:lvl4pPr marR="0" lvl="3" algn="l" rtl="0">
       <a:lnSpc>
         <a:spcPct val="100000"/>
       </a:lnSpc>
@@ -561,7 +576,7 @@
         <a:srgbClr val="000000"/>
       </a:buClr>
       <a:buFont typeface="Arial"/>
-      <a:defRPr b="0" i="0" sz="1400" u="none" cap="none" strike="noStrike">
+      <a:defRPr sz="1400" b="0" i="0" u="none" strike="noStrike" cap="none">
         <a:solidFill>
           <a:srgbClr val="000000"/>
         </a:solidFill>
@@ -571,7 +586,7 @@
         <a:sym typeface="Arial"/>
       </a:defRPr>
     </a:lvl4pPr>
-    <a:lvl5pPr lvl="4" marR="0" rtl="0" algn="l">
+    <a:lvl5pPr marR="0" lvl="4" algn="l" rtl="0">
       <a:lnSpc>
         <a:spcPct val="100000"/>
       </a:lnSpc>
@@ -585,7 +600,7 @@
         <a:srgbClr val="000000"/>
       </a:buClr>
       <a:buFont typeface="Arial"/>
-      <a:defRPr b="0" i="0" sz="1400" u="none" cap="none" strike="noStrike">
+      <a:defRPr sz="1400" b="0" i="0" u="none" strike="noStrike" cap="none">
         <a:solidFill>
           <a:srgbClr val="000000"/>
         </a:solidFill>
@@ -595,7 +610,7 @@
         <a:sym typeface="Arial"/>
       </a:defRPr>
     </a:lvl5pPr>
-    <a:lvl6pPr lvl="5" marR="0" rtl="0" algn="l">
+    <a:lvl6pPr marR="0" lvl="5" algn="l" rtl="0">
       <a:lnSpc>
         <a:spcPct val="100000"/>
       </a:lnSpc>
@@ -609,7 +624,7 @@
         <a:srgbClr val="000000"/>
       </a:buClr>
       <a:buFont typeface="Arial"/>
-      <a:defRPr b="0" i="0" sz="1400" u="none" cap="none" strike="noStrike">
+      <a:defRPr sz="1400" b="0" i="0" u="none" strike="noStrike" cap="none">
         <a:solidFill>
           <a:srgbClr val="000000"/>
         </a:solidFill>
@@ -619,7 +634,7 @@
         <a:sym typeface="Arial"/>
       </a:defRPr>
     </a:lvl6pPr>
-    <a:lvl7pPr lvl="6" marR="0" rtl="0" algn="l">
+    <a:lvl7pPr marR="0" lvl="6" algn="l" rtl="0">
       <a:lnSpc>
         <a:spcPct val="100000"/>
       </a:lnSpc>
@@ -633,7 +648,7 @@
         <a:srgbClr val="000000"/>
       </a:buClr>
       <a:buFont typeface="Arial"/>
-      <a:defRPr b="0" i="0" sz="1400" u="none" cap="none" strike="noStrike">
+      <a:defRPr sz="1400" b="0" i="0" u="none" strike="noStrike" cap="none">
         <a:solidFill>
           <a:srgbClr val="000000"/>
         </a:solidFill>
@@ -643,7 +658,7 @@
         <a:sym typeface="Arial"/>
       </a:defRPr>
     </a:lvl7pPr>
-    <a:lvl8pPr lvl="7" marR="0" rtl="0" algn="l">
+    <a:lvl8pPr marR="0" lvl="7" algn="l" rtl="0">
       <a:lnSpc>
         <a:spcPct val="100000"/>
       </a:lnSpc>
@@ -657,7 +672,7 @@
         <a:srgbClr val="000000"/>
       </a:buClr>
       <a:buFont typeface="Arial"/>
-      <a:defRPr b="0" i="0" sz="1400" u="none" cap="none" strike="noStrike">
+      <a:defRPr sz="1400" b="0" i="0" u="none" strike="noStrike" cap="none">
         <a:solidFill>
           <a:srgbClr val="000000"/>
         </a:solidFill>
@@ -667,7 +682,7 @@
         <a:sym typeface="Arial"/>
       </a:defRPr>
     </a:lvl8pPr>
-    <a:lvl9pPr lvl="8" marR="0" rtl="0" algn="l">
+    <a:lvl9pPr marR="0" lvl="8" algn="l" rtl="0">
       <a:lnSpc>
         <a:spcPct val="100000"/>
       </a:lnSpc>
@@ -681,7 +696,7 @@
         <a:srgbClr val="000000"/>
       </a:buClr>
       <a:buFont typeface="Arial"/>
-      <a:defRPr b="0" i="0" sz="1400" u="none" cap="none" strike="noStrike">
+      <a:defRPr sz="1400" b="0" i="0" u="none" strike="noStrike" cap="none">
         <a:solidFill>
           <a:srgbClr val="000000"/>
         </a:solidFill>
@@ -696,11 +711,11 @@
 </file>
 
 <file path=ppt/notesSlides/notesSlide1.xml><?xml version="1.0" encoding="utf-8"?>
-<p:notes xmlns:a="http://schemas.openxmlformats.org/drawingml/2006/main" xmlns:r="http://schemas.openxmlformats.org/officeDocument/2006/relationships" xmlns:mc="http://schemas.openxmlformats.org/markup-compatibility/2006" xmlns:mv="urn:schemas-microsoft-com:mac:vml" xmlns:p="http://schemas.openxmlformats.org/presentationml/2006/main" xmlns:c="http://schemas.openxmlformats.org/drawingml/2006/chart" xmlns:dgm="http://schemas.openxmlformats.org/drawingml/2006/diagram" xmlns:o="urn:schemas-microsoft-com:office:office" xmlns:v="urn:schemas-microsoft-com:vml" xmlns:pvml="urn:schemas-microsoft-com:office:powerpoint" xmlns:com="http://schemas.openxmlformats.org/drawingml/2006/compatibility" xmlns:p14="http://schemas.microsoft.com/office/powerpoint/2010/main" xmlns:p15="http://schemas.microsoft.com/office/powerpoint/2012/main" xmlns:ahyp="http://schemas.microsoft.com/office/drawing/2018/hyperlinkcolor" showMasterPhAnim="0" showMasterSp="0">
+<p:notes xmlns:a="http://schemas.openxmlformats.org/drawingml/2006/main" xmlns:r="http://schemas.openxmlformats.org/officeDocument/2006/relationships" xmlns:p="http://schemas.openxmlformats.org/presentationml/2006/main" showMasterSp="0" showMasterPhAnim="0">
   <p:cSld>
     <p:spTree>
       <p:nvGrpSpPr>
-        <p:cNvPr id="50" name="Shape 50"/>
+        <p:cNvPr id="1" name="Shape 50"/>
         <p:cNvGrpSpPr/>
         <p:nvPr/>
       </p:nvGrpSpPr>
@@ -715,20 +730,26 @@
       <p:sp>
         <p:nvSpPr>
           <p:cNvPr id="51" name="Google Shape;51;p:notes"/>
-          <p:cNvSpPr/>
+          <p:cNvSpPr>
+            <a:spLocks noGrp="1" noRot="1" noChangeAspect="1"/>
+          </p:cNvSpPr>
           <p:nvPr>
-            <p:ph idx="2" type="sldImg"/>
+            <p:ph type="sldImg" idx="2"/>
           </p:nvPr>
         </p:nvSpPr>
         <p:spPr>
           <a:xfrm>
-            <a:off x="381300" y="685800"/>
-            <a:ext cx="6096075" cy="3429000"/>
+            <a:off x="381000" y="685800"/>
+            <a:ext cx="6096000" cy="3429000"/>
           </a:xfrm>
           <a:custGeom>
-            <a:rect b="b" l="l" r="r" t="t"/>
+            <a:avLst/>
+            <a:gdLst/>
+            <a:ahLst/>
+            <a:cxnLst/>
+            <a:rect l="l" t="t" r="r" b="b"/>
             <a:pathLst>
-              <a:path extrusionOk="0" h="120000" w="120000">
+              <a:path w="120000" h="120000" extrusionOk="0">
                 <a:moveTo>
                   <a:pt x="0" y="0"/>
                 </a:moveTo>
@@ -750,9 +771,11 @@
       <p:sp>
         <p:nvSpPr>
           <p:cNvPr id="52" name="Google Shape;52;p:notes"/>
-          <p:cNvSpPr txBox="1"/>
+          <p:cNvSpPr txBox="1">
+            <a:spLocks noGrp="1"/>
+          </p:cNvSpPr>
           <p:nvPr>
-            <p:ph idx="1" type="body"/>
+            <p:ph type="body" idx="1"/>
           </p:nvPr>
         </p:nvSpPr>
         <p:spPr>
@@ -765,12 +788,12 @@
           </a:prstGeom>
         </p:spPr>
         <p:txBody>
-          <a:bodyPr anchorCtr="0" anchor="t" bIns="91425" lIns="91425" spcFirstLastPara="1" rIns="91425" wrap="square" tIns="91425">
+          <a:bodyPr spcFirstLastPara="1" wrap="square" lIns="91425" tIns="91425" rIns="91425" bIns="91425" anchor="t" anchorCtr="0">
             <a:noAutofit/>
           </a:bodyPr>
           <a:lstStyle/>
           <a:p>
-            <a:pPr indent="0" lvl="0" marL="0" rtl="0" algn="l">
+            <a:pPr marL="0" lvl="0" indent="0" algn="l" rtl="0">
               <a:spcBef>
                 <a:spcPts val="0"/>
               </a:spcBef>
@@ -779,9 +802,6 @@
               </a:spcAft>
               <a:buNone/>
             </a:pPr>
-            <a:r>
-              <a:t/>
-            </a:r>
             <a:endParaRPr/>
           </a:p>
         </p:txBody>
@@ -795,11 +815,11 @@
 </file>
 
 <file path=ppt/slideLayouts/slideLayout1.xml><?xml version="1.0" encoding="utf-8"?>
-<p:sldLayout xmlns:a="http://schemas.openxmlformats.org/drawingml/2006/main" xmlns:r="http://schemas.openxmlformats.org/officeDocument/2006/relationships" xmlns:mc="http://schemas.openxmlformats.org/markup-compatibility/2006" xmlns:mv="urn:schemas-microsoft-com:mac:vml" xmlns:p="http://schemas.openxmlformats.org/presentationml/2006/main" xmlns:c="http://schemas.openxmlformats.org/drawingml/2006/chart" xmlns:dgm="http://schemas.openxmlformats.org/drawingml/2006/diagram" xmlns:o="urn:schemas-microsoft-com:office:office" xmlns:v="urn:schemas-microsoft-com:vml" xmlns:pvml="urn:schemas-microsoft-com:office:powerpoint" xmlns:com="http://schemas.openxmlformats.org/drawingml/2006/compatibility" xmlns:p14="http://schemas.microsoft.com/office/powerpoint/2010/main" xmlns:p15="http://schemas.microsoft.com/office/powerpoint/2012/main" xmlns:ahyp="http://schemas.microsoft.com/office/drawing/2018/hyperlinkcolor" matchingName="Title slide" type="title">
+<p:sldLayout xmlns:a="http://schemas.openxmlformats.org/drawingml/2006/main" xmlns:r="http://schemas.openxmlformats.org/officeDocument/2006/relationships" xmlns:p="http://schemas.openxmlformats.org/presentationml/2006/main" matchingName="Title slide" type="title">
   <p:cSld name="TITLE">
     <p:spTree>
       <p:nvGrpSpPr>
-        <p:cNvPr id="9" name="Shape 9"/>
+        <p:cNvPr id="1" name="Shape 9"/>
         <p:cNvGrpSpPr/>
         <p:nvPr/>
       </p:nvGrpSpPr>
@@ -814,7 +834,9 @@
       <p:sp>
         <p:nvSpPr>
           <p:cNvPr id="10" name="Google Shape;10;p2"/>
-          <p:cNvSpPr txBox="1"/>
+          <p:cNvSpPr txBox="1">
+            <a:spLocks noGrp="1"/>
+          </p:cNvSpPr>
           <p:nvPr>
             <p:ph type="ctrTitle"/>
           </p:nvPr>
@@ -829,7 +851,7 @@
           </a:prstGeom>
         </p:spPr>
         <p:txBody>
-          <a:bodyPr anchorCtr="0" anchor="b" bIns="91425" lIns="91425" spcFirstLastPara="1" rIns="91425" wrap="square" tIns="91425">
+          <a:bodyPr spcFirstLastPara="1" wrap="square" lIns="91425" tIns="91425" rIns="91425" bIns="91425" anchor="b" anchorCtr="0">
             <a:normAutofit/>
           </a:bodyPr>
           <a:lstStyle>
@@ -933,15 +955,19 @@
               <a:defRPr sz="5200"/>
             </a:lvl9pPr>
           </a:lstStyle>
-          <a:p/>
+          <a:p>
+            <a:endParaRPr/>
+          </a:p>
         </p:txBody>
       </p:sp>
       <p:sp>
         <p:nvSpPr>
           <p:cNvPr id="11" name="Google Shape;11;p2"/>
-          <p:cNvSpPr txBox="1"/>
+          <p:cNvSpPr txBox="1">
+            <a:spLocks noGrp="1"/>
+          </p:cNvSpPr>
           <p:nvPr>
-            <p:ph idx="1" type="subTitle"/>
+            <p:ph type="subTitle" idx="1"/>
           </p:nvPr>
         </p:nvSpPr>
         <p:spPr>
@@ -954,7 +980,7 @@
           </a:prstGeom>
         </p:spPr>
         <p:txBody>
-          <a:bodyPr anchorCtr="0" anchor="t" bIns="91425" lIns="91425" spcFirstLastPara="1" rIns="91425" wrap="square" tIns="91425">
+          <a:bodyPr spcFirstLastPara="1" wrap="square" lIns="91425" tIns="91425" rIns="91425" bIns="91425" anchor="t" anchorCtr="0">
             <a:normAutofit/>
           </a:bodyPr>
           <a:lstStyle>
@@ -1085,15 +1111,19 @@
               <a:defRPr sz="2800"/>
             </a:lvl9pPr>
           </a:lstStyle>
-          <a:p/>
+          <a:p>
+            <a:endParaRPr/>
+          </a:p>
         </p:txBody>
       </p:sp>
       <p:sp>
         <p:nvSpPr>
           <p:cNvPr id="12" name="Google Shape;12;p2"/>
-          <p:cNvSpPr txBox="1"/>
+          <p:cNvSpPr txBox="1">
+            <a:spLocks noGrp="1"/>
+          </p:cNvSpPr>
           <p:nvPr>
-            <p:ph idx="12" type="sldNum"/>
+            <p:ph type="sldNum" idx="12"/>
           </p:nvPr>
         </p:nvSpPr>
         <p:spPr>
@@ -1106,7 +1136,7 @@
           </a:prstGeom>
         </p:spPr>
         <p:txBody>
-          <a:bodyPr anchorCtr="0" anchor="ctr" bIns="91425" lIns="91425" spcFirstLastPara="1" rIns="91425" wrap="square" tIns="91425">
+          <a:bodyPr spcFirstLastPara="1" wrap="square" lIns="91425" tIns="91425" rIns="91425" bIns="91425" anchor="ctr" anchorCtr="0">
             <a:normAutofit/>
           </a:bodyPr>
           <a:lstStyle>
@@ -1148,7 +1178,7 @@
             </a:lvl9pPr>
           </a:lstStyle>
           <a:p>
-            <a:pPr indent="0" lvl="0" marL="0" rtl="0" algn="r">
+            <a:pPr marL="0" lvl="0" indent="0" algn="r" rtl="0">
               <a:spcBef>
                 <a:spcPts val="0"/>
               </a:spcBef>
@@ -1174,11 +1204,11 @@
 </file>
 
 <file path=ppt/slideLayouts/slideLayout10.xml><?xml version="1.0" encoding="utf-8"?>
-<p:sldLayout xmlns:a="http://schemas.openxmlformats.org/drawingml/2006/main" xmlns:r="http://schemas.openxmlformats.org/officeDocument/2006/relationships" xmlns:mc="http://schemas.openxmlformats.org/markup-compatibility/2006" xmlns:mv="urn:schemas-microsoft-com:mac:vml" xmlns:p="http://schemas.openxmlformats.org/presentationml/2006/main" xmlns:c="http://schemas.openxmlformats.org/drawingml/2006/chart" xmlns:dgm="http://schemas.openxmlformats.org/drawingml/2006/diagram" xmlns:o="urn:schemas-microsoft-com:office:office" xmlns:v="urn:schemas-microsoft-com:vml" xmlns:pvml="urn:schemas-microsoft-com:office:powerpoint" xmlns:com="http://schemas.openxmlformats.org/drawingml/2006/compatibility" xmlns:p14="http://schemas.microsoft.com/office/powerpoint/2010/main" xmlns:p15="http://schemas.microsoft.com/office/powerpoint/2012/main" xmlns:ahyp="http://schemas.microsoft.com/office/drawing/2018/hyperlinkcolor" matchingName="Big number">
+<p:sldLayout xmlns:a="http://schemas.openxmlformats.org/drawingml/2006/main" xmlns:r="http://schemas.openxmlformats.org/officeDocument/2006/relationships" xmlns:p="http://schemas.openxmlformats.org/presentationml/2006/main" matchingName="Big number">
   <p:cSld name="BIG_NUMBER">
     <p:spTree>
       <p:nvGrpSpPr>
-        <p:cNvPr id="44" name="Shape 44"/>
+        <p:cNvPr id="1" name="Shape 44"/>
         <p:cNvGrpSpPr/>
         <p:nvPr/>
       </p:nvGrpSpPr>
@@ -1193,9 +1223,11 @@
       <p:sp>
         <p:nvSpPr>
           <p:cNvPr id="45" name="Google Shape;45;p11"/>
-          <p:cNvSpPr txBox="1"/>
+          <p:cNvSpPr txBox="1">
+            <a:spLocks noGrp="1"/>
+          </p:cNvSpPr>
           <p:nvPr>
-            <p:ph hasCustomPrompt="1" type="title"/>
+            <p:ph type="title" hasCustomPrompt="1"/>
           </p:nvPr>
         </p:nvSpPr>
         <p:spPr>
@@ -1208,7 +1240,7 @@
           </a:prstGeom>
         </p:spPr>
         <p:txBody>
-          <a:bodyPr anchorCtr="0" anchor="b" bIns="91425" lIns="91425" spcFirstLastPara="1" rIns="91425" wrap="square" tIns="91425">
+          <a:bodyPr spcFirstLastPara="1" wrap="square" lIns="91425" tIns="91425" rIns="91425" bIns="91425" anchor="b" anchorCtr="0">
             <a:normAutofit/>
           </a:bodyPr>
           <a:lstStyle>
@@ -1322,9 +1354,11 @@
       <p:sp>
         <p:nvSpPr>
           <p:cNvPr id="46" name="Google Shape;46;p11"/>
-          <p:cNvSpPr txBox="1"/>
+          <p:cNvSpPr txBox="1">
+            <a:spLocks noGrp="1"/>
+          </p:cNvSpPr>
           <p:nvPr>
-            <p:ph idx="1" type="body"/>
+            <p:ph type="body" idx="1"/>
           </p:nvPr>
         </p:nvSpPr>
         <p:spPr>
@@ -1337,11 +1371,11 @@
           </a:prstGeom>
         </p:spPr>
         <p:txBody>
-          <a:bodyPr anchorCtr="0" anchor="t" bIns="91425" lIns="91425" spcFirstLastPara="1" rIns="91425" wrap="square" tIns="91425">
+          <a:bodyPr spcFirstLastPara="1" wrap="square" lIns="91425" tIns="91425" rIns="91425" bIns="91425" anchor="t" anchorCtr="0">
             <a:normAutofit/>
           </a:bodyPr>
           <a:lstStyle>
-            <a:lvl1pPr indent="-342900" lvl="0" marL="457200" algn="ctr">
+            <a:lvl1pPr marL="457200" lvl="0" indent="-342900" algn="ctr">
               <a:spcBef>
                 <a:spcPts val="0"/>
               </a:spcBef>
@@ -1352,7 +1386,7 @@
               <a:buChar char="●"/>
               <a:defRPr/>
             </a:lvl1pPr>
-            <a:lvl2pPr indent="-317500" lvl="1" marL="914400" algn="ctr">
+            <a:lvl2pPr marL="914400" lvl="1" indent="-317500" algn="ctr">
               <a:spcBef>
                 <a:spcPts val="0"/>
               </a:spcBef>
@@ -1363,7 +1397,7 @@
               <a:buChar char="○"/>
               <a:defRPr/>
             </a:lvl2pPr>
-            <a:lvl3pPr indent="-317500" lvl="2" marL="1371600" algn="ctr">
+            <a:lvl3pPr marL="1371600" lvl="2" indent="-317500" algn="ctr">
               <a:spcBef>
                 <a:spcPts val="0"/>
               </a:spcBef>
@@ -1374,7 +1408,7 @@
               <a:buChar char="■"/>
               <a:defRPr/>
             </a:lvl3pPr>
-            <a:lvl4pPr indent="-317500" lvl="3" marL="1828800" algn="ctr">
+            <a:lvl4pPr marL="1828800" lvl="3" indent="-317500" algn="ctr">
               <a:spcBef>
                 <a:spcPts val="0"/>
               </a:spcBef>
@@ -1385,7 +1419,7 @@
               <a:buChar char="●"/>
               <a:defRPr/>
             </a:lvl4pPr>
-            <a:lvl5pPr indent="-317500" lvl="4" marL="2286000" algn="ctr">
+            <a:lvl5pPr marL="2286000" lvl="4" indent="-317500" algn="ctr">
               <a:spcBef>
                 <a:spcPts val="0"/>
               </a:spcBef>
@@ -1396,7 +1430,7 @@
               <a:buChar char="○"/>
               <a:defRPr/>
             </a:lvl5pPr>
-            <a:lvl6pPr indent="-317500" lvl="5" marL="2743200" algn="ctr">
+            <a:lvl6pPr marL="2743200" lvl="5" indent="-317500" algn="ctr">
               <a:spcBef>
                 <a:spcPts val="0"/>
               </a:spcBef>
@@ -1407,7 +1441,7 @@
               <a:buChar char="■"/>
               <a:defRPr/>
             </a:lvl6pPr>
-            <a:lvl7pPr indent="-317500" lvl="6" marL="3200400" algn="ctr">
+            <a:lvl7pPr marL="3200400" lvl="6" indent="-317500" algn="ctr">
               <a:spcBef>
                 <a:spcPts val="0"/>
               </a:spcBef>
@@ -1418,7 +1452,7 @@
               <a:buChar char="●"/>
               <a:defRPr/>
             </a:lvl7pPr>
-            <a:lvl8pPr indent="-317500" lvl="7" marL="3657600" algn="ctr">
+            <a:lvl8pPr marL="3657600" lvl="7" indent="-317500" algn="ctr">
               <a:spcBef>
                 <a:spcPts val="0"/>
               </a:spcBef>
@@ -1429,7 +1463,7 @@
               <a:buChar char="○"/>
               <a:defRPr/>
             </a:lvl8pPr>
-            <a:lvl9pPr indent="-317500" lvl="8" marL="4114800" algn="ctr">
+            <a:lvl9pPr marL="4114800" lvl="8" indent="-317500" algn="ctr">
               <a:spcBef>
                 <a:spcPts val="0"/>
               </a:spcBef>
@@ -1441,15 +1475,19 @@
               <a:defRPr/>
             </a:lvl9pPr>
           </a:lstStyle>
-          <a:p/>
+          <a:p>
+            <a:endParaRPr/>
+          </a:p>
         </p:txBody>
       </p:sp>
       <p:sp>
         <p:nvSpPr>
           <p:cNvPr id="47" name="Google Shape;47;p11"/>
-          <p:cNvSpPr txBox="1"/>
+          <p:cNvSpPr txBox="1">
+            <a:spLocks noGrp="1"/>
+          </p:cNvSpPr>
           <p:nvPr>
-            <p:ph idx="12" type="sldNum"/>
+            <p:ph type="sldNum" idx="12"/>
           </p:nvPr>
         </p:nvSpPr>
         <p:spPr>
@@ -1462,7 +1500,7 @@
           </a:prstGeom>
         </p:spPr>
         <p:txBody>
-          <a:bodyPr anchorCtr="0" anchor="ctr" bIns="91425" lIns="91425" spcFirstLastPara="1" rIns="91425" wrap="square" tIns="91425">
+          <a:bodyPr spcFirstLastPara="1" wrap="square" lIns="91425" tIns="91425" rIns="91425" bIns="91425" anchor="ctr" anchorCtr="0">
             <a:normAutofit/>
           </a:bodyPr>
           <a:lstStyle>
@@ -1504,7 +1542,7 @@
             </a:lvl9pPr>
           </a:lstStyle>
           <a:p>
-            <a:pPr indent="0" lvl="0" marL="0" rtl="0" algn="r">
+            <a:pPr marL="0" lvl="0" indent="0" algn="r" rtl="0">
               <a:spcBef>
                 <a:spcPts val="0"/>
               </a:spcBef>
@@ -1530,11 +1568,11 @@
 </file>
 
 <file path=ppt/slideLayouts/slideLayout11.xml><?xml version="1.0" encoding="utf-8"?>
-<p:sldLayout xmlns:a="http://schemas.openxmlformats.org/drawingml/2006/main" xmlns:r="http://schemas.openxmlformats.org/officeDocument/2006/relationships" xmlns:mc="http://schemas.openxmlformats.org/markup-compatibility/2006" xmlns:mv="urn:schemas-microsoft-com:mac:vml" xmlns:p="http://schemas.openxmlformats.org/presentationml/2006/main" xmlns:c="http://schemas.openxmlformats.org/drawingml/2006/chart" xmlns:dgm="http://schemas.openxmlformats.org/drawingml/2006/diagram" xmlns:o="urn:schemas-microsoft-com:office:office" xmlns:v="urn:schemas-microsoft-com:vml" xmlns:pvml="urn:schemas-microsoft-com:office:powerpoint" xmlns:com="http://schemas.openxmlformats.org/drawingml/2006/compatibility" xmlns:p14="http://schemas.microsoft.com/office/powerpoint/2010/main" xmlns:p15="http://schemas.microsoft.com/office/powerpoint/2012/main" xmlns:ahyp="http://schemas.microsoft.com/office/drawing/2018/hyperlinkcolor" matchingName="Blank" type="blank">
+<p:sldLayout xmlns:a="http://schemas.openxmlformats.org/drawingml/2006/main" xmlns:r="http://schemas.openxmlformats.org/officeDocument/2006/relationships" xmlns:p="http://schemas.openxmlformats.org/presentationml/2006/main" matchingName="Blank" type="blank">
   <p:cSld name="BLANK">
     <p:spTree>
       <p:nvGrpSpPr>
-        <p:cNvPr id="48" name="Shape 48"/>
+        <p:cNvPr id="1" name="Shape 48"/>
         <p:cNvGrpSpPr/>
         <p:nvPr/>
       </p:nvGrpSpPr>
@@ -1549,9 +1587,11 @@
       <p:sp>
         <p:nvSpPr>
           <p:cNvPr id="49" name="Google Shape;49;p12"/>
-          <p:cNvSpPr txBox="1"/>
+          <p:cNvSpPr txBox="1">
+            <a:spLocks noGrp="1"/>
+          </p:cNvSpPr>
           <p:nvPr>
-            <p:ph idx="12" type="sldNum"/>
+            <p:ph type="sldNum" idx="12"/>
           </p:nvPr>
         </p:nvSpPr>
         <p:spPr>
@@ -1564,7 +1604,7 @@
           </a:prstGeom>
         </p:spPr>
         <p:txBody>
-          <a:bodyPr anchorCtr="0" anchor="ctr" bIns="91425" lIns="91425" spcFirstLastPara="1" rIns="91425" wrap="square" tIns="91425">
+          <a:bodyPr spcFirstLastPara="1" wrap="square" lIns="91425" tIns="91425" rIns="91425" bIns="91425" anchor="ctr" anchorCtr="0">
             <a:normAutofit/>
           </a:bodyPr>
           <a:lstStyle>
@@ -1606,7 +1646,7 @@
             </a:lvl9pPr>
           </a:lstStyle>
           <a:p>
-            <a:pPr indent="0" lvl="0" marL="0" rtl="0" algn="r">
+            <a:pPr marL="0" lvl="0" indent="0" algn="r" rtl="0">
               <a:spcBef>
                 <a:spcPts val="0"/>
               </a:spcBef>
@@ -1632,11 +1672,11 @@
 </file>
 
 <file path=ppt/slideLayouts/slideLayout2.xml><?xml version="1.0" encoding="utf-8"?>
-<p:sldLayout xmlns:a="http://schemas.openxmlformats.org/drawingml/2006/main" xmlns:r="http://schemas.openxmlformats.org/officeDocument/2006/relationships" xmlns:mc="http://schemas.openxmlformats.org/markup-compatibility/2006" xmlns:mv="urn:schemas-microsoft-com:mac:vml" xmlns:p="http://schemas.openxmlformats.org/presentationml/2006/main" xmlns:c="http://schemas.openxmlformats.org/drawingml/2006/chart" xmlns:dgm="http://schemas.openxmlformats.org/drawingml/2006/diagram" xmlns:o="urn:schemas-microsoft-com:office:office" xmlns:v="urn:schemas-microsoft-com:vml" xmlns:pvml="urn:schemas-microsoft-com:office:powerpoint" xmlns:com="http://schemas.openxmlformats.org/drawingml/2006/compatibility" xmlns:p14="http://schemas.microsoft.com/office/powerpoint/2010/main" xmlns:p15="http://schemas.microsoft.com/office/powerpoint/2012/main" xmlns:ahyp="http://schemas.microsoft.com/office/drawing/2018/hyperlinkcolor" matchingName="Section header" type="secHead">
+<p:sldLayout xmlns:a="http://schemas.openxmlformats.org/drawingml/2006/main" xmlns:r="http://schemas.openxmlformats.org/officeDocument/2006/relationships" xmlns:p="http://schemas.openxmlformats.org/presentationml/2006/main" matchingName="Section header" type="secHead">
   <p:cSld name="SECTION_HEADER">
     <p:spTree>
       <p:nvGrpSpPr>
-        <p:cNvPr id="13" name="Shape 13"/>
+        <p:cNvPr id="1" name="Shape 13"/>
         <p:cNvGrpSpPr/>
         <p:nvPr/>
       </p:nvGrpSpPr>
@@ -1651,7 +1691,9 @@
       <p:sp>
         <p:nvSpPr>
           <p:cNvPr id="14" name="Google Shape;14;p3"/>
-          <p:cNvSpPr txBox="1"/>
+          <p:cNvSpPr txBox="1">
+            <a:spLocks noGrp="1"/>
+          </p:cNvSpPr>
           <p:nvPr>
             <p:ph type="title"/>
           </p:nvPr>
@@ -1666,7 +1708,7 @@
           </a:prstGeom>
         </p:spPr>
         <p:txBody>
-          <a:bodyPr anchorCtr="0" anchor="ctr" bIns="91425" lIns="91425" spcFirstLastPara="1" rIns="91425" wrap="square" tIns="91425">
+          <a:bodyPr spcFirstLastPara="1" wrap="square" lIns="91425" tIns="91425" rIns="91425" bIns="91425" anchor="ctr" anchorCtr="0">
             <a:normAutofit/>
           </a:bodyPr>
           <a:lstStyle>
@@ -1770,15 +1812,19 @@
               <a:defRPr sz="3600"/>
             </a:lvl9pPr>
           </a:lstStyle>
-          <a:p/>
+          <a:p>
+            <a:endParaRPr/>
+          </a:p>
         </p:txBody>
       </p:sp>
       <p:sp>
         <p:nvSpPr>
           <p:cNvPr id="15" name="Google Shape;15;p3"/>
-          <p:cNvSpPr txBox="1"/>
+          <p:cNvSpPr txBox="1">
+            <a:spLocks noGrp="1"/>
+          </p:cNvSpPr>
           <p:nvPr>
-            <p:ph idx="12" type="sldNum"/>
+            <p:ph type="sldNum" idx="12"/>
           </p:nvPr>
         </p:nvSpPr>
         <p:spPr>
@@ -1791,7 +1837,7 @@
           </a:prstGeom>
         </p:spPr>
         <p:txBody>
-          <a:bodyPr anchorCtr="0" anchor="ctr" bIns="91425" lIns="91425" spcFirstLastPara="1" rIns="91425" wrap="square" tIns="91425">
+          <a:bodyPr spcFirstLastPara="1" wrap="square" lIns="91425" tIns="91425" rIns="91425" bIns="91425" anchor="ctr" anchorCtr="0">
             <a:normAutofit/>
           </a:bodyPr>
           <a:lstStyle>
@@ -1833,7 +1879,7 @@
             </a:lvl9pPr>
           </a:lstStyle>
           <a:p>
-            <a:pPr indent="0" lvl="0" marL="0" rtl="0" algn="r">
+            <a:pPr marL="0" lvl="0" indent="0" algn="r" rtl="0">
               <a:spcBef>
                 <a:spcPts val="0"/>
               </a:spcBef>
@@ -1859,11 +1905,11 @@
 </file>
 
 <file path=ppt/slideLayouts/slideLayout3.xml><?xml version="1.0" encoding="utf-8"?>
-<p:sldLayout xmlns:a="http://schemas.openxmlformats.org/drawingml/2006/main" xmlns:r="http://schemas.openxmlformats.org/officeDocument/2006/relationships" xmlns:mc="http://schemas.openxmlformats.org/markup-compatibility/2006" xmlns:mv="urn:schemas-microsoft-com:mac:vml" xmlns:p="http://schemas.openxmlformats.org/presentationml/2006/main" xmlns:c="http://schemas.openxmlformats.org/drawingml/2006/chart" xmlns:dgm="http://schemas.openxmlformats.org/drawingml/2006/diagram" xmlns:o="urn:schemas-microsoft-com:office:office" xmlns:v="urn:schemas-microsoft-com:vml" xmlns:pvml="urn:schemas-microsoft-com:office:powerpoint" xmlns:com="http://schemas.openxmlformats.org/drawingml/2006/compatibility" xmlns:p14="http://schemas.microsoft.com/office/powerpoint/2010/main" xmlns:p15="http://schemas.microsoft.com/office/powerpoint/2012/main" xmlns:ahyp="http://schemas.microsoft.com/office/drawing/2018/hyperlinkcolor" matchingName="Title and body" type="tx">
+<p:sldLayout xmlns:a="http://schemas.openxmlformats.org/drawingml/2006/main" xmlns:r="http://schemas.openxmlformats.org/officeDocument/2006/relationships" xmlns:p="http://schemas.openxmlformats.org/presentationml/2006/main" matchingName="Title and body" type="tx">
   <p:cSld name="TITLE_AND_BODY">
     <p:spTree>
       <p:nvGrpSpPr>
-        <p:cNvPr id="16" name="Shape 16"/>
+        <p:cNvPr id="1" name="Shape 16"/>
         <p:cNvGrpSpPr/>
         <p:nvPr/>
       </p:nvGrpSpPr>
@@ -1878,7 +1924,9 @@
       <p:sp>
         <p:nvSpPr>
           <p:cNvPr id="17" name="Google Shape;17;p4"/>
-          <p:cNvSpPr txBox="1"/>
+          <p:cNvSpPr txBox="1">
+            <a:spLocks noGrp="1"/>
+          </p:cNvSpPr>
           <p:nvPr>
             <p:ph type="title"/>
           </p:nvPr>
@@ -1893,7 +1941,7 @@
           </a:prstGeom>
         </p:spPr>
         <p:txBody>
-          <a:bodyPr anchorCtr="0" anchor="t" bIns="91425" lIns="91425" spcFirstLastPara="1" rIns="91425" wrap="square" tIns="91425">
+          <a:bodyPr spcFirstLastPara="1" wrap="square" lIns="91425" tIns="91425" rIns="91425" bIns="91425" anchor="t" anchorCtr="0">
             <a:normAutofit/>
           </a:bodyPr>
           <a:lstStyle>
@@ -1997,15 +2045,19 @@
               <a:defRPr/>
             </a:lvl9pPr>
           </a:lstStyle>
-          <a:p/>
+          <a:p>
+            <a:endParaRPr/>
+          </a:p>
         </p:txBody>
       </p:sp>
       <p:sp>
         <p:nvSpPr>
           <p:cNvPr id="18" name="Google Shape;18;p4"/>
-          <p:cNvSpPr txBox="1"/>
+          <p:cNvSpPr txBox="1">
+            <a:spLocks noGrp="1"/>
+          </p:cNvSpPr>
           <p:nvPr>
-            <p:ph idx="1" type="body"/>
+            <p:ph type="body" idx="1"/>
           </p:nvPr>
         </p:nvSpPr>
         <p:spPr>
@@ -2018,11 +2070,11 @@
           </a:prstGeom>
         </p:spPr>
         <p:txBody>
-          <a:bodyPr anchorCtr="0" anchor="t" bIns="91425" lIns="91425" spcFirstLastPara="1" rIns="91425" wrap="square" tIns="91425">
+          <a:bodyPr spcFirstLastPara="1" wrap="square" lIns="91425" tIns="91425" rIns="91425" bIns="91425" anchor="t" anchorCtr="0">
             <a:normAutofit/>
           </a:bodyPr>
           <a:lstStyle>
-            <a:lvl1pPr indent="-342900" lvl="0" marL="457200">
+            <a:lvl1pPr marL="457200" lvl="0" indent="-342900">
               <a:spcBef>
                 <a:spcPts val="0"/>
               </a:spcBef>
@@ -2033,7 +2085,7 @@
               <a:buChar char="●"/>
               <a:defRPr/>
             </a:lvl1pPr>
-            <a:lvl2pPr indent="-317500" lvl="1" marL="914400">
+            <a:lvl2pPr marL="914400" lvl="1" indent="-317500">
               <a:spcBef>
                 <a:spcPts val="0"/>
               </a:spcBef>
@@ -2044,7 +2096,7 @@
               <a:buChar char="○"/>
               <a:defRPr/>
             </a:lvl2pPr>
-            <a:lvl3pPr indent="-317500" lvl="2" marL="1371600">
+            <a:lvl3pPr marL="1371600" lvl="2" indent="-317500">
               <a:spcBef>
                 <a:spcPts val="0"/>
               </a:spcBef>
@@ -2055,7 +2107,7 @@
               <a:buChar char="■"/>
               <a:defRPr/>
             </a:lvl3pPr>
-            <a:lvl4pPr indent="-317500" lvl="3" marL="1828800">
+            <a:lvl4pPr marL="1828800" lvl="3" indent="-317500">
               <a:spcBef>
                 <a:spcPts val="0"/>
               </a:spcBef>
@@ -2066,7 +2118,7 @@
               <a:buChar char="●"/>
               <a:defRPr/>
             </a:lvl4pPr>
-            <a:lvl5pPr indent="-317500" lvl="4" marL="2286000">
+            <a:lvl5pPr marL="2286000" lvl="4" indent="-317500">
               <a:spcBef>
                 <a:spcPts val="0"/>
               </a:spcBef>
@@ -2077,7 +2129,7 @@
               <a:buChar char="○"/>
               <a:defRPr/>
             </a:lvl5pPr>
-            <a:lvl6pPr indent="-317500" lvl="5" marL="2743200">
+            <a:lvl6pPr marL="2743200" lvl="5" indent="-317500">
               <a:spcBef>
                 <a:spcPts val="0"/>
               </a:spcBef>
@@ -2088,7 +2140,7 @@
               <a:buChar char="■"/>
               <a:defRPr/>
             </a:lvl6pPr>
-            <a:lvl7pPr indent="-317500" lvl="6" marL="3200400">
+            <a:lvl7pPr marL="3200400" lvl="6" indent="-317500">
               <a:spcBef>
                 <a:spcPts val="0"/>
               </a:spcBef>
@@ -2099,7 +2151,7 @@
               <a:buChar char="●"/>
               <a:defRPr/>
             </a:lvl7pPr>
-            <a:lvl8pPr indent="-317500" lvl="7" marL="3657600">
+            <a:lvl8pPr marL="3657600" lvl="7" indent="-317500">
               <a:spcBef>
                 <a:spcPts val="0"/>
               </a:spcBef>
@@ -2110,7 +2162,7 @@
               <a:buChar char="○"/>
               <a:defRPr/>
             </a:lvl8pPr>
-            <a:lvl9pPr indent="-317500" lvl="8" marL="4114800">
+            <a:lvl9pPr marL="4114800" lvl="8" indent="-317500">
               <a:spcBef>
                 <a:spcPts val="0"/>
               </a:spcBef>
@@ -2122,15 +2174,19 @@
               <a:defRPr/>
             </a:lvl9pPr>
           </a:lstStyle>
-          <a:p/>
+          <a:p>
+            <a:endParaRPr/>
+          </a:p>
         </p:txBody>
       </p:sp>
       <p:sp>
         <p:nvSpPr>
           <p:cNvPr id="19" name="Google Shape;19;p4"/>
-          <p:cNvSpPr txBox="1"/>
+          <p:cNvSpPr txBox="1">
+            <a:spLocks noGrp="1"/>
+          </p:cNvSpPr>
           <p:nvPr>
-            <p:ph idx="12" type="sldNum"/>
+            <p:ph type="sldNum" idx="12"/>
           </p:nvPr>
         </p:nvSpPr>
         <p:spPr>
@@ -2143,7 +2199,7 @@
           </a:prstGeom>
         </p:spPr>
         <p:txBody>
-          <a:bodyPr anchorCtr="0" anchor="ctr" bIns="91425" lIns="91425" spcFirstLastPara="1" rIns="91425" wrap="square" tIns="91425">
+          <a:bodyPr spcFirstLastPara="1" wrap="square" lIns="91425" tIns="91425" rIns="91425" bIns="91425" anchor="ctr" anchorCtr="0">
             <a:normAutofit/>
           </a:bodyPr>
           <a:lstStyle>
@@ -2185,7 +2241,7 @@
             </a:lvl9pPr>
           </a:lstStyle>
           <a:p>
-            <a:pPr indent="0" lvl="0" marL="0" rtl="0" algn="r">
+            <a:pPr marL="0" lvl="0" indent="0" algn="r" rtl="0">
               <a:spcBef>
                 <a:spcPts val="0"/>
               </a:spcBef>
@@ -2211,11 +2267,11 @@
 </file>
 
 <file path=ppt/slideLayouts/slideLayout4.xml><?xml version="1.0" encoding="utf-8"?>
-<p:sldLayout xmlns:a="http://schemas.openxmlformats.org/drawingml/2006/main" xmlns:r="http://schemas.openxmlformats.org/officeDocument/2006/relationships" xmlns:mc="http://schemas.openxmlformats.org/markup-compatibility/2006" xmlns:mv="urn:schemas-microsoft-com:mac:vml" xmlns:p="http://schemas.openxmlformats.org/presentationml/2006/main" xmlns:c="http://schemas.openxmlformats.org/drawingml/2006/chart" xmlns:dgm="http://schemas.openxmlformats.org/drawingml/2006/diagram" xmlns:o="urn:schemas-microsoft-com:office:office" xmlns:v="urn:schemas-microsoft-com:vml" xmlns:pvml="urn:schemas-microsoft-com:office:powerpoint" xmlns:com="http://schemas.openxmlformats.org/drawingml/2006/compatibility" xmlns:p14="http://schemas.microsoft.com/office/powerpoint/2010/main" xmlns:p15="http://schemas.microsoft.com/office/powerpoint/2012/main" xmlns:ahyp="http://schemas.microsoft.com/office/drawing/2018/hyperlinkcolor" matchingName="Title and two columns" type="twoColTx">
+<p:sldLayout xmlns:a="http://schemas.openxmlformats.org/drawingml/2006/main" xmlns:r="http://schemas.openxmlformats.org/officeDocument/2006/relationships" xmlns:p="http://schemas.openxmlformats.org/presentationml/2006/main" matchingName="Title and two columns" type="twoColTx">
   <p:cSld name="TITLE_AND_TWO_COLUMNS">
     <p:spTree>
       <p:nvGrpSpPr>
-        <p:cNvPr id="20" name="Shape 20"/>
+        <p:cNvPr id="1" name="Shape 20"/>
         <p:cNvGrpSpPr/>
         <p:nvPr/>
       </p:nvGrpSpPr>
@@ -2230,7 +2286,9 @@
       <p:sp>
         <p:nvSpPr>
           <p:cNvPr id="21" name="Google Shape;21;p5"/>
-          <p:cNvSpPr txBox="1"/>
+          <p:cNvSpPr txBox="1">
+            <a:spLocks noGrp="1"/>
+          </p:cNvSpPr>
           <p:nvPr>
             <p:ph type="title"/>
           </p:nvPr>
@@ -2245,7 +2303,7 @@
           </a:prstGeom>
         </p:spPr>
         <p:txBody>
-          <a:bodyPr anchorCtr="0" anchor="t" bIns="91425" lIns="91425" spcFirstLastPara="1" rIns="91425" wrap="square" tIns="91425">
+          <a:bodyPr spcFirstLastPara="1" wrap="square" lIns="91425" tIns="91425" rIns="91425" bIns="91425" anchor="t" anchorCtr="0">
             <a:normAutofit/>
           </a:bodyPr>
           <a:lstStyle>
@@ -2349,15 +2407,19 @@
               <a:defRPr/>
             </a:lvl9pPr>
           </a:lstStyle>
-          <a:p/>
+          <a:p>
+            <a:endParaRPr/>
+          </a:p>
         </p:txBody>
       </p:sp>
       <p:sp>
         <p:nvSpPr>
           <p:cNvPr id="22" name="Google Shape;22;p5"/>
-          <p:cNvSpPr txBox="1"/>
+          <p:cNvSpPr txBox="1">
+            <a:spLocks noGrp="1"/>
+          </p:cNvSpPr>
           <p:nvPr>
-            <p:ph idx="1" type="body"/>
+            <p:ph type="body" idx="1"/>
           </p:nvPr>
         </p:nvSpPr>
         <p:spPr>
@@ -2370,11 +2432,11 @@
           </a:prstGeom>
         </p:spPr>
         <p:txBody>
-          <a:bodyPr anchorCtr="0" anchor="t" bIns="91425" lIns="91425" spcFirstLastPara="1" rIns="91425" wrap="square" tIns="91425">
+          <a:bodyPr spcFirstLastPara="1" wrap="square" lIns="91425" tIns="91425" rIns="91425" bIns="91425" anchor="t" anchorCtr="0">
             <a:normAutofit/>
           </a:bodyPr>
           <a:lstStyle>
-            <a:lvl1pPr indent="-317500" lvl="0" marL="457200">
+            <a:lvl1pPr marL="457200" lvl="0" indent="-317500">
               <a:spcBef>
                 <a:spcPts val="0"/>
               </a:spcBef>
@@ -2385,7 +2447,7 @@
               <a:buChar char="●"/>
               <a:defRPr sz="1400"/>
             </a:lvl1pPr>
-            <a:lvl2pPr indent="-304800" lvl="1" marL="914400">
+            <a:lvl2pPr marL="914400" lvl="1" indent="-304800">
               <a:spcBef>
                 <a:spcPts val="0"/>
               </a:spcBef>
@@ -2396,7 +2458,7 @@
               <a:buChar char="○"/>
               <a:defRPr sz="1200"/>
             </a:lvl2pPr>
-            <a:lvl3pPr indent="-304800" lvl="2" marL="1371600">
+            <a:lvl3pPr marL="1371600" lvl="2" indent="-304800">
               <a:spcBef>
                 <a:spcPts val="0"/>
               </a:spcBef>
@@ -2407,7 +2469,7 @@
               <a:buChar char="■"/>
               <a:defRPr sz="1200"/>
             </a:lvl3pPr>
-            <a:lvl4pPr indent="-304800" lvl="3" marL="1828800">
+            <a:lvl4pPr marL="1828800" lvl="3" indent="-304800">
               <a:spcBef>
                 <a:spcPts val="0"/>
               </a:spcBef>
@@ -2418,7 +2480,7 @@
               <a:buChar char="●"/>
               <a:defRPr sz="1200"/>
             </a:lvl4pPr>
-            <a:lvl5pPr indent="-304800" lvl="4" marL="2286000">
+            <a:lvl5pPr marL="2286000" lvl="4" indent="-304800">
               <a:spcBef>
                 <a:spcPts val="0"/>
               </a:spcBef>
@@ -2429,7 +2491,7 @@
               <a:buChar char="○"/>
               <a:defRPr sz="1200"/>
             </a:lvl5pPr>
-            <a:lvl6pPr indent="-304800" lvl="5" marL="2743200">
+            <a:lvl6pPr marL="2743200" lvl="5" indent="-304800">
               <a:spcBef>
                 <a:spcPts val="0"/>
               </a:spcBef>
@@ -2440,7 +2502,7 @@
               <a:buChar char="■"/>
               <a:defRPr sz="1200"/>
             </a:lvl6pPr>
-            <a:lvl7pPr indent="-304800" lvl="6" marL="3200400">
+            <a:lvl7pPr marL="3200400" lvl="6" indent="-304800">
               <a:spcBef>
                 <a:spcPts val="0"/>
               </a:spcBef>
@@ -2451,7 +2513,7 @@
               <a:buChar char="●"/>
               <a:defRPr sz="1200"/>
             </a:lvl7pPr>
-            <a:lvl8pPr indent="-304800" lvl="7" marL="3657600">
+            <a:lvl8pPr marL="3657600" lvl="7" indent="-304800">
               <a:spcBef>
                 <a:spcPts val="0"/>
               </a:spcBef>
@@ -2462,7 +2524,7 @@
               <a:buChar char="○"/>
               <a:defRPr sz="1200"/>
             </a:lvl8pPr>
-            <a:lvl9pPr indent="-304800" lvl="8" marL="4114800">
+            <a:lvl9pPr marL="4114800" lvl="8" indent="-304800">
               <a:spcBef>
                 <a:spcPts val="0"/>
               </a:spcBef>
@@ -2474,15 +2536,19 @@
               <a:defRPr sz="1200"/>
             </a:lvl9pPr>
           </a:lstStyle>
-          <a:p/>
+          <a:p>
+            <a:endParaRPr/>
+          </a:p>
         </p:txBody>
       </p:sp>
       <p:sp>
         <p:nvSpPr>
           <p:cNvPr id="23" name="Google Shape;23;p5"/>
-          <p:cNvSpPr txBox="1"/>
+          <p:cNvSpPr txBox="1">
+            <a:spLocks noGrp="1"/>
+          </p:cNvSpPr>
           <p:nvPr>
-            <p:ph idx="2" type="body"/>
+            <p:ph type="body" idx="2"/>
           </p:nvPr>
         </p:nvSpPr>
         <p:spPr>
@@ -2495,11 +2561,11 @@
           </a:prstGeom>
         </p:spPr>
         <p:txBody>
-          <a:bodyPr anchorCtr="0" anchor="t" bIns="91425" lIns="91425" spcFirstLastPara="1" rIns="91425" wrap="square" tIns="91425">
+          <a:bodyPr spcFirstLastPara="1" wrap="square" lIns="91425" tIns="91425" rIns="91425" bIns="91425" anchor="t" anchorCtr="0">
             <a:normAutofit/>
           </a:bodyPr>
           <a:lstStyle>
-            <a:lvl1pPr indent="-317500" lvl="0" marL="457200">
+            <a:lvl1pPr marL="457200" lvl="0" indent="-317500">
               <a:spcBef>
                 <a:spcPts val="0"/>
               </a:spcBef>
@@ -2510,7 +2576,7 @@
               <a:buChar char="●"/>
               <a:defRPr sz="1400"/>
             </a:lvl1pPr>
-            <a:lvl2pPr indent="-304800" lvl="1" marL="914400">
+            <a:lvl2pPr marL="914400" lvl="1" indent="-304800">
               <a:spcBef>
                 <a:spcPts val="0"/>
               </a:spcBef>
@@ -2521,7 +2587,7 @@
               <a:buChar char="○"/>
               <a:defRPr sz="1200"/>
             </a:lvl2pPr>
-            <a:lvl3pPr indent="-304800" lvl="2" marL="1371600">
+            <a:lvl3pPr marL="1371600" lvl="2" indent="-304800">
               <a:spcBef>
                 <a:spcPts val="0"/>
               </a:spcBef>
@@ -2532,7 +2598,7 @@
               <a:buChar char="■"/>
               <a:defRPr sz="1200"/>
             </a:lvl3pPr>
-            <a:lvl4pPr indent="-304800" lvl="3" marL="1828800">
+            <a:lvl4pPr marL="1828800" lvl="3" indent="-304800">
               <a:spcBef>
                 <a:spcPts val="0"/>
               </a:spcBef>
@@ -2543,7 +2609,7 @@
               <a:buChar char="●"/>
               <a:defRPr sz="1200"/>
             </a:lvl4pPr>
-            <a:lvl5pPr indent="-304800" lvl="4" marL="2286000">
+            <a:lvl5pPr marL="2286000" lvl="4" indent="-304800">
               <a:spcBef>
                 <a:spcPts val="0"/>
               </a:spcBef>
@@ -2554,7 +2620,7 @@
               <a:buChar char="○"/>
               <a:defRPr sz="1200"/>
             </a:lvl5pPr>
-            <a:lvl6pPr indent="-304800" lvl="5" marL="2743200">
+            <a:lvl6pPr marL="2743200" lvl="5" indent="-304800">
               <a:spcBef>
                 <a:spcPts val="0"/>
               </a:spcBef>
@@ -2565,7 +2631,7 @@
               <a:buChar char="■"/>
               <a:defRPr sz="1200"/>
             </a:lvl6pPr>
-            <a:lvl7pPr indent="-304800" lvl="6" marL="3200400">
+            <a:lvl7pPr marL="3200400" lvl="6" indent="-304800">
               <a:spcBef>
                 <a:spcPts val="0"/>
               </a:spcBef>
@@ -2576,7 +2642,7 @@
               <a:buChar char="●"/>
               <a:defRPr sz="1200"/>
             </a:lvl7pPr>
-            <a:lvl8pPr indent="-304800" lvl="7" marL="3657600">
+            <a:lvl8pPr marL="3657600" lvl="7" indent="-304800">
               <a:spcBef>
                 <a:spcPts val="0"/>
               </a:spcBef>
@@ -2587,7 +2653,7 @@
               <a:buChar char="○"/>
               <a:defRPr sz="1200"/>
             </a:lvl8pPr>
-            <a:lvl9pPr indent="-304800" lvl="8" marL="4114800">
+            <a:lvl9pPr marL="4114800" lvl="8" indent="-304800">
               <a:spcBef>
                 <a:spcPts val="0"/>
               </a:spcBef>
@@ -2599,15 +2665,19 @@
               <a:defRPr sz="1200"/>
             </a:lvl9pPr>
           </a:lstStyle>
-          <a:p/>
+          <a:p>
+            <a:endParaRPr/>
+          </a:p>
         </p:txBody>
       </p:sp>
       <p:sp>
         <p:nvSpPr>
           <p:cNvPr id="24" name="Google Shape;24;p5"/>
-          <p:cNvSpPr txBox="1"/>
+          <p:cNvSpPr txBox="1">
+            <a:spLocks noGrp="1"/>
+          </p:cNvSpPr>
           <p:nvPr>
-            <p:ph idx="12" type="sldNum"/>
+            <p:ph type="sldNum" idx="12"/>
           </p:nvPr>
         </p:nvSpPr>
         <p:spPr>
@@ -2620,7 +2690,7 @@
           </a:prstGeom>
         </p:spPr>
         <p:txBody>
-          <a:bodyPr anchorCtr="0" anchor="ctr" bIns="91425" lIns="91425" spcFirstLastPara="1" rIns="91425" wrap="square" tIns="91425">
+          <a:bodyPr spcFirstLastPara="1" wrap="square" lIns="91425" tIns="91425" rIns="91425" bIns="91425" anchor="ctr" anchorCtr="0">
             <a:normAutofit/>
           </a:bodyPr>
           <a:lstStyle>
@@ -2662,7 +2732,7 @@
             </a:lvl9pPr>
           </a:lstStyle>
           <a:p>
-            <a:pPr indent="0" lvl="0" marL="0" rtl="0" algn="r">
+            <a:pPr marL="0" lvl="0" indent="0" algn="r" rtl="0">
               <a:spcBef>
                 <a:spcPts val="0"/>
               </a:spcBef>
@@ -2688,11 +2758,11 @@
 </file>
 
 <file path=ppt/slideLayouts/slideLayout5.xml><?xml version="1.0" encoding="utf-8"?>
-<p:sldLayout xmlns:a="http://schemas.openxmlformats.org/drawingml/2006/main" xmlns:r="http://schemas.openxmlformats.org/officeDocument/2006/relationships" xmlns:mc="http://schemas.openxmlformats.org/markup-compatibility/2006" xmlns:mv="urn:schemas-microsoft-com:mac:vml" xmlns:p="http://schemas.openxmlformats.org/presentationml/2006/main" xmlns:c="http://schemas.openxmlformats.org/drawingml/2006/chart" xmlns:dgm="http://schemas.openxmlformats.org/drawingml/2006/diagram" xmlns:o="urn:schemas-microsoft-com:office:office" xmlns:v="urn:schemas-microsoft-com:vml" xmlns:pvml="urn:schemas-microsoft-com:office:powerpoint" xmlns:com="http://schemas.openxmlformats.org/drawingml/2006/compatibility" xmlns:p14="http://schemas.microsoft.com/office/powerpoint/2010/main" xmlns:p15="http://schemas.microsoft.com/office/powerpoint/2012/main" xmlns:ahyp="http://schemas.microsoft.com/office/drawing/2018/hyperlinkcolor" matchingName="Title only" type="titleOnly">
+<p:sldLayout xmlns:a="http://schemas.openxmlformats.org/drawingml/2006/main" xmlns:r="http://schemas.openxmlformats.org/officeDocument/2006/relationships" xmlns:p="http://schemas.openxmlformats.org/presentationml/2006/main" matchingName="Title only" type="titleOnly">
   <p:cSld name="TITLE_ONLY">
     <p:spTree>
       <p:nvGrpSpPr>
-        <p:cNvPr id="25" name="Shape 25"/>
+        <p:cNvPr id="1" name="Shape 25"/>
         <p:cNvGrpSpPr/>
         <p:nvPr/>
       </p:nvGrpSpPr>
@@ -2707,7 +2777,9 @@
       <p:sp>
         <p:nvSpPr>
           <p:cNvPr id="26" name="Google Shape;26;p6"/>
-          <p:cNvSpPr txBox="1"/>
+          <p:cNvSpPr txBox="1">
+            <a:spLocks noGrp="1"/>
+          </p:cNvSpPr>
           <p:nvPr>
             <p:ph type="title"/>
           </p:nvPr>
@@ -2722,7 +2794,7 @@
           </a:prstGeom>
         </p:spPr>
         <p:txBody>
-          <a:bodyPr anchorCtr="0" anchor="t" bIns="91425" lIns="91425" spcFirstLastPara="1" rIns="91425" wrap="square" tIns="91425">
+          <a:bodyPr spcFirstLastPara="1" wrap="square" lIns="91425" tIns="91425" rIns="91425" bIns="91425" anchor="t" anchorCtr="0">
             <a:normAutofit/>
           </a:bodyPr>
           <a:lstStyle>
@@ -2826,15 +2898,19 @@
               <a:defRPr/>
             </a:lvl9pPr>
           </a:lstStyle>
-          <a:p/>
+          <a:p>
+            <a:endParaRPr/>
+          </a:p>
         </p:txBody>
       </p:sp>
       <p:sp>
         <p:nvSpPr>
           <p:cNvPr id="27" name="Google Shape;27;p6"/>
-          <p:cNvSpPr txBox="1"/>
+          <p:cNvSpPr txBox="1">
+            <a:spLocks noGrp="1"/>
+          </p:cNvSpPr>
           <p:nvPr>
-            <p:ph idx="12" type="sldNum"/>
+            <p:ph type="sldNum" idx="12"/>
           </p:nvPr>
         </p:nvSpPr>
         <p:spPr>
@@ -2847,7 +2923,7 @@
           </a:prstGeom>
         </p:spPr>
         <p:txBody>
-          <a:bodyPr anchorCtr="0" anchor="ctr" bIns="91425" lIns="91425" spcFirstLastPara="1" rIns="91425" wrap="square" tIns="91425">
+          <a:bodyPr spcFirstLastPara="1" wrap="square" lIns="91425" tIns="91425" rIns="91425" bIns="91425" anchor="ctr" anchorCtr="0">
             <a:normAutofit/>
           </a:bodyPr>
           <a:lstStyle>
@@ -2889,7 +2965,7 @@
             </a:lvl9pPr>
           </a:lstStyle>
           <a:p>
-            <a:pPr indent="0" lvl="0" marL="0" rtl="0" algn="r">
+            <a:pPr marL="0" lvl="0" indent="0" algn="r" rtl="0">
               <a:spcBef>
                 <a:spcPts val="0"/>
               </a:spcBef>
@@ -2915,11 +2991,11 @@
 </file>
 
 <file path=ppt/slideLayouts/slideLayout6.xml><?xml version="1.0" encoding="utf-8"?>
-<p:sldLayout xmlns:a="http://schemas.openxmlformats.org/drawingml/2006/main" xmlns:r="http://schemas.openxmlformats.org/officeDocument/2006/relationships" xmlns:mc="http://schemas.openxmlformats.org/markup-compatibility/2006" xmlns:mv="urn:schemas-microsoft-com:mac:vml" xmlns:p="http://schemas.openxmlformats.org/presentationml/2006/main" xmlns:c="http://schemas.openxmlformats.org/drawingml/2006/chart" xmlns:dgm="http://schemas.openxmlformats.org/drawingml/2006/diagram" xmlns:o="urn:schemas-microsoft-com:office:office" xmlns:v="urn:schemas-microsoft-com:vml" xmlns:pvml="urn:schemas-microsoft-com:office:powerpoint" xmlns:com="http://schemas.openxmlformats.org/drawingml/2006/compatibility" xmlns:p14="http://schemas.microsoft.com/office/powerpoint/2010/main" xmlns:p15="http://schemas.microsoft.com/office/powerpoint/2012/main" xmlns:ahyp="http://schemas.microsoft.com/office/drawing/2018/hyperlinkcolor" matchingName="One column text">
+<p:sldLayout xmlns:a="http://schemas.openxmlformats.org/drawingml/2006/main" xmlns:r="http://schemas.openxmlformats.org/officeDocument/2006/relationships" xmlns:p="http://schemas.openxmlformats.org/presentationml/2006/main" matchingName="One column text">
   <p:cSld name="ONE_COLUMN_TEXT">
     <p:spTree>
       <p:nvGrpSpPr>
-        <p:cNvPr id="28" name="Shape 28"/>
+        <p:cNvPr id="1" name="Shape 28"/>
         <p:cNvGrpSpPr/>
         <p:nvPr/>
       </p:nvGrpSpPr>
@@ -2934,7 +3010,9 @@
       <p:sp>
         <p:nvSpPr>
           <p:cNvPr id="29" name="Google Shape;29;p7"/>
-          <p:cNvSpPr txBox="1"/>
+          <p:cNvSpPr txBox="1">
+            <a:spLocks noGrp="1"/>
+          </p:cNvSpPr>
           <p:nvPr>
             <p:ph type="title"/>
           </p:nvPr>
@@ -2949,7 +3027,7 @@
           </a:prstGeom>
         </p:spPr>
         <p:txBody>
-          <a:bodyPr anchorCtr="0" anchor="b" bIns="91425" lIns="91425" spcFirstLastPara="1" rIns="91425" wrap="square" tIns="91425">
+          <a:bodyPr spcFirstLastPara="1" wrap="square" lIns="91425" tIns="91425" rIns="91425" bIns="91425" anchor="b" anchorCtr="0">
             <a:normAutofit/>
           </a:bodyPr>
           <a:lstStyle>
@@ -3053,15 +3131,19 @@
               <a:defRPr sz="2400"/>
             </a:lvl9pPr>
           </a:lstStyle>
-          <a:p/>
+          <a:p>
+            <a:endParaRPr/>
+          </a:p>
         </p:txBody>
       </p:sp>
       <p:sp>
         <p:nvSpPr>
           <p:cNvPr id="30" name="Google Shape;30;p7"/>
-          <p:cNvSpPr txBox="1"/>
+          <p:cNvSpPr txBox="1">
+            <a:spLocks noGrp="1"/>
+          </p:cNvSpPr>
           <p:nvPr>
-            <p:ph idx="1" type="body"/>
+            <p:ph type="body" idx="1"/>
           </p:nvPr>
         </p:nvSpPr>
         <p:spPr>
@@ -3074,11 +3156,11 @@
           </a:prstGeom>
         </p:spPr>
         <p:txBody>
-          <a:bodyPr anchorCtr="0" anchor="t" bIns="91425" lIns="91425" spcFirstLastPara="1" rIns="91425" wrap="square" tIns="91425">
+          <a:bodyPr spcFirstLastPara="1" wrap="square" lIns="91425" tIns="91425" rIns="91425" bIns="91425" anchor="t" anchorCtr="0">
             <a:normAutofit/>
           </a:bodyPr>
           <a:lstStyle>
-            <a:lvl1pPr indent="-304800" lvl="0" marL="457200">
+            <a:lvl1pPr marL="457200" lvl="0" indent="-304800">
               <a:spcBef>
                 <a:spcPts val="0"/>
               </a:spcBef>
@@ -3089,7 +3171,7 @@
               <a:buChar char="●"/>
               <a:defRPr sz="1200"/>
             </a:lvl1pPr>
-            <a:lvl2pPr indent="-304800" lvl="1" marL="914400">
+            <a:lvl2pPr marL="914400" lvl="1" indent="-304800">
               <a:spcBef>
                 <a:spcPts val="0"/>
               </a:spcBef>
@@ -3100,7 +3182,7 @@
               <a:buChar char="○"/>
               <a:defRPr sz="1200"/>
             </a:lvl2pPr>
-            <a:lvl3pPr indent="-304800" lvl="2" marL="1371600">
+            <a:lvl3pPr marL="1371600" lvl="2" indent="-304800">
               <a:spcBef>
                 <a:spcPts val="0"/>
               </a:spcBef>
@@ -3111,7 +3193,7 @@
               <a:buChar char="■"/>
               <a:defRPr sz="1200"/>
             </a:lvl3pPr>
-            <a:lvl4pPr indent="-304800" lvl="3" marL="1828800">
+            <a:lvl4pPr marL="1828800" lvl="3" indent="-304800">
               <a:spcBef>
                 <a:spcPts val="0"/>
               </a:spcBef>
@@ -3122,7 +3204,7 @@
               <a:buChar char="●"/>
               <a:defRPr sz="1200"/>
             </a:lvl4pPr>
-            <a:lvl5pPr indent="-304800" lvl="4" marL="2286000">
+            <a:lvl5pPr marL="2286000" lvl="4" indent="-304800">
               <a:spcBef>
                 <a:spcPts val="0"/>
               </a:spcBef>
@@ -3133,7 +3215,7 @@
               <a:buChar char="○"/>
               <a:defRPr sz="1200"/>
             </a:lvl5pPr>
-            <a:lvl6pPr indent="-304800" lvl="5" marL="2743200">
+            <a:lvl6pPr marL="2743200" lvl="5" indent="-304800">
               <a:spcBef>
                 <a:spcPts val="0"/>
               </a:spcBef>
@@ -3144,7 +3226,7 @@
               <a:buChar char="■"/>
               <a:defRPr sz="1200"/>
             </a:lvl6pPr>
-            <a:lvl7pPr indent="-304800" lvl="6" marL="3200400">
+            <a:lvl7pPr marL="3200400" lvl="6" indent="-304800">
               <a:spcBef>
                 <a:spcPts val="0"/>
               </a:spcBef>
@@ -3155,7 +3237,7 @@
               <a:buChar char="●"/>
               <a:defRPr sz="1200"/>
             </a:lvl7pPr>
-            <a:lvl8pPr indent="-304800" lvl="7" marL="3657600">
+            <a:lvl8pPr marL="3657600" lvl="7" indent="-304800">
               <a:spcBef>
                 <a:spcPts val="0"/>
               </a:spcBef>
@@ -3166,7 +3248,7 @@
               <a:buChar char="○"/>
               <a:defRPr sz="1200"/>
             </a:lvl8pPr>
-            <a:lvl9pPr indent="-304800" lvl="8" marL="4114800">
+            <a:lvl9pPr marL="4114800" lvl="8" indent="-304800">
               <a:spcBef>
                 <a:spcPts val="0"/>
               </a:spcBef>
@@ -3178,15 +3260,19 @@
               <a:defRPr sz="1200"/>
             </a:lvl9pPr>
           </a:lstStyle>
-          <a:p/>
+          <a:p>
+            <a:endParaRPr/>
+          </a:p>
         </p:txBody>
       </p:sp>
       <p:sp>
         <p:nvSpPr>
           <p:cNvPr id="31" name="Google Shape;31;p7"/>
-          <p:cNvSpPr txBox="1"/>
+          <p:cNvSpPr txBox="1">
+            <a:spLocks noGrp="1"/>
+          </p:cNvSpPr>
           <p:nvPr>
-            <p:ph idx="12" type="sldNum"/>
+            <p:ph type="sldNum" idx="12"/>
           </p:nvPr>
         </p:nvSpPr>
         <p:spPr>
@@ -3199,7 +3285,7 @@
           </a:prstGeom>
         </p:spPr>
         <p:txBody>
-          <a:bodyPr anchorCtr="0" anchor="ctr" bIns="91425" lIns="91425" spcFirstLastPara="1" rIns="91425" wrap="square" tIns="91425">
+          <a:bodyPr spcFirstLastPara="1" wrap="square" lIns="91425" tIns="91425" rIns="91425" bIns="91425" anchor="ctr" anchorCtr="0">
             <a:normAutofit/>
           </a:bodyPr>
           <a:lstStyle>
@@ -3241,7 +3327,7 @@
             </a:lvl9pPr>
           </a:lstStyle>
           <a:p>
-            <a:pPr indent="0" lvl="0" marL="0" rtl="0" algn="r">
+            <a:pPr marL="0" lvl="0" indent="0" algn="r" rtl="0">
               <a:spcBef>
                 <a:spcPts val="0"/>
               </a:spcBef>
@@ -3267,11 +3353,11 @@
 </file>
 
 <file path=ppt/slideLayouts/slideLayout7.xml><?xml version="1.0" encoding="utf-8"?>
-<p:sldLayout xmlns:a="http://schemas.openxmlformats.org/drawingml/2006/main" xmlns:r="http://schemas.openxmlformats.org/officeDocument/2006/relationships" xmlns:mc="http://schemas.openxmlformats.org/markup-compatibility/2006" xmlns:mv="urn:schemas-microsoft-com:mac:vml" xmlns:p="http://schemas.openxmlformats.org/presentationml/2006/main" xmlns:c="http://schemas.openxmlformats.org/drawingml/2006/chart" xmlns:dgm="http://schemas.openxmlformats.org/drawingml/2006/diagram" xmlns:o="urn:schemas-microsoft-com:office:office" xmlns:v="urn:schemas-microsoft-com:vml" xmlns:pvml="urn:schemas-microsoft-com:office:powerpoint" xmlns:com="http://schemas.openxmlformats.org/drawingml/2006/compatibility" xmlns:p14="http://schemas.microsoft.com/office/powerpoint/2010/main" xmlns:p15="http://schemas.microsoft.com/office/powerpoint/2012/main" xmlns:ahyp="http://schemas.microsoft.com/office/drawing/2018/hyperlinkcolor" matchingName="Main point">
+<p:sldLayout xmlns:a="http://schemas.openxmlformats.org/drawingml/2006/main" xmlns:r="http://schemas.openxmlformats.org/officeDocument/2006/relationships" xmlns:p="http://schemas.openxmlformats.org/presentationml/2006/main" matchingName="Main point">
   <p:cSld name="MAIN_POINT">
     <p:spTree>
       <p:nvGrpSpPr>
-        <p:cNvPr id="32" name="Shape 32"/>
+        <p:cNvPr id="1" name="Shape 32"/>
         <p:cNvGrpSpPr/>
         <p:nvPr/>
       </p:nvGrpSpPr>
@@ -3286,7 +3372,9 @@
       <p:sp>
         <p:nvSpPr>
           <p:cNvPr id="33" name="Google Shape;33;p8"/>
-          <p:cNvSpPr txBox="1"/>
+          <p:cNvSpPr txBox="1">
+            <a:spLocks noGrp="1"/>
+          </p:cNvSpPr>
           <p:nvPr>
             <p:ph type="title"/>
           </p:nvPr>
@@ -3301,7 +3389,7 @@
           </a:prstGeom>
         </p:spPr>
         <p:txBody>
-          <a:bodyPr anchorCtr="0" anchor="ctr" bIns="91425" lIns="91425" spcFirstLastPara="1" rIns="91425" wrap="square" tIns="91425">
+          <a:bodyPr spcFirstLastPara="1" wrap="square" lIns="91425" tIns="91425" rIns="91425" bIns="91425" anchor="ctr" anchorCtr="0">
             <a:normAutofit/>
           </a:bodyPr>
           <a:lstStyle>
@@ -3405,15 +3493,19 @@
               <a:defRPr sz="4800"/>
             </a:lvl9pPr>
           </a:lstStyle>
-          <a:p/>
+          <a:p>
+            <a:endParaRPr/>
+          </a:p>
         </p:txBody>
       </p:sp>
       <p:sp>
         <p:nvSpPr>
           <p:cNvPr id="34" name="Google Shape;34;p8"/>
-          <p:cNvSpPr txBox="1"/>
+          <p:cNvSpPr txBox="1">
+            <a:spLocks noGrp="1"/>
+          </p:cNvSpPr>
           <p:nvPr>
-            <p:ph idx="12" type="sldNum"/>
+            <p:ph type="sldNum" idx="12"/>
           </p:nvPr>
         </p:nvSpPr>
         <p:spPr>
@@ -3426,7 +3518,7 @@
           </a:prstGeom>
         </p:spPr>
         <p:txBody>
-          <a:bodyPr anchorCtr="0" anchor="ctr" bIns="91425" lIns="91425" spcFirstLastPara="1" rIns="91425" wrap="square" tIns="91425">
+          <a:bodyPr spcFirstLastPara="1" wrap="square" lIns="91425" tIns="91425" rIns="91425" bIns="91425" anchor="ctr" anchorCtr="0">
             <a:normAutofit/>
           </a:bodyPr>
           <a:lstStyle>
@@ -3468,7 +3560,7 @@
             </a:lvl9pPr>
           </a:lstStyle>
           <a:p>
-            <a:pPr indent="0" lvl="0" marL="0" rtl="0" algn="r">
+            <a:pPr marL="0" lvl="0" indent="0" algn="r" rtl="0">
               <a:spcBef>
                 <a:spcPts val="0"/>
               </a:spcBef>
@@ -3494,11 +3586,11 @@
 </file>
 
 <file path=ppt/slideLayouts/slideLayout8.xml><?xml version="1.0" encoding="utf-8"?>
-<p:sldLayout xmlns:a="http://schemas.openxmlformats.org/drawingml/2006/main" xmlns:r="http://schemas.openxmlformats.org/officeDocument/2006/relationships" xmlns:mc="http://schemas.openxmlformats.org/markup-compatibility/2006" xmlns:mv="urn:schemas-microsoft-com:mac:vml" xmlns:p="http://schemas.openxmlformats.org/presentationml/2006/main" xmlns:c="http://schemas.openxmlformats.org/drawingml/2006/chart" xmlns:dgm="http://schemas.openxmlformats.org/drawingml/2006/diagram" xmlns:o="urn:schemas-microsoft-com:office:office" xmlns:v="urn:schemas-microsoft-com:vml" xmlns:pvml="urn:schemas-microsoft-com:office:powerpoint" xmlns:com="http://schemas.openxmlformats.org/drawingml/2006/compatibility" xmlns:p14="http://schemas.microsoft.com/office/powerpoint/2010/main" xmlns:p15="http://schemas.microsoft.com/office/powerpoint/2012/main" xmlns:ahyp="http://schemas.microsoft.com/office/drawing/2018/hyperlinkcolor" matchingName="Section title and description">
+<p:sldLayout xmlns:a="http://schemas.openxmlformats.org/drawingml/2006/main" xmlns:r="http://schemas.openxmlformats.org/officeDocument/2006/relationships" xmlns:p="http://schemas.openxmlformats.org/presentationml/2006/main" matchingName="Section title and description">
   <p:cSld name="SECTION_TITLE_AND_DESCRIPTION">
     <p:spTree>
       <p:nvGrpSpPr>
-        <p:cNvPr id="35" name="Shape 35"/>
+        <p:cNvPr id="1" name="Shape 35"/>
         <p:cNvGrpSpPr/>
         <p:nvPr/>
       </p:nvGrpSpPr>
@@ -3532,12 +3624,12 @@
           </a:ln>
         </p:spPr>
         <p:txBody>
-          <a:bodyPr anchorCtr="0" anchor="ctr" bIns="91425" lIns="91425" spcFirstLastPara="1" rIns="91425" wrap="square" tIns="91425">
+          <a:bodyPr spcFirstLastPara="1" wrap="square" lIns="91425" tIns="91425" rIns="91425" bIns="91425" anchor="ctr" anchorCtr="0">
             <a:noAutofit/>
           </a:bodyPr>
           <a:lstStyle/>
           <a:p>
-            <a:pPr indent="0" lvl="0" marL="0" rtl="0" algn="l">
+            <a:pPr marL="0" lvl="0" indent="0" algn="l" rtl="0">
               <a:spcBef>
                 <a:spcPts val="0"/>
               </a:spcBef>
@@ -3546,9 +3638,6 @@
               </a:spcAft>
               <a:buNone/>
             </a:pPr>
-            <a:r>
-              <a:t/>
-            </a:r>
             <a:endParaRPr/>
           </a:p>
         </p:txBody>
@@ -3556,7 +3645,9 @@
       <p:sp>
         <p:nvSpPr>
           <p:cNvPr id="37" name="Google Shape;37;p9"/>
-          <p:cNvSpPr txBox="1"/>
+          <p:cNvSpPr txBox="1">
+            <a:spLocks noGrp="1"/>
+          </p:cNvSpPr>
           <p:nvPr>
             <p:ph type="title"/>
           </p:nvPr>
@@ -3571,7 +3662,7 @@
           </a:prstGeom>
         </p:spPr>
         <p:txBody>
-          <a:bodyPr anchorCtr="0" anchor="b" bIns="91425" lIns="91425" spcFirstLastPara="1" rIns="91425" wrap="square" tIns="91425">
+          <a:bodyPr spcFirstLastPara="1" wrap="square" lIns="91425" tIns="91425" rIns="91425" bIns="91425" anchor="b" anchorCtr="0">
             <a:normAutofit/>
           </a:bodyPr>
           <a:lstStyle>
@@ -3675,15 +3766,19 @@
               <a:defRPr sz="4200"/>
             </a:lvl9pPr>
           </a:lstStyle>
-          <a:p/>
+          <a:p>
+            <a:endParaRPr/>
+          </a:p>
         </p:txBody>
       </p:sp>
       <p:sp>
         <p:nvSpPr>
           <p:cNvPr id="38" name="Google Shape;38;p9"/>
-          <p:cNvSpPr txBox="1"/>
+          <p:cNvSpPr txBox="1">
+            <a:spLocks noGrp="1"/>
+          </p:cNvSpPr>
           <p:nvPr>
-            <p:ph idx="1" type="subTitle"/>
+            <p:ph type="subTitle" idx="1"/>
           </p:nvPr>
         </p:nvSpPr>
         <p:spPr>
@@ -3696,7 +3791,7 @@
           </a:prstGeom>
         </p:spPr>
         <p:txBody>
-          <a:bodyPr anchorCtr="0" anchor="t" bIns="91425" lIns="91425" spcFirstLastPara="1" rIns="91425" wrap="square" tIns="91425">
+          <a:bodyPr spcFirstLastPara="1" wrap="square" lIns="91425" tIns="91425" rIns="91425" bIns="91425" anchor="t" anchorCtr="0">
             <a:normAutofit/>
           </a:bodyPr>
           <a:lstStyle>
@@ -3827,15 +3922,19 @@
               <a:defRPr sz="2100"/>
             </a:lvl9pPr>
           </a:lstStyle>
-          <a:p/>
+          <a:p>
+            <a:endParaRPr/>
+          </a:p>
         </p:txBody>
       </p:sp>
       <p:sp>
         <p:nvSpPr>
           <p:cNvPr id="39" name="Google Shape;39;p9"/>
-          <p:cNvSpPr txBox="1"/>
+          <p:cNvSpPr txBox="1">
+            <a:spLocks noGrp="1"/>
+          </p:cNvSpPr>
           <p:nvPr>
-            <p:ph idx="2" type="body"/>
+            <p:ph type="body" idx="2"/>
           </p:nvPr>
         </p:nvSpPr>
         <p:spPr>
@@ -3848,11 +3947,11 @@
           </a:prstGeom>
         </p:spPr>
         <p:txBody>
-          <a:bodyPr anchorCtr="0" anchor="ctr" bIns="91425" lIns="91425" spcFirstLastPara="1" rIns="91425" wrap="square" tIns="91425">
+          <a:bodyPr spcFirstLastPara="1" wrap="square" lIns="91425" tIns="91425" rIns="91425" bIns="91425" anchor="ctr" anchorCtr="0">
             <a:normAutofit/>
           </a:bodyPr>
           <a:lstStyle>
-            <a:lvl1pPr indent="-342900" lvl="0" marL="457200">
+            <a:lvl1pPr marL="457200" lvl="0" indent="-342900">
               <a:spcBef>
                 <a:spcPts val="0"/>
               </a:spcBef>
@@ -3863,7 +3962,7 @@
               <a:buChar char="●"/>
               <a:defRPr/>
             </a:lvl1pPr>
-            <a:lvl2pPr indent="-317500" lvl="1" marL="914400">
+            <a:lvl2pPr marL="914400" lvl="1" indent="-317500">
               <a:spcBef>
                 <a:spcPts val="0"/>
               </a:spcBef>
@@ -3874,7 +3973,7 @@
               <a:buChar char="○"/>
               <a:defRPr/>
             </a:lvl2pPr>
-            <a:lvl3pPr indent="-317500" lvl="2" marL="1371600">
+            <a:lvl3pPr marL="1371600" lvl="2" indent="-317500">
               <a:spcBef>
                 <a:spcPts val="0"/>
               </a:spcBef>
@@ -3885,7 +3984,7 @@
               <a:buChar char="■"/>
               <a:defRPr/>
             </a:lvl3pPr>
-            <a:lvl4pPr indent="-317500" lvl="3" marL="1828800">
+            <a:lvl4pPr marL="1828800" lvl="3" indent="-317500">
               <a:spcBef>
                 <a:spcPts val="0"/>
               </a:spcBef>
@@ -3896,7 +3995,7 @@
               <a:buChar char="●"/>
               <a:defRPr/>
             </a:lvl4pPr>
-            <a:lvl5pPr indent="-317500" lvl="4" marL="2286000">
+            <a:lvl5pPr marL="2286000" lvl="4" indent="-317500">
               <a:spcBef>
                 <a:spcPts val="0"/>
               </a:spcBef>
@@ -3907,7 +4006,7 @@
               <a:buChar char="○"/>
               <a:defRPr/>
             </a:lvl5pPr>
-            <a:lvl6pPr indent="-317500" lvl="5" marL="2743200">
+            <a:lvl6pPr marL="2743200" lvl="5" indent="-317500">
               <a:spcBef>
                 <a:spcPts val="0"/>
               </a:spcBef>
@@ -3918,7 +4017,7 @@
               <a:buChar char="■"/>
               <a:defRPr/>
             </a:lvl6pPr>
-            <a:lvl7pPr indent="-317500" lvl="6" marL="3200400">
+            <a:lvl7pPr marL="3200400" lvl="6" indent="-317500">
               <a:spcBef>
                 <a:spcPts val="0"/>
               </a:spcBef>
@@ -3929,7 +4028,7 @@
               <a:buChar char="●"/>
               <a:defRPr/>
             </a:lvl7pPr>
-            <a:lvl8pPr indent="-317500" lvl="7" marL="3657600">
+            <a:lvl8pPr marL="3657600" lvl="7" indent="-317500">
               <a:spcBef>
                 <a:spcPts val="0"/>
               </a:spcBef>
@@ -3940,7 +4039,7 @@
               <a:buChar char="○"/>
               <a:defRPr/>
             </a:lvl8pPr>
-            <a:lvl9pPr indent="-317500" lvl="8" marL="4114800">
+            <a:lvl9pPr marL="4114800" lvl="8" indent="-317500">
               <a:spcBef>
                 <a:spcPts val="0"/>
               </a:spcBef>
@@ -3952,15 +4051,19 @@
               <a:defRPr/>
             </a:lvl9pPr>
           </a:lstStyle>
-          <a:p/>
+          <a:p>
+            <a:endParaRPr/>
+          </a:p>
         </p:txBody>
       </p:sp>
       <p:sp>
         <p:nvSpPr>
           <p:cNvPr id="40" name="Google Shape;40;p9"/>
-          <p:cNvSpPr txBox="1"/>
+          <p:cNvSpPr txBox="1">
+            <a:spLocks noGrp="1"/>
+          </p:cNvSpPr>
           <p:nvPr>
-            <p:ph idx="12" type="sldNum"/>
+            <p:ph type="sldNum" idx="12"/>
           </p:nvPr>
         </p:nvSpPr>
         <p:spPr>
@@ -3973,7 +4076,7 @@
           </a:prstGeom>
         </p:spPr>
         <p:txBody>
-          <a:bodyPr anchorCtr="0" anchor="ctr" bIns="91425" lIns="91425" spcFirstLastPara="1" rIns="91425" wrap="square" tIns="91425">
+          <a:bodyPr spcFirstLastPara="1" wrap="square" lIns="91425" tIns="91425" rIns="91425" bIns="91425" anchor="ctr" anchorCtr="0">
             <a:normAutofit/>
           </a:bodyPr>
           <a:lstStyle>
@@ -4015,7 +4118,7 @@
             </a:lvl9pPr>
           </a:lstStyle>
           <a:p>
-            <a:pPr indent="0" lvl="0" marL="0" rtl="0" algn="r">
+            <a:pPr marL="0" lvl="0" indent="0" algn="r" rtl="0">
               <a:spcBef>
                 <a:spcPts val="0"/>
               </a:spcBef>
@@ -4041,11 +4144,11 @@
 </file>
 
 <file path=ppt/slideLayouts/slideLayout9.xml><?xml version="1.0" encoding="utf-8"?>
-<p:sldLayout xmlns:a="http://schemas.openxmlformats.org/drawingml/2006/main" xmlns:r="http://schemas.openxmlformats.org/officeDocument/2006/relationships" xmlns:mc="http://schemas.openxmlformats.org/markup-compatibility/2006" xmlns:mv="urn:schemas-microsoft-com:mac:vml" xmlns:p="http://schemas.openxmlformats.org/presentationml/2006/main" xmlns:c="http://schemas.openxmlformats.org/drawingml/2006/chart" xmlns:dgm="http://schemas.openxmlformats.org/drawingml/2006/diagram" xmlns:o="urn:schemas-microsoft-com:office:office" xmlns:v="urn:schemas-microsoft-com:vml" xmlns:pvml="urn:schemas-microsoft-com:office:powerpoint" xmlns:com="http://schemas.openxmlformats.org/drawingml/2006/compatibility" xmlns:p14="http://schemas.microsoft.com/office/powerpoint/2010/main" xmlns:p15="http://schemas.microsoft.com/office/powerpoint/2012/main" xmlns:ahyp="http://schemas.microsoft.com/office/drawing/2018/hyperlinkcolor" matchingName="Caption">
+<p:sldLayout xmlns:a="http://schemas.openxmlformats.org/drawingml/2006/main" xmlns:r="http://schemas.openxmlformats.org/officeDocument/2006/relationships" xmlns:p="http://schemas.openxmlformats.org/presentationml/2006/main" matchingName="Caption">
   <p:cSld name="CAPTION_ONLY">
     <p:spTree>
       <p:nvGrpSpPr>
-        <p:cNvPr id="41" name="Shape 41"/>
+        <p:cNvPr id="1" name="Shape 41"/>
         <p:cNvGrpSpPr/>
         <p:nvPr/>
       </p:nvGrpSpPr>
@@ -4060,9 +4163,11 @@
       <p:sp>
         <p:nvSpPr>
           <p:cNvPr id="42" name="Google Shape;42;p10"/>
-          <p:cNvSpPr txBox="1"/>
+          <p:cNvSpPr txBox="1">
+            <a:spLocks noGrp="1"/>
+          </p:cNvSpPr>
           <p:nvPr>
-            <p:ph idx="1" type="body"/>
+            <p:ph type="body" idx="1"/>
           </p:nvPr>
         </p:nvSpPr>
         <p:spPr>
@@ -4075,11 +4180,11 @@
           </a:prstGeom>
         </p:spPr>
         <p:txBody>
-          <a:bodyPr anchorCtr="0" anchor="ctr" bIns="91425" lIns="91425" spcFirstLastPara="1" rIns="91425" wrap="square" tIns="91425">
+          <a:bodyPr spcFirstLastPara="1" wrap="square" lIns="91425" tIns="91425" rIns="91425" bIns="91425" anchor="ctr" anchorCtr="0">
             <a:normAutofit/>
           </a:bodyPr>
           <a:lstStyle>
-            <a:lvl1pPr indent="-228600" lvl="0" marL="457200">
+            <a:lvl1pPr marL="457200" lvl="0" indent="-228600">
               <a:lnSpc>
                 <a:spcPct val="100000"/>
               </a:lnSpc>
@@ -4094,15 +4199,19 @@
               <a:defRPr/>
             </a:lvl1pPr>
           </a:lstStyle>
-          <a:p/>
+          <a:p>
+            <a:endParaRPr/>
+          </a:p>
         </p:txBody>
       </p:sp>
       <p:sp>
         <p:nvSpPr>
           <p:cNvPr id="43" name="Google Shape;43;p10"/>
-          <p:cNvSpPr txBox="1"/>
+          <p:cNvSpPr txBox="1">
+            <a:spLocks noGrp="1"/>
+          </p:cNvSpPr>
           <p:nvPr>
-            <p:ph idx="12" type="sldNum"/>
+            <p:ph type="sldNum" idx="12"/>
           </p:nvPr>
         </p:nvSpPr>
         <p:spPr>
@@ -4115,7 +4224,7 @@
           </a:prstGeom>
         </p:spPr>
         <p:txBody>
-          <a:bodyPr anchorCtr="0" anchor="ctr" bIns="91425" lIns="91425" spcFirstLastPara="1" rIns="91425" wrap="square" tIns="91425">
+          <a:bodyPr spcFirstLastPara="1" wrap="square" lIns="91425" tIns="91425" rIns="91425" bIns="91425" anchor="ctr" anchorCtr="0">
             <a:normAutofit/>
           </a:bodyPr>
           <a:lstStyle>
@@ -4157,7 +4266,7 @@
             </a:lvl9pPr>
           </a:lstStyle>
           <a:p>
-            <a:pPr indent="0" lvl="0" marL="0" rtl="0" algn="r">
+            <a:pPr marL="0" lvl="0" indent="0" algn="r" rtl="0">
               <a:spcBef>
                 <a:spcPts val="0"/>
               </a:spcBef>
@@ -4183,18 +4292,19 @@
 </file>
 
 <file path=ppt/slideMasters/slideMaster1.xml><?xml version="1.0" encoding="utf-8"?>
-<p:sldMaster xmlns:a="http://schemas.openxmlformats.org/drawingml/2006/main" xmlns:r="http://schemas.openxmlformats.org/officeDocument/2006/relationships" xmlns:mc="http://schemas.openxmlformats.org/markup-compatibility/2006" xmlns:mv="urn:schemas-microsoft-com:mac:vml" xmlns:p="http://schemas.openxmlformats.org/presentationml/2006/main" xmlns:c="http://schemas.openxmlformats.org/drawingml/2006/chart" xmlns:dgm="http://schemas.openxmlformats.org/drawingml/2006/diagram" xmlns:o="urn:schemas-microsoft-com:office:office" xmlns:v="urn:schemas-microsoft-com:vml" xmlns:pvml="urn:schemas-microsoft-com:office:powerpoint" xmlns:com="http://schemas.openxmlformats.org/drawingml/2006/compatibility" xmlns:p14="http://schemas.microsoft.com/office/powerpoint/2010/main" xmlns:p15="http://schemas.microsoft.com/office/powerpoint/2012/main" xmlns:ahyp="http://schemas.microsoft.com/office/drawing/2018/hyperlinkcolor">
+<p:sldMaster xmlns:a="http://schemas.openxmlformats.org/drawingml/2006/main" xmlns:r="http://schemas.openxmlformats.org/officeDocument/2006/relationships" xmlns:p="http://schemas.openxmlformats.org/presentationml/2006/main">
   <p:cSld name="simple-light-2">
     <p:bg>
       <p:bgPr>
         <a:solidFill>
           <a:schemeClr val="lt1"/>
         </a:solidFill>
+        <a:effectLst/>
       </p:bgPr>
     </p:bg>
     <p:spTree>
       <p:nvGrpSpPr>
-        <p:cNvPr id="5" name="Shape 5"/>
+        <p:cNvPr id="1" name="Shape 5"/>
         <p:cNvGrpSpPr/>
         <p:nvPr/>
       </p:nvGrpSpPr>
@@ -4209,7 +4319,9 @@
       <p:sp>
         <p:nvSpPr>
           <p:cNvPr id="6" name="Google Shape;6;p1"/>
-          <p:cNvSpPr txBox="1"/>
+          <p:cNvSpPr txBox="1">
+            <a:spLocks noGrp="1"/>
+          </p:cNvSpPr>
           <p:nvPr>
             <p:ph type="title"/>
           </p:nvPr>
@@ -4228,7 +4340,7 @@
           </a:ln>
         </p:spPr>
         <p:txBody>
-          <a:bodyPr anchorCtr="0" anchor="t" bIns="91425" lIns="91425" spcFirstLastPara="1" rIns="91425" wrap="square" tIns="91425">
+          <a:bodyPr spcFirstLastPara="1" wrap="square" lIns="91425" tIns="91425" rIns="91425" bIns="91425" anchor="t" anchorCtr="0">
             <a:normAutofit/>
           </a:bodyPr>
           <a:lstStyle>
@@ -4395,15 +4507,19 @@
               </a:defRPr>
             </a:lvl9pPr>
           </a:lstStyle>
-          <a:p/>
+          <a:p>
+            <a:endParaRPr/>
+          </a:p>
         </p:txBody>
       </p:sp>
       <p:sp>
         <p:nvSpPr>
           <p:cNvPr id="7" name="Google Shape;7;p1"/>
-          <p:cNvSpPr txBox="1"/>
+          <p:cNvSpPr txBox="1">
+            <a:spLocks noGrp="1"/>
+          </p:cNvSpPr>
           <p:nvPr>
-            <p:ph idx="1" type="body"/>
+            <p:ph type="body" idx="1"/>
           </p:nvPr>
         </p:nvSpPr>
         <p:spPr>
@@ -4420,11 +4536,11 @@
           </a:ln>
         </p:spPr>
         <p:txBody>
-          <a:bodyPr anchorCtr="0" anchor="t" bIns="91425" lIns="91425" spcFirstLastPara="1" rIns="91425" wrap="square" tIns="91425">
+          <a:bodyPr spcFirstLastPara="1" wrap="square" lIns="91425" tIns="91425" rIns="91425" bIns="91425" anchor="t" anchorCtr="0">
             <a:normAutofit/>
           </a:bodyPr>
           <a:lstStyle>
-            <a:lvl1pPr indent="-342900" lvl="0" marL="457200">
+            <a:lvl1pPr marL="457200" lvl="0" indent="-342900">
               <a:lnSpc>
                 <a:spcPct val="115000"/>
               </a:lnSpc>
@@ -4445,7 +4561,7 @@
                 </a:solidFill>
               </a:defRPr>
             </a:lvl1pPr>
-            <a:lvl2pPr indent="-317500" lvl="1" marL="914400">
+            <a:lvl2pPr marL="914400" lvl="1" indent="-317500">
               <a:lnSpc>
                 <a:spcPct val="115000"/>
               </a:lnSpc>
@@ -4466,7 +4582,7 @@
                 </a:solidFill>
               </a:defRPr>
             </a:lvl2pPr>
-            <a:lvl3pPr indent="-317500" lvl="2" marL="1371600">
+            <a:lvl3pPr marL="1371600" lvl="2" indent="-317500">
               <a:lnSpc>
                 <a:spcPct val="115000"/>
               </a:lnSpc>
@@ -4487,7 +4603,7 @@
                 </a:solidFill>
               </a:defRPr>
             </a:lvl3pPr>
-            <a:lvl4pPr indent="-317500" lvl="3" marL="1828800">
+            <a:lvl4pPr marL="1828800" lvl="3" indent="-317500">
               <a:lnSpc>
                 <a:spcPct val="115000"/>
               </a:lnSpc>
@@ -4508,7 +4624,7 @@
                 </a:solidFill>
               </a:defRPr>
             </a:lvl4pPr>
-            <a:lvl5pPr indent="-317500" lvl="4" marL="2286000">
+            <a:lvl5pPr marL="2286000" lvl="4" indent="-317500">
               <a:lnSpc>
                 <a:spcPct val="115000"/>
               </a:lnSpc>
@@ -4529,7 +4645,7 @@
                 </a:solidFill>
               </a:defRPr>
             </a:lvl5pPr>
-            <a:lvl6pPr indent="-317500" lvl="5" marL="2743200">
+            <a:lvl6pPr marL="2743200" lvl="5" indent="-317500">
               <a:lnSpc>
                 <a:spcPct val="115000"/>
               </a:lnSpc>
@@ -4550,7 +4666,7 @@
                 </a:solidFill>
               </a:defRPr>
             </a:lvl6pPr>
-            <a:lvl7pPr indent="-317500" lvl="6" marL="3200400">
+            <a:lvl7pPr marL="3200400" lvl="6" indent="-317500">
               <a:lnSpc>
                 <a:spcPct val="115000"/>
               </a:lnSpc>
@@ -4571,7 +4687,7 @@
                 </a:solidFill>
               </a:defRPr>
             </a:lvl7pPr>
-            <a:lvl8pPr indent="-317500" lvl="7" marL="3657600">
+            <a:lvl8pPr marL="3657600" lvl="7" indent="-317500">
               <a:lnSpc>
                 <a:spcPct val="115000"/>
               </a:lnSpc>
@@ -4592,7 +4708,7 @@
                 </a:solidFill>
               </a:defRPr>
             </a:lvl8pPr>
-            <a:lvl9pPr indent="-317500" lvl="8" marL="4114800">
+            <a:lvl9pPr marL="4114800" lvl="8" indent="-317500">
               <a:lnSpc>
                 <a:spcPct val="115000"/>
               </a:lnSpc>
@@ -4614,15 +4730,19 @@
               </a:defRPr>
             </a:lvl9pPr>
           </a:lstStyle>
-          <a:p/>
+          <a:p>
+            <a:endParaRPr/>
+          </a:p>
         </p:txBody>
       </p:sp>
       <p:sp>
         <p:nvSpPr>
           <p:cNvPr id="8" name="Google Shape;8;p1"/>
-          <p:cNvSpPr txBox="1"/>
+          <p:cNvSpPr txBox="1">
+            <a:spLocks noGrp="1"/>
+          </p:cNvSpPr>
           <p:nvPr>
-            <p:ph idx="12" type="sldNum"/>
+            <p:ph type="sldNum" idx="12"/>
           </p:nvPr>
         </p:nvSpPr>
         <p:spPr>
@@ -4639,7 +4759,7 @@
           </a:ln>
         </p:spPr>
         <p:txBody>
-          <a:bodyPr anchorCtr="0" anchor="ctr" bIns="91425" lIns="91425" spcFirstLastPara="1" rIns="91425" wrap="square" tIns="91425">
+          <a:bodyPr spcFirstLastPara="1" wrap="square" lIns="91425" tIns="91425" rIns="91425" bIns="91425" anchor="ctr" anchorCtr="0">
             <a:normAutofit/>
           </a:bodyPr>
           <a:lstStyle>
@@ -4717,7 +4837,7 @@
             </a:lvl9pPr>
           </a:lstStyle>
           <a:p>
-            <a:pPr indent="0" lvl="0" marL="0" rtl="0" algn="r">
+            <a:pPr marL="0" lvl="0" indent="0" algn="r" rtl="0">
               <a:spcBef>
                 <a:spcPts val="0"/>
               </a:spcBef>
@@ -4736,7 +4856,7 @@
       </p:sp>
     </p:spTree>
   </p:cSld>
-  <p:clrMap accent1="accent1" accent2="accent2" accent3="accent3" accent4="accent4" accent5="accent5" accent6="accent6" bg1="lt1" bg2="dk2" tx1="dk1" tx2="lt2" folHlink="folHlink" hlink="hlink"/>
+  <p:clrMap bg1="lt1" tx1="dk1" bg2="dk2" tx2="lt2" accent1="accent1" accent2="accent2" accent3="accent3" accent4="accent4" accent5="accent5" accent6="accent6" hlink="hlink" folHlink="folHlink"/>
   <p:sldLayoutIdLst>
     <p:sldLayoutId id="2147483648" r:id="rId1"/>
     <p:sldLayoutId id="2147483649" r:id="rId2"/>
@@ -4750,10 +4870,10 @@
     <p:sldLayoutId id="2147483657" r:id="rId10"/>
     <p:sldLayoutId id="2147483658" r:id="rId11"/>
   </p:sldLayoutIdLst>
-  <p:hf dt="0" ftr="0" hdr="0" sldNum="0"/>
+  <p:hf sldNum="0" hdr="0" ftr="0" dt="0"/>
   <p:txStyles>
     <p:titleStyle>
-      <a:defPPr lvl="0" marR="0" rtl="0" algn="l">
+      <a:defPPr marR="0" lvl="0" algn="l" rtl="0">
         <a:lnSpc>
           <a:spcPct val="100000"/>
         </a:lnSpc>
@@ -4764,7 +4884,7 @@
           <a:spcPts val="0"/>
         </a:spcAft>
       </a:defPPr>
-      <a:lvl1pPr lvl="0" marR="0" rtl="0" algn="l">
+      <a:lvl1pPr marR="0" lvl="0" algn="l" rtl="0">
         <a:lnSpc>
           <a:spcPct val="100000"/>
         </a:lnSpc>
@@ -4778,7 +4898,7 @@
           <a:srgbClr val="000000"/>
         </a:buClr>
         <a:buFont typeface="Arial"/>
-        <a:defRPr b="0" i="0" sz="1400" u="none" cap="none" strike="noStrike">
+        <a:defRPr sz="1400" b="0" i="0" u="none" strike="noStrike" cap="none">
           <a:solidFill>
             <a:srgbClr val="000000"/>
           </a:solidFill>
@@ -4788,7 +4908,7 @@
           <a:sym typeface="Arial"/>
         </a:defRPr>
       </a:lvl1pPr>
-      <a:lvl2pPr lvl="1" marR="0" rtl="0" algn="l">
+      <a:lvl2pPr marR="0" lvl="1" algn="l" rtl="0">
         <a:lnSpc>
           <a:spcPct val="100000"/>
         </a:lnSpc>
@@ -4802,7 +4922,7 @@
           <a:srgbClr val="000000"/>
         </a:buClr>
         <a:buFont typeface="Arial"/>
-        <a:defRPr b="0" i="0" sz="1400" u="none" cap="none" strike="noStrike">
+        <a:defRPr sz="1400" b="0" i="0" u="none" strike="noStrike" cap="none">
           <a:solidFill>
             <a:srgbClr val="000000"/>
           </a:solidFill>
@@ -4812,7 +4932,7 @@
           <a:sym typeface="Arial"/>
         </a:defRPr>
       </a:lvl2pPr>
-      <a:lvl3pPr lvl="2" marR="0" rtl="0" algn="l">
+      <a:lvl3pPr marR="0" lvl="2" algn="l" rtl="0">
         <a:lnSpc>
           <a:spcPct val="100000"/>
         </a:lnSpc>
@@ -4826,7 +4946,7 @@
           <a:srgbClr val="000000"/>
         </a:buClr>
         <a:buFont typeface="Arial"/>
-        <a:defRPr b="0" i="0" sz="1400" u="none" cap="none" strike="noStrike">
+        <a:defRPr sz="1400" b="0" i="0" u="none" strike="noStrike" cap="none">
           <a:solidFill>
             <a:srgbClr val="000000"/>
           </a:solidFill>
@@ -4836,7 +4956,7 @@
           <a:sym typeface="Arial"/>
         </a:defRPr>
       </a:lvl3pPr>
-      <a:lvl4pPr lvl="3" marR="0" rtl="0" algn="l">
+      <a:lvl4pPr marR="0" lvl="3" algn="l" rtl="0">
         <a:lnSpc>
           <a:spcPct val="100000"/>
         </a:lnSpc>
@@ -4850,7 +4970,7 @@
           <a:srgbClr val="000000"/>
         </a:buClr>
         <a:buFont typeface="Arial"/>
-        <a:defRPr b="0" i="0" sz="1400" u="none" cap="none" strike="noStrike">
+        <a:defRPr sz="1400" b="0" i="0" u="none" strike="noStrike" cap="none">
           <a:solidFill>
             <a:srgbClr val="000000"/>
           </a:solidFill>
@@ -4860,7 +4980,7 @@
           <a:sym typeface="Arial"/>
         </a:defRPr>
       </a:lvl4pPr>
-      <a:lvl5pPr lvl="4" marR="0" rtl="0" algn="l">
+      <a:lvl5pPr marR="0" lvl="4" algn="l" rtl="0">
         <a:lnSpc>
           <a:spcPct val="100000"/>
         </a:lnSpc>
@@ -4874,7 +4994,7 @@
           <a:srgbClr val="000000"/>
         </a:buClr>
         <a:buFont typeface="Arial"/>
-        <a:defRPr b="0" i="0" sz="1400" u="none" cap="none" strike="noStrike">
+        <a:defRPr sz="1400" b="0" i="0" u="none" strike="noStrike" cap="none">
           <a:solidFill>
             <a:srgbClr val="000000"/>
           </a:solidFill>
@@ -4884,7 +5004,7 @@
           <a:sym typeface="Arial"/>
         </a:defRPr>
       </a:lvl5pPr>
-      <a:lvl6pPr lvl="5" marR="0" rtl="0" algn="l">
+      <a:lvl6pPr marR="0" lvl="5" algn="l" rtl="0">
         <a:lnSpc>
           <a:spcPct val="100000"/>
         </a:lnSpc>
@@ -4898,7 +5018,7 @@
           <a:srgbClr val="000000"/>
         </a:buClr>
         <a:buFont typeface="Arial"/>
-        <a:defRPr b="0" i="0" sz="1400" u="none" cap="none" strike="noStrike">
+        <a:defRPr sz="1400" b="0" i="0" u="none" strike="noStrike" cap="none">
           <a:solidFill>
             <a:srgbClr val="000000"/>
           </a:solidFill>
@@ -4908,7 +5028,7 @@
           <a:sym typeface="Arial"/>
         </a:defRPr>
       </a:lvl6pPr>
-      <a:lvl7pPr lvl="6" marR="0" rtl="0" algn="l">
+      <a:lvl7pPr marR="0" lvl="6" algn="l" rtl="0">
         <a:lnSpc>
           <a:spcPct val="100000"/>
         </a:lnSpc>
@@ -4922,7 +5042,7 @@
           <a:srgbClr val="000000"/>
         </a:buClr>
         <a:buFont typeface="Arial"/>
-        <a:defRPr b="0" i="0" sz="1400" u="none" cap="none" strike="noStrike">
+        <a:defRPr sz="1400" b="0" i="0" u="none" strike="noStrike" cap="none">
           <a:solidFill>
             <a:srgbClr val="000000"/>
           </a:solidFill>
@@ -4932,7 +5052,7 @@
           <a:sym typeface="Arial"/>
         </a:defRPr>
       </a:lvl7pPr>
-      <a:lvl8pPr lvl="7" marR="0" rtl="0" algn="l">
+      <a:lvl8pPr marR="0" lvl="7" algn="l" rtl="0">
         <a:lnSpc>
           <a:spcPct val="100000"/>
         </a:lnSpc>
@@ -4946,7 +5066,7 @@
           <a:srgbClr val="000000"/>
         </a:buClr>
         <a:buFont typeface="Arial"/>
-        <a:defRPr b="0" i="0" sz="1400" u="none" cap="none" strike="noStrike">
+        <a:defRPr sz="1400" b="0" i="0" u="none" strike="noStrike" cap="none">
           <a:solidFill>
             <a:srgbClr val="000000"/>
           </a:solidFill>
@@ -4956,7 +5076,7 @@
           <a:sym typeface="Arial"/>
         </a:defRPr>
       </a:lvl8pPr>
-      <a:lvl9pPr lvl="8" marR="0" rtl="0" algn="l">
+      <a:lvl9pPr marR="0" lvl="8" algn="l" rtl="0">
         <a:lnSpc>
           <a:spcPct val="100000"/>
         </a:lnSpc>
@@ -4970,7 +5090,7 @@
           <a:srgbClr val="000000"/>
         </a:buClr>
         <a:buFont typeface="Arial"/>
-        <a:defRPr b="0" i="0" sz="1400" u="none" cap="none" strike="noStrike">
+        <a:defRPr sz="1400" b="0" i="0" u="none" strike="noStrike" cap="none">
           <a:solidFill>
             <a:srgbClr val="000000"/>
           </a:solidFill>
@@ -4982,7 +5102,7 @@
       </a:lvl9pPr>
     </p:titleStyle>
     <p:bodyStyle>
-      <a:defPPr lvl="0" marR="0" rtl="0" algn="l">
+      <a:defPPr marR="0" lvl="0" algn="l" rtl="0">
         <a:lnSpc>
           <a:spcPct val="100000"/>
         </a:lnSpc>
@@ -4993,7 +5113,7 @@
           <a:spcPts val="0"/>
         </a:spcAft>
       </a:defPPr>
-      <a:lvl1pPr lvl="0" marR="0" rtl="0" algn="l">
+      <a:lvl1pPr marR="0" lvl="0" algn="l" rtl="0">
         <a:lnSpc>
           <a:spcPct val="100000"/>
         </a:lnSpc>
@@ -5007,7 +5127,7 @@
           <a:srgbClr val="000000"/>
         </a:buClr>
         <a:buFont typeface="Arial"/>
-        <a:defRPr b="0" i="0" sz="1400" u="none" cap="none" strike="noStrike">
+        <a:defRPr sz="1400" b="0" i="0" u="none" strike="noStrike" cap="none">
           <a:solidFill>
             <a:srgbClr val="000000"/>
           </a:solidFill>
@@ -5017,7 +5137,7 @@
           <a:sym typeface="Arial"/>
         </a:defRPr>
       </a:lvl1pPr>
-      <a:lvl2pPr lvl="1" marR="0" rtl="0" algn="l">
+      <a:lvl2pPr marR="0" lvl="1" algn="l" rtl="0">
         <a:lnSpc>
           <a:spcPct val="100000"/>
         </a:lnSpc>
@@ -5031,7 +5151,7 @@
           <a:srgbClr val="000000"/>
         </a:buClr>
         <a:buFont typeface="Arial"/>
-        <a:defRPr b="0" i="0" sz="1400" u="none" cap="none" strike="noStrike">
+        <a:defRPr sz="1400" b="0" i="0" u="none" strike="noStrike" cap="none">
           <a:solidFill>
             <a:srgbClr val="000000"/>
           </a:solidFill>
@@ -5041,7 +5161,7 @@
           <a:sym typeface="Arial"/>
         </a:defRPr>
       </a:lvl2pPr>
-      <a:lvl3pPr lvl="2" marR="0" rtl="0" algn="l">
+      <a:lvl3pPr marR="0" lvl="2" algn="l" rtl="0">
         <a:lnSpc>
           <a:spcPct val="100000"/>
         </a:lnSpc>
@@ -5055,7 +5175,7 @@
           <a:srgbClr val="000000"/>
         </a:buClr>
         <a:buFont typeface="Arial"/>
-        <a:defRPr b="0" i="0" sz="1400" u="none" cap="none" strike="noStrike">
+        <a:defRPr sz="1400" b="0" i="0" u="none" strike="noStrike" cap="none">
           <a:solidFill>
             <a:srgbClr val="000000"/>
           </a:solidFill>
@@ -5065,7 +5185,7 @@
           <a:sym typeface="Arial"/>
         </a:defRPr>
       </a:lvl3pPr>
-      <a:lvl4pPr lvl="3" marR="0" rtl="0" algn="l">
+      <a:lvl4pPr marR="0" lvl="3" algn="l" rtl="0">
         <a:lnSpc>
           <a:spcPct val="100000"/>
         </a:lnSpc>
@@ -5079,7 +5199,7 @@
           <a:srgbClr val="000000"/>
         </a:buClr>
         <a:buFont typeface="Arial"/>
-        <a:defRPr b="0" i="0" sz="1400" u="none" cap="none" strike="noStrike">
+        <a:defRPr sz="1400" b="0" i="0" u="none" strike="noStrike" cap="none">
           <a:solidFill>
             <a:srgbClr val="000000"/>
           </a:solidFill>
@@ -5089,7 +5209,7 @@
           <a:sym typeface="Arial"/>
         </a:defRPr>
       </a:lvl4pPr>
-      <a:lvl5pPr lvl="4" marR="0" rtl="0" algn="l">
+      <a:lvl5pPr marR="0" lvl="4" algn="l" rtl="0">
         <a:lnSpc>
           <a:spcPct val="100000"/>
         </a:lnSpc>
@@ -5103,7 +5223,7 @@
           <a:srgbClr val="000000"/>
         </a:buClr>
         <a:buFont typeface="Arial"/>
-        <a:defRPr b="0" i="0" sz="1400" u="none" cap="none" strike="noStrike">
+        <a:defRPr sz="1400" b="0" i="0" u="none" strike="noStrike" cap="none">
           <a:solidFill>
             <a:srgbClr val="000000"/>
           </a:solidFill>
@@ -5113,7 +5233,7 @@
           <a:sym typeface="Arial"/>
         </a:defRPr>
       </a:lvl5pPr>
-      <a:lvl6pPr lvl="5" marR="0" rtl="0" algn="l">
+      <a:lvl6pPr marR="0" lvl="5" algn="l" rtl="0">
         <a:lnSpc>
           <a:spcPct val="100000"/>
         </a:lnSpc>
@@ -5127,7 +5247,7 @@
           <a:srgbClr val="000000"/>
         </a:buClr>
         <a:buFont typeface="Arial"/>
-        <a:defRPr b="0" i="0" sz="1400" u="none" cap="none" strike="noStrike">
+        <a:defRPr sz="1400" b="0" i="0" u="none" strike="noStrike" cap="none">
           <a:solidFill>
             <a:srgbClr val="000000"/>
           </a:solidFill>
@@ -5137,7 +5257,7 @@
           <a:sym typeface="Arial"/>
         </a:defRPr>
       </a:lvl6pPr>
-      <a:lvl7pPr lvl="6" marR="0" rtl="0" algn="l">
+      <a:lvl7pPr marR="0" lvl="6" algn="l" rtl="0">
         <a:lnSpc>
           <a:spcPct val="100000"/>
         </a:lnSpc>
@@ -5151,7 +5271,7 @@
           <a:srgbClr val="000000"/>
         </a:buClr>
         <a:buFont typeface="Arial"/>
-        <a:defRPr b="0" i="0" sz="1400" u="none" cap="none" strike="noStrike">
+        <a:defRPr sz="1400" b="0" i="0" u="none" strike="noStrike" cap="none">
           <a:solidFill>
             <a:srgbClr val="000000"/>
           </a:solidFill>
@@ -5161,7 +5281,7 @@
           <a:sym typeface="Arial"/>
         </a:defRPr>
       </a:lvl7pPr>
-      <a:lvl8pPr lvl="7" marR="0" rtl="0" algn="l">
+      <a:lvl8pPr marR="0" lvl="7" algn="l" rtl="0">
         <a:lnSpc>
           <a:spcPct val="100000"/>
         </a:lnSpc>
@@ -5175,7 +5295,7 @@
           <a:srgbClr val="000000"/>
         </a:buClr>
         <a:buFont typeface="Arial"/>
-        <a:defRPr b="0" i="0" sz="1400" u="none" cap="none" strike="noStrike">
+        <a:defRPr sz="1400" b="0" i="0" u="none" strike="noStrike" cap="none">
           <a:solidFill>
             <a:srgbClr val="000000"/>
           </a:solidFill>
@@ -5185,7 +5305,7 @@
           <a:sym typeface="Arial"/>
         </a:defRPr>
       </a:lvl8pPr>
-      <a:lvl9pPr lvl="8" marR="0" rtl="0" algn="l">
+      <a:lvl9pPr marR="0" lvl="8" algn="l" rtl="0">
         <a:lnSpc>
           <a:spcPct val="100000"/>
         </a:lnSpc>
@@ -5199,7 +5319,7 @@
           <a:srgbClr val="000000"/>
         </a:buClr>
         <a:buFont typeface="Arial"/>
-        <a:defRPr b="0" i="0" sz="1400" u="none" cap="none" strike="noStrike">
+        <a:defRPr sz="1400" b="0" i="0" u="none" strike="noStrike" cap="none">
           <a:solidFill>
             <a:srgbClr val="000000"/>
           </a:solidFill>
@@ -5211,7 +5331,7 @@
       </a:lvl9pPr>
     </p:bodyStyle>
     <p:otherStyle>
-      <a:defPPr lvl="0" marR="0" rtl="0" algn="l">
+      <a:defPPr marR="0" lvl="0" algn="l" rtl="0">
         <a:lnSpc>
           <a:spcPct val="100000"/>
         </a:lnSpc>
@@ -5222,7 +5342,7 @@
           <a:spcPts val="0"/>
         </a:spcAft>
       </a:defPPr>
-      <a:lvl1pPr lvl="0" marR="0" rtl="0" algn="l">
+      <a:lvl1pPr marR="0" lvl="0" algn="l" rtl="0">
         <a:lnSpc>
           <a:spcPct val="100000"/>
         </a:lnSpc>
@@ -5236,7 +5356,7 @@
           <a:srgbClr val="000000"/>
         </a:buClr>
         <a:buFont typeface="Arial"/>
-        <a:defRPr b="0" i="0" sz="1400" u="none" cap="none" strike="noStrike">
+        <a:defRPr sz="1400" b="0" i="0" u="none" strike="noStrike" cap="none">
           <a:solidFill>
             <a:srgbClr val="000000"/>
           </a:solidFill>
@@ -5246,7 +5366,7 @@
           <a:sym typeface="Arial"/>
         </a:defRPr>
       </a:lvl1pPr>
-      <a:lvl2pPr lvl="1" marR="0" rtl="0" algn="l">
+      <a:lvl2pPr marR="0" lvl="1" algn="l" rtl="0">
         <a:lnSpc>
           <a:spcPct val="100000"/>
         </a:lnSpc>
@@ -5260,7 +5380,7 @@
           <a:srgbClr val="000000"/>
         </a:buClr>
         <a:buFont typeface="Arial"/>
-        <a:defRPr b="0" i="0" sz="1400" u="none" cap="none" strike="noStrike">
+        <a:defRPr sz="1400" b="0" i="0" u="none" strike="noStrike" cap="none">
           <a:solidFill>
             <a:srgbClr val="000000"/>
           </a:solidFill>
@@ -5270,7 +5390,7 @@
           <a:sym typeface="Arial"/>
         </a:defRPr>
       </a:lvl2pPr>
-      <a:lvl3pPr lvl="2" marR="0" rtl="0" algn="l">
+      <a:lvl3pPr marR="0" lvl="2" algn="l" rtl="0">
         <a:lnSpc>
           <a:spcPct val="100000"/>
         </a:lnSpc>
@@ -5284,7 +5404,7 @@
           <a:srgbClr val="000000"/>
         </a:buClr>
         <a:buFont typeface="Arial"/>
-        <a:defRPr b="0" i="0" sz="1400" u="none" cap="none" strike="noStrike">
+        <a:defRPr sz="1400" b="0" i="0" u="none" strike="noStrike" cap="none">
           <a:solidFill>
             <a:srgbClr val="000000"/>
           </a:solidFill>
@@ -5294,7 +5414,7 @@
           <a:sym typeface="Arial"/>
         </a:defRPr>
       </a:lvl3pPr>
-      <a:lvl4pPr lvl="3" marR="0" rtl="0" algn="l">
+      <a:lvl4pPr marR="0" lvl="3" algn="l" rtl="0">
         <a:lnSpc>
           <a:spcPct val="100000"/>
         </a:lnSpc>
@@ -5308,7 +5428,7 @@
           <a:srgbClr val="000000"/>
         </a:buClr>
         <a:buFont typeface="Arial"/>
-        <a:defRPr b="0" i="0" sz="1400" u="none" cap="none" strike="noStrike">
+        <a:defRPr sz="1400" b="0" i="0" u="none" strike="noStrike" cap="none">
           <a:solidFill>
             <a:srgbClr val="000000"/>
           </a:solidFill>
@@ -5318,7 +5438,7 @@
           <a:sym typeface="Arial"/>
         </a:defRPr>
       </a:lvl4pPr>
-      <a:lvl5pPr lvl="4" marR="0" rtl="0" algn="l">
+      <a:lvl5pPr marR="0" lvl="4" algn="l" rtl="0">
         <a:lnSpc>
           <a:spcPct val="100000"/>
         </a:lnSpc>
@@ -5332,7 +5452,7 @@
           <a:srgbClr val="000000"/>
         </a:buClr>
         <a:buFont typeface="Arial"/>
-        <a:defRPr b="0" i="0" sz="1400" u="none" cap="none" strike="noStrike">
+        <a:defRPr sz="1400" b="0" i="0" u="none" strike="noStrike" cap="none">
           <a:solidFill>
             <a:srgbClr val="000000"/>
           </a:solidFill>
@@ -5342,7 +5462,7 @@
           <a:sym typeface="Arial"/>
         </a:defRPr>
       </a:lvl5pPr>
-      <a:lvl6pPr lvl="5" marR="0" rtl="0" algn="l">
+      <a:lvl6pPr marR="0" lvl="5" algn="l" rtl="0">
         <a:lnSpc>
           <a:spcPct val="100000"/>
         </a:lnSpc>
@@ -5356,7 +5476,7 @@
           <a:srgbClr val="000000"/>
         </a:buClr>
         <a:buFont typeface="Arial"/>
-        <a:defRPr b="0" i="0" sz="1400" u="none" cap="none" strike="noStrike">
+        <a:defRPr sz="1400" b="0" i="0" u="none" strike="noStrike" cap="none">
           <a:solidFill>
             <a:srgbClr val="000000"/>
           </a:solidFill>
@@ -5366,7 +5486,7 @@
           <a:sym typeface="Arial"/>
         </a:defRPr>
       </a:lvl6pPr>
-      <a:lvl7pPr lvl="6" marR="0" rtl="0" algn="l">
+      <a:lvl7pPr marR="0" lvl="6" algn="l" rtl="0">
         <a:lnSpc>
           <a:spcPct val="100000"/>
         </a:lnSpc>
@@ -5380,7 +5500,7 @@
           <a:srgbClr val="000000"/>
         </a:buClr>
         <a:buFont typeface="Arial"/>
-        <a:defRPr b="0" i="0" sz="1400" u="none" cap="none" strike="noStrike">
+        <a:defRPr sz="1400" b="0" i="0" u="none" strike="noStrike" cap="none">
           <a:solidFill>
             <a:srgbClr val="000000"/>
           </a:solidFill>
@@ -5390,7 +5510,7 @@
           <a:sym typeface="Arial"/>
         </a:defRPr>
       </a:lvl7pPr>
-      <a:lvl8pPr lvl="7" marR="0" rtl="0" algn="l">
+      <a:lvl8pPr marR="0" lvl="7" algn="l" rtl="0">
         <a:lnSpc>
           <a:spcPct val="100000"/>
         </a:lnSpc>
@@ -5404,7 +5524,7 @@
           <a:srgbClr val="000000"/>
         </a:buClr>
         <a:buFont typeface="Arial"/>
-        <a:defRPr b="0" i="0" sz="1400" u="none" cap="none" strike="noStrike">
+        <a:defRPr sz="1400" b="0" i="0" u="none" strike="noStrike" cap="none">
           <a:solidFill>
             <a:srgbClr val="000000"/>
           </a:solidFill>
@@ -5414,7 +5534,7 @@
           <a:sym typeface="Arial"/>
         </a:defRPr>
       </a:lvl8pPr>
-      <a:lvl9pPr lvl="8" marR="0" rtl="0" algn="l">
+      <a:lvl9pPr marR="0" lvl="8" algn="l" rtl="0">
         <a:lnSpc>
           <a:spcPct val="100000"/>
         </a:lnSpc>
@@ -5428,7 +5548,7 @@
           <a:srgbClr val="000000"/>
         </a:buClr>
         <a:buFont typeface="Arial"/>
-        <a:defRPr b="0" i="0" sz="1400" u="none" cap="none" strike="noStrike">
+        <a:defRPr sz="1400" b="0" i="0" u="none" strike="noStrike" cap="none">
           <a:solidFill>
             <a:srgbClr val="000000"/>
           </a:solidFill>
@@ -5444,11 +5564,11 @@
 </file>
 
 <file path=ppt/slides/slide1.xml><?xml version="1.0" encoding="utf-8"?>
-<p:sld xmlns:a="http://schemas.openxmlformats.org/drawingml/2006/main" xmlns:r="http://schemas.openxmlformats.org/officeDocument/2006/relationships" xmlns:mc="http://schemas.openxmlformats.org/markup-compatibility/2006" xmlns:mv="urn:schemas-microsoft-com:mac:vml" xmlns:p="http://schemas.openxmlformats.org/presentationml/2006/main" xmlns:c="http://schemas.openxmlformats.org/drawingml/2006/chart" xmlns:dgm="http://schemas.openxmlformats.org/drawingml/2006/diagram" xmlns:o="urn:schemas-microsoft-com:office:office" xmlns:v="urn:schemas-microsoft-com:vml" xmlns:pvml="urn:schemas-microsoft-com:office:powerpoint" xmlns:com="http://schemas.openxmlformats.org/drawingml/2006/compatibility" xmlns:p14="http://schemas.microsoft.com/office/powerpoint/2010/main" xmlns:p15="http://schemas.microsoft.com/office/powerpoint/2012/main" xmlns:ahyp="http://schemas.microsoft.com/office/drawing/2018/hyperlinkcolor">
+<p:sld xmlns:a="http://schemas.openxmlformats.org/drawingml/2006/main" xmlns:r="http://schemas.openxmlformats.org/officeDocument/2006/relationships" xmlns:p="http://schemas.openxmlformats.org/presentationml/2006/main">
   <p:cSld>
     <p:spTree>
       <p:nvGrpSpPr>
-        <p:cNvPr id="53" name="Shape 53"/>
+        <p:cNvPr id="1" name="Shape 53"/>
         <p:cNvGrpSpPr/>
         <p:nvPr/>
       </p:nvGrpSpPr>
@@ -5473,29 +5593,29 @@
           </a:xfrm>
           <a:prstGeom prst="roundRect">
             <a:avLst>
-              <a:gd fmla="val 16667" name="adj"/>
+              <a:gd name="adj" fmla="val 16667"/>
             </a:avLst>
           </a:prstGeom>
           <a:solidFill>
             <a:srgbClr val="FFEDB8"/>
           </a:solidFill>
-          <a:ln cap="flat" cmpd="sng" w="38100">
+          <a:ln w="38100" cap="flat" cmpd="sng">
             <a:solidFill>
               <a:srgbClr val="FFD966"/>
             </a:solidFill>
             <a:prstDash val="solid"/>
             <a:round/>
-            <a:headEnd len="sm" w="sm" type="none"/>
-            <a:tailEnd len="sm" w="sm" type="none"/>
+            <a:headEnd type="none" w="sm" len="sm"/>
+            <a:tailEnd type="none" w="sm" len="sm"/>
           </a:ln>
         </p:spPr>
         <p:txBody>
-          <a:bodyPr anchorCtr="0" anchor="ctr" bIns="91425" lIns="91425" spcFirstLastPara="1" rIns="91425" wrap="square" tIns="91425">
+          <a:bodyPr spcFirstLastPara="1" wrap="square" lIns="91425" tIns="91425" rIns="91425" bIns="91425" anchor="ctr" anchorCtr="0">
             <a:noAutofit/>
           </a:bodyPr>
           <a:lstStyle/>
           <a:p>
-            <a:pPr indent="0" lvl="0" marL="0" rtl="0" algn="ctr">
+            <a:pPr marL="0" lvl="0" indent="0" algn="ctr" rtl="0">
               <a:spcBef>
                 <a:spcPts val="0"/>
               </a:spcBef>
@@ -5535,29 +5655,29 @@
           </a:xfrm>
           <a:prstGeom prst="roundRect">
             <a:avLst>
-              <a:gd fmla="val 0" name="adj"/>
+              <a:gd name="adj" fmla="val 0"/>
             </a:avLst>
           </a:prstGeom>
           <a:solidFill>
             <a:srgbClr val="B7CDF1"/>
           </a:solidFill>
-          <a:ln cap="flat" cmpd="sng" w="38100">
+          <a:ln w="38100" cap="flat" cmpd="sng">
             <a:solidFill>
               <a:srgbClr val="6D9EEB"/>
             </a:solidFill>
             <a:prstDash val="solid"/>
             <a:round/>
-            <a:headEnd len="sm" w="sm" type="none"/>
-            <a:tailEnd len="sm" w="sm" type="none"/>
+            <a:headEnd type="none" w="sm" len="sm"/>
+            <a:tailEnd type="none" w="sm" len="sm"/>
           </a:ln>
         </p:spPr>
         <p:txBody>
-          <a:bodyPr anchorCtr="0" anchor="ctr" bIns="91425" lIns="91425" spcFirstLastPara="1" rIns="91425" wrap="square" tIns="91425">
+          <a:bodyPr spcFirstLastPara="1" wrap="square" lIns="91425" tIns="91425" rIns="91425" bIns="91425" anchor="ctr" anchorCtr="0">
             <a:noAutofit/>
           </a:bodyPr>
           <a:lstStyle/>
           <a:p>
-            <a:pPr indent="0" lvl="0" marL="0" rtl="0" algn="ctr">
+            <a:pPr marL="0" lvl="0" indent="0" algn="ctr" rtl="0">
               <a:spcBef>
                 <a:spcPts val="0"/>
               </a:spcBef>
@@ -5597,29 +5717,29 @@
           </a:xfrm>
           <a:prstGeom prst="roundRect">
             <a:avLst>
-              <a:gd fmla="val 16667" name="adj"/>
+              <a:gd name="adj" fmla="val 16667"/>
             </a:avLst>
           </a:prstGeom>
           <a:solidFill>
             <a:srgbClr val="DFBDCF"/>
           </a:solidFill>
-          <a:ln cap="flat" cmpd="sng" w="38100">
+          <a:ln w="38100" cap="flat" cmpd="sng">
             <a:solidFill>
               <a:srgbClr val="D09CB7"/>
             </a:solidFill>
             <a:prstDash val="solid"/>
             <a:round/>
-            <a:headEnd len="sm" w="sm" type="none"/>
-            <a:tailEnd len="sm" w="sm" type="none"/>
+            <a:headEnd type="none" w="sm" len="sm"/>
+            <a:tailEnd type="none" w="sm" len="sm"/>
           </a:ln>
         </p:spPr>
         <p:txBody>
-          <a:bodyPr anchorCtr="0" anchor="ctr" bIns="91425" lIns="91425" spcFirstLastPara="1" rIns="91425" wrap="square" tIns="91425">
+          <a:bodyPr spcFirstLastPara="1" wrap="square" lIns="91425" tIns="91425" rIns="91425" bIns="91425" anchor="ctr" anchorCtr="0">
             <a:noAutofit/>
           </a:bodyPr>
           <a:lstStyle/>
           <a:p>
-            <a:pPr indent="0" lvl="0" marL="0" rtl="0" algn="ctr">
+            <a:pPr marL="0" lvl="0" indent="0" algn="ctr" rtl="0">
               <a:spcBef>
                 <a:spcPts val="0"/>
               </a:spcBef>
@@ -5659,29 +5779,29 @@
           </a:xfrm>
           <a:prstGeom prst="octagon">
             <a:avLst>
-              <a:gd fmla="val 29289" name="adj"/>
+              <a:gd name="adj" fmla="val 29289"/>
             </a:avLst>
           </a:prstGeom>
           <a:solidFill>
             <a:srgbClr val="FFC08B"/>
           </a:solidFill>
-          <a:ln cap="flat" cmpd="sng" w="38100">
+          <a:ln w="38100" cap="flat" cmpd="sng">
             <a:solidFill>
               <a:srgbClr val="E88814"/>
             </a:solidFill>
             <a:prstDash val="solid"/>
             <a:round/>
-            <a:headEnd len="sm" w="sm" type="none"/>
-            <a:tailEnd len="sm" w="sm" type="none"/>
+            <a:headEnd type="none" w="sm" len="sm"/>
+            <a:tailEnd type="none" w="sm" len="sm"/>
           </a:ln>
         </p:spPr>
         <p:txBody>
-          <a:bodyPr anchorCtr="0" anchor="ctr" bIns="91425" lIns="91425" spcFirstLastPara="1" rIns="91425" wrap="square" tIns="91425">
+          <a:bodyPr spcFirstLastPara="1" wrap="square" lIns="91425" tIns="91425" rIns="91425" bIns="91425" anchor="ctr" anchorCtr="0">
             <a:noAutofit/>
           </a:bodyPr>
           <a:lstStyle/>
           <a:p>
-            <a:pPr indent="0" lvl="0" marL="0" rtl="0" algn="ctr">
+            <a:pPr marL="0" lvl="0" indent="0" algn="ctr" rtl="0">
               <a:spcBef>
                 <a:spcPts val="0"/>
               </a:spcBef>
@@ -5716,8 +5836,8 @@
         </p:nvSpPr>
         <p:spPr>
           <a:xfrm>
-            <a:off x="2294600" y="136000"/>
-            <a:ext cx="6539100" cy="943500"/>
+            <a:off x="2414016" y="136000"/>
+            <a:ext cx="6611112" cy="943500"/>
           </a:xfrm>
           <a:prstGeom prst="rect">
             <a:avLst/>
@@ -5728,12 +5848,12 @@
           </a:ln>
         </p:spPr>
         <p:txBody>
-          <a:bodyPr anchorCtr="0" anchor="t" bIns="91425" lIns="91425" spcFirstLastPara="1" rIns="91425" wrap="square" tIns="91425">
+          <a:bodyPr spcFirstLastPara="1" wrap="square" lIns="91425" tIns="91425" rIns="91425" bIns="91425" anchor="t" anchorCtr="0">
             <a:noAutofit/>
           </a:bodyPr>
           <a:lstStyle/>
           <a:p>
-            <a:pPr indent="0" lvl="0" marL="0" rtl="0" algn="l">
+            <a:pPr marL="0" lvl="0" indent="0" algn="l" rtl="0">
               <a:lnSpc>
                 <a:spcPct val="115000"/>
               </a:lnSpc>
@@ -5746,7 +5866,7 @@
               <a:buNone/>
             </a:pPr>
             <a:r>
-              <a:rPr lang="en-GB" sz="1000">
+              <a:rPr lang="en-GB" sz="1000" dirty="0">
                 <a:solidFill>
                   <a:srgbClr val="434343"/>
                 </a:solidFill>
@@ -5755,10 +5875,34 @@
                 <a:cs typeface="Open Sans"/>
                 <a:sym typeface="Open Sans"/>
               </a:rPr>
-              <a:t>These shapes can be used as copy/paste templates for modeling organization design and team interactions based on the ideas in Team Topologies. See</a:t>
+              <a:t>These shapes can be used as copy/paste templates for </a:t>
             </a:r>
             <a:r>
-              <a:rPr lang="en-GB" sz="1000">
+              <a:rPr lang="en-GB" sz="1000" dirty="0" err="1">
+                <a:solidFill>
+                  <a:srgbClr val="434343"/>
+                </a:solidFill>
+                <a:latin typeface="Open Sans"/>
+                <a:ea typeface="Open Sans"/>
+                <a:cs typeface="Open Sans"/>
+                <a:sym typeface="Open Sans"/>
+              </a:rPr>
+              <a:t>modeling</a:t>
+            </a:r>
+            <a:r>
+              <a:rPr lang="en-GB" sz="1000" dirty="0">
+                <a:solidFill>
+                  <a:srgbClr val="434343"/>
+                </a:solidFill>
+                <a:latin typeface="Open Sans"/>
+                <a:ea typeface="Open Sans"/>
+                <a:cs typeface="Open Sans"/>
+                <a:sym typeface="Open Sans"/>
+              </a:rPr>
+              <a:t> organization design and team interactions based on the ideas in Team Topologies. See</a:t>
+            </a:r>
+            <a:r>
+              <a:rPr lang="en-GB" sz="1000" dirty="0">
                 <a:solidFill>
                   <a:srgbClr val="434343"/>
                 </a:solidFill>
@@ -5772,7 +5916,7 @@
                 <a:hlinkClick r:id="rId3">
                   <a:extLst>
                     <a:ext uri="{A12FA001-AC4F-418D-AE19-62706E023703}">
-                      <ahyp:hlinkClr val="tx"/>
+                      <ahyp:hlinkClr xmlns:ahyp="http://schemas.microsoft.com/office/drawing/2018/hyperlinkcolor" val="tx"/>
                     </a:ext>
                   </a:extLst>
                 </a:hlinkClick>
@@ -5780,7 +5924,7 @@
               <a:t> </a:t>
             </a:r>
             <a:r>
-              <a:rPr lang="en-GB" sz="1000" u="sng">
+              <a:rPr lang="en-GB" sz="1000" u="sng" dirty="0">
                 <a:solidFill>
                   <a:srgbClr val="434343"/>
                 </a:solidFill>
@@ -5788,10 +5932,10 @@
                 <a:ea typeface="Open Sans"/>
                 <a:cs typeface="Open Sans"/>
                 <a:sym typeface="Open Sans"/>
-                <a:hlinkClick r:id="rId4">
+                <a:hlinkClick r:id="rId3">
                   <a:extLst>
                     <a:ext uri="{A12FA001-AC4F-418D-AE19-62706E023703}">
-                      <ahyp:hlinkClr val="tx"/>
+                      <ahyp:hlinkClr xmlns:ahyp="http://schemas.microsoft.com/office/drawing/2018/hyperlinkcolor" val="tx"/>
                     </a:ext>
                   </a:extLst>
                 </a:hlinkClick>
@@ -5799,7 +5943,7 @@
               <a:t>teamtopologies.com</a:t>
             </a:r>
             <a:r>
-              <a:rPr lang="en-GB" sz="1000">
+              <a:rPr lang="en-GB" sz="1000" dirty="0">
                 <a:solidFill>
                   <a:srgbClr val="434343"/>
                 </a:solidFill>
@@ -5810,7 +5954,7 @@
               </a:rPr>
               <a:t> for more details. We have tried to make the shapes match as closely as possible to those in the book, but some shapes are slightly different.</a:t>
             </a:r>
-            <a:endParaRPr sz="1000">
+            <a:endParaRPr sz="1000" dirty="0">
               <a:solidFill>
                 <a:srgbClr val="434343"/>
               </a:solidFill>
@@ -5846,12 +5990,12 @@
           </a:ln>
         </p:spPr>
         <p:txBody>
-          <a:bodyPr anchorCtr="0" anchor="ctr" bIns="91425" lIns="91425" spcFirstLastPara="1" rIns="91425" wrap="square" tIns="91425">
+          <a:bodyPr spcFirstLastPara="1" wrap="square" lIns="91425" tIns="91425" rIns="91425" bIns="91425" anchor="ctr" anchorCtr="0">
             <a:noAutofit/>
           </a:bodyPr>
           <a:lstStyle/>
           <a:p>
-            <a:pPr indent="0" lvl="0" marL="0" rtl="0" algn="ctr">
+            <a:pPr marL="0" lvl="0" indent="0" algn="ctr" rtl="0">
               <a:spcBef>
                 <a:spcPts val="0"/>
               </a:spcBef>
@@ -5898,12 +6042,12 @@
           </a:ln>
         </p:spPr>
         <p:txBody>
-          <a:bodyPr anchorCtr="0" anchor="t" bIns="91425" lIns="91425" spcFirstLastPara="1" rIns="91425" wrap="square" tIns="91425">
+          <a:bodyPr spcFirstLastPara="1" wrap="square" lIns="91425" tIns="91425" rIns="91425" bIns="91425" anchor="t" anchorCtr="0">
             <a:noAutofit/>
           </a:bodyPr>
           <a:lstStyle/>
           <a:p>
-            <a:pPr indent="0" lvl="0" marL="0" rtl="0" algn="ctr">
+            <a:pPr marL="0" lvl="0" indent="0" algn="ctr" rtl="0">
               <a:spcBef>
                 <a:spcPts val="0"/>
               </a:spcBef>
@@ -5913,7 +6057,7 @@
               <a:buNone/>
             </a:pPr>
             <a:r>
-              <a:rPr b="1" lang="en-GB" sz="1050" u="sng">
+              <a:rPr lang="en-GB" sz="1050" b="1" u="sng">
                 <a:solidFill>
                   <a:srgbClr val="1A1A1A"/>
                 </a:solidFill>
@@ -5953,12 +6097,12 @@
           </a:ln>
         </p:spPr>
         <p:txBody>
-          <a:bodyPr anchorCtr="0" anchor="t" bIns="91425" lIns="91425" spcFirstLastPara="1" rIns="91425" wrap="square" tIns="91425">
+          <a:bodyPr spcFirstLastPara="1" wrap="square" lIns="91425" tIns="91425" rIns="91425" bIns="91425" anchor="t" anchorCtr="0">
             <a:noAutofit/>
           </a:bodyPr>
           <a:lstStyle/>
           <a:p>
-            <a:pPr indent="0" lvl="0" marL="0" rtl="0" algn="ctr">
+            <a:pPr marL="0" lvl="0" indent="0" algn="ctr" rtl="0">
               <a:spcBef>
                 <a:spcPts val="0"/>
               </a:spcBef>
@@ -5968,7 +6112,7 @@
               <a:buNone/>
             </a:pPr>
             <a:r>
-              <a:rPr b="1" lang="en-GB" sz="1050" u="sng">
+              <a:rPr lang="en-GB" sz="1050" b="1" u="sng">
                 <a:solidFill>
                   <a:srgbClr val="1A1A1A"/>
                 </a:solidFill>
@@ -6001,7 +6145,7 @@
           </a:xfrm>
           <a:prstGeom prst="triangle">
             <a:avLst>
-              <a:gd fmla="val 50000" name="adj"/>
+              <a:gd name="adj" fmla="val 50000"/>
             </a:avLst>
           </a:prstGeom>
           <a:solidFill>
@@ -6012,12 +6156,12 @@
           </a:ln>
         </p:spPr>
         <p:txBody>
-          <a:bodyPr anchorCtr="0" anchor="ctr" bIns="91425" lIns="91425" spcFirstLastPara="1" rIns="91425" wrap="square" tIns="91425">
+          <a:bodyPr spcFirstLastPara="1" wrap="square" lIns="91425" tIns="91425" rIns="91425" bIns="91425" anchor="ctr" anchorCtr="0">
             <a:noAutofit/>
           </a:bodyPr>
           <a:lstStyle/>
           <a:p>
-            <a:pPr indent="0" lvl="0" marL="0" rtl="0" algn="ctr">
+            <a:pPr marL="0" lvl="0" indent="0" algn="ctr" rtl="0">
               <a:spcBef>
                 <a:spcPts val="0"/>
               </a:spcBef>
@@ -6068,12 +6212,12 @@
           </a:ln>
         </p:spPr>
         <p:txBody>
-          <a:bodyPr anchorCtr="0" anchor="ctr" bIns="91425" lIns="91425" spcFirstLastPara="1" rIns="91425" wrap="square" tIns="91425">
+          <a:bodyPr spcFirstLastPara="1" wrap="square" lIns="91425" tIns="91425" rIns="91425" bIns="91425" anchor="ctr" anchorCtr="0">
             <a:noAutofit/>
           </a:bodyPr>
           <a:lstStyle/>
           <a:p>
-            <a:pPr indent="0" lvl="0" marL="0" rtl="0" algn="ctr">
+            <a:pPr marL="0" lvl="0" indent="0" algn="ctr" rtl="0">
               <a:spcBef>
                 <a:spcPts val="0"/>
               </a:spcBef>
@@ -6109,7 +6253,7 @@
         <p:spPr>
           <a:xfrm>
             <a:off x="262700" y="171275"/>
-            <a:ext cx="2031900" cy="615600"/>
+            <a:ext cx="2151316" cy="615600"/>
           </a:xfrm>
           <a:prstGeom prst="rect">
             <a:avLst/>
@@ -6120,12 +6264,12 @@
           </a:ln>
         </p:spPr>
         <p:txBody>
-          <a:bodyPr anchorCtr="0" anchor="t" bIns="91425" lIns="91425" spcFirstLastPara="1" rIns="91425" wrap="square" tIns="91425">
+          <a:bodyPr spcFirstLastPara="1" wrap="square" lIns="91425" tIns="91425" rIns="91425" bIns="91425" anchor="t" anchorCtr="0">
             <a:spAutoFit/>
           </a:bodyPr>
           <a:lstStyle/>
           <a:p>
-            <a:pPr indent="0" lvl="0" marL="0" rtl="0" algn="l">
+            <a:pPr marL="0" lvl="0" indent="0" algn="l" rtl="0">
               <a:spcBef>
                 <a:spcPts val="0"/>
               </a:spcBef>
@@ -6135,16 +6279,27 @@
               <a:buNone/>
             </a:pPr>
             <a:r>
-              <a:rPr b="1" lang="en-GB">
+              <a:rPr lang="en-GB" b="1" dirty="0">
                 <a:latin typeface="Open Sans"/>
                 <a:ea typeface="Open Sans"/>
                 <a:cs typeface="Open Sans"/>
                 <a:sym typeface="Open Sans"/>
               </a:rPr>
-              <a:t>Team Topologies </a:t>
+              <a:t>Team Topologies</a:t>
             </a:r>
+          </a:p>
+          <a:p>
+            <a:pPr marL="0" lvl="0" indent="0" algn="l" rtl="0">
+              <a:spcBef>
+                <a:spcPts val="0"/>
+              </a:spcBef>
+              <a:spcAft>
+                <a:spcPts val="0"/>
+              </a:spcAft>
+              <a:buNone/>
+            </a:pPr>
             <a:r>
-              <a:rPr lang="en-GB">
+              <a:rPr lang="en-GB" dirty="0">
                 <a:latin typeface="Open Sans"/>
                 <a:ea typeface="Open Sans"/>
                 <a:cs typeface="Open Sans"/>
@@ -6152,7 +6307,7 @@
               </a:rPr>
               <a:t>team shapes template</a:t>
             </a:r>
-            <a:endParaRPr>
+            <a:endParaRPr dirty="0">
               <a:latin typeface="Open Sans"/>
               <a:ea typeface="Open Sans"/>
               <a:cs typeface="Open Sans"/>
@@ -6174,28 +6329,28 @@
           </a:xfrm>
           <a:prstGeom prst="rightArrow">
             <a:avLst>
-              <a:gd fmla="val 57171" name="adj1"/>
-              <a:gd fmla="val 70330" name="adj2"/>
+              <a:gd name="adj1" fmla="val 57171"/>
+              <a:gd name="adj2" fmla="val 70330"/>
             </a:avLst>
           </a:prstGeom>
           <a:noFill/>
-          <a:ln cap="flat" cmpd="sng" w="9525">
+          <a:ln w="9525" cap="flat" cmpd="sng">
             <a:solidFill>
               <a:schemeClr val="dk2"/>
             </a:solidFill>
             <a:prstDash val="dash"/>
             <a:round/>
-            <a:headEnd len="sm" w="sm" type="none"/>
-            <a:tailEnd len="sm" w="sm" type="none"/>
+            <a:headEnd type="none" w="sm" len="sm"/>
+            <a:tailEnd type="none" w="sm" len="sm"/>
           </a:ln>
         </p:spPr>
         <p:txBody>
-          <a:bodyPr anchorCtr="0" anchor="ctr" bIns="91425" lIns="91425" spcFirstLastPara="1" rIns="91425" wrap="square" tIns="91425">
+          <a:bodyPr spcFirstLastPara="1" wrap="square" lIns="91425" tIns="91425" rIns="91425" bIns="91425" anchor="ctr" anchorCtr="0">
             <a:noAutofit/>
           </a:bodyPr>
           <a:lstStyle/>
           <a:p>
-            <a:pPr indent="0" lvl="0" marL="0" rtl="0" algn="ctr">
+            <a:pPr marL="0" lvl="0" indent="0" algn="ctr" rtl="0">
               <a:spcBef>
                 <a:spcPts val="0"/>
               </a:spcBef>
@@ -6221,7 +6376,288 @@
 </file>
 
 <file path=ppt/theme/theme1.xml><?xml version="1.0" encoding="utf-8"?>
-<a:theme xmlns:a="http://schemas.openxmlformats.org/drawingml/2006/main" xmlns:r="http://schemas.openxmlformats.org/officeDocument/2006/relationships">
+<a:theme xmlns:a="http://schemas.openxmlformats.org/drawingml/2006/main" name="Simple Light">
+  <a:themeElements>
+    <a:clrScheme name="Simple Light">
+      <a:dk1>
+        <a:srgbClr val="000000"/>
+      </a:dk1>
+      <a:lt1>
+        <a:srgbClr val="FFFFFF"/>
+      </a:lt1>
+      <a:dk2>
+        <a:srgbClr val="595959"/>
+      </a:dk2>
+      <a:lt2>
+        <a:srgbClr val="EEEEEE"/>
+      </a:lt2>
+      <a:accent1>
+        <a:srgbClr val="4285F4"/>
+      </a:accent1>
+      <a:accent2>
+        <a:srgbClr val="212121"/>
+      </a:accent2>
+      <a:accent3>
+        <a:srgbClr val="78909C"/>
+      </a:accent3>
+      <a:accent4>
+        <a:srgbClr val="FFAB40"/>
+      </a:accent4>
+      <a:accent5>
+        <a:srgbClr val="0097A7"/>
+      </a:accent5>
+      <a:accent6>
+        <a:srgbClr val="EEFF41"/>
+      </a:accent6>
+      <a:hlink>
+        <a:srgbClr val="0097A7"/>
+      </a:hlink>
+      <a:folHlink>
+        <a:srgbClr val="0097A7"/>
+      </a:folHlink>
+    </a:clrScheme>
+    <a:fontScheme name="Office">
+      <a:majorFont>
+        <a:latin typeface="Arial"/>
+        <a:ea typeface=""/>
+        <a:cs typeface=""/>
+        <a:font script="Jpan" typeface="ＭＳ Ｐゴシック"/>
+        <a:font script="Hang" typeface="맑은 고딕"/>
+        <a:font script="Hans" typeface="宋体"/>
+        <a:font script="Hant" typeface="新細明體"/>
+        <a:font script="Arab" typeface="Times New Roman"/>
+        <a:font script="Hebr" typeface="Times New Roman"/>
+        <a:font script="Thai" typeface="Angsana New"/>
+        <a:font script="Ethi" typeface="Nyala"/>
+        <a:font script="Beng" typeface="Vrinda"/>
+        <a:font script="Gujr" typeface="Shruti"/>
+        <a:font script="Khmr" typeface="MoolBoran"/>
+        <a:font script="Knda" typeface="Tunga"/>
+        <a:font script="Guru" typeface="Raavi"/>
+        <a:font script="Cans" typeface="Euphemia"/>
+        <a:font script="Cher" typeface="Plantagenet Cherokee"/>
+        <a:font script="Yiii" typeface="Microsoft Yi Baiti"/>
+        <a:font script="Tibt" typeface="Microsoft Himalaya"/>
+        <a:font script="Thaa" typeface="MV Boli"/>
+        <a:font script="Deva" typeface="Mangal"/>
+        <a:font script="Telu" typeface="Gautami"/>
+        <a:font script="Taml" typeface="Latha"/>
+        <a:font script="Syrc" typeface="Estrangelo Edessa"/>
+        <a:font script="Orya" typeface="Kalinga"/>
+        <a:font script="Mlym" typeface="Kartika"/>
+        <a:font script="Laoo" typeface="DokChampa"/>
+        <a:font script="Sinh" typeface="Iskoola Pota"/>
+        <a:font script="Mong" typeface="Mongolian Baiti"/>
+        <a:font script="Viet" typeface="Times New Roman"/>
+        <a:font script="Uigh" typeface="Microsoft Uighur"/>
+        <a:font script="Geor" typeface="Sylfaen"/>
+      </a:majorFont>
+      <a:minorFont>
+        <a:latin typeface="Arial"/>
+        <a:ea typeface=""/>
+        <a:cs typeface=""/>
+        <a:font script="Jpan" typeface="ＭＳ Ｐゴシック"/>
+        <a:font script="Hang" typeface="맑은 고딕"/>
+        <a:font script="Hans" typeface="宋体"/>
+        <a:font script="Hant" typeface="新細明體"/>
+        <a:font script="Arab" typeface="Arial"/>
+        <a:font script="Hebr" typeface="Arial"/>
+        <a:font script="Thai" typeface="Cordia New"/>
+        <a:font script="Ethi" typeface="Nyala"/>
+        <a:font script="Beng" typeface="Vrinda"/>
+        <a:font script="Gujr" typeface="Shruti"/>
+        <a:font script="Khmr" typeface="DaunPenh"/>
+        <a:font script="Knda" typeface="Tunga"/>
+        <a:font script="Guru" typeface="Raavi"/>
+        <a:font script="Cans" typeface="Euphemia"/>
+        <a:font script="Cher" typeface="Plantagenet Cherokee"/>
+        <a:font script="Yiii" typeface="Microsoft Yi Baiti"/>
+        <a:font script="Tibt" typeface="Microsoft Himalaya"/>
+        <a:font script="Thaa" typeface="MV Boli"/>
+        <a:font script="Deva" typeface="Mangal"/>
+        <a:font script="Telu" typeface="Gautami"/>
+        <a:font script="Taml" typeface="Latha"/>
+        <a:font script="Syrc" typeface="Estrangelo Edessa"/>
+        <a:font script="Orya" typeface="Kalinga"/>
+        <a:font script="Mlym" typeface="Kartika"/>
+        <a:font script="Laoo" typeface="DokChampa"/>
+        <a:font script="Sinh" typeface="Iskoola Pota"/>
+        <a:font script="Mong" typeface="Mongolian Baiti"/>
+        <a:font script="Viet" typeface="Arial"/>
+        <a:font script="Uigh" typeface="Microsoft Uighur"/>
+        <a:font script="Geor" typeface="Sylfaen"/>
+      </a:minorFont>
+    </a:fontScheme>
+    <a:fmtScheme name="Office">
+      <a:fillStyleLst>
+        <a:solidFill>
+          <a:schemeClr val="phClr"/>
+        </a:solidFill>
+        <a:gradFill rotWithShape="1">
+          <a:gsLst>
+            <a:gs pos="0">
+              <a:schemeClr val="phClr">
+                <a:tint val="50000"/>
+                <a:satMod val="300000"/>
+              </a:schemeClr>
+            </a:gs>
+            <a:gs pos="35000">
+              <a:schemeClr val="phClr">
+                <a:tint val="37000"/>
+                <a:satMod val="300000"/>
+              </a:schemeClr>
+            </a:gs>
+            <a:gs pos="100000">
+              <a:schemeClr val="phClr">
+                <a:tint val="15000"/>
+                <a:satMod val="350000"/>
+              </a:schemeClr>
+            </a:gs>
+          </a:gsLst>
+          <a:lin ang="16200000" scaled="1"/>
+        </a:gradFill>
+        <a:gradFill rotWithShape="1">
+          <a:gsLst>
+            <a:gs pos="0">
+              <a:schemeClr val="phClr">
+                <a:tint val="100000"/>
+                <a:shade val="100000"/>
+                <a:satMod val="130000"/>
+              </a:schemeClr>
+            </a:gs>
+            <a:gs pos="100000">
+              <a:schemeClr val="phClr">
+                <a:tint val="50000"/>
+                <a:shade val="100000"/>
+                <a:satMod val="350000"/>
+              </a:schemeClr>
+            </a:gs>
+          </a:gsLst>
+          <a:lin ang="16200000" scaled="0"/>
+        </a:gradFill>
+      </a:fillStyleLst>
+      <a:lnStyleLst>
+        <a:ln w="9525" cap="flat" cmpd="sng" algn="ctr">
+          <a:solidFill>
+            <a:schemeClr val="phClr">
+              <a:shade val="95000"/>
+              <a:satMod val="105000"/>
+            </a:schemeClr>
+          </a:solidFill>
+          <a:prstDash val="solid"/>
+        </a:ln>
+        <a:ln w="25400" cap="flat" cmpd="sng" algn="ctr">
+          <a:solidFill>
+            <a:schemeClr val="phClr"/>
+          </a:solidFill>
+          <a:prstDash val="solid"/>
+        </a:ln>
+        <a:ln w="38100" cap="flat" cmpd="sng" algn="ctr">
+          <a:solidFill>
+            <a:schemeClr val="phClr"/>
+          </a:solidFill>
+          <a:prstDash val="solid"/>
+        </a:ln>
+      </a:lnStyleLst>
+      <a:effectStyleLst>
+        <a:effectStyle>
+          <a:effectLst>
+            <a:outerShdw blurRad="40000" dist="20000" dir="5400000" rotWithShape="0">
+              <a:srgbClr val="000000">
+                <a:alpha val="38000"/>
+              </a:srgbClr>
+            </a:outerShdw>
+          </a:effectLst>
+        </a:effectStyle>
+        <a:effectStyle>
+          <a:effectLst>
+            <a:outerShdw blurRad="40000" dist="23000" dir="5400000" rotWithShape="0">
+              <a:srgbClr val="000000">
+                <a:alpha val="35000"/>
+              </a:srgbClr>
+            </a:outerShdw>
+          </a:effectLst>
+        </a:effectStyle>
+        <a:effectStyle>
+          <a:effectLst>
+            <a:outerShdw blurRad="40000" dist="23000" dir="5400000" rotWithShape="0">
+              <a:srgbClr val="000000">
+                <a:alpha val="35000"/>
+              </a:srgbClr>
+            </a:outerShdw>
+          </a:effectLst>
+          <a:scene3d>
+            <a:camera prst="orthographicFront">
+              <a:rot lat="0" lon="0" rev="0"/>
+            </a:camera>
+            <a:lightRig rig="threePt" dir="t">
+              <a:rot lat="0" lon="0" rev="1200000"/>
+            </a:lightRig>
+          </a:scene3d>
+          <a:sp3d>
+            <a:bevelT w="63500" h="25400"/>
+          </a:sp3d>
+        </a:effectStyle>
+      </a:effectStyleLst>
+      <a:bgFillStyleLst>
+        <a:solidFill>
+          <a:schemeClr val="phClr"/>
+        </a:solidFill>
+        <a:gradFill rotWithShape="1">
+          <a:gsLst>
+            <a:gs pos="0">
+              <a:schemeClr val="phClr">
+                <a:tint val="40000"/>
+                <a:satMod val="350000"/>
+              </a:schemeClr>
+            </a:gs>
+            <a:gs pos="40000">
+              <a:schemeClr val="phClr">
+                <a:tint val="45000"/>
+                <a:shade val="99000"/>
+                <a:satMod val="350000"/>
+              </a:schemeClr>
+            </a:gs>
+            <a:gs pos="100000">
+              <a:schemeClr val="phClr">
+                <a:shade val="20000"/>
+                <a:satMod val="255000"/>
+              </a:schemeClr>
+            </a:gs>
+          </a:gsLst>
+          <a:path path="circle">
+            <a:fillToRect l="50000" t="-80000" r="50000" b="180000"/>
+          </a:path>
+        </a:gradFill>
+        <a:gradFill rotWithShape="1">
+          <a:gsLst>
+            <a:gs pos="0">
+              <a:schemeClr val="phClr">
+                <a:tint val="80000"/>
+                <a:satMod val="300000"/>
+              </a:schemeClr>
+            </a:gs>
+            <a:gs pos="100000">
+              <a:schemeClr val="phClr">
+                <a:shade val="30000"/>
+                <a:satMod val="200000"/>
+              </a:schemeClr>
+            </a:gs>
+          </a:gsLst>
+          <a:path path="circle">
+            <a:fillToRect l="50000" t="50000" r="50000" b="50000"/>
+          </a:path>
+        </a:gradFill>
+      </a:bgFillStyleLst>
+    </a:fmtScheme>
+  </a:themeElements>
+  <a:objectDefaults/>
+  <a:extraClrSchemeLst/>
+</a:theme>
+</file>
+
+<file path=ppt/theme/theme2.xml><?xml version="1.0" encoding="utf-8"?>
+<a:theme xmlns:a="http://schemas.openxmlformats.org/drawingml/2006/main">
   <a:themeElements>
     <a:clrScheme name="Default">
       <a:dk1>
@@ -6496,284 +6932,7 @@
       </a:bgFillStyleLst>
     </a:fmtScheme>
   </a:themeElements>
-</a:theme>
-</file>
-
-<file path=ppt/theme/theme2.xml><?xml version="1.0" encoding="utf-8"?>
-<a:theme xmlns:a="http://schemas.openxmlformats.org/drawingml/2006/main" xmlns:r="http://schemas.openxmlformats.org/officeDocument/2006/relationships" name="Simple Light">
-  <a:themeElements>
-    <a:clrScheme name="Simple Light">
-      <a:dk1>
-        <a:srgbClr val="000000"/>
-      </a:dk1>
-      <a:lt1>
-        <a:srgbClr val="FFFFFF"/>
-      </a:lt1>
-      <a:dk2>
-        <a:srgbClr val="595959"/>
-      </a:dk2>
-      <a:lt2>
-        <a:srgbClr val="EEEEEE"/>
-      </a:lt2>
-      <a:accent1>
-        <a:srgbClr val="4285F4"/>
-      </a:accent1>
-      <a:accent2>
-        <a:srgbClr val="212121"/>
-      </a:accent2>
-      <a:accent3>
-        <a:srgbClr val="78909C"/>
-      </a:accent3>
-      <a:accent4>
-        <a:srgbClr val="FFAB40"/>
-      </a:accent4>
-      <a:accent5>
-        <a:srgbClr val="0097A7"/>
-      </a:accent5>
-      <a:accent6>
-        <a:srgbClr val="EEFF41"/>
-      </a:accent6>
-      <a:hlink>
-        <a:srgbClr val="0097A7"/>
-      </a:hlink>
-      <a:folHlink>
-        <a:srgbClr val="0097A7"/>
-      </a:folHlink>
-    </a:clrScheme>
-    <a:fontScheme name="Office">
-      <a:majorFont>
-        <a:latin typeface="Arial"/>
-        <a:ea typeface=""/>
-        <a:cs typeface=""/>
-        <a:font script="Jpan" typeface="ＭＳ Ｐゴシック"/>
-        <a:font script="Hang" typeface="맑은 고딕"/>
-        <a:font script="Hans" typeface="宋体"/>
-        <a:font script="Hant" typeface="新細明體"/>
-        <a:font script="Arab" typeface="Times New Roman"/>
-        <a:font script="Hebr" typeface="Times New Roman"/>
-        <a:font script="Thai" typeface="Angsana New"/>
-        <a:font script="Ethi" typeface="Nyala"/>
-        <a:font script="Beng" typeface="Vrinda"/>
-        <a:font script="Gujr" typeface="Shruti"/>
-        <a:font script="Khmr" typeface="MoolBoran"/>
-        <a:font script="Knda" typeface="Tunga"/>
-        <a:font script="Guru" typeface="Raavi"/>
-        <a:font script="Cans" typeface="Euphemia"/>
-        <a:font script="Cher" typeface="Plantagenet Cherokee"/>
-        <a:font script="Yiii" typeface="Microsoft Yi Baiti"/>
-        <a:font script="Tibt" typeface="Microsoft Himalaya"/>
-        <a:font script="Thaa" typeface="MV Boli"/>
-        <a:font script="Deva" typeface="Mangal"/>
-        <a:font script="Telu" typeface="Gautami"/>
-        <a:font script="Taml" typeface="Latha"/>
-        <a:font script="Syrc" typeface="Estrangelo Edessa"/>
-        <a:font script="Orya" typeface="Kalinga"/>
-        <a:font script="Mlym" typeface="Kartika"/>
-        <a:font script="Laoo" typeface="DokChampa"/>
-        <a:font script="Sinh" typeface="Iskoola Pota"/>
-        <a:font script="Mong" typeface="Mongolian Baiti"/>
-        <a:font script="Viet" typeface="Times New Roman"/>
-        <a:font script="Uigh" typeface="Microsoft Uighur"/>
-        <a:font script="Geor" typeface="Sylfaen"/>
-      </a:majorFont>
-      <a:minorFont>
-        <a:latin typeface="Arial"/>
-        <a:ea typeface=""/>
-        <a:cs typeface=""/>
-        <a:font script="Jpan" typeface="ＭＳ Ｐゴシック"/>
-        <a:font script="Hang" typeface="맑은 고딕"/>
-        <a:font script="Hans" typeface="宋体"/>
-        <a:font script="Hant" typeface="新細明體"/>
-        <a:font script="Arab" typeface="Arial"/>
-        <a:font script="Hebr" typeface="Arial"/>
-        <a:font script="Thai" typeface="Cordia New"/>
-        <a:font script="Ethi" typeface="Nyala"/>
-        <a:font script="Beng" typeface="Vrinda"/>
-        <a:font script="Gujr" typeface="Shruti"/>
-        <a:font script="Khmr" typeface="DaunPenh"/>
-        <a:font script="Knda" typeface="Tunga"/>
-        <a:font script="Guru" typeface="Raavi"/>
-        <a:font script="Cans" typeface="Euphemia"/>
-        <a:font script="Cher" typeface="Plantagenet Cherokee"/>
-        <a:font script="Yiii" typeface="Microsoft Yi Baiti"/>
-        <a:font script="Tibt" typeface="Microsoft Himalaya"/>
-        <a:font script="Thaa" typeface="MV Boli"/>
-        <a:font script="Deva" typeface="Mangal"/>
-        <a:font script="Telu" typeface="Gautami"/>
-        <a:font script="Taml" typeface="Latha"/>
-        <a:font script="Syrc" typeface="Estrangelo Edessa"/>
-        <a:font script="Orya" typeface="Kalinga"/>
-        <a:font script="Mlym" typeface="Kartika"/>
-        <a:font script="Laoo" typeface="DokChampa"/>
-        <a:font script="Sinh" typeface="Iskoola Pota"/>
-        <a:font script="Mong" typeface="Mongolian Baiti"/>
-        <a:font script="Viet" typeface="Arial"/>
-        <a:font script="Uigh" typeface="Microsoft Uighur"/>
-        <a:font script="Geor" typeface="Sylfaen"/>
-      </a:minorFont>
-    </a:fontScheme>
-    <a:fmtScheme name="Office">
-      <a:fillStyleLst>
-        <a:solidFill>
-          <a:schemeClr val="phClr"/>
-        </a:solidFill>
-        <a:gradFill rotWithShape="1">
-          <a:gsLst>
-            <a:gs pos="0">
-              <a:schemeClr val="phClr">
-                <a:tint val="50000"/>
-                <a:satMod val="300000"/>
-              </a:schemeClr>
-            </a:gs>
-            <a:gs pos="35000">
-              <a:schemeClr val="phClr">
-                <a:tint val="37000"/>
-                <a:satMod val="300000"/>
-              </a:schemeClr>
-            </a:gs>
-            <a:gs pos="100000">
-              <a:schemeClr val="phClr">
-                <a:tint val="15000"/>
-                <a:satMod val="350000"/>
-              </a:schemeClr>
-            </a:gs>
-          </a:gsLst>
-          <a:lin ang="16200000" scaled="1"/>
-        </a:gradFill>
-        <a:gradFill rotWithShape="1">
-          <a:gsLst>
-            <a:gs pos="0">
-              <a:schemeClr val="phClr">
-                <a:tint val="100000"/>
-                <a:shade val="100000"/>
-                <a:satMod val="130000"/>
-              </a:schemeClr>
-            </a:gs>
-            <a:gs pos="100000">
-              <a:schemeClr val="phClr">
-                <a:tint val="50000"/>
-                <a:shade val="100000"/>
-                <a:satMod val="350000"/>
-              </a:schemeClr>
-            </a:gs>
-          </a:gsLst>
-          <a:lin ang="16200000" scaled="0"/>
-        </a:gradFill>
-      </a:fillStyleLst>
-      <a:lnStyleLst>
-        <a:ln w="9525" cap="flat" cmpd="sng" algn="ctr">
-          <a:solidFill>
-            <a:schemeClr val="phClr">
-              <a:shade val="95000"/>
-              <a:satMod val="105000"/>
-            </a:schemeClr>
-          </a:solidFill>
-          <a:prstDash val="solid"/>
-        </a:ln>
-        <a:ln w="25400" cap="flat" cmpd="sng" algn="ctr">
-          <a:solidFill>
-            <a:schemeClr val="phClr"/>
-          </a:solidFill>
-          <a:prstDash val="solid"/>
-        </a:ln>
-        <a:ln w="38100" cap="flat" cmpd="sng" algn="ctr">
-          <a:solidFill>
-            <a:schemeClr val="phClr"/>
-          </a:solidFill>
-          <a:prstDash val="solid"/>
-        </a:ln>
-      </a:lnStyleLst>
-      <a:effectStyleLst>
-        <a:effectStyle>
-          <a:effectLst>
-            <a:outerShdw blurRad="40000" dist="20000" dir="5400000" rotWithShape="0">
-              <a:srgbClr val="000000">
-                <a:alpha val="38000"/>
-              </a:srgbClr>
-            </a:outerShdw>
-          </a:effectLst>
-        </a:effectStyle>
-        <a:effectStyle>
-          <a:effectLst>
-            <a:outerShdw blurRad="40000" dist="23000" dir="5400000" rotWithShape="0">
-              <a:srgbClr val="000000">
-                <a:alpha val="35000"/>
-              </a:srgbClr>
-            </a:outerShdw>
-          </a:effectLst>
-        </a:effectStyle>
-        <a:effectStyle>
-          <a:effectLst>
-            <a:outerShdw blurRad="40000" dist="23000" dir="5400000" rotWithShape="0">
-              <a:srgbClr val="000000">
-                <a:alpha val="35000"/>
-              </a:srgbClr>
-            </a:outerShdw>
-          </a:effectLst>
-          <a:scene3d>
-            <a:camera prst="orthographicFront">
-              <a:rot lat="0" lon="0" rev="0"/>
-            </a:camera>
-            <a:lightRig rig="threePt" dir="t">
-              <a:rot lat="0" lon="0" rev="1200000"/>
-            </a:lightRig>
-          </a:scene3d>
-          <a:sp3d>
-            <a:bevelT w="63500" h="25400"/>
-          </a:sp3d>
-        </a:effectStyle>
-      </a:effectStyleLst>
-      <a:bgFillStyleLst>
-        <a:solidFill>
-          <a:schemeClr val="phClr"/>
-        </a:solidFill>
-        <a:gradFill rotWithShape="1">
-          <a:gsLst>
-            <a:gs pos="0">
-              <a:schemeClr val="phClr">
-                <a:tint val="40000"/>
-                <a:satMod val="350000"/>
-              </a:schemeClr>
-            </a:gs>
-            <a:gs pos="40000">
-              <a:schemeClr val="phClr">
-                <a:tint val="45000"/>
-                <a:shade val="99000"/>
-                <a:satMod val="350000"/>
-              </a:schemeClr>
-            </a:gs>
-            <a:gs pos="100000">
-              <a:schemeClr val="phClr">
-                <a:shade val="20000"/>
-                <a:satMod val="255000"/>
-              </a:schemeClr>
-            </a:gs>
-          </a:gsLst>
-          <a:path path="circle">
-            <a:fillToRect l="50000" t="-80000" r="50000" b="180000"/>
-          </a:path>
-        </a:gradFill>
-        <a:gradFill rotWithShape="1">
-          <a:gsLst>
-            <a:gs pos="0">
-              <a:schemeClr val="phClr">
-                <a:tint val="80000"/>
-                <a:satMod val="300000"/>
-              </a:schemeClr>
-            </a:gs>
-            <a:gs pos="100000">
-              <a:schemeClr val="phClr">
-                <a:shade val="30000"/>
-                <a:satMod val="200000"/>
-              </a:schemeClr>
-            </a:gs>
-          </a:gsLst>
-          <a:path path="circle">
-            <a:fillToRect l="50000" t="50000" r="50000" b="50000"/>
-          </a:path>
-        </a:gradFill>
-      </a:bgFillStyleLst>
-    </a:fmtScheme>
-  </a:themeElements>
+  <a:objectDefaults/>
+  <a:extraClrSchemeLst/>
 </a:theme>
 </file>
</xml_diff>

<commit_message>
TTM4 - Add outline to facilitation modes
</commit_message>
<xml_diff>
--- a/powerpoint/Team Topologies Template for modelling - PowerPoint.pptx
+++ b/powerpoint/Team Topologies Template for modelling - PowerPoint.pptx
@@ -1,28 +1,28 @@
 
 <file path=ppt/presentation.xml><?xml version="1.0" encoding="utf-8"?>
-<p:presentation xmlns:a="http://schemas.openxmlformats.org/drawingml/2006/main" xmlns:r="http://schemas.openxmlformats.org/officeDocument/2006/relationships" xmlns:p="http://schemas.openxmlformats.org/presentationml/2006/main" strictFirstAndLastChars="0" embedTrueTypeFonts="1" saveSubsetFonts="1" autoCompressPictures="0">
+<p:presentation xmlns:a="http://schemas.openxmlformats.org/drawingml/2006/main" xmlns:r="http://schemas.openxmlformats.org/officeDocument/2006/relationships" xmlns:mc="http://schemas.openxmlformats.org/markup-compatibility/2006" xmlns:mv="urn:schemas-microsoft-com:mac:vml" xmlns:p="http://schemas.openxmlformats.org/presentationml/2006/main" xmlns:c="http://schemas.openxmlformats.org/drawingml/2006/chart" xmlns:dgm="http://schemas.openxmlformats.org/drawingml/2006/diagram" xmlns:o="urn:schemas-microsoft-com:office:office" xmlns:v="urn:schemas-microsoft-com:vml" xmlns:pvml="urn:schemas-microsoft-com:office:powerpoint" xmlns:com="http://schemas.openxmlformats.org/drawingml/2006/compatibility" xmlns:p14="http://schemas.microsoft.com/office/powerpoint/2010/main" xmlns:p15="http://schemas.microsoft.com/office/powerpoint/2012/main" xmlns:ahyp="http://schemas.microsoft.com/office/drawing/2018/hyperlinkcolor" autoCompressPictures="0" embedTrueTypeFonts="1" strictFirstAndLastChars="0" saveSubsetFonts="1">
   <p:sldMasterIdLst>
-    <p:sldMasterId id="2147483659" r:id="rId1"/>
+    <p:sldMasterId id="2147483659" r:id="rId4"/>
   </p:sldMasterIdLst>
   <p:notesMasterIdLst>
-    <p:notesMasterId r:id="rId3"/>
+    <p:notesMasterId r:id="rId5"/>
   </p:notesMasterIdLst>
   <p:sldIdLst>
-    <p:sldId id="256" r:id="rId2"/>
+    <p:sldId id="256" r:id="rId6"/>
   </p:sldIdLst>
-  <p:sldSz cx="9144000" cy="5143500" type="screen16x9"/>
+  <p:sldSz cy="5143500" cx="9144000"/>
   <p:notesSz cx="6858000" cy="9144000"/>
   <p:embeddedFontLst>
     <p:embeddedFont>
-      <p:font typeface="Open Sans" panose="020B0604020202020204" charset="0"/>
-      <p:regular r:id="rId4"/>
-      <p:bold r:id="rId5"/>
-      <p:italic r:id="rId6"/>
-      <p:boldItalic r:id="rId7"/>
+      <p:font typeface="Open Sans"/>
+      <p:regular r:id="rId7"/>
+      <p:bold r:id="rId8"/>
+      <p:italic r:id="rId9"/>
+      <p:boldItalic r:id="rId10"/>
     </p:embeddedFont>
   </p:embeddedFontLst>
   <p:defaultTextStyle>
-    <a:defPPr marR="0" lvl="0" algn="l" rtl="0">
+    <a:defPPr lvl="0" marR="0" rtl="0" algn="l">
       <a:lnSpc>
         <a:spcPct val="100000"/>
       </a:lnSpc>
@@ -33,7 +33,7 @@
         <a:spcPts val="0"/>
       </a:spcAft>
     </a:defPPr>
-    <a:lvl1pPr marR="0" lvl="0" algn="l" rtl="0">
+    <a:lvl1pPr lvl="0" marR="0" rtl="0" algn="l">
       <a:lnSpc>
         <a:spcPct val="100000"/>
       </a:lnSpc>
@@ -47,7 +47,7 @@
         <a:srgbClr val="000000"/>
       </a:buClr>
       <a:buFont typeface="Arial"/>
-      <a:defRPr sz="1400" b="0" i="0" u="none" strike="noStrike" cap="none">
+      <a:defRPr b="0" i="0" sz="1400" u="none" cap="none" strike="noStrike">
         <a:solidFill>
           <a:srgbClr val="000000"/>
         </a:solidFill>
@@ -57,7 +57,7 @@
         <a:sym typeface="Arial"/>
       </a:defRPr>
     </a:lvl1pPr>
-    <a:lvl2pPr marR="0" lvl="1" algn="l" rtl="0">
+    <a:lvl2pPr lvl="1" marR="0" rtl="0" algn="l">
       <a:lnSpc>
         <a:spcPct val="100000"/>
       </a:lnSpc>
@@ -71,7 +71,7 @@
         <a:srgbClr val="000000"/>
       </a:buClr>
       <a:buFont typeface="Arial"/>
-      <a:defRPr sz="1400" b="0" i="0" u="none" strike="noStrike" cap="none">
+      <a:defRPr b="0" i="0" sz="1400" u="none" cap="none" strike="noStrike">
         <a:solidFill>
           <a:srgbClr val="000000"/>
         </a:solidFill>
@@ -81,7 +81,7 @@
         <a:sym typeface="Arial"/>
       </a:defRPr>
     </a:lvl2pPr>
-    <a:lvl3pPr marR="0" lvl="2" algn="l" rtl="0">
+    <a:lvl3pPr lvl="2" marR="0" rtl="0" algn="l">
       <a:lnSpc>
         <a:spcPct val="100000"/>
       </a:lnSpc>
@@ -95,7 +95,7 @@
         <a:srgbClr val="000000"/>
       </a:buClr>
       <a:buFont typeface="Arial"/>
-      <a:defRPr sz="1400" b="0" i="0" u="none" strike="noStrike" cap="none">
+      <a:defRPr b="0" i="0" sz="1400" u="none" cap="none" strike="noStrike">
         <a:solidFill>
           <a:srgbClr val="000000"/>
         </a:solidFill>
@@ -105,7 +105,7 @@
         <a:sym typeface="Arial"/>
       </a:defRPr>
     </a:lvl3pPr>
-    <a:lvl4pPr marR="0" lvl="3" algn="l" rtl="0">
+    <a:lvl4pPr lvl="3" marR="0" rtl="0" algn="l">
       <a:lnSpc>
         <a:spcPct val="100000"/>
       </a:lnSpc>
@@ -119,7 +119,7 @@
         <a:srgbClr val="000000"/>
       </a:buClr>
       <a:buFont typeface="Arial"/>
-      <a:defRPr sz="1400" b="0" i="0" u="none" strike="noStrike" cap="none">
+      <a:defRPr b="0" i="0" sz="1400" u="none" cap="none" strike="noStrike">
         <a:solidFill>
           <a:srgbClr val="000000"/>
         </a:solidFill>
@@ -129,7 +129,7 @@
         <a:sym typeface="Arial"/>
       </a:defRPr>
     </a:lvl4pPr>
-    <a:lvl5pPr marR="0" lvl="4" algn="l" rtl="0">
+    <a:lvl5pPr lvl="4" marR="0" rtl="0" algn="l">
       <a:lnSpc>
         <a:spcPct val="100000"/>
       </a:lnSpc>
@@ -143,7 +143,7 @@
         <a:srgbClr val="000000"/>
       </a:buClr>
       <a:buFont typeface="Arial"/>
-      <a:defRPr sz="1400" b="0" i="0" u="none" strike="noStrike" cap="none">
+      <a:defRPr b="0" i="0" sz="1400" u="none" cap="none" strike="noStrike">
         <a:solidFill>
           <a:srgbClr val="000000"/>
         </a:solidFill>
@@ -153,7 +153,7 @@
         <a:sym typeface="Arial"/>
       </a:defRPr>
     </a:lvl5pPr>
-    <a:lvl6pPr marR="0" lvl="5" algn="l" rtl="0">
+    <a:lvl6pPr lvl="5" marR="0" rtl="0" algn="l">
       <a:lnSpc>
         <a:spcPct val="100000"/>
       </a:lnSpc>
@@ -167,7 +167,7 @@
         <a:srgbClr val="000000"/>
       </a:buClr>
       <a:buFont typeface="Arial"/>
-      <a:defRPr sz="1400" b="0" i="0" u="none" strike="noStrike" cap="none">
+      <a:defRPr b="0" i="0" sz="1400" u="none" cap="none" strike="noStrike">
         <a:solidFill>
           <a:srgbClr val="000000"/>
         </a:solidFill>
@@ -177,7 +177,7 @@
         <a:sym typeface="Arial"/>
       </a:defRPr>
     </a:lvl6pPr>
-    <a:lvl7pPr marR="0" lvl="6" algn="l" rtl="0">
+    <a:lvl7pPr lvl="6" marR="0" rtl="0" algn="l">
       <a:lnSpc>
         <a:spcPct val="100000"/>
       </a:lnSpc>
@@ -191,7 +191,7 @@
         <a:srgbClr val="000000"/>
       </a:buClr>
       <a:buFont typeface="Arial"/>
-      <a:defRPr sz="1400" b="0" i="0" u="none" strike="noStrike" cap="none">
+      <a:defRPr b="0" i="0" sz="1400" u="none" cap="none" strike="noStrike">
         <a:solidFill>
           <a:srgbClr val="000000"/>
         </a:solidFill>
@@ -201,7 +201,7 @@
         <a:sym typeface="Arial"/>
       </a:defRPr>
     </a:lvl7pPr>
-    <a:lvl8pPr marR="0" lvl="7" algn="l" rtl="0">
+    <a:lvl8pPr lvl="7" marR="0" rtl="0" algn="l">
       <a:lnSpc>
         <a:spcPct val="100000"/>
       </a:lnSpc>
@@ -215,7 +215,7 @@
         <a:srgbClr val="000000"/>
       </a:buClr>
       <a:buFont typeface="Arial"/>
-      <a:defRPr sz="1400" b="0" i="0" u="none" strike="noStrike" cap="none">
+      <a:defRPr b="0" i="0" sz="1400" u="none" cap="none" strike="noStrike">
         <a:solidFill>
           <a:srgbClr val="000000"/>
         </a:solidFill>
@@ -225,7 +225,7 @@
         <a:sym typeface="Arial"/>
       </a:defRPr>
     </a:lvl8pPr>
-    <a:lvl9pPr marR="0" lvl="8" algn="l" rtl="0">
+    <a:lvl9pPr lvl="8" marR="0" rtl="0" algn="l">
       <a:lnSpc>
         <a:spcPct val="100000"/>
       </a:lnSpc>
@@ -239,7 +239,7 @@
         <a:srgbClr val="000000"/>
       </a:buClr>
       <a:buFont typeface="Arial"/>
-      <a:defRPr sz="1400" b="0" i="0" u="none" strike="noStrike" cap="none">
+      <a:defRPr b="0" i="0" sz="1400" u="none" cap="none" strike="noStrike">
         <a:solidFill>
           <a:srgbClr val="000000"/>
         </a:solidFill>
@@ -252,7 +252,7 @@
   </p:defaultTextStyle>
   <p:extLst>
     <p:ext uri="{EFAFB233-063F-42B5-8137-9DF3F51BA10A}">
-      <p15:sldGuideLst xmlns:p15="http://schemas.microsoft.com/office/powerpoint/2012/main">
+      <p15:sldGuideLst>
         <p15:guide id="1" orient="horz" pos="1620">
           <p15:clr>
             <a:srgbClr val="A4A3A4"/>
@@ -270,16 +270,11 @@
 </file>
 
 <file path=ppt/notesMasters/notesMaster1.xml><?xml version="1.0" encoding="utf-8"?>
-<p:notesMaster xmlns:a="http://schemas.openxmlformats.org/drawingml/2006/main" xmlns:r="http://schemas.openxmlformats.org/officeDocument/2006/relationships" xmlns:p="http://schemas.openxmlformats.org/presentationml/2006/main">
+<p:notesMaster xmlns:a="http://schemas.openxmlformats.org/drawingml/2006/main" xmlns:r="http://schemas.openxmlformats.org/officeDocument/2006/relationships" xmlns:mc="http://schemas.openxmlformats.org/markup-compatibility/2006" xmlns:mv="urn:schemas-microsoft-com:mac:vml" xmlns:p="http://schemas.openxmlformats.org/presentationml/2006/main" xmlns:c="http://schemas.openxmlformats.org/drawingml/2006/chart" xmlns:dgm="http://schemas.openxmlformats.org/drawingml/2006/diagram" xmlns:o="urn:schemas-microsoft-com:office:office" xmlns:v="urn:schemas-microsoft-com:vml" xmlns:pvml="urn:schemas-microsoft-com:office:powerpoint" xmlns:com="http://schemas.openxmlformats.org/drawingml/2006/compatibility" xmlns:p14="http://schemas.microsoft.com/office/powerpoint/2010/main" xmlns:p15="http://schemas.microsoft.com/office/powerpoint/2012/main" xmlns:ahyp="http://schemas.microsoft.com/office/drawing/2018/hyperlinkcolor">
   <p:cSld>
-    <p:bg>
-      <p:bgRef idx="1001">
-        <a:schemeClr val="bg1"/>
-      </p:bgRef>
-    </p:bg>
     <p:spTree>
       <p:nvGrpSpPr>
-        <p:cNvPr id="1" name="Shape 2"/>
+        <p:cNvPr id="2" name="Shape 2"/>
         <p:cNvGrpSpPr/>
         <p:nvPr/>
       </p:nvGrpSpPr>
@@ -294,11 +289,9 @@
       <p:sp>
         <p:nvSpPr>
           <p:cNvPr id="3" name="Google Shape;3;n"/>
-          <p:cNvSpPr>
-            <a:spLocks noGrp="1" noRot="1" noChangeAspect="1"/>
-          </p:cNvSpPr>
+          <p:cNvSpPr/>
           <p:nvPr>
-            <p:ph type="sldImg" idx="2"/>
+            <p:ph idx="2" type="sldImg"/>
           </p:nvPr>
         </p:nvSpPr>
         <p:spPr>
@@ -307,13 +300,9 @@
             <a:ext cx="6096075" cy="3429000"/>
           </a:xfrm>
           <a:custGeom>
-            <a:avLst/>
-            <a:gdLst/>
-            <a:ahLst/>
-            <a:cxnLst/>
-            <a:rect l="l" t="t" r="r" b="b"/>
+            <a:rect b="b" l="l" r="r" t="t"/>
             <a:pathLst>
-              <a:path w="120000" h="120000" extrusionOk="0">
+              <a:path extrusionOk="0" h="120000" w="120000">
                 <a:moveTo>
                   <a:pt x="0" y="0"/>
                 </a:moveTo>
@@ -331,25 +320,23 @@
             </a:pathLst>
           </a:custGeom>
           <a:noFill/>
-          <a:ln w="9525" cap="flat" cmpd="sng">
+          <a:ln cap="flat" cmpd="sng" w="9525">
             <a:solidFill>
               <a:srgbClr val="000000"/>
             </a:solidFill>
             <a:prstDash val="solid"/>
             <a:round/>
-            <a:headEnd type="none" w="sm" len="sm"/>
-            <a:tailEnd type="none" w="sm" len="sm"/>
+            <a:headEnd len="sm" w="sm" type="none"/>
+            <a:tailEnd len="sm" w="sm" type="none"/>
           </a:ln>
         </p:spPr>
       </p:sp>
       <p:sp>
         <p:nvSpPr>
           <p:cNvPr id="4" name="Google Shape;4;n"/>
-          <p:cNvSpPr txBox="1">
-            <a:spLocks noGrp="1"/>
-          </p:cNvSpPr>
+          <p:cNvSpPr txBox="1"/>
           <p:nvPr>
-            <p:ph type="body" idx="1"/>
+            <p:ph idx="1" type="body"/>
           </p:nvPr>
         </p:nvSpPr>
         <p:spPr>
@@ -366,11 +353,11 @@
           </a:ln>
         </p:spPr>
         <p:txBody>
-          <a:bodyPr spcFirstLastPara="1" wrap="square" lIns="91425" tIns="91425" rIns="91425" bIns="91425" anchor="t" anchorCtr="0">
+          <a:bodyPr anchorCtr="0" anchor="t" bIns="91425" lIns="91425" spcFirstLastPara="1" rIns="91425" wrap="square" tIns="91425">
             <a:noAutofit/>
           </a:bodyPr>
           <a:lstStyle>
-            <a:lvl1pPr marL="457200" lvl="0" indent="-298450">
+            <a:lvl1pPr indent="-298450" lvl="0" marL="457200">
               <a:spcBef>
                 <a:spcPts val="0"/>
               </a:spcBef>
@@ -381,7 +368,7 @@
               <a:buChar char="●"/>
               <a:defRPr sz="1100"/>
             </a:lvl1pPr>
-            <a:lvl2pPr marL="914400" lvl="1" indent="-298450">
+            <a:lvl2pPr indent="-298450" lvl="1" marL="914400">
               <a:spcBef>
                 <a:spcPts val="0"/>
               </a:spcBef>
@@ -392,7 +379,7 @@
               <a:buChar char="○"/>
               <a:defRPr sz="1100"/>
             </a:lvl2pPr>
-            <a:lvl3pPr marL="1371600" lvl="2" indent="-298450">
+            <a:lvl3pPr indent="-298450" lvl="2" marL="1371600">
               <a:spcBef>
                 <a:spcPts val="0"/>
               </a:spcBef>
@@ -403,7 +390,7 @@
               <a:buChar char="■"/>
               <a:defRPr sz="1100"/>
             </a:lvl3pPr>
-            <a:lvl4pPr marL="1828800" lvl="3" indent="-298450">
+            <a:lvl4pPr indent="-298450" lvl="3" marL="1828800">
               <a:spcBef>
                 <a:spcPts val="0"/>
               </a:spcBef>
@@ -414,7 +401,7 @@
               <a:buChar char="●"/>
               <a:defRPr sz="1100"/>
             </a:lvl4pPr>
-            <a:lvl5pPr marL="2286000" lvl="4" indent="-298450">
+            <a:lvl5pPr indent="-298450" lvl="4" marL="2286000">
               <a:spcBef>
                 <a:spcPts val="0"/>
               </a:spcBef>
@@ -425,7 +412,7 @@
               <a:buChar char="○"/>
               <a:defRPr sz="1100"/>
             </a:lvl5pPr>
-            <a:lvl6pPr marL="2743200" lvl="5" indent="-298450">
+            <a:lvl6pPr indent="-298450" lvl="5" marL="2743200">
               <a:spcBef>
                 <a:spcPts val="0"/>
               </a:spcBef>
@@ -436,7 +423,7 @@
               <a:buChar char="■"/>
               <a:defRPr sz="1100"/>
             </a:lvl6pPr>
-            <a:lvl7pPr marL="3200400" lvl="6" indent="-298450">
+            <a:lvl7pPr indent="-298450" lvl="6" marL="3200400">
               <a:spcBef>
                 <a:spcPts val="0"/>
               </a:spcBef>
@@ -447,7 +434,7 @@
               <a:buChar char="●"/>
               <a:defRPr sz="1100"/>
             </a:lvl7pPr>
-            <a:lvl8pPr marL="3657600" lvl="7" indent="-298450">
+            <a:lvl8pPr indent="-298450" lvl="7" marL="3657600">
               <a:spcBef>
                 <a:spcPts val="0"/>
               </a:spcBef>
@@ -458,7 +445,7 @@
               <a:buChar char="○"/>
               <a:defRPr sz="1100"/>
             </a:lvl8pPr>
-            <a:lvl9pPr marL="4114800" lvl="8" indent="-298450">
+            <a:lvl9pPr indent="-298450" lvl="8" marL="4114800">
               <a:spcBef>
                 <a:spcPts val="0"/>
               </a:spcBef>
@@ -470,16 +457,14 @@
               <a:defRPr sz="1100"/>
             </a:lvl9pPr>
           </a:lstStyle>
-          <a:p>
-            <a:endParaRPr/>
-          </a:p>
+          <a:p/>
         </p:txBody>
       </p:sp>
     </p:spTree>
   </p:cSld>
-  <p:clrMap bg1="lt1" tx1="dk1" bg2="dk2" tx2="lt2" accent1="accent1" accent2="accent2" accent3="accent3" accent4="accent4" accent5="accent5" accent6="accent6" hlink="hlink" folHlink="folHlink"/>
+  <p:clrMap accent1="accent1" accent2="accent2" accent3="accent3" accent4="accent4" accent5="accent5" accent6="accent6" bg1="lt1" bg2="dk2" tx1="dk1" tx2="lt2" folHlink="folHlink" hlink="hlink"/>
   <p:notesStyle>
-    <a:defPPr marR="0" lvl="0" algn="l" rtl="0">
+    <a:defPPr lvl="0" marR="0" rtl="0" algn="l">
       <a:lnSpc>
         <a:spcPct val="100000"/>
       </a:lnSpc>
@@ -490,7 +475,7 @@
         <a:spcPts val="0"/>
       </a:spcAft>
     </a:defPPr>
-    <a:lvl1pPr marR="0" lvl="0" algn="l" rtl="0">
+    <a:lvl1pPr lvl="0" marR="0" rtl="0" algn="l">
       <a:lnSpc>
         <a:spcPct val="100000"/>
       </a:lnSpc>
@@ -504,7 +489,7 @@
         <a:srgbClr val="000000"/>
       </a:buClr>
       <a:buFont typeface="Arial"/>
-      <a:defRPr sz="1400" b="0" i="0" u="none" strike="noStrike" cap="none">
+      <a:defRPr b="0" i="0" sz="1400" u="none" cap="none" strike="noStrike">
         <a:solidFill>
           <a:srgbClr val="000000"/>
         </a:solidFill>
@@ -514,7 +499,7 @@
         <a:sym typeface="Arial"/>
       </a:defRPr>
     </a:lvl1pPr>
-    <a:lvl2pPr marR="0" lvl="1" algn="l" rtl="0">
+    <a:lvl2pPr lvl="1" marR="0" rtl="0" algn="l">
       <a:lnSpc>
         <a:spcPct val="100000"/>
       </a:lnSpc>
@@ -528,7 +513,7 @@
         <a:srgbClr val="000000"/>
       </a:buClr>
       <a:buFont typeface="Arial"/>
-      <a:defRPr sz="1400" b="0" i="0" u="none" strike="noStrike" cap="none">
+      <a:defRPr b="0" i="0" sz="1400" u="none" cap="none" strike="noStrike">
         <a:solidFill>
           <a:srgbClr val="000000"/>
         </a:solidFill>
@@ -538,7 +523,7 @@
         <a:sym typeface="Arial"/>
       </a:defRPr>
     </a:lvl2pPr>
-    <a:lvl3pPr marR="0" lvl="2" algn="l" rtl="0">
+    <a:lvl3pPr lvl="2" marR="0" rtl="0" algn="l">
       <a:lnSpc>
         <a:spcPct val="100000"/>
       </a:lnSpc>
@@ -552,7 +537,7 @@
         <a:srgbClr val="000000"/>
       </a:buClr>
       <a:buFont typeface="Arial"/>
-      <a:defRPr sz="1400" b="0" i="0" u="none" strike="noStrike" cap="none">
+      <a:defRPr b="0" i="0" sz="1400" u="none" cap="none" strike="noStrike">
         <a:solidFill>
           <a:srgbClr val="000000"/>
         </a:solidFill>
@@ -562,7 +547,7 @@
         <a:sym typeface="Arial"/>
       </a:defRPr>
     </a:lvl3pPr>
-    <a:lvl4pPr marR="0" lvl="3" algn="l" rtl="0">
+    <a:lvl4pPr lvl="3" marR="0" rtl="0" algn="l">
       <a:lnSpc>
         <a:spcPct val="100000"/>
       </a:lnSpc>
@@ -576,7 +561,7 @@
         <a:srgbClr val="000000"/>
       </a:buClr>
       <a:buFont typeface="Arial"/>
-      <a:defRPr sz="1400" b="0" i="0" u="none" strike="noStrike" cap="none">
+      <a:defRPr b="0" i="0" sz="1400" u="none" cap="none" strike="noStrike">
         <a:solidFill>
           <a:srgbClr val="000000"/>
         </a:solidFill>
@@ -586,7 +571,7 @@
         <a:sym typeface="Arial"/>
       </a:defRPr>
     </a:lvl4pPr>
-    <a:lvl5pPr marR="0" lvl="4" algn="l" rtl="0">
+    <a:lvl5pPr lvl="4" marR="0" rtl="0" algn="l">
       <a:lnSpc>
         <a:spcPct val="100000"/>
       </a:lnSpc>
@@ -600,7 +585,7 @@
         <a:srgbClr val="000000"/>
       </a:buClr>
       <a:buFont typeface="Arial"/>
-      <a:defRPr sz="1400" b="0" i="0" u="none" strike="noStrike" cap="none">
+      <a:defRPr b="0" i="0" sz="1400" u="none" cap="none" strike="noStrike">
         <a:solidFill>
           <a:srgbClr val="000000"/>
         </a:solidFill>
@@ -610,7 +595,7 @@
         <a:sym typeface="Arial"/>
       </a:defRPr>
     </a:lvl5pPr>
-    <a:lvl6pPr marR="0" lvl="5" algn="l" rtl="0">
+    <a:lvl6pPr lvl="5" marR="0" rtl="0" algn="l">
       <a:lnSpc>
         <a:spcPct val="100000"/>
       </a:lnSpc>
@@ -624,7 +609,7 @@
         <a:srgbClr val="000000"/>
       </a:buClr>
       <a:buFont typeface="Arial"/>
-      <a:defRPr sz="1400" b="0" i="0" u="none" strike="noStrike" cap="none">
+      <a:defRPr b="0" i="0" sz="1400" u="none" cap="none" strike="noStrike">
         <a:solidFill>
           <a:srgbClr val="000000"/>
         </a:solidFill>
@@ -634,7 +619,7 @@
         <a:sym typeface="Arial"/>
       </a:defRPr>
     </a:lvl6pPr>
-    <a:lvl7pPr marR="0" lvl="6" algn="l" rtl="0">
+    <a:lvl7pPr lvl="6" marR="0" rtl="0" algn="l">
       <a:lnSpc>
         <a:spcPct val="100000"/>
       </a:lnSpc>
@@ -648,7 +633,7 @@
         <a:srgbClr val="000000"/>
       </a:buClr>
       <a:buFont typeface="Arial"/>
-      <a:defRPr sz="1400" b="0" i="0" u="none" strike="noStrike" cap="none">
+      <a:defRPr b="0" i="0" sz="1400" u="none" cap="none" strike="noStrike">
         <a:solidFill>
           <a:srgbClr val="000000"/>
         </a:solidFill>
@@ -658,7 +643,7 @@
         <a:sym typeface="Arial"/>
       </a:defRPr>
     </a:lvl7pPr>
-    <a:lvl8pPr marR="0" lvl="7" algn="l" rtl="0">
+    <a:lvl8pPr lvl="7" marR="0" rtl="0" algn="l">
       <a:lnSpc>
         <a:spcPct val="100000"/>
       </a:lnSpc>
@@ -672,7 +657,7 @@
         <a:srgbClr val="000000"/>
       </a:buClr>
       <a:buFont typeface="Arial"/>
-      <a:defRPr sz="1400" b="0" i="0" u="none" strike="noStrike" cap="none">
+      <a:defRPr b="0" i="0" sz="1400" u="none" cap="none" strike="noStrike">
         <a:solidFill>
           <a:srgbClr val="000000"/>
         </a:solidFill>
@@ -682,7 +667,7 @@
         <a:sym typeface="Arial"/>
       </a:defRPr>
     </a:lvl8pPr>
-    <a:lvl9pPr marR="0" lvl="8" algn="l" rtl="0">
+    <a:lvl9pPr lvl="8" marR="0" rtl="0" algn="l">
       <a:lnSpc>
         <a:spcPct val="100000"/>
       </a:lnSpc>
@@ -696,7 +681,7 @@
         <a:srgbClr val="000000"/>
       </a:buClr>
       <a:buFont typeface="Arial"/>
-      <a:defRPr sz="1400" b="0" i="0" u="none" strike="noStrike" cap="none">
+      <a:defRPr b="0" i="0" sz="1400" u="none" cap="none" strike="noStrike">
         <a:solidFill>
           <a:srgbClr val="000000"/>
         </a:solidFill>
@@ -711,11 +696,11 @@
 </file>
 
 <file path=ppt/notesSlides/notesSlide1.xml><?xml version="1.0" encoding="utf-8"?>
-<p:notes xmlns:a="http://schemas.openxmlformats.org/drawingml/2006/main" xmlns:r="http://schemas.openxmlformats.org/officeDocument/2006/relationships" xmlns:p="http://schemas.openxmlformats.org/presentationml/2006/main" showMasterSp="0" showMasterPhAnim="0">
+<p:notes xmlns:a="http://schemas.openxmlformats.org/drawingml/2006/main" xmlns:r="http://schemas.openxmlformats.org/officeDocument/2006/relationships" xmlns:mc="http://schemas.openxmlformats.org/markup-compatibility/2006" xmlns:mv="urn:schemas-microsoft-com:mac:vml" xmlns:p="http://schemas.openxmlformats.org/presentationml/2006/main" xmlns:c="http://schemas.openxmlformats.org/drawingml/2006/chart" xmlns:dgm="http://schemas.openxmlformats.org/drawingml/2006/diagram" xmlns:o="urn:schemas-microsoft-com:office:office" xmlns:v="urn:schemas-microsoft-com:vml" xmlns:pvml="urn:schemas-microsoft-com:office:powerpoint" xmlns:com="http://schemas.openxmlformats.org/drawingml/2006/compatibility" xmlns:p14="http://schemas.microsoft.com/office/powerpoint/2010/main" xmlns:p15="http://schemas.microsoft.com/office/powerpoint/2012/main" xmlns:ahyp="http://schemas.microsoft.com/office/drawing/2018/hyperlinkcolor" showMasterPhAnim="0" showMasterSp="0">
   <p:cSld>
     <p:spTree>
       <p:nvGrpSpPr>
-        <p:cNvPr id="1" name="Shape 50"/>
+        <p:cNvPr id="50" name="Shape 50"/>
         <p:cNvGrpSpPr/>
         <p:nvPr/>
       </p:nvGrpSpPr>
@@ -730,26 +715,20 @@
       <p:sp>
         <p:nvSpPr>
           <p:cNvPr id="51" name="Google Shape;51;p:notes"/>
-          <p:cNvSpPr>
-            <a:spLocks noGrp="1" noRot="1" noChangeAspect="1"/>
-          </p:cNvSpPr>
+          <p:cNvSpPr/>
           <p:nvPr>
-            <p:ph type="sldImg" idx="2"/>
+            <p:ph idx="2" type="sldImg"/>
           </p:nvPr>
         </p:nvSpPr>
         <p:spPr>
           <a:xfrm>
-            <a:off x="381000" y="685800"/>
-            <a:ext cx="6096000" cy="3429000"/>
+            <a:off x="381300" y="685800"/>
+            <a:ext cx="6096075" cy="3429000"/>
           </a:xfrm>
           <a:custGeom>
-            <a:avLst/>
-            <a:gdLst/>
-            <a:ahLst/>
-            <a:cxnLst/>
-            <a:rect l="l" t="t" r="r" b="b"/>
+            <a:rect b="b" l="l" r="r" t="t"/>
             <a:pathLst>
-              <a:path w="120000" h="120000" extrusionOk="0">
+              <a:path extrusionOk="0" h="120000" w="120000">
                 <a:moveTo>
                   <a:pt x="0" y="0"/>
                 </a:moveTo>
@@ -771,11 +750,9 @@
       <p:sp>
         <p:nvSpPr>
           <p:cNvPr id="52" name="Google Shape;52;p:notes"/>
-          <p:cNvSpPr txBox="1">
-            <a:spLocks noGrp="1"/>
-          </p:cNvSpPr>
+          <p:cNvSpPr txBox="1"/>
           <p:nvPr>
-            <p:ph type="body" idx="1"/>
+            <p:ph idx="1" type="body"/>
           </p:nvPr>
         </p:nvSpPr>
         <p:spPr>
@@ -788,12 +765,12 @@
           </a:prstGeom>
         </p:spPr>
         <p:txBody>
-          <a:bodyPr spcFirstLastPara="1" wrap="square" lIns="91425" tIns="91425" rIns="91425" bIns="91425" anchor="t" anchorCtr="0">
+          <a:bodyPr anchorCtr="0" anchor="t" bIns="91425" lIns="91425" spcFirstLastPara="1" rIns="91425" wrap="square" tIns="91425">
             <a:noAutofit/>
           </a:bodyPr>
           <a:lstStyle/>
           <a:p>
-            <a:pPr marL="0" lvl="0" indent="0" algn="l" rtl="0">
+            <a:pPr indent="0" lvl="0" marL="0" rtl="0" algn="l">
               <a:spcBef>
                 <a:spcPts val="0"/>
               </a:spcBef>
@@ -802,6 +779,9 @@
               </a:spcAft>
               <a:buNone/>
             </a:pPr>
+            <a:r>
+              <a:t/>
+            </a:r>
             <a:endParaRPr/>
           </a:p>
         </p:txBody>
@@ -815,11 +795,11 @@
 </file>
 
 <file path=ppt/slideLayouts/slideLayout1.xml><?xml version="1.0" encoding="utf-8"?>
-<p:sldLayout xmlns:a="http://schemas.openxmlformats.org/drawingml/2006/main" xmlns:r="http://schemas.openxmlformats.org/officeDocument/2006/relationships" xmlns:p="http://schemas.openxmlformats.org/presentationml/2006/main" matchingName="Title slide" type="title">
+<p:sldLayout xmlns:a="http://schemas.openxmlformats.org/drawingml/2006/main" xmlns:r="http://schemas.openxmlformats.org/officeDocument/2006/relationships" xmlns:mc="http://schemas.openxmlformats.org/markup-compatibility/2006" xmlns:mv="urn:schemas-microsoft-com:mac:vml" xmlns:p="http://schemas.openxmlformats.org/presentationml/2006/main" xmlns:c="http://schemas.openxmlformats.org/drawingml/2006/chart" xmlns:dgm="http://schemas.openxmlformats.org/drawingml/2006/diagram" xmlns:o="urn:schemas-microsoft-com:office:office" xmlns:v="urn:schemas-microsoft-com:vml" xmlns:pvml="urn:schemas-microsoft-com:office:powerpoint" xmlns:com="http://schemas.openxmlformats.org/drawingml/2006/compatibility" xmlns:p14="http://schemas.microsoft.com/office/powerpoint/2010/main" xmlns:p15="http://schemas.microsoft.com/office/powerpoint/2012/main" xmlns:ahyp="http://schemas.microsoft.com/office/drawing/2018/hyperlinkcolor" matchingName="Title slide" type="title">
   <p:cSld name="TITLE">
     <p:spTree>
       <p:nvGrpSpPr>
-        <p:cNvPr id="1" name="Shape 9"/>
+        <p:cNvPr id="9" name="Shape 9"/>
         <p:cNvGrpSpPr/>
         <p:nvPr/>
       </p:nvGrpSpPr>
@@ -834,9 +814,7 @@
       <p:sp>
         <p:nvSpPr>
           <p:cNvPr id="10" name="Google Shape;10;p2"/>
-          <p:cNvSpPr txBox="1">
-            <a:spLocks noGrp="1"/>
-          </p:cNvSpPr>
+          <p:cNvSpPr txBox="1"/>
           <p:nvPr>
             <p:ph type="ctrTitle"/>
           </p:nvPr>
@@ -851,7 +829,7 @@
           </a:prstGeom>
         </p:spPr>
         <p:txBody>
-          <a:bodyPr spcFirstLastPara="1" wrap="square" lIns="91425" tIns="91425" rIns="91425" bIns="91425" anchor="b" anchorCtr="0">
+          <a:bodyPr anchorCtr="0" anchor="b" bIns="91425" lIns="91425" spcFirstLastPara="1" rIns="91425" wrap="square" tIns="91425">
             <a:normAutofit/>
           </a:bodyPr>
           <a:lstStyle>
@@ -955,19 +933,15 @@
               <a:defRPr sz="5200"/>
             </a:lvl9pPr>
           </a:lstStyle>
-          <a:p>
-            <a:endParaRPr/>
-          </a:p>
+          <a:p/>
         </p:txBody>
       </p:sp>
       <p:sp>
         <p:nvSpPr>
           <p:cNvPr id="11" name="Google Shape;11;p2"/>
-          <p:cNvSpPr txBox="1">
-            <a:spLocks noGrp="1"/>
-          </p:cNvSpPr>
+          <p:cNvSpPr txBox="1"/>
           <p:nvPr>
-            <p:ph type="subTitle" idx="1"/>
+            <p:ph idx="1" type="subTitle"/>
           </p:nvPr>
         </p:nvSpPr>
         <p:spPr>
@@ -980,7 +954,7 @@
           </a:prstGeom>
         </p:spPr>
         <p:txBody>
-          <a:bodyPr spcFirstLastPara="1" wrap="square" lIns="91425" tIns="91425" rIns="91425" bIns="91425" anchor="t" anchorCtr="0">
+          <a:bodyPr anchorCtr="0" anchor="t" bIns="91425" lIns="91425" spcFirstLastPara="1" rIns="91425" wrap="square" tIns="91425">
             <a:normAutofit/>
           </a:bodyPr>
           <a:lstStyle>
@@ -1111,19 +1085,15 @@
               <a:defRPr sz="2800"/>
             </a:lvl9pPr>
           </a:lstStyle>
-          <a:p>
-            <a:endParaRPr/>
-          </a:p>
+          <a:p/>
         </p:txBody>
       </p:sp>
       <p:sp>
         <p:nvSpPr>
           <p:cNvPr id="12" name="Google Shape;12;p2"/>
-          <p:cNvSpPr txBox="1">
-            <a:spLocks noGrp="1"/>
-          </p:cNvSpPr>
+          <p:cNvSpPr txBox="1"/>
           <p:nvPr>
-            <p:ph type="sldNum" idx="12"/>
+            <p:ph idx="12" type="sldNum"/>
           </p:nvPr>
         </p:nvSpPr>
         <p:spPr>
@@ -1136,7 +1106,7 @@
           </a:prstGeom>
         </p:spPr>
         <p:txBody>
-          <a:bodyPr spcFirstLastPara="1" wrap="square" lIns="91425" tIns="91425" rIns="91425" bIns="91425" anchor="ctr" anchorCtr="0">
+          <a:bodyPr anchorCtr="0" anchor="ctr" bIns="91425" lIns="91425" spcFirstLastPara="1" rIns="91425" wrap="square" tIns="91425">
             <a:normAutofit/>
           </a:bodyPr>
           <a:lstStyle>
@@ -1178,7 +1148,7 @@
             </a:lvl9pPr>
           </a:lstStyle>
           <a:p>
-            <a:pPr marL="0" lvl="0" indent="0" algn="r" rtl="0">
+            <a:pPr indent="0" lvl="0" marL="0" rtl="0" algn="r">
               <a:spcBef>
                 <a:spcPts val="0"/>
               </a:spcBef>
@@ -1204,11 +1174,11 @@
 </file>
 
 <file path=ppt/slideLayouts/slideLayout10.xml><?xml version="1.0" encoding="utf-8"?>
-<p:sldLayout xmlns:a="http://schemas.openxmlformats.org/drawingml/2006/main" xmlns:r="http://schemas.openxmlformats.org/officeDocument/2006/relationships" xmlns:p="http://schemas.openxmlformats.org/presentationml/2006/main" matchingName="Big number">
+<p:sldLayout xmlns:a="http://schemas.openxmlformats.org/drawingml/2006/main" xmlns:r="http://schemas.openxmlformats.org/officeDocument/2006/relationships" xmlns:mc="http://schemas.openxmlformats.org/markup-compatibility/2006" xmlns:mv="urn:schemas-microsoft-com:mac:vml" xmlns:p="http://schemas.openxmlformats.org/presentationml/2006/main" xmlns:c="http://schemas.openxmlformats.org/drawingml/2006/chart" xmlns:dgm="http://schemas.openxmlformats.org/drawingml/2006/diagram" xmlns:o="urn:schemas-microsoft-com:office:office" xmlns:v="urn:schemas-microsoft-com:vml" xmlns:pvml="urn:schemas-microsoft-com:office:powerpoint" xmlns:com="http://schemas.openxmlformats.org/drawingml/2006/compatibility" xmlns:p14="http://schemas.microsoft.com/office/powerpoint/2010/main" xmlns:p15="http://schemas.microsoft.com/office/powerpoint/2012/main" xmlns:ahyp="http://schemas.microsoft.com/office/drawing/2018/hyperlinkcolor" matchingName="Big number">
   <p:cSld name="BIG_NUMBER">
     <p:spTree>
       <p:nvGrpSpPr>
-        <p:cNvPr id="1" name="Shape 44"/>
+        <p:cNvPr id="44" name="Shape 44"/>
         <p:cNvGrpSpPr/>
         <p:nvPr/>
       </p:nvGrpSpPr>
@@ -1223,11 +1193,9 @@
       <p:sp>
         <p:nvSpPr>
           <p:cNvPr id="45" name="Google Shape;45;p11"/>
-          <p:cNvSpPr txBox="1">
-            <a:spLocks noGrp="1"/>
-          </p:cNvSpPr>
+          <p:cNvSpPr txBox="1"/>
           <p:nvPr>
-            <p:ph type="title" hasCustomPrompt="1"/>
+            <p:ph hasCustomPrompt="1" type="title"/>
           </p:nvPr>
         </p:nvSpPr>
         <p:spPr>
@@ -1240,7 +1208,7 @@
           </a:prstGeom>
         </p:spPr>
         <p:txBody>
-          <a:bodyPr spcFirstLastPara="1" wrap="square" lIns="91425" tIns="91425" rIns="91425" bIns="91425" anchor="b" anchorCtr="0">
+          <a:bodyPr anchorCtr="0" anchor="b" bIns="91425" lIns="91425" spcFirstLastPara="1" rIns="91425" wrap="square" tIns="91425">
             <a:normAutofit/>
           </a:bodyPr>
           <a:lstStyle>
@@ -1354,11 +1322,9 @@
       <p:sp>
         <p:nvSpPr>
           <p:cNvPr id="46" name="Google Shape;46;p11"/>
-          <p:cNvSpPr txBox="1">
-            <a:spLocks noGrp="1"/>
-          </p:cNvSpPr>
+          <p:cNvSpPr txBox="1"/>
           <p:nvPr>
-            <p:ph type="body" idx="1"/>
+            <p:ph idx="1" type="body"/>
           </p:nvPr>
         </p:nvSpPr>
         <p:spPr>
@@ -1371,11 +1337,11 @@
           </a:prstGeom>
         </p:spPr>
         <p:txBody>
-          <a:bodyPr spcFirstLastPara="1" wrap="square" lIns="91425" tIns="91425" rIns="91425" bIns="91425" anchor="t" anchorCtr="0">
+          <a:bodyPr anchorCtr="0" anchor="t" bIns="91425" lIns="91425" spcFirstLastPara="1" rIns="91425" wrap="square" tIns="91425">
             <a:normAutofit/>
           </a:bodyPr>
           <a:lstStyle>
-            <a:lvl1pPr marL="457200" lvl="0" indent="-342900" algn="ctr">
+            <a:lvl1pPr indent="-342900" lvl="0" marL="457200" algn="ctr">
               <a:spcBef>
                 <a:spcPts val="0"/>
               </a:spcBef>
@@ -1386,7 +1352,7 @@
               <a:buChar char="●"/>
               <a:defRPr/>
             </a:lvl1pPr>
-            <a:lvl2pPr marL="914400" lvl="1" indent="-317500" algn="ctr">
+            <a:lvl2pPr indent="-317500" lvl="1" marL="914400" algn="ctr">
               <a:spcBef>
                 <a:spcPts val="0"/>
               </a:spcBef>
@@ -1397,7 +1363,7 @@
               <a:buChar char="○"/>
               <a:defRPr/>
             </a:lvl2pPr>
-            <a:lvl3pPr marL="1371600" lvl="2" indent="-317500" algn="ctr">
+            <a:lvl3pPr indent="-317500" lvl="2" marL="1371600" algn="ctr">
               <a:spcBef>
                 <a:spcPts val="0"/>
               </a:spcBef>
@@ -1408,7 +1374,7 @@
               <a:buChar char="■"/>
               <a:defRPr/>
             </a:lvl3pPr>
-            <a:lvl4pPr marL="1828800" lvl="3" indent="-317500" algn="ctr">
+            <a:lvl4pPr indent="-317500" lvl="3" marL="1828800" algn="ctr">
               <a:spcBef>
                 <a:spcPts val="0"/>
               </a:spcBef>
@@ -1419,7 +1385,7 @@
               <a:buChar char="●"/>
               <a:defRPr/>
             </a:lvl4pPr>
-            <a:lvl5pPr marL="2286000" lvl="4" indent="-317500" algn="ctr">
+            <a:lvl5pPr indent="-317500" lvl="4" marL="2286000" algn="ctr">
               <a:spcBef>
                 <a:spcPts val="0"/>
               </a:spcBef>
@@ -1430,7 +1396,7 @@
               <a:buChar char="○"/>
               <a:defRPr/>
             </a:lvl5pPr>
-            <a:lvl6pPr marL="2743200" lvl="5" indent="-317500" algn="ctr">
+            <a:lvl6pPr indent="-317500" lvl="5" marL="2743200" algn="ctr">
               <a:spcBef>
                 <a:spcPts val="0"/>
               </a:spcBef>
@@ -1441,7 +1407,7 @@
               <a:buChar char="■"/>
               <a:defRPr/>
             </a:lvl6pPr>
-            <a:lvl7pPr marL="3200400" lvl="6" indent="-317500" algn="ctr">
+            <a:lvl7pPr indent="-317500" lvl="6" marL="3200400" algn="ctr">
               <a:spcBef>
                 <a:spcPts val="0"/>
               </a:spcBef>
@@ -1452,7 +1418,7 @@
               <a:buChar char="●"/>
               <a:defRPr/>
             </a:lvl7pPr>
-            <a:lvl8pPr marL="3657600" lvl="7" indent="-317500" algn="ctr">
+            <a:lvl8pPr indent="-317500" lvl="7" marL="3657600" algn="ctr">
               <a:spcBef>
                 <a:spcPts val="0"/>
               </a:spcBef>
@@ -1463,7 +1429,7 @@
               <a:buChar char="○"/>
               <a:defRPr/>
             </a:lvl8pPr>
-            <a:lvl9pPr marL="4114800" lvl="8" indent="-317500" algn="ctr">
+            <a:lvl9pPr indent="-317500" lvl="8" marL="4114800" algn="ctr">
               <a:spcBef>
                 <a:spcPts val="0"/>
               </a:spcBef>
@@ -1475,19 +1441,15 @@
               <a:defRPr/>
             </a:lvl9pPr>
           </a:lstStyle>
-          <a:p>
-            <a:endParaRPr/>
-          </a:p>
+          <a:p/>
         </p:txBody>
       </p:sp>
       <p:sp>
         <p:nvSpPr>
           <p:cNvPr id="47" name="Google Shape;47;p11"/>
-          <p:cNvSpPr txBox="1">
-            <a:spLocks noGrp="1"/>
-          </p:cNvSpPr>
+          <p:cNvSpPr txBox="1"/>
           <p:nvPr>
-            <p:ph type="sldNum" idx="12"/>
+            <p:ph idx="12" type="sldNum"/>
           </p:nvPr>
         </p:nvSpPr>
         <p:spPr>
@@ -1500,7 +1462,7 @@
           </a:prstGeom>
         </p:spPr>
         <p:txBody>
-          <a:bodyPr spcFirstLastPara="1" wrap="square" lIns="91425" tIns="91425" rIns="91425" bIns="91425" anchor="ctr" anchorCtr="0">
+          <a:bodyPr anchorCtr="0" anchor="ctr" bIns="91425" lIns="91425" spcFirstLastPara="1" rIns="91425" wrap="square" tIns="91425">
             <a:normAutofit/>
           </a:bodyPr>
           <a:lstStyle>
@@ -1542,7 +1504,7 @@
             </a:lvl9pPr>
           </a:lstStyle>
           <a:p>
-            <a:pPr marL="0" lvl="0" indent="0" algn="r" rtl="0">
+            <a:pPr indent="0" lvl="0" marL="0" rtl="0" algn="r">
               <a:spcBef>
                 <a:spcPts val="0"/>
               </a:spcBef>
@@ -1568,11 +1530,11 @@
 </file>
 
 <file path=ppt/slideLayouts/slideLayout11.xml><?xml version="1.0" encoding="utf-8"?>
-<p:sldLayout xmlns:a="http://schemas.openxmlformats.org/drawingml/2006/main" xmlns:r="http://schemas.openxmlformats.org/officeDocument/2006/relationships" xmlns:p="http://schemas.openxmlformats.org/presentationml/2006/main" matchingName="Blank" type="blank">
+<p:sldLayout xmlns:a="http://schemas.openxmlformats.org/drawingml/2006/main" xmlns:r="http://schemas.openxmlformats.org/officeDocument/2006/relationships" xmlns:mc="http://schemas.openxmlformats.org/markup-compatibility/2006" xmlns:mv="urn:schemas-microsoft-com:mac:vml" xmlns:p="http://schemas.openxmlformats.org/presentationml/2006/main" xmlns:c="http://schemas.openxmlformats.org/drawingml/2006/chart" xmlns:dgm="http://schemas.openxmlformats.org/drawingml/2006/diagram" xmlns:o="urn:schemas-microsoft-com:office:office" xmlns:v="urn:schemas-microsoft-com:vml" xmlns:pvml="urn:schemas-microsoft-com:office:powerpoint" xmlns:com="http://schemas.openxmlformats.org/drawingml/2006/compatibility" xmlns:p14="http://schemas.microsoft.com/office/powerpoint/2010/main" xmlns:p15="http://schemas.microsoft.com/office/powerpoint/2012/main" xmlns:ahyp="http://schemas.microsoft.com/office/drawing/2018/hyperlinkcolor" matchingName="Blank" type="blank">
   <p:cSld name="BLANK">
     <p:spTree>
       <p:nvGrpSpPr>
-        <p:cNvPr id="1" name="Shape 48"/>
+        <p:cNvPr id="48" name="Shape 48"/>
         <p:cNvGrpSpPr/>
         <p:nvPr/>
       </p:nvGrpSpPr>
@@ -1587,11 +1549,9 @@
       <p:sp>
         <p:nvSpPr>
           <p:cNvPr id="49" name="Google Shape;49;p12"/>
-          <p:cNvSpPr txBox="1">
-            <a:spLocks noGrp="1"/>
-          </p:cNvSpPr>
+          <p:cNvSpPr txBox="1"/>
           <p:nvPr>
-            <p:ph type="sldNum" idx="12"/>
+            <p:ph idx="12" type="sldNum"/>
           </p:nvPr>
         </p:nvSpPr>
         <p:spPr>
@@ -1604,7 +1564,7 @@
           </a:prstGeom>
         </p:spPr>
         <p:txBody>
-          <a:bodyPr spcFirstLastPara="1" wrap="square" lIns="91425" tIns="91425" rIns="91425" bIns="91425" anchor="ctr" anchorCtr="0">
+          <a:bodyPr anchorCtr="0" anchor="ctr" bIns="91425" lIns="91425" spcFirstLastPara="1" rIns="91425" wrap="square" tIns="91425">
             <a:normAutofit/>
           </a:bodyPr>
           <a:lstStyle>
@@ -1646,7 +1606,7 @@
             </a:lvl9pPr>
           </a:lstStyle>
           <a:p>
-            <a:pPr marL="0" lvl="0" indent="0" algn="r" rtl="0">
+            <a:pPr indent="0" lvl="0" marL="0" rtl="0" algn="r">
               <a:spcBef>
                 <a:spcPts val="0"/>
               </a:spcBef>
@@ -1672,11 +1632,11 @@
 </file>
 
 <file path=ppt/slideLayouts/slideLayout2.xml><?xml version="1.0" encoding="utf-8"?>
-<p:sldLayout xmlns:a="http://schemas.openxmlformats.org/drawingml/2006/main" xmlns:r="http://schemas.openxmlformats.org/officeDocument/2006/relationships" xmlns:p="http://schemas.openxmlformats.org/presentationml/2006/main" matchingName="Section header" type="secHead">
+<p:sldLayout xmlns:a="http://schemas.openxmlformats.org/drawingml/2006/main" xmlns:r="http://schemas.openxmlformats.org/officeDocument/2006/relationships" xmlns:mc="http://schemas.openxmlformats.org/markup-compatibility/2006" xmlns:mv="urn:schemas-microsoft-com:mac:vml" xmlns:p="http://schemas.openxmlformats.org/presentationml/2006/main" xmlns:c="http://schemas.openxmlformats.org/drawingml/2006/chart" xmlns:dgm="http://schemas.openxmlformats.org/drawingml/2006/diagram" xmlns:o="urn:schemas-microsoft-com:office:office" xmlns:v="urn:schemas-microsoft-com:vml" xmlns:pvml="urn:schemas-microsoft-com:office:powerpoint" xmlns:com="http://schemas.openxmlformats.org/drawingml/2006/compatibility" xmlns:p14="http://schemas.microsoft.com/office/powerpoint/2010/main" xmlns:p15="http://schemas.microsoft.com/office/powerpoint/2012/main" xmlns:ahyp="http://schemas.microsoft.com/office/drawing/2018/hyperlinkcolor" matchingName="Section header" type="secHead">
   <p:cSld name="SECTION_HEADER">
     <p:spTree>
       <p:nvGrpSpPr>
-        <p:cNvPr id="1" name="Shape 13"/>
+        <p:cNvPr id="13" name="Shape 13"/>
         <p:cNvGrpSpPr/>
         <p:nvPr/>
       </p:nvGrpSpPr>
@@ -1691,9 +1651,7 @@
       <p:sp>
         <p:nvSpPr>
           <p:cNvPr id="14" name="Google Shape;14;p3"/>
-          <p:cNvSpPr txBox="1">
-            <a:spLocks noGrp="1"/>
-          </p:cNvSpPr>
+          <p:cNvSpPr txBox="1"/>
           <p:nvPr>
             <p:ph type="title"/>
           </p:nvPr>
@@ -1708,7 +1666,7 @@
           </a:prstGeom>
         </p:spPr>
         <p:txBody>
-          <a:bodyPr spcFirstLastPara="1" wrap="square" lIns="91425" tIns="91425" rIns="91425" bIns="91425" anchor="ctr" anchorCtr="0">
+          <a:bodyPr anchorCtr="0" anchor="ctr" bIns="91425" lIns="91425" spcFirstLastPara="1" rIns="91425" wrap="square" tIns="91425">
             <a:normAutofit/>
           </a:bodyPr>
           <a:lstStyle>
@@ -1812,19 +1770,15 @@
               <a:defRPr sz="3600"/>
             </a:lvl9pPr>
           </a:lstStyle>
-          <a:p>
-            <a:endParaRPr/>
-          </a:p>
+          <a:p/>
         </p:txBody>
       </p:sp>
       <p:sp>
         <p:nvSpPr>
           <p:cNvPr id="15" name="Google Shape;15;p3"/>
-          <p:cNvSpPr txBox="1">
-            <a:spLocks noGrp="1"/>
-          </p:cNvSpPr>
+          <p:cNvSpPr txBox="1"/>
           <p:nvPr>
-            <p:ph type="sldNum" idx="12"/>
+            <p:ph idx="12" type="sldNum"/>
           </p:nvPr>
         </p:nvSpPr>
         <p:spPr>
@@ -1837,7 +1791,7 @@
           </a:prstGeom>
         </p:spPr>
         <p:txBody>
-          <a:bodyPr spcFirstLastPara="1" wrap="square" lIns="91425" tIns="91425" rIns="91425" bIns="91425" anchor="ctr" anchorCtr="0">
+          <a:bodyPr anchorCtr="0" anchor="ctr" bIns="91425" lIns="91425" spcFirstLastPara="1" rIns="91425" wrap="square" tIns="91425">
             <a:normAutofit/>
           </a:bodyPr>
           <a:lstStyle>
@@ -1879,7 +1833,7 @@
             </a:lvl9pPr>
           </a:lstStyle>
           <a:p>
-            <a:pPr marL="0" lvl="0" indent="0" algn="r" rtl="0">
+            <a:pPr indent="0" lvl="0" marL="0" rtl="0" algn="r">
               <a:spcBef>
                 <a:spcPts val="0"/>
               </a:spcBef>
@@ -1905,11 +1859,11 @@
 </file>
 
 <file path=ppt/slideLayouts/slideLayout3.xml><?xml version="1.0" encoding="utf-8"?>
-<p:sldLayout xmlns:a="http://schemas.openxmlformats.org/drawingml/2006/main" xmlns:r="http://schemas.openxmlformats.org/officeDocument/2006/relationships" xmlns:p="http://schemas.openxmlformats.org/presentationml/2006/main" matchingName="Title and body" type="tx">
+<p:sldLayout xmlns:a="http://schemas.openxmlformats.org/drawingml/2006/main" xmlns:r="http://schemas.openxmlformats.org/officeDocument/2006/relationships" xmlns:mc="http://schemas.openxmlformats.org/markup-compatibility/2006" xmlns:mv="urn:schemas-microsoft-com:mac:vml" xmlns:p="http://schemas.openxmlformats.org/presentationml/2006/main" xmlns:c="http://schemas.openxmlformats.org/drawingml/2006/chart" xmlns:dgm="http://schemas.openxmlformats.org/drawingml/2006/diagram" xmlns:o="urn:schemas-microsoft-com:office:office" xmlns:v="urn:schemas-microsoft-com:vml" xmlns:pvml="urn:schemas-microsoft-com:office:powerpoint" xmlns:com="http://schemas.openxmlformats.org/drawingml/2006/compatibility" xmlns:p14="http://schemas.microsoft.com/office/powerpoint/2010/main" xmlns:p15="http://schemas.microsoft.com/office/powerpoint/2012/main" xmlns:ahyp="http://schemas.microsoft.com/office/drawing/2018/hyperlinkcolor" matchingName="Title and body" type="tx">
   <p:cSld name="TITLE_AND_BODY">
     <p:spTree>
       <p:nvGrpSpPr>
-        <p:cNvPr id="1" name="Shape 16"/>
+        <p:cNvPr id="16" name="Shape 16"/>
         <p:cNvGrpSpPr/>
         <p:nvPr/>
       </p:nvGrpSpPr>
@@ -1924,9 +1878,7 @@
       <p:sp>
         <p:nvSpPr>
           <p:cNvPr id="17" name="Google Shape;17;p4"/>
-          <p:cNvSpPr txBox="1">
-            <a:spLocks noGrp="1"/>
-          </p:cNvSpPr>
+          <p:cNvSpPr txBox="1"/>
           <p:nvPr>
             <p:ph type="title"/>
           </p:nvPr>
@@ -1941,7 +1893,7 @@
           </a:prstGeom>
         </p:spPr>
         <p:txBody>
-          <a:bodyPr spcFirstLastPara="1" wrap="square" lIns="91425" tIns="91425" rIns="91425" bIns="91425" anchor="t" anchorCtr="0">
+          <a:bodyPr anchorCtr="0" anchor="t" bIns="91425" lIns="91425" spcFirstLastPara="1" rIns="91425" wrap="square" tIns="91425">
             <a:normAutofit/>
           </a:bodyPr>
           <a:lstStyle>
@@ -2045,19 +1997,15 @@
               <a:defRPr/>
             </a:lvl9pPr>
           </a:lstStyle>
-          <a:p>
-            <a:endParaRPr/>
-          </a:p>
+          <a:p/>
         </p:txBody>
       </p:sp>
       <p:sp>
         <p:nvSpPr>
           <p:cNvPr id="18" name="Google Shape;18;p4"/>
-          <p:cNvSpPr txBox="1">
-            <a:spLocks noGrp="1"/>
-          </p:cNvSpPr>
+          <p:cNvSpPr txBox="1"/>
           <p:nvPr>
-            <p:ph type="body" idx="1"/>
+            <p:ph idx="1" type="body"/>
           </p:nvPr>
         </p:nvSpPr>
         <p:spPr>
@@ -2070,11 +2018,11 @@
           </a:prstGeom>
         </p:spPr>
         <p:txBody>
-          <a:bodyPr spcFirstLastPara="1" wrap="square" lIns="91425" tIns="91425" rIns="91425" bIns="91425" anchor="t" anchorCtr="0">
+          <a:bodyPr anchorCtr="0" anchor="t" bIns="91425" lIns="91425" spcFirstLastPara="1" rIns="91425" wrap="square" tIns="91425">
             <a:normAutofit/>
           </a:bodyPr>
           <a:lstStyle>
-            <a:lvl1pPr marL="457200" lvl="0" indent="-342900">
+            <a:lvl1pPr indent="-342900" lvl="0" marL="457200">
               <a:spcBef>
                 <a:spcPts val="0"/>
               </a:spcBef>
@@ -2085,7 +2033,7 @@
               <a:buChar char="●"/>
               <a:defRPr/>
             </a:lvl1pPr>
-            <a:lvl2pPr marL="914400" lvl="1" indent="-317500">
+            <a:lvl2pPr indent="-317500" lvl="1" marL="914400">
               <a:spcBef>
                 <a:spcPts val="0"/>
               </a:spcBef>
@@ -2096,7 +2044,7 @@
               <a:buChar char="○"/>
               <a:defRPr/>
             </a:lvl2pPr>
-            <a:lvl3pPr marL="1371600" lvl="2" indent="-317500">
+            <a:lvl3pPr indent="-317500" lvl="2" marL="1371600">
               <a:spcBef>
                 <a:spcPts val="0"/>
               </a:spcBef>
@@ -2107,7 +2055,7 @@
               <a:buChar char="■"/>
               <a:defRPr/>
             </a:lvl3pPr>
-            <a:lvl4pPr marL="1828800" lvl="3" indent="-317500">
+            <a:lvl4pPr indent="-317500" lvl="3" marL="1828800">
               <a:spcBef>
                 <a:spcPts val="0"/>
               </a:spcBef>
@@ -2118,7 +2066,7 @@
               <a:buChar char="●"/>
               <a:defRPr/>
             </a:lvl4pPr>
-            <a:lvl5pPr marL="2286000" lvl="4" indent="-317500">
+            <a:lvl5pPr indent="-317500" lvl="4" marL="2286000">
               <a:spcBef>
                 <a:spcPts val="0"/>
               </a:spcBef>
@@ -2129,7 +2077,7 @@
               <a:buChar char="○"/>
               <a:defRPr/>
             </a:lvl5pPr>
-            <a:lvl6pPr marL="2743200" lvl="5" indent="-317500">
+            <a:lvl6pPr indent="-317500" lvl="5" marL="2743200">
               <a:spcBef>
                 <a:spcPts val="0"/>
               </a:spcBef>
@@ -2140,7 +2088,7 @@
               <a:buChar char="■"/>
               <a:defRPr/>
             </a:lvl6pPr>
-            <a:lvl7pPr marL="3200400" lvl="6" indent="-317500">
+            <a:lvl7pPr indent="-317500" lvl="6" marL="3200400">
               <a:spcBef>
                 <a:spcPts val="0"/>
               </a:spcBef>
@@ -2151,7 +2099,7 @@
               <a:buChar char="●"/>
               <a:defRPr/>
             </a:lvl7pPr>
-            <a:lvl8pPr marL="3657600" lvl="7" indent="-317500">
+            <a:lvl8pPr indent="-317500" lvl="7" marL="3657600">
               <a:spcBef>
                 <a:spcPts val="0"/>
               </a:spcBef>
@@ -2162,7 +2110,7 @@
               <a:buChar char="○"/>
               <a:defRPr/>
             </a:lvl8pPr>
-            <a:lvl9pPr marL="4114800" lvl="8" indent="-317500">
+            <a:lvl9pPr indent="-317500" lvl="8" marL="4114800">
               <a:spcBef>
                 <a:spcPts val="0"/>
               </a:spcBef>
@@ -2174,19 +2122,15 @@
               <a:defRPr/>
             </a:lvl9pPr>
           </a:lstStyle>
-          <a:p>
-            <a:endParaRPr/>
-          </a:p>
+          <a:p/>
         </p:txBody>
       </p:sp>
       <p:sp>
         <p:nvSpPr>
           <p:cNvPr id="19" name="Google Shape;19;p4"/>
-          <p:cNvSpPr txBox="1">
-            <a:spLocks noGrp="1"/>
-          </p:cNvSpPr>
+          <p:cNvSpPr txBox="1"/>
           <p:nvPr>
-            <p:ph type="sldNum" idx="12"/>
+            <p:ph idx="12" type="sldNum"/>
           </p:nvPr>
         </p:nvSpPr>
         <p:spPr>
@@ -2199,7 +2143,7 @@
           </a:prstGeom>
         </p:spPr>
         <p:txBody>
-          <a:bodyPr spcFirstLastPara="1" wrap="square" lIns="91425" tIns="91425" rIns="91425" bIns="91425" anchor="ctr" anchorCtr="0">
+          <a:bodyPr anchorCtr="0" anchor="ctr" bIns="91425" lIns="91425" spcFirstLastPara="1" rIns="91425" wrap="square" tIns="91425">
             <a:normAutofit/>
           </a:bodyPr>
           <a:lstStyle>
@@ -2241,7 +2185,7 @@
             </a:lvl9pPr>
           </a:lstStyle>
           <a:p>
-            <a:pPr marL="0" lvl="0" indent="0" algn="r" rtl="0">
+            <a:pPr indent="0" lvl="0" marL="0" rtl="0" algn="r">
               <a:spcBef>
                 <a:spcPts val="0"/>
               </a:spcBef>
@@ -2267,11 +2211,11 @@
 </file>
 
 <file path=ppt/slideLayouts/slideLayout4.xml><?xml version="1.0" encoding="utf-8"?>
-<p:sldLayout xmlns:a="http://schemas.openxmlformats.org/drawingml/2006/main" xmlns:r="http://schemas.openxmlformats.org/officeDocument/2006/relationships" xmlns:p="http://schemas.openxmlformats.org/presentationml/2006/main" matchingName="Title and two columns" type="twoColTx">
+<p:sldLayout xmlns:a="http://schemas.openxmlformats.org/drawingml/2006/main" xmlns:r="http://schemas.openxmlformats.org/officeDocument/2006/relationships" xmlns:mc="http://schemas.openxmlformats.org/markup-compatibility/2006" xmlns:mv="urn:schemas-microsoft-com:mac:vml" xmlns:p="http://schemas.openxmlformats.org/presentationml/2006/main" xmlns:c="http://schemas.openxmlformats.org/drawingml/2006/chart" xmlns:dgm="http://schemas.openxmlformats.org/drawingml/2006/diagram" xmlns:o="urn:schemas-microsoft-com:office:office" xmlns:v="urn:schemas-microsoft-com:vml" xmlns:pvml="urn:schemas-microsoft-com:office:powerpoint" xmlns:com="http://schemas.openxmlformats.org/drawingml/2006/compatibility" xmlns:p14="http://schemas.microsoft.com/office/powerpoint/2010/main" xmlns:p15="http://schemas.microsoft.com/office/powerpoint/2012/main" xmlns:ahyp="http://schemas.microsoft.com/office/drawing/2018/hyperlinkcolor" matchingName="Title and two columns" type="twoColTx">
   <p:cSld name="TITLE_AND_TWO_COLUMNS">
     <p:spTree>
       <p:nvGrpSpPr>
-        <p:cNvPr id="1" name="Shape 20"/>
+        <p:cNvPr id="20" name="Shape 20"/>
         <p:cNvGrpSpPr/>
         <p:nvPr/>
       </p:nvGrpSpPr>
@@ -2286,9 +2230,7 @@
       <p:sp>
         <p:nvSpPr>
           <p:cNvPr id="21" name="Google Shape;21;p5"/>
-          <p:cNvSpPr txBox="1">
-            <a:spLocks noGrp="1"/>
-          </p:cNvSpPr>
+          <p:cNvSpPr txBox="1"/>
           <p:nvPr>
             <p:ph type="title"/>
           </p:nvPr>
@@ -2303,7 +2245,7 @@
           </a:prstGeom>
         </p:spPr>
         <p:txBody>
-          <a:bodyPr spcFirstLastPara="1" wrap="square" lIns="91425" tIns="91425" rIns="91425" bIns="91425" anchor="t" anchorCtr="0">
+          <a:bodyPr anchorCtr="0" anchor="t" bIns="91425" lIns="91425" spcFirstLastPara="1" rIns="91425" wrap="square" tIns="91425">
             <a:normAutofit/>
           </a:bodyPr>
           <a:lstStyle>
@@ -2407,19 +2349,15 @@
               <a:defRPr/>
             </a:lvl9pPr>
           </a:lstStyle>
-          <a:p>
-            <a:endParaRPr/>
-          </a:p>
+          <a:p/>
         </p:txBody>
       </p:sp>
       <p:sp>
         <p:nvSpPr>
           <p:cNvPr id="22" name="Google Shape;22;p5"/>
-          <p:cNvSpPr txBox="1">
-            <a:spLocks noGrp="1"/>
-          </p:cNvSpPr>
+          <p:cNvSpPr txBox="1"/>
           <p:nvPr>
-            <p:ph type="body" idx="1"/>
+            <p:ph idx="1" type="body"/>
           </p:nvPr>
         </p:nvSpPr>
         <p:spPr>
@@ -2432,11 +2370,11 @@
           </a:prstGeom>
         </p:spPr>
         <p:txBody>
-          <a:bodyPr spcFirstLastPara="1" wrap="square" lIns="91425" tIns="91425" rIns="91425" bIns="91425" anchor="t" anchorCtr="0">
+          <a:bodyPr anchorCtr="0" anchor="t" bIns="91425" lIns="91425" spcFirstLastPara="1" rIns="91425" wrap="square" tIns="91425">
             <a:normAutofit/>
           </a:bodyPr>
           <a:lstStyle>
-            <a:lvl1pPr marL="457200" lvl="0" indent="-317500">
+            <a:lvl1pPr indent="-317500" lvl="0" marL="457200">
               <a:spcBef>
                 <a:spcPts val="0"/>
               </a:spcBef>
@@ -2447,7 +2385,7 @@
               <a:buChar char="●"/>
               <a:defRPr sz="1400"/>
             </a:lvl1pPr>
-            <a:lvl2pPr marL="914400" lvl="1" indent="-304800">
+            <a:lvl2pPr indent="-304800" lvl="1" marL="914400">
               <a:spcBef>
                 <a:spcPts val="0"/>
               </a:spcBef>
@@ -2458,7 +2396,7 @@
               <a:buChar char="○"/>
               <a:defRPr sz="1200"/>
             </a:lvl2pPr>
-            <a:lvl3pPr marL="1371600" lvl="2" indent="-304800">
+            <a:lvl3pPr indent="-304800" lvl="2" marL="1371600">
               <a:spcBef>
                 <a:spcPts val="0"/>
               </a:spcBef>
@@ -2469,7 +2407,7 @@
               <a:buChar char="■"/>
               <a:defRPr sz="1200"/>
             </a:lvl3pPr>
-            <a:lvl4pPr marL="1828800" lvl="3" indent="-304800">
+            <a:lvl4pPr indent="-304800" lvl="3" marL="1828800">
               <a:spcBef>
                 <a:spcPts val="0"/>
               </a:spcBef>
@@ -2480,7 +2418,7 @@
               <a:buChar char="●"/>
               <a:defRPr sz="1200"/>
             </a:lvl4pPr>
-            <a:lvl5pPr marL="2286000" lvl="4" indent="-304800">
+            <a:lvl5pPr indent="-304800" lvl="4" marL="2286000">
               <a:spcBef>
                 <a:spcPts val="0"/>
               </a:spcBef>
@@ -2491,7 +2429,7 @@
               <a:buChar char="○"/>
               <a:defRPr sz="1200"/>
             </a:lvl5pPr>
-            <a:lvl6pPr marL="2743200" lvl="5" indent="-304800">
+            <a:lvl6pPr indent="-304800" lvl="5" marL="2743200">
               <a:spcBef>
                 <a:spcPts val="0"/>
               </a:spcBef>
@@ -2502,7 +2440,7 @@
               <a:buChar char="■"/>
               <a:defRPr sz="1200"/>
             </a:lvl6pPr>
-            <a:lvl7pPr marL="3200400" lvl="6" indent="-304800">
+            <a:lvl7pPr indent="-304800" lvl="6" marL="3200400">
               <a:spcBef>
                 <a:spcPts val="0"/>
               </a:spcBef>
@@ -2513,7 +2451,7 @@
               <a:buChar char="●"/>
               <a:defRPr sz="1200"/>
             </a:lvl7pPr>
-            <a:lvl8pPr marL="3657600" lvl="7" indent="-304800">
+            <a:lvl8pPr indent="-304800" lvl="7" marL="3657600">
               <a:spcBef>
                 <a:spcPts val="0"/>
               </a:spcBef>
@@ -2524,7 +2462,7 @@
               <a:buChar char="○"/>
               <a:defRPr sz="1200"/>
             </a:lvl8pPr>
-            <a:lvl9pPr marL="4114800" lvl="8" indent="-304800">
+            <a:lvl9pPr indent="-304800" lvl="8" marL="4114800">
               <a:spcBef>
                 <a:spcPts val="0"/>
               </a:spcBef>
@@ -2536,19 +2474,15 @@
               <a:defRPr sz="1200"/>
             </a:lvl9pPr>
           </a:lstStyle>
-          <a:p>
-            <a:endParaRPr/>
-          </a:p>
+          <a:p/>
         </p:txBody>
       </p:sp>
       <p:sp>
         <p:nvSpPr>
           <p:cNvPr id="23" name="Google Shape;23;p5"/>
-          <p:cNvSpPr txBox="1">
-            <a:spLocks noGrp="1"/>
-          </p:cNvSpPr>
+          <p:cNvSpPr txBox="1"/>
           <p:nvPr>
-            <p:ph type="body" idx="2"/>
+            <p:ph idx="2" type="body"/>
           </p:nvPr>
         </p:nvSpPr>
         <p:spPr>
@@ -2561,11 +2495,11 @@
           </a:prstGeom>
         </p:spPr>
         <p:txBody>
-          <a:bodyPr spcFirstLastPara="1" wrap="square" lIns="91425" tIns="91425" rIns="91425" bIns="91425" anchor="t" anchorCtr="0">
+          <a:bodyPr anchorCtr="0" anchor="t" bIns="91425" lIns="91425" spcFirstLastPara="1" rIns="91425" wrap="square" tIns="91425">
             <a:normAutofit/>
           </a:bodyPr>
           <a:lstStyle>
-            <a:lvl1pPr marL="457200" lvl="0" indent="-317500">
+            <a:lvl1pPr indent="-317500" lvl="0" marL="457200">
               <a:spcBef>
                 <a:spcPts val="0"/>
               </a:spcBef>
@@ -2576,7 +2510,7 @@
               <a:buChar char="●"/>
               <a:defRPr sz="1400"/>
             </a:lvl1pPr>
-            <a:lvl2pPr marL="914400" lvl="1" indent="-304800">
+            <a:lvl2pPr indent="-304800" lvl="1" marL="914400">
               <a:spcBef>
                 <a:spcPts val="0"/>
               </a:spcBef>
@@ -2587,7 +2521,7 @@
               <a:buChar char="○"/>
               <a:defRPr sz="1200"/>
             </a:lvl2pPr>
-            <a:lvl3pPr marL="1371600" lvl="2" indent="-304800">
+            <a:lvl3pPr indent="-304800" lvl="2" marL="1371600">
               <a:spcBef>
                 <a:spcPts val="0"/>
               </a:spcBef>
@@ -2598,7 +2532,7 @@
               <a:buChar char="■"/>
               <a:defRPr sz="1200"/>
             </a:lvl3pPr>
-            <a:lvl4pPr marL="1828800" lvl="3" indent="-304800">
+            <a:lvl4pPr indent="-304800" lvl="3" marL="1828800">
               <a:spcBef>
                 <a:spcPts val="0"/>
               </a:spcBef>
@@ -2609,7 +2543,7 @@
               <a:buChar char="●"/>
               <a:defRPr sz="1200"/>
             </a:lvl4pPr>
-            <a:lvl5pPr marL="2286000" lvl="4" indent="-304800">
+            <a:lvl5pPr indent="-304800" lvl="4" marL="2286000">
               <a:spcBef>
                 <a:spcPts val="0"/>
               </a:spcBef>
@@ -2620,7 +2554,7 @@
               <a:buChar char="○"/>
               <a:defRPr sz="1200"/>
             </a:lvl5pPr>
-            <a:lvl6pPr marL="2743200" lvl="5" indent="-304800">
+            <a:lvl6pPr indent="-304800" lvl="5" marL="2743200">
               <a:spcBef>
                 <a:spcPts val="0"/>
               </a:spcBef>
@@ -2631,7 +2565,7 @@
               <a:buChar char="■"/>
               <a:defRPr sz="1200"/>
             </a:lvl6pPr>
-            <a:lvl7pPr marL="3200400" lvl="6" indent="-304800">
+            <a:lvl7pPr indent="-304800" lvl="6" marL="3200400">
               <a:spcBef>
                 <a:spcPts val="0"/>
               </a:spcBef>
@@ -2642,7 +2576,7 @@
               <a:buChar char="●"/>
               <a:defRPr sz="1200"/>
             </a:lvl7pPr>
-            <a:lvl8pPr marL="3657600" lvl="7" indent="-304800">
+            <a:lvl8pPr indent="-304800" lvl="7" marL="3657600">
               <a:spcBef>
                 <a:spcPts val="0"/>
               </a:spcBef>
@@ -2653,7 +2587,7 @@
               <a:buChar char="○"/>
               <a:defRPr sz="1200"/>
             </a:lvl8pPr>
-            <a:lvl9pPr marL="4114800" lvl="8" indent="-304800">
+            <a:lvl9pPr indent="-304800" lvl="8" marL="4114800">
               <a:spcBef>
                 <a:spcPts val="0"/>
               </a:spcBef>
@@ -2665,19 +2599,15 @@
               <a:defRPr sz="1200"/>
             </a:lvl9pPr>
           </a:lstStyle>
-          <a:p>
-            <a:endParaRPr/>
-          </a:p>
+          <a:p/>
         </p:txBody>
       </p:sp>
       <p:sp>
         <p:nvSpPr>
           <p:cNvPr id="24" name="Google Shape;24;p5"/>
-          <p:cNvSpPr txBox="1">
-            <a:spLocks noGrp="1"/>
-          </p:cNvSpPr>
+          <p:cNvSpPr txBox="1"/>
           <p:nvPr>
-            <p:ph type="sldNum" idx="12"/>
+            <p:ph idx="12" type="sldNum"/>
           </p:nvPr>
         </p:nvSpPr>
         <p:spPr>
@@ -2690,7 +2620,7 @@
           </a:prstGeom>
         </p:spPr>
         <p:txBody>
-          <a:bodyPr spcFirstLastPara="1" wrap="square" lIns="91425" tIns="91425" rIns="91425" bIns="91425" anchor="ctr" anchorCtr="0">
+          <a:bodyPr anchorCtr="0" anchor="ctr" bIns="91425" lIns="91425" spcFirstLastPara="1" rIns="91425" wrap="square" tIns="91425">
             <a:normAutofit/>
           </a:bodyPr>
           <a:lstStyle>
@@ -2732,7 +2662,7 @@
             </a:lvl9pPr>
           </a:lstStyle>
           <a:p>
-            <a:pPr marL="0" lvl="0" indent="0" algn="r" rtl="0">
+            <a:pPr indent="0" lvl="0" marL="0" rtl="0" algn="r">
               <a:spcBef>
                 <a:spcPts val="0"/>
               </a:spcBef>
@@ -2758,11 +2688,11 @@
 </file>
 
 <file path=ppt/slideLayouts/slideLayout5.xml><?xml version="1.0" encoding="utf-8"?>
-<p:sldLayout xmlns:a="http://schemas.openxmlformats.org/drawingml/2006/main" xmlns:r="http://schemas.openxmlformats.org/officeDocument/2006/relationships" xmlns:p="http://schemas.openxmlformats.org/presentationml/2006/main" matchingName="Title only" type="titleOnly">
+<p:sldLayout xmlns:a="http://schemas.openxmlformats.org/drawingml/2006/main" xmlns:r="http://schemas.openxmlformats.org/officeDocument/2006/relationships" xmlns:mc="http://schemas.openxmlformats.org/markup-compatibility/2006" xmlns:mv="urn:schemas-microsoft-com:mac:vml" xmlns:p="http://schemas.openxmlformats.org/presentationml/2006/main" xmlns:c="http://schemas.openxmlformats.org/drawingml/2006/chart" xmlns:dgm="http://schemas.openxmlformats.org/drawingml/2006/diagram" xmlns:o="urn:schemas-microsoft-com:office:office" xmlns:v="urn:schemas-microsoft-com:vml" xmlns:pvml="urn:schemas-microsoft-com:office:powerpoint" xmlns:com="http://schemas.openxmlformats.org/drawingml/2006/compatibility" xmlns:p14="http://schemas.microsoft.com/office/powerpoint/2010/main" xmlns:p15="http://schemas.microsoft.com/office/powerpoint/2012/main" xmlns:ahyp="http://schemas.microsoft.com/office/drawing/2018/hyperlinkcolor" matchingName="Title only" type="titleOnly">
   <p:cSld name="TITLE_ONLY">
     <p:spTree>
       <p:nvGrpSpPr>
-        <p:cNvPr id="1" name="Shape 25"/>
+        <p:cNvPr id="25" name="Shape 25"/>
         <p:cNvGrpSpPr/>
         <p:nvPr/>
       </p:nvGrpSpPr>
@@ -2777,9 +2707,7 @@
       <p:sp>
         <p:nvSpPr>
           <p:cNvPr id="26" name="Google Shape;26;p6"/>
-          <p:cNvSpPr txBox="1">
-            <a:spLocks noGrp="1"/>
-          </p:cNvSpPr>
+          <p:cNvSpPr txBox="1"/>
           <p:nvPr>
             <p:ph type="title"/>
           </p:nvPr>
@@ -2794,7 +2722,7 @@
           </a:prstGeom>
         </p:spPr>
         <p:txBody>
-          <a:bodyPr spcFirstLastPara="1" wrap="square" lIns="91425" tIns="91425" rIns="91425" bIns="91425" anchor="t" anchorCtr="0">
+          <a:bodyPr anchorCtr="0" anchor="t" bIns="91425" lIns="91425" spcFirstLastPara="1" rIns="91425" wrap="square" tIns="91425">
             <a:normAutofit/>
           </a:bodyPr>
           <a:lstStyle>
@@ -2898,19 +2826,15 @@
               <a:defRPr/>
             </a:lvl9pPr>
           </a:lstStyle>
-          <a:p>
-            <a:endParaRPr/>
-          </a:p>
+          <a:p/>
         </p:txBody>
       </p:sp>
       <p:sp>
         <p:nvSpPr>
           <p:cNvPr id="27" name="Google Shape;27;p6"/>
-          <p:cNvSpPr txBox="1">
-            <a:spLocks noGrp="1"/>
-          </p:cNvSpPr>
+          <p:cNvSpPr txBox="1"/>
           <p:nvPr>
-            <p:ph type="sldNum" idx="12"/>
+            <p:ph idx="12" type="sldNum"/>
           </p:nvPr>
         </p:nvSpPr>
         <p:spPr>
@@ -2923,7 +2847,7 @@
           </a:prstGeom>
         </p:spPr>
         <p:txBody>
-          <a:bodyPr spcFirstLastPara="1" wrap="square" lIns="91425" tIns="91425" rIns="91425" bIns="91425" anchor="ctr" anchorCtr="0">
+          <a:bodyPr anchorCtr="0" anchor="ctr" bIns="91425" lIns="91425" spcFirstLastPara="1" rIns="91425" wrap="square" tIns="91425">
             <a:normAutofit/>
           </a:bodyPr>
           <a:lstStyle>
@@ -2965,7 +2889,7 @@
             </a:lvl9pPr>
           </a:lstStyle>
           <a:p>
-            <a:pPr marL="0" lvl="0" indent="0" algn="r" rtl="0">
+            <a:pPr indent="0" lvl="0" marL="0" rtl="0" algn="r">
               <a:spcBef>
                 <a:spcPts val="0"/>
               </a:spcBef>
@@ -2991,11 +2915,11 @@
 </file>
 
 <file path=ppt/slideLayouts/slideLayout6.xml><?xml version="1.0" encoding="utf-8"?>
-<p:sldLayout xmlns:a="http://schemas.openxmlformats.org/drawingml/2006/main" xmlns:r="http://schemas.openxmlformats.org/officeDocument/2006/relationships" xmlns:p="http://schemas.openxmlformats.org/presentationml/2006/main" matchingName="One column text">
+<p:sldLayout xmlns:a="http://schemas.openxmlformats.org/drawingml/2006/main" xmlns:r="http://schemas.openxmlformats.org/officeDocument/2006/relationships" xmlns:mc="http://schemas.openxmlformats.org/markup-compatibility/2006" xmlns:mv="urn:schemas-microsoft-com:mac:vml" xmlns:p="http://schemas.openxmlformats.org/presentationml/2006/main" xmlns:c="http://schemas.openxmlformats.org/drawingml/2006/chart" xmlns:dgm="http://schemas.openxmlformats.org/drawingml/2006/diagram" xmlns:o="urn:schemas-microsoft-com:office:office" xmlns:v="urn:schemas-microsoft-com:vml" xmlns:pvml="urn:schemas-microsoft-com:office:powerpoint" xmlns:com="http://schemas.openxmlformats.org/drawingml/2006/compatibility" xmlns:p14="http://schemas.microsoft.com/office/powerpoint/2010/main" xmlns:p15="http://schemas.microsoft.com/office/powerpoint/2012/main" xmlns:ahyp="http://schemas.microsoft.com/office/drawing/2018/hyperlinkcolor" matchingName="One column text">
   <p:cSld name="ONE_COLUMN_TEXT">
     <p:spTree>
       <p:nvGrpSpPr>
-        <p:cNvPr id="1" name="Shape 28"/>
+        <p:cNvPr id="28" name="Shape 28"/>
         <p:cNvGrpSpPr/>
         <p:nvPr/>
       </p:nvGrpSpPr>
@@ -3010,9 +2934,7 @@
       <p:sp>
         <p:nvSpPr>
           <p:cNvPr id="29" name="Google Shape;29;p7"/>
-          <p:cNvSpPr txBox="1">
-            <a:spLocks noGrp="1"/>
-          </p:cNvSpPr>
+          <p:cNvSpPr txBox="1"/>
           <p:nvPr>
             <p:ph type="title"/>
           </p:nvPr>
@@ -3027,7 +2949,7 @@
           </a:prstGeom>
         </p:spPr>
         <p:txBody>
-          <a:bodyPr spcFirstLastPara="1" wrap="square" lIns="91425" tIns="91425" rIns="91425" bIns="91425" anchor="b" anchorCtr="0">
+          <a:bodyPr anchorCtr="0" anchor="b" bIns="91425" lIns="91425" spcFirstLastPara="1" rIns="91425" wrap="square" tIns="91425">
             <a:normAutofit/>
           </a:bodyPr>
           <a:lstStyle>
@@ -3131,19 +3053,15 @@
               <a:defRPr sz="2400"/>
             </a:lvl9pPr>
           </a:lstStyle>
-          <a:p>
-            <a:endParaRPr/>
-          </a:p>
+          <a:p/>
         </p:txBody>
       </p:sp>
       <p:sp>
         <p:nvSpPr>
           <p:cNvPr id="30" name="Google Shape;30;p7"/>
-          <p:cNvSpPr txBox="1">
-            <a:spLocks noGrp="1"/>
-          </p:cNvSpPr>
+          <p:cNvSpPr txBox="1"/>
           <p:nvPr>
-            <p:ph type="body" idx="1"/>
+            <p:ph idx="1" type="body"/>
           </p:nvPr>
         </p:nvSpPr>
         <p:spPr>
@@ -3156,11 +3074,11 @@
           </a:prstGeom>
         </p:spPr>
         <p:txBody>
-          <a:bodyPr spcFirstLastPara="1" wrap="square" lIns="91425" tIns="91425" rIns="91425" bIns="91425" anchor="t" anchorCtr="0">
+          <a:bodyPr anchorCtr="0" anchor="t" bIns="91425" lIns="91425" spcFirstLastPara="1" rIns="91425" wrap="square" tIns="91425">
             <a:normAutofit/>
           </a:bodyPr>
           <a:lstStyle>
-            <a:lvl1pPr marL="457200" lvl="0" indent="-304800">
+            <a:lvl1pPr indent="-304800" lvl="0" marL="457200">
               <a:spcBef>
                 <a:spcPts val="0"/>
               </a:spcBef>
@@ -3171,7 +3089,7 @@
               <a:buChar char="●"/>
               <a:defRPr sz="1200"/>
             </a:lvl1pPr>
-            <a:lvl2pPr marL="914400" lvl="1" indent="-304800">
+            <a:lvl2pPr indent="-304800" lvl="1" marL="914400">
               <a:spcBef>
                 <a:spcPts val="0"/>
               </a:spcBef>
@@ -3182,7 +3100,7 @@
               <a:buChar char="○"/>
               <a:defRPr sz="1200"/>
             </a:lvl2pPr>
-            <a:lvl3pPr marL="1371600" lvl="2" indent="-304800">
+            <a:lvl3pPr indent="-304800" lvl="2" marL="1371600">
               <a:spcBef>
                 <a:spcPts val="0"/>
               </a:spcBef>
@@ -3193,7 +3111,7 @@
               <a:buChar char="■"/>
               <a:defRPr sz="1200"/>
             </a:lvl3pPr>
-            <a:lvl4pPr marL="1828800" lvl="3" indent="-304800">
+            <a:lvl4pPr indent="-304800" lvl="3" marL="1828800">
               <a:spcBef>
                 <a:spcPts val="0"/>
               </a:spcBef>
@@ -3204,7 +3122,7 @@
               <a:buChar char="●"/>
               <a:defRPr sz="1200"/>
             </a:lvl4pPr>
-            <a:lvl5pPr marL="2286000" lvl="4" indent="-304800">
+            <a:lvl5pPr indent="-304800" lvl="4" marL="2286000">
               <a:spcBef>
                 <a:spcPts val="0"/>
               </a:spcBef>
@@ -3215,7 +3133,7 @@
               <a:buChar char="○"/>
               <a:defRPr sz="1200"/>
             </a:lvl5pPr>
-            <a:lvl6pPr marL="2743200" lvl="5" indent="-304800">
+            <a:lvl6pPr indent="-304800" lvl="5" marL="2743200">
               <a:spcBef>
                 <a:spcPts val="0"/>
               </a:spcBef>
@@ -3226,7 +3144,7 @@
               <a:buChar char="■"/>
               <a:defRPr sz="1200"/>
             </a:lvl6pPr>
-            <a:lvl7pPr marL="3200400" lvl="6" indent="-304800">
+            <a:lvl7pPr indent="-304800" lvl="6" marL="3200400">
               <a:spcBef>
                 <a:spcPts val="0"/>
               </a:spcBef>
@@ -3237,7 +3155,7 @@
               <a:buChar char="●"/>
               <a:defRPr sz="1200"/>
             </a:lvl7pPr>
-            <a:lvl8pPr marL="3657600" lvl="7" indent="-304800">
+            <a:lvl8pPr indent="-304800" lvl="7" marL="3657600">
               <a:spcBef>
                 <a:spcPts val="0"/>
               </a:spcBef>
@@ -3248,7 +3166,7 @@
               <a:buChar char="○"/>
               <a:defRPr sz="1200"/>
             </a:lvl8pPr>
-            <a:lvl9pPr marL="4114800" lvl="8" indent="-304800">
+            <a:lvl9pPr indent="-304800" lvl="8" marL="4114800">
               <a:spcBef>
                 <a:spcPts val="0"/>
               </a:spcBef>
@@ -3260,19 +3178,15 @@
               <a:defRPr sz="1200"/>
             </a:lvl9pPr>
           </a:lstStyle>
-          <a:p>
-            <a:endParaRPr/>
-          </a:p>
+          <a:p/>
         </p:txBody>
       </p:sp>
       <p:sp>
         <p:nvSpPr>
           <p:cNvPr id="31" name="Google Shape;31;p7"/>
-          <p:cNvSpPr txBox="1">
-            <a:spLocks noGrp="1"/>
-          </p:cNvSpPr>
+          <p:cNvSpPr txBox="1"/>
           <p:nvPr>
-            <p:ph type="sldNum" idx="12"/>
+            <p:ph idx="12" type="sldNum"/>
           </p:nvPr>
         </p:nvSpPr>
         <p:spPr>
@@ -3285,7 +3199,7 @@
           </a:prstGeom>
         </p:spPr>
         <p:txBody>
-          <a:bodyPr spcFirstLastPara="1" wrap="square" lIns="91425" tIns="91425" rIns="91425" bIns="91425" anchor="ctr" anchorCtr="0">
+          <a:bodyPr anchorCtr="0" anchor="ctr" bIns="91425" lIns="91425" spcFirstLastPara="1" rIns="91425" wrap="square" tIns="91425">
             <a:normAutofit/>
           </a:bodyPr>
           <a:lstStyle>
@@ -3327,7 +3241,7 @@
             </a:lvl9pPr>
           </a:lstStyle>
           <a:p>
-            <a:pPr marL="0" lvl="0" indent="0" algn="r" rtl="0">
+            <a:pPr indent="0" lvl="0" marL="0" rtl="0" algn="r">
               <a:spcBef>
                 <a:spcPts val="0"/>
               </a:spcBef>
@@ -3353,11 +3267,11 @@
 </file>
 
 <file path=ppt/slideLayouts/slideLayout7.xml><?xml version="1.0" encoding="utf-8"?>
-<p:sldLayout xmlns:a="http://schemas.openxmlformats.org/drawingml/2006/main" xmlns:r="http://schemas.openxmlformats.org/officeDocument/2006/relationships" xmlns:p="http://schemas.openxmlformats.org/presentationml/2006/main" matchingName="Main point">
+<p:sldLayout xmlns:a="http://schemas.openxmlformats.org/drawingml/2006/main" xmlns:r="http://schemas.openxmlformats.org/officeDocument/2006/relationships" xmlns:mc="http://schemas.openxmlformats.org/markup-compatibility/2006" xmlns:mv="urn:schemas-microsoft-com:mac:vml" xmlns:p="http://schemas.openxmlformats.org/presentationml/2006/main" xmlns:c="http://schemas.openxmlformats.org/drawingml/2006/chart" xmlns:dgm="http://schemas.openxmlformats.org/drawingml/2006/diagram" xmlns:o="urn:schemas-microsoft-com:office:office" xmlns:v="urn:schemas-microsoft-com:vml" xmlns:pvml="urn:schemas-microsoft-com:office:powerpoint" xmlns:com="http://schemas.openxmlformats.org/drawingml/2006/compatibility" xmlns:p14="http://schemas.microsoft.com/office/powerpoint/2010/main" xmlns:p15="http://schemas.microsoft.com/office/powerpoint/2012/main" xmlns:ahyp="http://schemas.microsoft.com/office/drawing/2018/hyperlinkcolor" matchingName="Main point">
   <p:cSld name="MAIN_POINT">
     <p:spTree>
       <p:nvGrpSpPr>
-        <p:cNvPr id="1" name="Shape 32"/>
+        <p:cNvPr id="32" name="Shape 32"/>
         <p:cNvGrpSpPr/>
         <p:nvPr/>
       </p:nvGrpSpPr>
@@ -3372,9 +3286,7 @@
       <p:sp>
         <p:nvSpPr>
           <p:cNvPr id="33" name="Google Shape;33;p8"/>
-          <p:cNvSpPr txBox="1">
-            <a:spLocks noGrp="1"/>
-          </p:cNvSpPr>
+          <p:cNvSpPr txBox="1"/>
           <p:nvPr>
             <p:ph type="title"/>
           </p:nvPr>
@@ -3389,7 +3301,7 @@
           </a:prstGeom>
         </p:spPr>
         <p:txBody>
-          <a:bodyPr spcFirstLastPara="1" wrap="square" lIns="91425" tIns="91425" rIns="91425" bIns="91425" anchor="ctr" anchorCtr="0">
+          <a:bodyPr anchorCtr="0" anchor="ctr" bIns="91425" lIns="91425" spcFirstLastPara="1" rIns="91425" wrap="square" tIns="91425">
             <a:normAutofit/>
           </a:bodyPr>
           <a:lstStyle>
@@ -3493,19 +3405,15 @@
               <a:defRPr sz="4800"/>
             </a:lvl9pPr>
           </a:lstStyle>
-          <a:p>
-            <a:endParaRPr/>
-          </a:p>
+          <a:p/>
         </p:txBody>
       </p:sp>
       <p:sp>
         <p:nvSpPr>
           <p:cNvPr id="34" name="Google Shape;34;p8"/>
-          <p:cNvSpPr txBox="1">
-            <a:spLocks noGrp="1"/>
-          </p:cNvSpPr>
+          <p:cNvSpPr txBox="1"/>
           <p:nvPr>
-            <p:ph type="sldNum" idx="12"/>
+            <p:ph idx="12" type="sldNum"/>
           </p:nvPr>
         </p:nvSpPr>
         <p:spPr>
@@ -3518,7 +3426,7 @@
           </a:prstGeom>
         </p:spPr>
         <p:txBody>
-          <a:bodyPr spcFirstLastPara="1" wrap="square" lIns="91425" tIns="91425" rIns="91425" bIns="91425" anchor="ctr" anchorCtr="0">
+          <a:bodyPr anchorCtr="0" anchor="ctr" bIns="91425" lIns="91425" spcFirstLastPara="1" rIns="91425" wrap="square" tIns="91425">
             <a:normAutofit/>
           </a:bodyPr>
           <a:lstStyle>
@@ -3560,7 +3468,7 @@
             </a:lvl9pPr>
           </a:lstStyle>
           <a:p>
-            <a:pPr marL="0" lvl="0" indent="0" algn="r" rtl="0">
+            <a:pPr indent="0" lvl="0" marL="0" rtl="0" algn="r">
               <a:spcBef>
                 <a:spcPts val="0"/>
               </a:spcBef>
@@ -3586,11 +3494,11 @@
 </file>
 
 <file path=ppt/slideLayouts/slideLayout8.xml><?xml version="1.0" encoding="utf-8"?>
-<p:sldLayout xmlns:a="http://schemas.openxmlformats.org/drawingml/2006/main" xmlns:r="http://schemas.openxmlformats.org/officeDocument/2006/relationships" xmlns:p="http://schemas.openxmlformats.org/presentationml/2006/main" matchingName="Section title and description">
+<p:sldLayout xmlns:a="http://schemas.openxmlformats.org/drawingml/2006/main" xmlns:r="http://schemas.openxmlformats.org/officeDocument/2006/relationships" xmlns:mc="http://schemas.openxmlformats.org/markup-compatibility/2006" xmlns:mv="urn:schemas-microsoft-com:mac:vml" xmlns:p="http://schemas.openxmlformats.org/presentationml/2006/main" xmlns:c="http://schemas.openxmlformats.org/drawingml/2006/chart" xmlns:dgm="http://schemas.openxmlformats.org/drawingml/2006/diagram" xmlns:o="urn:schemas-microsoft-com:office:office" xmlns:v="urn:schemas-microsoft-com:vml" xmlns:pvml="urn:schemas-microsoft-com:office:powerpoint" xmlns:com="http://schemas.openxmlformats.org/drawingml/2006/compatibility" xmlns:p14="http://schemas.microsoft.com/office/powerpoint/2010/main" xmlns:p15="http://schemas.microsoft.com/office/powerpoint/2012/main" xmlns:ahyp="http://schemas.microsoft.com/office/drawing/2018/hyperlinkcolor" matchingName="Section title and description">
   <p:cSld name="SECTION_TITLE_AND_DESCRIPTION">
     <p:spTree>
       <p:nvGrpSpPr>
-        <p:cNvPr id="1" name="Shape 35"/>
+        <p:cNvPr id="35" name="Shape 35"/>
         <p:cNvGrpSpPr/>
         <p:nvPr/>
       </p:nvGrpSpPr>
@@ -3624,12 +3532,12 @@
           </a:ln>
         </p:spPr>
         <p:txBody>
-          <a:bodyPr spcFirstLastPara="1" wrap="square" lIns="91425" tIns="91425" rIns="91425" bIns="91425" anchor="ctr" anchorCtr="0">
+          <a:bodyPr anchorCtr="0" anchor="ctr" bIns="91425" lIns="91425" spcFirstLastPara="1" rIns="91425" wrap="square" tIns="91425">
             <a:noAutofit/>
           </a:bodyPr>
           <a:lstStyle/>
           <a:p>
-            <a:pPr marL="0" lvl="0" indent="0" algn="l" rtl="0">
+            <a:pPr indent="0" lvl="0" marL="0" rtl="0" algn="l">
               <a:spcBef>
                 <a:spcPts val="0"/>
               </a:spcBef>
@@ -3638,6 +3546,9 @@
               </a:spcAft>
               <a:buNone/>
             </a:pPr>
+            <a:r>
+              <a:t/>
+            </a:r>
             <a:endParaRPr/>
           </a:p>
         </p:txBody>
@@ -3645,9 +3556,7 @@
       <p:sp>
         <p:nvSpPr>
           <p:cNvPr id="37" name="Google Shape;37;p9"/>
-          <p:cNvSpPr txBox="1">
-            <a:spLocks noGrp="1"/>
-          </p:cNvSpPr>
+          <p:cNvSpPr txBox="1"/>
           <p:nvPr>
             <p:ph type="title"/>
           </p:nvPr>
@@ -3662,7 +3571,7 @@
           </a:prstGeom>
         </p:spPr>
         <p:txBody>
-          <a:bodyPr spcFirstLastPara="1" wrap="square" lIns="91425" tIns="91425" rIns="91425" bIns="91425" anchor="b" anchorCtr="0">
+          <a:bodyPr anchorCtr="0" anchor="b" bIns="91425" lIns="91425" spcFirstLastPara="1" rIns="91425" wrap="square" tIns="91425">
             <a:normAutofit/>
           </a:bodyPr>
           <a:lstStyle>
@@ -3766,19 +3675,15 @@
               <a:defRPr sz="4200"/>
             </a:lvl9pPr>
           </a:lstStyle>
-          <a:p>
-            <a:endParaRPr/>
-          </a:p>
+          <a:p/>
         </p:txBody>
       </p:sp>
       <p:sp>
         <p:nvSpPr>
           <p:cNvPr id="38" name="Google Shape;38;p9"/>
-          <p:cNvSpPr txBox="1">
-            <a:spLocks noGrp="1"/>
-          </p:cNvSpPr>
+          <p:cNvSpPr txBox="1"/>
           <p:nvPr>
-            <p:ph type="subTitle" idx="1"/>
+            <p:ph idx="1" type="subTitle"/>
           </p:nvPr>
         </p:nvSpPr>
         <p:spPr>
@@ -3791,7 +3696,7 @@
           </a:prstGeom>
         </p:spPr>
         <p:txBody>
-          <a:bodyPr spcFirstLastPara="1" wrap="square" lIns="91425" tIns="91425" rIns="91425" bIns="91425" anchor="t" anchorCtr="0">
+          <a:bodyPr anchorCtr="0" anchor="t" bIns="91425" lIns="91425" spcFirstLastPara="1" rIns="91425" wrap="square" tIns="91425">
             <a:normAutofit/>
           </a:bodyPr>
           <a:lstStyle>
@@ -3922,19 +3827,15 @@
               <a:defRPr sz="2100"/>
             </a:lvl9pPr>
           </a:lstStyle>
-          <a:p>
-            <a:endParaRPr/>
-          </a:p>
+          <a:p/>
         </p:txBody>
       </p:sp>
       <p:sp>
         <p:nvSpPr>
           <p:cNvPr id="39" name="Google Shape;39;p9"/>
-          <p:cNvSpPr txBox="1">
-            <a:spLocks noGrp="1"/>
-          </p:cNvSpPr>
+          <p:cNvSpPr txBox="1"/>
           <p:nvPr>
-            <p:ph type="body" idx="2"/>
+            <p:ph idx="2" type="body"/>
           </p:nvPr>
         </p:nvSpPr>
         <p:spPr>
@@ -3947,11 +3848,11 @@
           </a:prstGeom>
         </p:spPr>
         <p:txBody>
-          <a:bodyPr spcFirstLastPara="1" wrap="square" lIns="91425" tIns="91425" rIns="91425" bIns="91425" anchor="ctr" anchorCtr="0">
+          <a:bodyPr anchorCtr="0" anchor="ctr" bIns="91425" lIns="91425" spcFirstLastPara="1" rIns="91425" wrap="square" tIns="91425">
             <a:normAutofit/>
           </a:bodyPr>
           <a:lstStyle>
-            <a:lvl1pPr marL="457200" lvl="0" indent="-342900">
+            <a:lvl1pPr indent="-342900" lvl="0" marL="457200">
               <a:spcBef>
                 <a:spcPts val="0"/>
               </a:spcBef>
@@ -3962,7 +3863,7 @@
               <a:buChar char="●"/>
               <a:defRPr/>
             </a:lvl1pPr>
-            <a:lvl2pPr marL="914400" lvl="1" indent="-317500">
+            <a:lvl2pPr indent="-317500" lvl="1" marL="914400">
               <a:spcBef>
                 <a:spcPts val="0"/>
               </a:spcBef>
@@ -3973,7 +3874,7 @@
               <a:buChar char="○"/>
               <a:defRPr/>
             </a:lvl2pPr>
-            <a:lvl3pPr marL="1371600" lvl="2" indent="-317500">
+            <a:lvl3pPr indent="-317500" lvl="2" marL="1371600">
               <a:spcBef>
                 <a:spcPts val="0"/>
               </a:spcBef>
@@ -3984,7 +3885,7 @@
               <a:buChar char="■"/>
               <a:defRPr/>
             </a:lvl3pPr>
-            <a:lvl4pPr marL="1828800" lvl="3" indent="-317500">
+            <a:lvl4pPr indent="-317500" lvl="3" marL="1828800">
               <a:spcBef>
                 <a:spcPts val="0"/>
               </a:spcBef>
@@ -3995,7 +3896,7 @@
               <a:buChar char="●"/>
               <a:defRPr/>
             </a:lvl4pPr>
-            <a:lvl5pPr marL="2286000" lvl="4" indent="-317500">
+            <a:lvl5pPr indent="-317500" lvl="4" marL="2286000">
               <a:spcBef>
                 <a:spcPts val="0"/>
               </a:spcBef>
@@ -4006,7 +3907,7 @@
               <a:buChar char="○"/>
               <a:defRPr/>
             </a:lvl5pPr>
-            <a:lvl6pPr marL="2743200" lvl="5" indent="-317500">
+            <a:lvl6pPr indent="-317500" lvl="5" marL="2743200">
               <a:spcBef>
                 <a:spcPts val="0"/>
               </a:spcBef>
@@ -4017,7 +3918,7 @@
               <a:buChar char="■"/>
               <a:defRPr/>
             </a:lvl6pPr>
-            <a:lvl7pPr marL="3200400" lvl="6" indent="-317500">
+            <a:lvl7pPr indent="-317500" lvl="6" marL="3200400">
               <a:spcBef>
                 <a:spcPts val="0"/>
               </a:spcBef>
@@ -4028,7 +3929,7 @@
               <a:buChar char="●"/>
               <a:defRPr/>
             </a:lvl7pPr>
-            <a:lvl8pPr marL="3657600" lvl="7" indent="-317500">
+            <a:lvl8pPr indent="-317500" lvl="7" marL="3657600">
               <a:spcBef>
                 <a:spcPts val="0"/>
               </a:spcBef>
@@ -4039,7 +3940,7 @@
               <a:buChar char="○"/>
               <a:defRPr/>
             </a:lvl8pPr>
-            <a:lvl9pPr marL="4114800" lvl="8" indent="-317500">
+            <a:lvl9pPr indent="-317500" lvl="8" marL="4114800">
               <a:spcBef>
                 <a:spcPts val="0"/>
               </a:spcBef>
@@ -4051,19 +3952,15 @@
               <a:defRPr/>
             </a:lvl9pPr>
           </a:lstStyle>
-          <a:p>
-            <a:endParaRPr/>
-          </a:p>
+          <a:p/>
         </p:txBody>
       </p:sp>
       <p:sp>
         <p:nvSpPr>
           <p:cNvPr id="40" name="Google Shape;40;p9"/>
-          <p:cNvSpPr txBox="1">
-            <a:spLocks noGrp="1"/>
-          </p:cNvSpPr>
+          <p:cNvSpPr txBox="1"/>
           <p:nvPr>
-            <p:ph type="sldNum" idx="12"/>
+            <p:ph idx="12" type="sldNum"/>
           </p:nvPr>
         </p:nvSpPr>
         <p:spPr>
@@ -4076,7 +3973,7 @@
           </a:prstGeom>
         </p:spPr>
         <p:txBody>
-          <a:bodyPr spcFirstLastPara="1" wrap="square" lIns="91425" tIns="91425" rIns="91425" bIns="91425" anchor="ctr" anchorCtr="0">
+          <a:bodyPr anchorCtr="0" anchor="ctr" bIns="91425" lIns="91425" spcFirstLastPara="1" rIns="91425" wrap="square" tIns="91425">
             <a:normAutofit/>
           </a:bodyPr>
           <a:lstStyle>
@@ -4118,7 +4015,7 @@
             </a:lvl9pPr>
           </a:lstStyle>
           <a:p>
-            <a:pPr marL="0" lvl="0" indent="0" algn="r" rtl="0">
+            <a:pPr indent="0" lvl="0" marL="0" rtl="0" algn="r">
               <a:spcBef>
                 <a:spcPts val="0"/>
               </a:spcBef>
@@ -4144,11 +4041,11 @@
 </file>
 
 <file path=ppt/slideLayouts/slideLayout9.xml><?xml version="1.0" encoding="utf-8"?>
-<p:sldLayout xmlns:a="http://schemas.openxmlformats.org/drawingml/2006/main" xmlns:r="http://schemas.openxmlformats.org/officeDocument/2006/relationships" xmlns:p="http://schemas.openxmlformats.org/presentationml/2006/main" matchingName="Caption">
+<p:sldLayout xmlns:a="http://schemas.openxmlformats.org/drawingml/2006/main" xmlns:r="http://schemas.openxmlformats.org/officeDocument/2006/relationships" xmlns:mc="http://schemas.openxmlformats.org/markup-compatibility/2006" xmlns:mv="urn:schemas-microsoft-com:mac:vml" xmlns:p="http://schemas.openxmlformats.org/presentationml/2006/main" xmlns:c="http://schemas.openxmlformats.org/drawingml/2006/chart" xmlns:dgm="http://schemas.openxmlformats.org/drawingml/2006/diagram" xmlns:o="urn:schemas-microsoft-com:office:office" xmlns:v="urn:schemas-microsoft-com:vml" xmlns:pvml="urn:schemas-microsoft-com:office:powerpoint" xmlns:com="http://schemas.openxmlformats.org/drawingml/2006/compatibility" xmlns:p14="http://schemas.microsoft.com/office/powerpoint/2010/main" xmlns:p15="http://schemas.microsoft.com/office/powerpoint/2012/main" xmlns:ahyp="http://schemas.microsoft.com/office/drawing/2018/hyperlinkcolor" matchingName="Caption">
   <p:cSld name="CAPTION_ONLY">
     <p:spTree>
       <p:nvGrpSpPr>
-        <p:cNvPr id="1" name="Shape 41"/>
+        <p:cNvPr id="41" name="Shape 41"/>
         <p:cNvGrpSpPr/>
         <p:nvPr/>
       </p:nvGrpSpPr>
@@ -4163,11 +4060,9 @@
       <p:sp>
         <p:nvSpPr>
           <p:cNvPr id="42" name="Google Shape;42;p10"/>
-          <p:cNvSpPr txBox="1">
-            <a:spLocks noGrp="1"/>
-          </p:cNvSpPr>
+          <p:cNvSpPr txBox="1"/>
           <p:nvPr>
-            <p:ph type="body" idx="1"/>
+            <p:ph idx="1" type="body"/>
           </p:nvPr>
         </p:nvSpPr>
         <p:spPr>
@@ -4180,11 +4075,11 @@
           </a:prstGeom>
         </p:spPr>
         <p:txBody>
-          <a:bodyPr spcFirstLastPara="1" wrap="square" lIns="91425" tIns="91425" rIns="91425" bIns="91425" anchor="ctr" anchorCtr="0">
+          <a:bodyPr anchorCtr="0" anchor="ctr" bIns="91425" lIns="91425" spcFirstLastPara="1" rIns="91425" wrap="square" tIns="91425">
             <a:normAutofit/>
           </a:bodyPr>
           <a:lstStyle>
-            <a:lvl1pPr marL="457200" lvl="0" indent="-228600">
+            <a:lvl1pPr indent="-228600" lvl="0" marL="457200">
               <a:lnSpc>
                 <a:spcPct val="100000"/>
               </a:lnSpc>
@@ -4199,19 +4094,15 @@
               <a:defRPr/>
             </a:lvl1pPr>
           </a:lstStyle>
-          <a:p>
-            <a:endParaRPr/>
-          </a:p>
+          <a:p/>
         </p:txBody>
       </p:sp>
       <p:sp>
         <p:nvSpPr>
           <p:cNvPr id="43" name="Google Shape;43;p10"/>
-          <p:cNvSpPr txBox="1">
-            <a:spLocks noGrp="1"/>
-          </p:cNvSpPr>
+          <p:cNvSpPr txBox="1"/>
           <p:nvPr>
-            <p:ph type="sldNum" idx="12"/>
+            <p:ph idx="12" type="sldNum"/>
           </p:nvPr>
         </p:nvSpPr>
         <p:spPr>
@@ -4224,7 +4115,7 @@
           </a:prstGeom>
         </p:spPr>
         <p:txBody>
-          <a:bodyPr spcFirstLastPara="1" wrap="square" lIns="91425" tIns="91425" rIns="91425" bIns="91425" anchor="ctr" anchorCtr="0">
+          <a:bodyPr anchorCtr="0" anchor="ctr" bIns="91425" lIns="91425" spcFirstLastPara="1" rIns="91425" wrap="square" tIns="91425">
             <a:normAutofit/>
           </a:bodyPr>
           <a:lstStyle>
@@ -4266,7 +4157,7 @@
             </a:lvl9pPr>
           </a:lstStyle>
           <a:p>
-            <a:pPr marL="0" lvl="0" indent="0" algn="r" rtl="0">
+            <a:pPr indent="0" lvl="0" marL="0" rtl="0" algn="r">
               <a:spcBef>
                 <a:spcPts val="0"/>
               </a:spcBef>
@@ -4292,19 +4183,18 @@
 </file>
 
 <file path=ppt/slideMasters/slideMaster1.xml><?xml version="1.0" encoding="utf-8"?>
-<p:sldMaster xmlns:a="http://schemas.openxmlformats.org/drawingml/2006/main" xmlns:r="http://schemas.openxmlformats.org/officeDocument/2006/relationships" xmlns:p="http://schemas.openxmlformats.org/presentationml/2006/main">
+<p:sldMaster xmlns:a="http://schemas.openxmlformats.org/drawingml/2006/main" xmlns:r="http://schemas.openxmlformats.org/officeDocument/2006/relationships" xmlns:mc="http://schemas.openxmlformats.org/markup-compatibility/2006" xmlns:mv="urn:schemas-microsoft-com:mac:vml" xmlns:p="http://schemas.openxmlformats.org/presentationml/2006/main" xmlns:c="http://schemas.openxmlformats.org/drawingml/2006/chart" xmlns:dgm="http://schemas.openxmlformats.org/drawingml/2006/diagram" xmlns:o="urn:schemas-microsoft-com:office:office" xmlns:v="urn:schemas-microsoft-com:vml" xmlns:pvml="urn:schemas-microsoft-com:office:powerpoint" xmlns:com="http://schemas.openxmlformats.org/drawingml/2006/compatibility" xmlns:p14="http://schemas.microsoft.com/office/powerpoint/2010/main" xmlns:p15="http://schemas.microsoft.com/office/powerpoint/2012/main" xmlns:ahyp="http://schemas.microsoft.com/office/drawing/2018/hyperlinkcolor">
   <p:cSld name="simple-light-2">
     <p:bg>
       <p:bgPr>
         <a:solidFill>
           <a:schemeClr val="lt1"/>
         </a:solidFill>
-        <a:effectLst/>
       </p:bgPr>
     </p:bg>
     <p:spTree>
       <p:nvGrpSpPr>
-        <p:cNvPr id="1" name="Shape 5"/>
+        <p:cNvPr id="5" name="Shape 5"/>
         <p:cNvGrpSpPr/>
         <p:nvPr/>
       </p:nvGrpSpPr>
@@ -4319,9 +4209,7 @@
       <p:sp>
         <p:nvSpPr>
           <p:cNvPr id="6" name="Google Shape;6;p1"/>
-          <p:cNvSpPr txBox="1">
-            <a:spLocks noGrp="1"/>
-          </p:cNvSpPr>
+          <p:cNvSpPr txBox="1"/>
           <p:nvPr>
             <p:ph type="title"/>
           </p:nvPr>
@@ -4340,7 +4228,7 @@
           </a:ln>
         </p:spPr>
         <p:txBody>
-          <a:bodyPr spcFirstLastPara="1" wrap="square" lIns="91425" tIns="91425" rIns="91425" bIns="91425" anchor="t" anchorCtr="0">
+          <a:bodyPr anchorCtr="0" anchor="t" bIns="91425" lIns="91425" spcFirstLastPara="1" rIns="91425" wrap="square" tIns="91425">
             <a:normAutofit/>
           </a:bodyPr>
           <a:lstStyle>
@@ -4507,19 +4395,15 @@
               </a:defRPr>
             </a:lvl9pPr>
           </a:lstStyle>
-          <a:p>
-            <a:endParaRPr/>
-          </a:p>
+          <a:p/>
         </p:txBody>
       </p:sp>
       <p:sp>
         <p:nvSpPr>
           <p:cNvPr id="7" name="Google Shape;7;p1"/>
-          <p:cNvSpPr txBox="1">
-            <a:spLocks noGrp="1"/>
-          </p:cNvSpPr>
+          <p:cNvSpPr txBox="1"/>
           <p:nvPr>
-            <p:ph type="body" idx="1"/>
+            <p:ph idx="1" type="body"/>
           </p:nvPr>
         </p:nvSpPr>
         <p:spPr>
@@ -4536,11 +4420,11 @@
           </a:ln>
         </p:spPr>
         <p:txBody>
-          <a:bodyPr spcFirstLastPara="1" wrap="square" lIns="91425" tIns="91425" rIns="91425" bIns="91425" anchor="t" anchorCtr="0">
+          <a:bodyPr anchorCtr="0" anchor="t" bIns="91425" lIns="91425" spcFirstLastPara="1" rIns="91425" wrap="square" tIns="91425">
             <a:normAutofit/>
           </a:bodyPr>
           <a:lstStyle>
-            <a:lvl1pPr marL="457200" lvl="0" indent="-342900">
+            <a:lvl1pPr indent="-342900" lvl="0" marL="457200">
               <a:lnSpc>
                 <a:spcPct val="115000"/>
               </a:lnSpc>
@@ -4561,7 +4445,7 @@
                 </a:solidFill>
               </a:defRPr>
             </a:lvl1pPr>
-            <a:lvl2pPr marL="914400" lvl="1" indent="-317500">
+            <a:lvl2pPr indent="-317500" lvl="1" marL="914400">
               <a:lnSpc>
                 <a:spcPct val="115000"/>
               </a:lnSpc>
@@ -4582,7 +4466,7 @@
                 </a:solidFill>
               </a:defRPr>
             </a:lvl2pPr>
-            <a:lvl3pPr marL="1371600" lvl="2" indent="-317500">
+            <a:lvl3pPr indent="-317500" lvl="2" marL="1371600">
               <a:lnSpc>
                 <a:spcPct val="115000"/>
               </a:lnSpc>
@@ -4603,7 +4487,7 @@
                 </a:solidFill>
               </a:defRPr>
             </a:lvl3pPr>
-            <a:lvl4pPr marL="1828800" lvl="3" indent="-317500">
+            <a:lvl4pPr indent="-317500" lvl="3" marL="1828800">
               <a:lnSpc>
                 <a:spcPct val="115000"/>
               </a:lnSpc>
@@ -4624,7 +4508,7 @@
                 </a:solidFill>
               </a:defRPr>
             </a:lvl4pPr>
-            <a:lvl5pPr marL="2286000" lvl="4" indent="-317500">
+            <a:lvl5pPr indent="-317500" lvl="4" marL="2286000">
               <a:lnSpc>
                 <a:spcPct val="115000"/>
               </a:lnSpc>
@@ -4645,7 +4529,7 @@
                 </a:solidFill>
               </a:defRPr>
             </a:lvl5pPr>
-            <a:lvl6pPr marL="2743200" lvl="5" indent="-317500">
+            <a:lvl6pPr indent="-317500" lvl="5" marL="2743200">
               <a:lnSpc>
                 <a:spcPct val="115000"/>
               </a:lnSpc>
@@ -4666,7 +4550,7 @@
                 </a:solidFill>
               </a:defRPr>
             </a:lvl6pPr>
-            <a:lvl7pPr marL="3200400" lvl="6" indent="-317500">
+            <a:lvl7pPr indent="-317500" lvl="6" marL="3200400">
               <a:lnSpc>
                 <a:spcPct val="115000"/>
               </a:lnSpc>
@@ -4687,7 +4571,7 @@
                 </a:solidFill>
               </a:defRPr>
             </a:lvl7pPr>
-            <a:lvl8pPr marL="3657600" lvl="7" indent="-317500">
+            <a:lvl8pPr indent="-317500" lvl="7" marL="3657600">
               <a:lnSpc>
                 <a:spcPct val="115000"/>
               </a:lnSpc>
@@ -4708,7 +4592,7 @@
                 </a:solidFill>
               </a:defRPr>
             </a:lvl8pPr>
-            <a:lvl9pPr marL="4114800" lvl="8" indent="-317500">
+            <a:lvl9pPr indent="-317500" lvl="8" marL="4114800">
               <a:lnSpc>
                 <a:spcPct val="115000"/>
               </a:lnSpc>
@@ -4730,19 +4614,15 @@
               </a:defRPr>
             </a:lvl9pPr>
           </a:lstStyle>
-          <a:p>
-            <a:endParaRPr/>
-          </a:p>
+          <a:p/>
         </p:txBody>
       </p:sp>
       <p:sp>
         <p:nvSpPr>
           <p:cNvPr id="8" name="Google Shape;8;p1"/>
-          <p:cNvSpPr txBox="1">
-            <a:spLocks noGrp="1"/>
-          </p:cNvSpPr>
+          <p:cNvSpPr txBox="1"/>
           <p:nvPr>
-            <p:ph type="sldNum" idx="12"/>
+            <p:ph idx="12" type="sldNum"/>
           </p:nvPr>
         </p:nvSpPr>
         <p:spPr>
@@ -4759,7 +4639,7 @@
           </a:ln>
         </p:spPr>
         <p:txBody>
-          <a:bodyPr spcFirstLastPara="1" wrap="square" lIns="91425" tIns="91425" rIns="91425" bIns="91425" anchor="ctr" anchorCtr="0">
+          <a:bodyPr anchorCtr="0" anchor="ctr" bIns="91425" lIns="91425" spcFirstLastPara="1" rIns="91425" wrap="square" tIns="91425">
             <a:normAutofit/>
           </a:bodyPr>
           <a:lstStyle>
@@ -4837,7 +4717,7 @@
             </a:lvl9pPr>
           </a:lstStyle>
           <a:p>
-            <a:pPr marL="0" lvl="0" indent="0" algn="r" rtl="0">
+            <a:pPr indent="0" lvl="0" marL="0" rtl="0" algn="r">
               <a:spcBef>
                 <a:spcPts val="0"/>
               </a:spcBef>
@@ -4856,7 +4736,7 @@
       </p:sp>
     </p:spTree>
   </p:cSld>
-  <p:clrMap bg1="lt1" tx1="dk1" bg2="dk2" tx2="lt2" accent1="accent1" accent2="accent2" accent3="accent3" accent4="accent4" accent5="accent5" accent6="accent6" hlink="hlink" folHlink="folHlink"/>
+  <p:clrMap accent1="accent1" accent2="accent2" accent3="accent3" accent4="accent4" accent5="accent5" accent6="accent6" bg1="lt1" bg2="dk2" tx1="dk1" tx2="lt2" folHlink="folHlink" hlink="hlink"/>
   <p:sldLayoutIdLst>
     <p:sldLayoutId id="2147483648" r:id="rId1"/>
     <p:sldLayoutId id="2147483649" r:id="rId2"/>
@@ -4870,10 +4750,10 @@
     <p:sldLayoutId id="2147483657" r:id="rId10"/>
     <p:sldLayoutId id="2147483658" r:id="rId11"/>
   </p:sldLayoutIdLst>
-  <p:hf sldNum="0" hdr="0" ftr="0" dt="0"/>
+  <p:hf dt="0" ftr="0" hdr="0" sldNum="0"/>
   <p:txStyles>
     <p:titleStyle>
-      <a:defPPr marR="0" lvl="0" algn="l" rtl="0">
+      <a:defPPr lvl="0" marR="0" rtl="0" algn="l">
         <a:lnSpc>
           <a:spcPct val="100000"/>
         </a:lnSpc>
@@ -4884,7 +4764,7 @@
           <a:spcPts val="0"/>
         </a:spcAft>
       </a:defPPr>
-      <a:lvl1pPr marR="0" lvl="0" algn="l" rtl="0">
+      <a:lvl1pPr lvl="0" marR="0" rtl="0" algn="l">
         <a:lnSpc>
           <a:spcPct val="100000"/>
         </a:lnSpc>
@@ -4898,7 +4778,7 @@
           <a:srgbClr val="000000"/>
         </a:buClr>
         <a:buFont typeface="Arial"/>
-        <a:defRPr sz="1400" b="0" i="0" u="none" strike="noStrike" cap="none">
+        <a:defRPr b="0" i="0" sz="1400" u="none" cap="none" strike="noStrike">
           <a:solidFill>
             <a:srgbClr val="000000"/>
           </a:solidFill>
@@ -4908,7 +4788,7 @@
           <a:sym typeface="Arial"/>
         </a:defRPr>
       </a:lvl1pPr>
-      <a:lvl2pPr marR="0" lvl="1" algn="l" rtl="0">
+      <a:lvl2pPr lvl="1" marR="0" rtl="0" algn="l">
         <a:lnSpc>
           <a:spcPct val="100000"/>
         </a:lnSpc>
@@ -4922,7 +4802,7 @@
           <a:srgbClr val="000000"/>
         </a:buClr>
         <a:buFont typeface="Arial"/>
-        <a:defRPr sz="1400" b="0" i="0" u="none" strike="noStrike" cap="none">
+        <a:defRPr b="0" i="0" sz="1400" u="none" cap="none" strike="noStrike">
           <a:solidFill>
             <a:srgbClr val="000000"/>
           </a:solidFill>
@@ -4932,7 +4812,7 @@
           <a:sym typeface="Arial"/>
         </a:defRPr>
       </a:lvl2pPr>
-      <a:lvl3pPr marR="0" lvl="2" algn="l" rtl="0">
+      <a:lvl3pPr lvl="2" marR="0" rtl="0" algn="l">
         <a:lnSpc>
           <a:spcPct val="100000"/>
         </a:lnSpc>
@@ -4946,7 +4826,7 @@
           <a:srgbClr val="000000"/>
         </a:buClr>
         <a:buFont typeface="Arial"/>
-        <a:defRPr sz="1400" b="0" i="0" u="none" strike="noStrike" cap="none">
+        <a:defRPr b="0" i="0" sz="1400" u="none" cap="none" strike="noStrike">
           <a:solidFill>
             <a:srgbClr val="000000"/>
           </a:solidFill>
@@ -4956,7 +4836,7 @@
           <a:sym typeface="Arial"/>
         </a:defRPr>
       </a:lvl3pPr>
-      <a:lvl4pPr marR="0" lvl="3" algn="l" rtl="0">
+      <a:lvl4pPr lvl="3" marR="0" rtl="0" algn="l">
         <a:lnSpc>
           <a:spcPct val="100000"/>
         </a:lnSpc>
@@ -4970,7 +4850,7 @@
           <a:srgbClr val="000000"/>
         </a:buClr>
         <a:buFont typeface="Arial"/>
-        <a:defRPr sz="1400" b="0" i="0" u="none" strike="noStrike" cap="none">
+        <a:defRPr b="0" i="0" sz="1400" u="none" cap="none" strike="noStrike">
           <a:solidFill>
             <a:srgbClr val="000000"/>
           </a:solidFill>
@@ -4980,7 +4860,7 @@
           <a:sym typeface="Arial"/>
         </a:defRPr>
       </a:lvl4pPr>
-      <a:lvl5pPr marR="0" lvl="4" algn="l" rtl="0">
+      <a:lvl5pPr lvl="4" marR="0" rtl="0" algn="l">
         <a:lnSpc>
           <a:spcPct val="100000"/>
         </a:lnSpc>
@@ -4994,7 +4874,7 @@
           <a:srgbClr val="000000"/>
         </a:buClr>
         <a:buFont typeface="Arial"/>
-        <a:defRPr sz="1400" b="0" i="0" u="none" strike="noStrike" cap="none">
+        <a:defRPr b="0" i="0" sz="1400" u="none" cap="none" strike="noStrike">
           <a:solidFill>
             <a:srgbClr val="000000"/>
           </a:solidFill>
@@ -5004,7 +4884,7 @@
           <a:sym typeface="Arial"/>
         </a:defRPr>
       </a:lvl5pPr>
-      <a:lvl6pPr marR="0" lvl="5" algn="l" rtl="0">
+      <a:lvl6pPr lvl="5" marR="0" rtl="0" algn="l">
         <a:lnSpc>
           <a:spcPct val="100000"/>
         </a:lnSpc>
@@ -5018,7 +4898,7 @@
           <a:srgbClr val="000000"/>
         </a:buClr>
         <a:buFont typeface="Arial"/>
-        <a:defRPr sz="1400" b="0" i="0" u="none" strike="noStrike" cap="none">
+        <a:defRPr b="0" i="0" sz="1400" u="none" cap="none" strike="noStrike">
           <a:solidFill>
             <a:srgbClr val="000000"/>
           </a:solidFill>
@@ -5028,7 +4908,7 @@
           <a:sym typeface="Arial"/>
         </a:defRPr>
       </a:lvl6pPr>
-      <a:lvl7pPr marR="0" lvl="6" algn="l" rtl="0">
+      <a:lvl7pPr lvl="6" marR="0" rtl="0" algn="l">
         <a:lnSpc>
           <a:spcPct val="100000"/>
         </a:lnSpc>
@@ -5042,7 +4922,7 @@
           <a:srgbClr val="000000"/>
         </a:buClr>
         <a:buFont typeface="Arial"/>
-        <a:defRPr sz="1400" b="0" i="0" u="none" strike="noStrike" cap="none">
+        <a:defRPr b="0" i="0" sz="1400" u="none" cap="none" strike="noStrike">
           <a:solidFill>
             <a:srgbClr val="000000"/>
           </a:solidFill>
@@ -5052,7 +4932,7 @@
           <a:sym typeface="Arial"/>
         </a:defRPr>
       </a:lvl7pPr>
-      <a:lvl8pPr marR="0" lvl="7" algn="l" rtl="0">
+      <a:lvl8pPr lvl="7" marR="0" rtl="0" algn="l">
         <a:lnSpc>
           <a:spcPct val="100000"/>
         </a:lnSpc>
@@ -5066,7 +4946,7 @@
           <a:srgbClr val="000000"/>
         </a:buClr>
         <a:buFont typeface="Arial"/>
-        <a:defRPr sz="1400" b="0" i="0" u="none" strike="noStrike" cap="none">
+        <a:defRPr b="0" i="0" sz="1400" u="none" cap="none" strike="noStrike">
           <a:solidFill>
             <a:srgbClr val="000000"/>
           </a:solidFill>
@@ -5076,7 +4956,7 @@
           <a:sym typeface="Arial"/>
         </a:defRPr>
       </a:lvl8pPr>
-      <a:lvl9pPr marR="0" lvl="8" algn="l" rtl="0">
+      <a:lvl9pPr lvl="8" marR="0" rtl="0" algn="l">
         <a:lnSpc>
           <a:spcPct val="100000"/>
         </a:lnSpc>
@@ -5090,7 +4970,7 @@
           <a:srgbClr val="000000"/>
         </a:buClr>
         <a:buFont typeface="Arial"/>
-        <a:defRPr sz="1400" b="0" i="0" u="none" strike="noStrike" cap="none">
+        <a:defRPr b="0" i="0" sz="1400" u="none" cap="none" strike="noStrike">
           <a:solidFill>
             <a:srgbClr val="000000"/>
           </a:solidFill>
@@ -5102,7 +4982,7 @@
       </a:lvl9pPr>
     </p:titleStyle>
     <p:bodyStyle>
-      <a:defPPr marR="0" lvl="0" algn="l" rtl="0">
+      <a:defPPr lvl="0" marR="0" rtl="0" algn="l">
         <a:lnSpc>
           <a:spcPct val="100000"/>
         </a:lnSpc>
@@ -5113,7 +4993,7 @@
           <a:spcPts val="0"/>
         </a:spcAft>
       </a:defPPr>
-      <a:lvl1pPr marR="0" lvl="0" algn="l" rtl="0">
+      <a:lvl1pPr lvl="0" marR="0" rtl="0" algn="l">
         <a:lnSpc>
           <a:spcPct val="100000"/>
         </a:lnSpc>
@@ -5127,7 +5007,7 @@
           <a:srgbClr val="000000"/>
         </a:buClr>
         <a:buFont typeface="Arial"/>
-        <a:defRPr sz="1400" b="0" i="0" u="none" strike="noStrike" cap="none">
+        <a:defRPr b="0" i="0" sz="1400" u="none" cap="none" strike="noStrike">
           <a:solidFill>
             <a:srgbClr val="000000"/>
           </a:solidFill>
@@ -5137,7 +5017,7 @@
           <a:sym typeface="Arial"/>
         </a:defRPr>
       </a:lvl1pPr>
-      <a:lvl2pPr marR="0" lvl="1" algn="l" rtl="0">
+      <a:lvl2pPr lvl="1" marR="0" rtl="0" algn="l">
         <a:lnSpc>
           <a:spcPct val="100000"/>
         </a:lnSpc>
@@ -5151,7 +5031,7 @@
           <a:srgbClr val="000000"/>
         </a:buClr>
         <a:buFont typeface="Arial"/>
-        <a:defRPr sz="1400" b="0" i="0" u="none" strike="noStrike" cap="none">
+        <a:defRPr b="0" i="0" sz="1400" u="none" cap="none" strike="noStrike">
           <a:solidFill>
             <a:srgbClr val="000000"/>
           </a:solidFill>
@@ -5161,7 +5041,7 @@
           <a:sym typeface="Arial"/>
         </a:defRPr>
       </a:lvl2pPr>
-      <a:lvl3pPr marR="0" lvl="2" algn="l" rtl="0">
+      <a:lvl3pPr lvl="2" marR="0" rtl="0" algn="l">
         <a:lnSpc>
           <a:spcPct val="100000"/>
         </a:lnSpc>
@@ -5175,7 +5055,7 @@
           <a:srgbClr val="000000"/>
         </a:buClr>
         <a:buFont typeface="Arial"/>
-        <a:defRPr sz="1400" b="0" i="0" u="none" strike="noStrike" cap="none">
+        <a:defRPr b="0" i="0" sz="1400" u="none" cap="none" strike="noStrike">
           <a:solidFill>
             <a:srgbClr val="000000"/>
           </a:solidFill>
@@ -5185,7 +5065,7 @@
           <a:sym typeface="Arial"/>
         </a:defRPr>
       </a:lvl3pPr>
-      <a:lvl4pPr marR="0" lvl="3" algn="l" rtl="0">
+      <a:lvl4pPr lvl="3" marR="0" rtl="0" algn="l">
         <a:lnSpc>
           <a:spcPct val="100000"/>
         </a:lnSpc>
@@ -5199,7 +5079,7 @@
           <a:srgbClr val="000000"/>
         </a:buClr>
         <a:buFont typeface="Arial"/>
-        <a:defRPr sz="1400" b="0" i="0" u="none" strike="noStrike" cap="none">
+        <a:defRPr b="0" i="0" sz="1400" u="none" cap="none" strike="noStrike">
           <a:solidFill>
             <a:srgbClr val="000000"/>
           </a:solidFill>
@@ -5209,7 +5089,7 @@
           <a:sym typeface="Arial"/>
         </a:defRPr>
       </a:lvl4pPr>
-      <a:lvl5pPr marR="0" lvl="4" algn="l" rtl="0">
+      <a:lvl5pPr lvl="4" marR="0" rtl="0" algn="l">
         <a:lnSpc>
           <a:spcPct val="100000"/>
         </a:lnSpc>
@@ -5223,7 +5103,7 @@
           <a:srgbClr val="000000"/>
         </a:buClr>
         <a:buFont typeface="Arial"/>
-        <a:defRPr sz="1400" b="0" i="0" u="none" strike="noStrike" cap="none">
+        <a:defRPr b="0" i="0" sz="1400" u="none" cap="none" strike="noStrike">
           <a:solidFill>
             <a:srgbClr val="000000"/>
           </a:solidFill>
@@ -5233,7 +5113,7 @@
           <a:sym typeface="Arial"/>
         </a:defRPr>
       </a:lvl5pPr>
-      <a:lvl6pPr marR="0" lvl="5" algn="l" rtl="0">
+      <a:lvl6pPr lvl="5" marR="0" rtl="0" algn="l">
         <a:lnSpc>
           <a:spcPct val="100000"/>
         </a:lnSpc>
@@ -5247,7 +5127,7 @@
           <a:srgbClr val="000000"/>
         </a:buClr>
         <a:buFont typeface="Arial"/>
-        <a:defRPr sz="1400" b="0" i="0" u="none" strike="noStrike" cap="none">
+        <a:defRPr b="0" i="0" sz="1400" u="none" cap="none" strike="noStrike">
           <a:solidFill>
             <a:srgbClr val="000000"/>
           </a:solidFill>
@@ -5257,7 +5137,7 @@
           <a:sym typeface="Arial"/>
         </a:defRPr>
       </a:lvl6pPr>
-      <a:lvl7pPr marR="0" lvl="6" algn="l" rtl="0">
+      <a:lvl7pPr lvl="6" marR="0" rtl="0" algn="l">
         <a:lnSpc>
           <a:spcPct val="100000"/>
         </a:lnSpc>
@@ -5271,7 +5151,7 @@
           <a:srgbClr val="000000"/>
         </a:buClr>
         <a:buFont typeface="Arial"/>
-        <a:defRPr sz="1400" b="0" i="0" u="none" strike="noStrike" cap="none">
+        <a:defRPr b="0" i="0" sz="1400" u="none" cap="none" strike="noStrike">
           <a:solidFill>
             <a:srgbClr val="000000"/>
           </a:solidFill>
@@ -5281,7 +5161,7 @@
           <a:sym typeface="Arial"/>
         </a:defRPr>
       </a:lvl7pPr>
-      <a:lvl8pPr marR="0" lvl="7" algn="l" rtl="0">
+      <a:lvl8pPr lvl="7" marR="0" rtl="0" algn="l">
         <a:lnSpc>
           <a:spcPct val="100000"/>
         </a:lnSpc>
@@ -5295,7 +5175,7 @@
           <a:srgbClr val="000000"/>
         </a:buClr>
         <a:buFont typeface="Arial"/>
-        <a:defRPr sz="1400" b="0" i="0" u="none" strike="noStrike" cap="none">
+        <a:defRPr b="0" i="0" sz="1400" u="none" cap="none" strike="noStrike">
           <a:solidFill>
             <a:srgbClr val="000000"/>
           </a:solidFill>
@@ -5305,7 +5185,7 @@
           <a:sym typeface="Arial"/>
         </a:defRPr>
       </a:lvl8pPr>
-      <a:lvl9pPr marR="0" lvl="8" algn="l" rtl="0">
+      <a:lvl9pPr lvl="8" marR="0" rtl="0" algn="l">
         <a:lnSpc>
           <a:spcPct val="100000"/>
         </a:lnSpc>
@@ -5319,7 +5199,7 @@
           <a:srgbClr val="000000"/>
         </a:buClr>
         <a:buFont typeface="Arial"/>
-        <a:defRPr sz="1400" b="0" i="0" u="none" strike="noStrike" cap="none">
+        <a:defRPr b="0" i="0" sz="1400" u="none" cap="none" strike="noStrike">
           <a:solidFill>
             <a:srgbClr val="000000"/>
           </a:solidFill>
@@ -5331,7 +5211,7 @@
       </a:lvl9pPr>
     </p:bodyStyle>
     <p:otherStyle>
-      <a:defPPr marR="0" lvl="0" algn="l" rtl="0">
+      <a:defPPr lvl="0" marR="0" rtl="0" algn="l">
         <a:lnSpc>
           <a:spcPct val="100000"/>
         </a:lnSpc>
@@ -5342,7 +5222,7 @@
           <a:spcPts val="0"/>
         </a:spcAft>
       </a:defPPr>
-      <a:lvl1pPr marR="0" lvl="0" algn="l" rtl="0">
+      <a:lvl1pPr lvl="0" marR="0" rtl="0" algn="l">
         <a:lnSpc>
           <a:spcPct val="100000"/>
         </a:lnSpc>
@@ -5356,7 +5236,7 @@
           <a:srgbClr val="000000"/>
         </a:buClr>
         <a:buFont typeface="Arial"/>
-        <a:defRPr sz="1400" b="0" i="0" u="none" strike="noStrike" cap="none">
+        <a:defRPr b="0" i="0" sz="1400" u="none" cap="none" strike="noStrike">
           <a:solidFill>
             <a:srgbClr val="000000"/>
           </a:solidFill>
@@ -5366,7 +5246,7 @@
           <a:sym typeface="Arial"/>
         </a:defRPr>
       </a:lvl1pPr>
-      <a:lvl2pPr marR="0" lvl="1" algn="l" rtl="0">
+      <a:lvl2pPr lvl="1" marR="0" rtl="0" algn="l">
         <a:lnSpc>
           <a:spcPct val="100000"/>
         </a:lnSpc>
@@ -5380,7 +5260,7 @@
           <a:srgbClr val="000000"/>
         </a:buClr>
         <a:buFont typeface="Arial"/>
-        <a:defRPr sz="1400" b="0" i="0" u="none" strike="noStrike" cap="none">
+        <a:defRPr b="0" i="0" sz="1400" u="none" cap="none" strike="noStrike">
           <a:solidFill>
             <a:srgbClr val="000000"/>
           </a:solidFill>
@@ -5390,7 +5270,7 @@
           <a:sym typeface="Arial"/>
         </a:defRPr>
       </a:lvl2pPr>
-      <a:lvl3pPr marR="0" lvl="2" algn="l" rtl="0">
+      <a:lvl3pPr lvl="2" marR="0" rtl="0" algn="l">
         <a:lnSpc>
           <a:spcPct val="100000"/>
         </a:lnSpc>
@@ -5404,7 +5284,7 @@
           <a:srgbClr val="000000"/>
         </a:buClr>
         <a:buFont typeface="Arial"/>
-        <a:defRPr sz="1400" b="0" i="0" u="none" strike="noStrike" cap="none">
+        <a:defRPr b="0" i="0" sz="1400" u="none" cap="none" strike="noStrike">
           <a:solidFill>
             <a:srgbClr val="000000"/>
           </a:solidFill>
@@ -5414,7 +5294,7 @@
           <a:sym typeface="Arial"/>
         </a:defRPr>
       </a:lvl3pPr>
-      <a:lvl4pPr marR="0" lvl="3" algn="l" rtl="0">
+      <a:lvl4pPr lvl="3" marR="0" rtl="0" algn="l">
         <a:lnSpc>
           <a:spcPct val="100000"/>
         </a:lnSpc>
@@ -5428,7 +5308,7 @@
           <a:srgbClr val="000000"/>
         </a:buClr>
         <a:buFont typeface="Arial"/>
-        <a:defRPr sz="1400" b="0" i="0" u="none" strike="noStrike" cap="none">
+        <a:defRPr b="0" i="0" sz="1400" u="none" cap="none" strike="noStrike">
           <a:solidFill>
             <a:srgbClr val="000000"/>
           </a:solidFill>
@@ -5438,7 +5318,7 @@
           <a:sym typeface="Arial"/>
         </a:defRPr>
       </a:lvl4pPr>
-      <a:lvl5pPr marR="0" lvl="4" algn="l" rtl="0">
+      <a:lvl5pPr lvl="4" marR="0" rtl="0" algn="l">
         <a:lnSpc>
           <a:spcPct val="100000"/>
         </a:lnSpc>
@@ -5452,7 +5332,7 @@
           <a:srgbClr val="000000"/>
         </a:buClr>
         <a:buFont typeface="Arial"/>
-        <a:defRPr sz="1400" b="0" i="0" u="none" strike="noStrike" cap="none">
+        <a:defRPr b="0" i="0" sz="1400" u="none" cap="none" strike="noStrike">
           <a:solidFill>
             <a:srgbClr val="000000"/>
           </a:solidFill>
@@ -5462,7 +5342,7 @@
           <a:sym typeface="Arial"/>
         </a:defRPr>
       </a:lvl5pPr>
-      <a:lvl6pPr marR="0" lvl="5" algn="l" rtl="0">
+      <a:lvl6pPr lvl="5" marR="0" rtl="0" algn="l">
         <a:lnSpc>
           <a:spcPct val="100000"/>
         </a:lnSpc>
@@ -5476,7 +5356,7 @@
           <a:srgbClr val="000000"/>
         </a:buClr>
         <a:buFont typeface="Arial"/>
-        <a:defRPr sz="1400" b="0" i="0" u="none" strike="noStrike" cap="none">
+        <a:defRPr b="0" i="0" sz="1400" u="none" cap="none" strike="noStrike">
           <a:solidFill>
             <a:srgbClr val="000000"/>
           </a:solidFill>
@@ -5486,7 +5366,7 @@
           <a:sym typeface="Arial"/>
         </a:defRPr>
       </a:lvl6pPr>
-      <a:lvl7pPr marR="0" lvl="6" algn="l" rtl="0">
+      <a:lvl7pPr lvl="6" marR="0" rtl="0" algn="l">
         <a:lnSpc>
           <a:spcPct val="100000"/>
         </a:lnSpc>
@@ -5500,7 +5380,7 @@
           <a:srgbClr val="000000"/>
         </a:buClr>
         <a:buFont typeface="Arial"/>
-        <a:defRPr sz="1400" b="0" i="0" u="none" strike="noStrike" cap="none">
+        <a:defRPr b="0" i="0" sz="1400" u="none" cap="none" strike="noStrike">
           <a:solidFill>
             <a:srgbClr val="000000"/>
           </a:solidFill>
@@ -5510,7 +5390,7 @@
           <a:sym typeface="Arial"/>
         </a:defRPr>
       </a:lvl7pPr>
-      <a:lvl8pPr marR="0" lvl="7" algn="l" rtl="0">
+      <a:lvl8pPr lvl="7" marR="0" rtl="0" algn="l">
         <a:lnSpc>
           <a:spcPct val="100000"/>
         </a:lnSpc>
@@ -5524,7 +5404,7 @@
           <a:srgbClr val="000000"/>
         </a:buClr>
         <a:buFont typeface="Arial"/>
-        <a:defRPr sz="1400" b="0" i="0" u="none" strike="noStrike" cap="none">
+        <a:defRPr b="0" i="0" sz="1400" u="none" cap="none" strike="noStrike">
           <a:solidFill>
             <a:srgbClr val="000000"/>
           </a:solidFill>
@@ -5534,7 +5414,7 @@
           <a:sym typeface="Arial"/>
         </a:defRPr>
       </a:lvl8pPr>
-      <a:lvl9pPr marR="0" lvl="8" algn="l" rtl="0">
+      <a:lvl9pPr lvl="8" marR="0" rtl="0" algn="l">
         <a:lnSpc>
           <a:spcPct val="100000"/>
         </a:lnSpc>
@@ -5548,7 +5428,7 @@
           <a:srgbClr val="000000"/>
         </a:buClr>
         <a:buFont typeface="Arial"/>
-        <a:defRPr sz="1400" b="0" i="0" u="none" strike="noStrike" cap="none">
+        <a:defRPr b="0" i="0" sz="1400" u="none" cap="none" strike="noStrike">
           <a:solidFill>
             <a:srgbClr val="000000"/>
           </a:solidFill>
@@ -5564,11 +5444,11 @@
 </file>
 
 <file path=ppt/slides/slide1.xml><?xml version="1.0" encoding="utf-8"?>
-<p:sld xmlns:a="http://schemas.openxmlformats.org/drawingml/2006/main" xmlns:r="http://schemas.openxmlformats.org/officeDocument/2006/relationships" xmlns:p="http://schemas.openxmlformats.org/presentationml/2006/main">
+<p:sld xmlns:a="http://schemas.openxmlformats.org/drawingml/2006/main" xmlns:r="http://schemas.openxmlformats.org/officeDocument/2006/relationships" xmlns:mc="http://schemas.openxmlformats.org/markup-compatibility/2006" xmlns:mv="urn:schemas-microsoft-com:mac:vml" xmlns:p="http://schemas.openxmlformats.org/presentationml/2006/main" xmlns:c="http://schemas.openxmlformats.org/drawingml/2006/chart" xmlns:dgm="http://schemas.openxmlformats.org/drawingml/2006/diagram" xmlns:o="urn:schemas-microsoft-com:office:office" xmlns:v="urn:schemas-microsoft-com:vml" xmlns:pvml="urn:schemas-microsoft-com:office:powerpoint" xmlns:com="http://schemas.openxmlformats.org/drawingml/2006/compatibility" xmlns:p14="http://schemas.microsoft.com/office/powerpoint/2010/main" xmlns:p15="http://schemas.microsoft.com/office/powerpoint/2012/main" xmlns:ahyp="http://schemas.microsoft.com/office/drawing/2018/hyperlinkcolor">
   <p:cSld>
     <p:spTree>
       <p:nvGrpSpPr>
-        <p:cNvPr id="1" name="Shape 53"/>
+        <p:cNvPr id="53" name="Shape 53"/>
         <p:cNvGrpSpPr/>
         <p:nvPr/>
       </p:nvGrpSpPr>
@@ -5593,29 +5473,29 @@
           </a:xfrm>
           <a:prstGeom prst="roundRect">
             <a:avLst>
-              <a:gd name="adj" fmla="val 16667"/>
+              <a:gd fmla="val 16667" name="adj"/>
             </a:avLst>
           </a:prstGeom>
           <a:solidFill>
             <a:srgbClr val="FFEDB8"/>
           </a:solidFill>
-          <a:ln w="38100" cap="flat" cmpd="sng">
+          <a:ln cap="flat" cmpd="sng" w="19050">
             <a:solidFill>
               <a:srgbClr val="FFD966"/>
             </a:solidFill>
             <a:prstDash val="solid"/>
             <a:round/>
-            <a:headEnd type="none" w="sm" len="sm"/>
-            <a:tailEnd type="none" w="sm" len="sm"/>
+            <a:headEnd len="sm" w="sm" type="none"/>
+            <a:tailEnd len="sm" w="sm" type="none"/>
           </a:ln>
         </p:spPr>
         <p:txBody>
-          <a:bodyPr spcFirstLastPara="1" wrap="square" lIns="91425" tIns="91425" rIns="91425" bIns="91425" anchor="ctr" anchorCtr="0">
+          <a:bodyPr anchorCtr="0" anchor="ctr" bIns="91425" lIns="91425" spcFirstLastPara="1" rIns="91425" wrap="square" tIns="91425">
             <a:noAutofit/>
           </a:bodyPr>
           <a:lstStyle/>
           <a:p>
-            <a:pPr marL="0" lvl="0" indent="0" algn="ctr" rtl="0">
+            <a:pPr indent="0" lvl="0" marL="0" rtl="0" algn="ctr">
               <a:spcBef>
                 <a:spcPts val="0"/>
               </a:spcBef>
@@ -5655,29 +5535,29 @@
           </a:xfrm>
           <a:prstGeom prst="roundRect">
             <a:avLst>
-              <a:gd name="adj" fmla="val 0"/>
+              <a:gd fmla="val 0" name="adj"/>
             </a:avLst>
           </a:prstGeom>
           <a:solidFill>
             <a:srgbClr val="B7CDF1"/>
           </a:solidFill>
-          <a:ln w="38100" cap="flat" cmpd="sng">
+          <a:ln cap="flat" cmpd="sng" w="19050">
             <a:solidFill>
               <a:srgbClr val="6D9EEB"/>
             </a:solidFill>
             <a:prstDash val="solid"/>
             <a:round/>
-            <a:headEnd type="none" w="sm" len="sm"/>
-            <a:tailEnd type="none" w="sm" len="sm"/>
+            <a:headEnd len="sm" w="sm" type="none"/>
+            <a:tailEnd len="sm" w="sm" type="none"/>
           </a:ln>
         </p:spPr>
         <p:txBody>
-          <a:bodyPr spcFirstLastPara="1" wrap="square" lIns="91425" tIns="91425" rIns="91425" bIns="91425" anchor="ctr" anchorCtr="0">
+          <a:bodyPr anchorCtr="0" anchor="ctr" bIns="91425" lIns="91425" spcFirstLastPara="1" rIns="91425" wrap="square" tIns="91425">
             <a:noAutofit/>
           </a:bodyPr>
           <a:lstStyle/>
           <a:p>
-            <a:pPr marL="0" lvl="0" indent="0" algn="ctr" rtl="0">
+            <a:pPr indent="0" lvl="0" marL="0" rtl="0" algn="ctr">
               <a:spcBef>
                 <a:spcPts val="0"/>
               </a:spcBef>
@@ -5717,29 +5597,29 @@
           </a:xfrm>
           <a:prstGeom prst="roundRect">
             <a:avLst>
-              <a:gd name="adj" fmla="val 16667"/>
+              <a:gd fmla="val 16667" name="adj"/>
             </a:avLst>
           </a:prstGeom>
           <a:solidFill>
             <a:srgbClr val="DFBDCF"/>
           </a:solidFill>
-          <a:ln w="38100" cap="flat" cmpd="sng">
+          <a:ln cap="flat" cmpd="sng" w="19050">
             <a:solidFill>
               <a:srgbClr val="D09CB7"/>
             </a:solidFill>
             <a:prstDash val="solid"/>
             <a:round/>
-            <a:headEnd type="none" w="sm" len="sm"/>
-            <a:tailEnd type="none" w="sm" len="sm"/>
+            <a:headEnd len="sm" w="sm" type="none"/>
+            <a:tailEnd len="sm" w="sm" type="none"/>
           </a:ln>
         </p:spPr>
         <p:txBody>
-          <a:bodyPr spcFirstLastPara="1" wrap="square" lIns="91425" tIns="91425" rIns="91425" bIns="91425" anchor="ctr" anchorCtr="0">
+          <a:bodyPr anchorCtr="0" anchor="ctr" bIns="91425" lIns="91425" spcFirstLastPara="1" rIns="91425" wrap="square" tIns="91425">
             <a:noAutofit/>
           </a:bodyPr>
           <a:lstStyle/>
           <a:p>
-            <a:pPr marL="0" lvl="0" indent="0" algn="ctr" rtl="0">
+            <a:pPr indent="0" lvl="0" marL="0" rtl="0" algn="ctr">
               <a:spcBef>
                 <a:spcPts val="0"/>
               </a:spcBef>
@@ -5779,29 +5659,29 @@
           </a:xfrm>
           <a:prstGeom prst="octagon">
             <a:avLst>
-              <a:gd name="adj" fmla="val 29289"/>
+              <a:gd fmla="val 29289" name="adj"/>
             </a:avLst>
           </a:prstGeom>
           <a:solidFill>
             <a:srgbClr val="FFC08B"/>
           </a:solidFill>
-          <a:ln w="38100" cap="flat" cmpd="sng">
+          <a:ln cap="flat" cmpd="sng" w="19050">
             <a:solidFill>
               <a:srgbClr val="E88814"/>
             </a:solidFill>
             <a:prstDash val="solid"/>
             <a:round/>
-            <a:headEnd type="none" w="sm" len="sm"/>
-            <a:tailEnd type="none" w="sm" len="sm"/>
+            <a:headEnd len="sm" w="sm" type="none"/>
+            <a:tailEnd len="sm" w="sm" type="none"/>
           </a:ln>
         </p:spPr>
         <p:txBody>
-          <a:bodyPr spcFirstLastPara="1" wrap="square" lIns="91425" tIns="91425" rIns="91425" bIns="91425" anchor="ctr" anchorCtr="0">
+          <a:bodyPr anchorCtr="0" anchor="ctr" bIns="91425" lIns="91425" spcFirstLastPara="1" rIns="91425" wrap="square" tIns="91425">
             <a:noAutofit/>
           </a:bodyPr>
           <a:lstStyle/>
           <a:p>
-            <a:pPr marL="0" lvl="0" indent="0" algn="ctr" rtl="0">
+            <a:pPr indent="0" lvl="0" marL="0" rtl="0" algn="ctr">
               <a:spcBef>
                 <a:spcPts val="0"/>
               </a:spcBef>
@@ -5836,8 +5716,8 @@
         </p:nvSpPr>
         <p:spPr>
           <a:xfrm>
-            <a:off x="2414016" y="136000"/>
-            <a:ext cx="6611112" cy="943500"/>
+            <a:off x="2294600" y="136000"/>
+            <a:ext cx="6539100" cy="943500"/>
           </a:xfrm>
           <a:prstGeom prst="rect">
             <a:avLst/>
@@ -5848,12 +5728,12 @@
           </a:ln>
         </p:spPr>
         <p:txBody>
-          <a:bodyPr spcFirstLastPara="1" wrap="square" lIns="91425" tIns="91425" rIns="91425" bIns="91425" anchor="t" anchorCtr="0">
+          <a:bodyPr anchorCtr="0" anchor="t" bIns="91425" lIns="91425" spcFirstLastPara="1" rIns="91425" wrap="square" tIns="91425">
             <a:noAutofit/>
           </a:bodyPr>
           <a:lstStyle/>
           <a:p>
-            <a:pPr marL="0" lvl="0" indent="0" algn="l" rtl="0">
+            <a:pPr indent="0" lvl="0" marL="0" rtl="0" algn="l">
               <a:lnSpc>
                 <a:spcPct val="115000"/>
               </a:lnSpc>
@@ -5866,7 +5746,7 @@
               <a:buNone/>
             </a:pPr>
             <a:r>
-              <a:rPr lang="en-GB" sz="1000" dirty="0">
+              <a:rPr lang="en-GB" sz="1000">
                 <a:solidFill>
                   <a:srgbClr val="434343"/>
                 </a:solidFill>
@@ -5875,34 +5755,10 @@
                 <a:cs typeface="Open Sans"/>
                 <a:sym typeface="Open Sans"/>
               </a:rPr>
-              <a:t>These shapes can be used as copy/paste templates for </a:t>
+              <a:t>These shapes can be used as copy/paste templates for modeling organization design and team interactions based on the ideas in Team Topologies. See</a:t>
             </a:r>
             <a:r>
-              <a:rPr lang="en-GB" sz="1000" dirty="0" err="1">
-                <a:solidFill>
-                  <a:srgbClr val="434343"/>
-                </a:solidFill>
-                <a:latin typeface="Open Sans"/>
-                <a:ea typeface="Open Sans"/>
-                <a:cs typeface="Open Sans"/>
-                <a:sym typeface="Open Sans"/>
-              </a:rPr>
-              <a:t>modeling</a:t>
-            </a:r>
-            <a:r>
-              <a:rPr lang="en-GB" sz="1000" dirty="0">
-                <a:solidFill>
-                  <a:srgbClr val="434343"/>
-                </a:solidFill>
-                <a:latin typeface="Open Sans"/>
-                <a:ea typeface="Open Sans"/>
-                <a:cs typeface="Open Sans"/>
-                <a:sym typeface="Open Sans"/>
-              </a:rPr>
-              <a:t> organization design and team interactions based on the ideas in Team Topologies. See</a:t>
-            </a:r>
-            <a:r>
-              <a:rPr lang="en-GB" sz="1000" dirty="0">
+              <a:rPr lang="en-GB" sz="1000">
                 <a:solidFill>
                   <a:srgbClr val="434343"/>
                 </a:solidFill>
@@ -5916,7 +5772,7 @@
                 <a:hlinkClick r:id="rId3">
                   <a:extLst>
                     <a:ext uri="{A12FA001-AC4F-418D-AE19-62706E023703}">
-                      <ahyp:hlinkClr xmlns:ahyp="http://schemas.microsoft.com/office/drawing/2018/hyperlinkcolor" val="tx"/>
+                      <ahyp:hlinkClr val="tx"/>
                     </a:ext>
                   </a:extLst>
                 </a:hlinkClick>
@@ -5924,7 +5780,7 @@
               <a:t> </a:t>
             </a:r>
             <a:r>
-              <a:rPr lang="en-GB" sz="1000" u="sng" dirty="0">
+              <a:rPr lang="en-GB" sz="1000" u="sng">
                 <a:solidFill>
                   <a:srgbClr val="434343"/>
                 </a:solidFill>
@@ -5932,10 +5788,10 @@
                 <a:ea typeface="Open Sans"/>
                 <a:cs typeface="Open Sans"/>
                 <a:sym typeface="Open Sans"/>
-                <a:hlinkClick r:id="rId3">
+                <a:hlinkClick r:id="rId4">
                   <a:extLst>
                     <a:ext uri="{A12FA001-AC4F-418D-AE19-62706E023703}">
-                      <ahyp:hlinkClr xmlns:ahyp="http://schemas.microsoft.com/office/drawing/2018/hyperlinkcolor" val="tx"/>
+                      <ahyp:hlinkClr val="tx"/>
                     </a:ext>
                   </a:extLst>
                 </a:hlinkClick>
@@ -5943,7 +5799,7 @@
               <a:t>teamtopologies.com</a:t>
             </a:r>
             <a:r>
-              <a:rPr lang="en-GB" sz="1000" dirty="0">
+              <a:rPr lang="en-GB" sz="1000">
                 <a:solidFill>
                   <a:srgbClr val="434343"/>
                 </a:solidFill>
@@ -5954,7 +5810,7 @@
               </a:rPr>
               <a:t> for more details. We have tried to make the shapes match as closely as possible to those in the book, but some shapes are slightly different.</a:t>
             </a:r>
-            <a:endParaRPr sz="1000" dirty="0">
+            <a:endParaRPr sz="1000">
               <a:solidFill>
                 <a:srgbClr val="434343"/>
               </a:solidFill>
@@ -5985,17 +5841,23 @@
               <a:alpha val="54490"/>
             </a:srgbClr>
           </a:solidFill>
-          <a:ln>
-            <a:noFill/>
+          <a:ln cap="flat" cmpd="sng" w="9525">
+            <a:solidFill>
+              <a:srgbClr val="C3B6EF"/>
+            </a:solidFill>
+            <a:prstDash val="solid"/>
+            <a:round/>
+            <a:headEnd len="sm" w="sm" type="none"/>
+            <a:tailEnd len="sm" w="sm" type="none"/>
           </a:ln>
         </p:spPr>
         <p:txBody>
-          <a:bodyPr spcFirstLastPara="1" wrap="square" lIns="91425" tIns="91425" rIns="91425" bIns="91425" anchor="ctr" anchorCtr="0">
+          <a:bodyPr anchorCtr="0" anchor="ctr" bIns="91425" lIns="91425" spcFirstLastPara="1" rIns="91425" wrap="square" tIns="91425">
             <a:noAutofit/>
           </a:bodyPr>
           <a:lstStyle/>
           <a:p>
-            <a:pPr marL="0" lvl="0" indent="0" algn="ctr" rtl="0">
+            <a:pPr indent="0" lvl="0" marL="0" rtl="0" algn="ctr">
               <a:spcBef>
                 <a:spcPts val="0"/>
               </a:spcBef>
@@ -6042,12 +5904,12 @@
           </a:ln>
         </p:spPr>
         <p:txBody>
-          <a:bodyPr spcFirstLastPara="1" wrap="square" lIns="91425" tIns="91425" rIns="91425" bIns="91425" anchor="t" anchorCtr="0">
+          <a:bodyPr anchorCtr="0" anchor="t" bIns="91425" lIns="91425" spcFirstLastPara="1" rIns="91425" wrap="square" tIns="91425">
             <a:noAutofit/>
           </a:bodyPr>
           <a:lstStyle/>
           <a:p>
-            <a:pPr marL="0" lvl="0" indent="0" algn="ctr" rtl="0">
+            <a:pPr indent="0" lvl="0" marL="0" rtl="0" algn="ctr">
               <a:spcBef>
                 <a:spcPts val="0"/>
               </a:spcBef>
@@ -6057,7 +5919,7 @@
               <a:buNone/>
             </a:pPr>
             <a:r>
-              <a:rPr lang="en-GB" sz="1050" b="1" u="sng">
+              <a:rPr b="1" lang="en-GB" sz="1050" u="sng">
                 <a:solidFill>
                   <a:srgbClr val="1A1A1A"/>
                 </a:solidFill>
@@ -6097,12 +5959,12 @@
           </a:ln>
         </p:spPr>
         <p:txBody>
-          <a:bodyPr spcFirstLastPara="1" wrap="square" lIns="91425" tIns="91425" rIns="91425" bIns="91425" anchor="t" anchorCtr="0">
+          <a:bodyPr anchorCtr="0" anchor="t" bIns="91425" lIns="91425" spcFirstLastPara="1" rIns="91425" wrap="square" tIns="91425">
             <a:noAutofit/>
           </a:bodyPr>
           <a:lstStyle/>
           <a:p>
-            <a:pPr marL="0" lvl="0" indent="0" algn="ctr" rtl="0">
+            <a:pPr indent="0" lvl="0" marL="0" rtl="0" algn="ctr">
               <a:spcBef>
                 <a:spcPts val="0"/>
               </a:spcBef>
@@ -6112,7 +5974,7 @@
               <a:buNone/>
             </a:pPr>
             <a:r>
-              <a:rPr lang="en-GB" sz="1050" b="1" u="sng">
+              <a:rPr b="1" lang="en-GB" sz="1050" u="sng">
                 <a:solidFill>
                   <a:srgbClr val="1A1A1A"/>
                 </a:solidFill>
@@ -6140,28 +6002,34 @@
         </p:nvSpPr>
         <p:spPr>
           <a:xfrm>
-            <a:off x="5830879" y="2116470"/>
-            <a:ext cx="1065000" cy="796200"/>
+            <a:off x="5905876" y="2125412"/>
+            <a:ext cx="915000" cy="804300"/>
           </a:xfrm>
           <a:prstGeom prst="triangle">
             <a:avLst>
-              <a:gd name="adj" fmla="val 50000"/>
+              <a:gd fmla="val 50000" name="adj"/>
             </a:avLst>
           </a:prstGeom>
           <a:solidFill>
             <a:srgbClr val="B4B4B4"/>
           </a:solidFill>
-          <a:ln>
-            <a:noFill/>
+          <a:ln cap="flat" cmpd="sng" w="9525">
+            <a:solidFill>
+              <a:srgbClr val="999696"/>
+            </a:solidFill>
+            <a:prstDash val="solid"/>
+            <a:round/>
+            <a:headEnd len="sm" w="sm" type="none"/>
+            <a:tailEnd len="sm" w="sm" type="none"/>
           </a:ln>
         </p:spPr>
         <p:txBody>
-          <a:bodyPr spcFirstLastPara="1" wrap="square" lIns="91425" tIns="91425" rIns="91425" bIns="91425" anchor="ctr" anchorCtr="0">
+          <a:bodyPr anchorCtr="0" anchor="ctr" bIns="91425" lIns="91425" spcFirstLastPara="1" rIns="91425" wrap="square" tIns="91425">
             <a:noAutofit/>
           </a:bodyPr>
           <a:lstStyle/>
           <a:p>
-            <a:pPr marL="0" lvl="0" indent="0" algn="ctr" rtl="0">
+            <a:pPr indent="0" lvl="0" marL="0" rtl="0" algn="ctr">
               <a:spcBef>
                 <a:spcPts val="0"/>
               </a:spcBef>
@@ -6207,17 +6075,23 @@
               <a:alpha val="51120"/>
             </a:srgbClr>
           </a:solidFill>
-          <a:ln>
-            <a:noFill/>
+          <a:ln cap="flat" cmpd="sng" w="9525">
+            <a:solidFill>
+              <a:srgbClr val="CCD8C7"/>
+            </a:solidFill>
+            <a:prstDash val="solid"/>
+            <a:round/>
+            <a:headEnd len="sm" w="sm" type="none"/>
+            <a:tailEnd len="sm" w="sm" type="none"/>
           </a:ln>
         </p:spPr>
         <p:txBody>
-          <a:bodyPr spcFirstLastPara="1" wrap="square" lIns="91425" tIns="91425" rIns="91425" bIns="91425" anchor="ctr" anchorCtr="0">
+          <a:bodyPr anchorCtr="0" anchor="ctr" bIns="91425" lIns="91425" spcFirstLastPara="1" rIns="91425" wrap="square" tIns="91425">
             <a:noAutofit/>
           </a:bodyPr>
           <a:lstStyle/>
           <a:p>
-            <a:pPr marL="0" lvl="0" indent="0" algn="ctr" rtl="0">
+            <a:pPr indent="0" lvl="0" marL="0" rtl="0" algn="ctr">
               <a:spcBef>
                 <a:spcPts val="0"/>
               </a:spcBef>
@@ -6253,7 +6127,7 @@
         <p:spPr>
           <a:xfrm>
             <a:off x="262700" y="171275"/>
-            <a:ext cx="2151316" cy="615600"/>
+            <a:ext cx="2031900" cy="615600"/>
           </a:xfrm>
           <a:prstGeom prst="rect">
             <a:avLst/>
@@ -6264,12 +6138,12 @@
           </a:ln>
         </p:spPr>
         <p:txBody>
-          <a:bodyPr spcFirstLastPara="1" wrap="square" lIns="91425" tIns="91425" rIns="91425" bIns="91425" anchor="t" anchorCtr="0">
+          <a:bodyPr anchorCtr="0" anchor="t" bIns="91425" lIns="91425" spcFirstLastPara="1" rIns="91425" wrap="square" tIns="91425">
             <a:spAutoFit/>
           </a:bodyPr>
           <a:lstStyle/>
           <a:p>
-            <a:pPr marL="0" lvl="0" indent="0" algn="l" rtl="0">
+            <a:pPr indent="0" lvl="0" marL="0" rtl="0" algn="l">
               <a:spcBef>
                 <a:spcPts val="0"/>
               </a:spcBef>
@@ -6279,27 +6153,16 @@
               <a:buNone/>
             </a:pPr>
             <a:r>
-              <a:rPr lang="en-GB" b="1" dirty="0">
+              <a:rPr b="1" lang="en-GB">
                 <a:latin typeface="Open Sans"/>
                 <a:ea typeface="Open Sans"/>
                 <a:cs typeface="Open Sans"/>
                 <a:sym typeface="Open Sans"/>
               </a:rPr>
-              <a:t>Team Topologies</a:t>
+              <a:t>Team Topologies </a:t>
             </a:r>
-          </a:p>
-          <a:p>
-            <a:pPr marL="0" lvl="0" indent="0" algn="l" rtl="0">
-              <a:spcBef>
-                <a:spcPts val="0"/>
-              </a:spcBef>
-              <a:spcAft>
-                <a:spcPts val="0"/>
-              </a:spcAft>
-              <a:buNone/>
-            </a:pPr>
             <a:r>
-              <a:rPr lang="en-GB" dirty="0">
+              <a:rPr lang="en-GB">
                 <a:latin typeface="Open Sans"/>
                 <a:ea typeface="Open Sans"/>
                 <a:cs typeface="Open Sans"/>
@@ -6307,7 +6170,7 @@
               </a:rPr>
               <a:t>team shapes template</a:t>
             </a:r>
-            <a:endParaRPr dirty="0">
+            <a:endParaRPr>
               <a:latin typeface="Open Sans"/>
               <a:ea typeface="Open Sans"/>
               <a:cs typeface="Open Sans"/>
@@ -6329,28 +6192,28 @@
           </a:xfrm>
           <a:prstGeom prst="rightArrow">
             <a:avLst>
-              <a:gd name="adj1" fmla="val 57171"/>
-              <a:gd name="adj2" fmla="val 70330"/>
+              <a:gd fmla="val 57171" name="adj1"/>
+              <a:gd fmla="val 70330" name="adj2"/>
             </a:avLst>
           </a:prstGeom>
           <a:noFill/>
-          <a:ln w="9525" cap="flat" cmpd="sng">
+          <a:ln cap="flat" cmpd="sng" w="9525">
             <a:solidFill>
               <a:schemeClr val="dk2"/>
             </a:solidFill>
             <a:prstDash val="dash"/>
             <a:round/>
-            <a:headEnd type="none" w="sm" len="sm"/>
-            <a:tailEnd type="none" w="sm" len="sm"/>
+            <a:headEnd len="sm" w="sm" type="none"/>
+            <a:tailEnd len="sm" w="sm" type="none"/>
           </a:ln>
         </p:spPr>
         <p:txBody>
-          <a:bodyPr spcFirstLastPara="1" wrap="square" lIns="91425" tIns="91425" rIns="91425" bIns="91425" anchor="ctr" anchorCtr="0">
+          <a:bodyPr anchorCtr="0" anchor="ctr" bIns="91425" lIns="91425" spcFirstLastPara="1" rIns="91425" wrap="square" tIns="91425">
             <a:noAutofit/>
           </a:bodyPr>
           <a:lstStyle/>
           <a:p>
-            <a:pPr marL="0" lvl="0" indent="0" algn="ctr" rtl="0">
+            <a:pPr indent="0" lvl="0" marL="0" rtl="0" algn="ctr">
               <a:spcBef>
                 <a:spcPts val="0"/>
               </a:spcBef>
@@ -6376,7 +6239,286 @@
 </file>
 
 <file path=ppt/theme/theme1.xml><?xml version="1.0" encoding="utf-8"?>
-<a:theme xmlns:a="http://schemas.openxmlformats.org/drawingml/2006/main" name="Simple Light">
+<a:theme xmlns:a="http://schemas.openxmlformats.org/drawingml/2006/main" xmlns:r="http://schemas.openxmlformats.org/officeDocument/2006/relationships">
+  <a:themeElements>
+    <a:clrScheme name="Default">
+      <a:dk1>
+        <a:srgbClr val="000000"/>
+      </a:dk1>
+      <a:lt1>
+        <a:srgbClr val="FFFFFF"/>
+      </a:lt1>
+      <a:dk2>
+        <a:srgbClr val="158158"/>
+      </a:dk2>
+      <a:lt2>
+        <a:srgbClr val="F3F3F3"/>
+      </a:lt2>
+      <a:accent1>
+        <a:srgbClr val="058DC7"/>
+      </a:accent1>
+      <a:accent2>
+        <a:srgbClr val="50B432"/>
+      </a:accent2>
+      <a:accent3>
+        <a:srgbClr val="ED561B"/>
+      </a:accent3>
+      <a:accent4>
+        <a:srgbClr val="EDEF00"/>
+      </a:accent4>
+      <a:accent5>
+        <a:srgbClr val="24CBE5"/>
+      </a:accent5>
+      <a:accent6>
+        <a:srgbClr val="64E572"/>
+      </a:accent6>
+      <a:hlink>
+        <a:srgbClr val="2200CC"/>
+      </a:hlink>
+      <a:folHlink>
+        <a:srgbClr val="551A8B"/>
+      </a:folHlink>
+    </a:clrScheme>
+    <a:fontScheme name="Office">
+      <a:majorFont>
+        <a:latin typeface="Arial"/>
+        <a:ea typeface=""/>
+        <a:cs typeface=""/>
+        <a:font script="Jpan" typeface="ＭＳ Ｐゴシック"/>
+        <a:font script="Hang" typeface="맑은 고딕"/>
+        <a:font script="Hans" typeface="宋体"/>
+        <a:font script="Hant" typeface="新細明體"/>
+        <a:font script="Arab" typeface="Times New Roman"/>
+        <a:font script="Hebr" typeface="Times New Roman"/>
+        <a:font script="Thai" typeface="Angsana New"/>
+        <a:font script="Ethi" typeface="Nyala"/>
+        <a:font script="Beng" typeface="Vrinda"/>
+        <a:font script="Gujr" typeface="Shruti"/>
+        <a:font script="Khmr" typeface="MoolBoran"/>
+        <a:font script="Knda" typeface="Tunga"/>
+        <a:font script="Guru" typeface="Raavi"/>
+        <a:font script="Cans" typeface="Euphemia"/>
+        <a:font script="Cher" typeface="Plantagenet Cherokee"/>
+        <a:font script="Yiii" typeface="Microsoft Yi Baiti"/>
+        <a:font script="Tibt" typeface="Microsoft Himalaya"/>
+        <a:font script="Thaa" typeface="MV Boli"/>
+        <a:font script="Deva" typeface="Mangal"/>
+        <a:font script="Telu" typeface="Gautami"/>
+        <a:font script="Taml" typeface="Latha"/>
+        <a:font script="Syrc" typeface="Estrangelo Edessa"/>
+        <a:font script="Orya" typeface="Kalinga"/>
+        <a:font script="Mlym" typeface="Kartika"/>
+        <a:font script="Laoo" typeface="DokChampa"/>
+        <a:font script="Sinh" typeface="Iskoola Pota"/>
+        <a:font script="Mong" typeface="Mongolian Baiti"/>
+        <a:font script="Viet" typeface="Times New Roman"/>
+        <a:font script="Uigh" typeface="Microsoft Uighur"/>
+        <a:font script="Geor" typeface="Sylfaen"/>
+      </a:majorFont>
+      <a:minorFont>
+        <a:latin typeface="Arial"/>
+        <a:ea typeface=""/>
+        <a:cs typeface=""/>
+        <a:font script="Jpan" typeface="ＭＳ Ｐゴシック"/>
+        <a:font script="Hang" typeface="맑은 고딕"/>
+        <a:font script="Hans" typeface="宋体"/>
+        <a:font script="Hant" typeface="新細明體"/>
+        <a:font script="Arab" typeface="Arial"/>
+        <a:font script="Hebr" typeface="Arial"/>
+        <a:font script="Thai" typeface="Cordia New"/>
+        <a:font script="Ethi" typeface="Nyala"/>
+        <a:font script="Beng" typeface="Vrinda"/>
+        <a:font script="Gujr" typeface="Shruti"/>
+        <a:font script="Khmr" typeface="DaunPenh"/>
+        <a:font script="Knda" typeface="Tunga"/>
+        <a:font script="Guru" typeface="Raavi"/>
+        <a:font script="Cans" typeface="Euphemia"/>
+        <a:font script="Cher" typeface="Plantagenet Cherokee"/>
+        <a:font script="Yiii" typeface="Microsoft Yi Baiti"/>
+        <a:font script="Tibt" typeface="Microsoft Himalaya"/>
+        <a:font script="Thaa" typeface="MV Boli"/>
+        <a:font script="Deva" typeface="Mangal"/>
+        <a:font script="Telu" typeface="Gautami"/>
+        <a:font script="Taml" typeface="Latha"/>
+        <a:font script="Syrc" typeface="Estrangelo Edessa"/>
+        <a:font script="Orya" typeface="Kalinga"/>
+        <a:font script="Mlym" typeface="Kartika"/>
+        <a:font script="Laoo" typeface="DokChampa"/>
+        <a:font script="Sinh" typeface="Iskoola Pota"/>
+        <a:font script="Mong" typeface="Mongolian Baiti"/>
+        <a:font script="Viet" typeface="Arial"/>
+        <a:font script="Uigh" typeface="Microsoft Uighur"/>
+        <a:font script="Geor" typeface="Sylfaen"/>
+      </a:minorFont>
+    </a:fontScheme>
+    <a:fmtScheme name="Office">
+      <a:fillStyleLst>
+        <a:solidFill>
+          <a:schemeClr val="phClr"/>
+        </a:solidFill>
+        <a:gradFill rotWithShape="1">
+          <a:gsLst>
+            <a:gs pos="0">
+              <a:schemeClr val="phClr">
+                <a:tint val="50000"/>
+                <a:satMod val="300000"/>
+              </a:schemeClr>
+            </a:gs>
+            <a:gs pos="35000">
+              <a:schemeClr val="phClr">
+                <a:tint val="37000"/>
+                <a:satMod val="300000"/>
+              </a:schemeClr>
+            </a:gs>
+            <a:gs pos="100000">
+              <a:schemeClr val="phClr">
+                <a:tint val="15000"/>
+                <a:satMod val="350000"/>
+              </a:schemeClr>
+            </a:gs>
+          </a:gsLst>
+          <a:lin ang="16200000" scaled="1"/>
+        </a:gradFill>
+        <a:gradFill rotWithShape="1">
+          <a:gsLst>
+            <a:gs pos="0">
+              <a:schemeClr val="phClr">
+                <a:tint val="100000"/>
+                <a:shade val="100000"/>
+                <a:satMod val="130000"/>
+              </a:schemeClr>
+            </a:gs>
+            <a:gs pos="100000">
+              <a:schemeClr val="phClr">
+                <a:tint val="50000"/>
+                <a:shade val="100000"/>
+                <a:satMod val="350000"/>
+              </a:schemeClr>
+            </a:gs>
+          </a:gsLst>
+          <a:lin ang="16200000" scaled="0"/>
+        </a:gradFill>
+      </a:fillStyleLst>
+      <a:lnStyleLst>
+        <a:ln w="9525" cap="flat" cmpd="sng" algn="ctr">
+          <a:solidFill>
+            <a:schemeClr val="phClr">
+              <a:shade val="95000"/>
+              <a:satMod val="105000"/>
+            </a:schemeClr>
+          </a:solidFill>
+          <a:prstDash val="solid"/>
+        </a:ln>
+        <a:ln w="25400" cap="flat" cmpd="sng" algn="ctr">
+          <a:solidFill>
+            <a:schemeClr val="phClr"/>
+          </a:solidFill>
+          <a:prstDash val="solid"/>
+        </a:ln>
+        <a:ln w="38100" cap="flat" cmpd="sng" algn="ctr">
+          <a:solidFill>
+            <a:schemeClr val="phClr"/>
+          </a:solidFill>
+          <a:prstDash val="solid"/>
+        </a:ln>
+      </a:lnStyleLst>
+      <a:effectStyleLst>
+        <a:effectStyle>
+          <a:effectLst>
+            <a:outerShdw blurRad="40000" dist="20000" dir="5400000" rotWithShape="0">
+              <a:srgbClr val="000000">
+                <a:alpha val="38000"/>
+              </a:srgbClr>
+            </a:outerShdw>
+          </a:effectLst>
+        </a:effectStyle>
+        <a:effectStyle>
+          <a:effectLst>
+            <a:outerShdw blurRad="40000" dist="23000" dir="5400000" rotWithShape="0">
+              <a:srgbClr val="000000">
+                <a:alpha val="35000"/>
+              </a:srgbClr>
+            </a:outerShdw>
+          </a:effectLst>
+        </a:effectStyle>
+        <a:effectStyle>
+          <a:effectLst>
+            <a:outerShdw blurRad="40000" dist="23000" dir="5400000" rotWithShape="0">
+              <a:srgbClr val="000000">
+                <a:alpha val="35000"/>
+              </a:srgbClr>
+            </a:outerShdw>
+          </a:effectLst>
+          <a:scene3d>
+            <a:camera prst="orthographicFront">
+              <a:rot lat="0" lon="0" rev="0"/>
+            </a:camera>
+            <a:lightRig rig="threePt" dir="t">
+              <a:rot lat="0" lon="0" rev="1200000"/>
+            </a:lightRig>
+          </a:scene3d>
+          <a:sp3d>
+            <a:bevelT w="63500" h="25400"/>
+          </a:sp3d>
+        </a:effectStyle>
+      </a:effectStyleLst>
+      <a:bgFillStyleLst>
+        <a:solidFill>
+          <a:schemeClr val="phClr"/>
+        </a:solidFill>
+        <a:gradFill rotWithShape="1">
+          <a:gsLst>
+            <a:gs pos="0">
+              <a:schemeClr val="phClr">
+                <a:tint val="40000"/>
+                <a:satMod val="350000"/>
+              </a:schemeClr>
+            </a:gs>
+            <a:gs pos="40000">
+              <a:schemeClr val="phClr">
+                <a:tint val="45000"/>
+                <a:shade val="99000"/>
+                <a:satMod val="350000"/>
+              </a:schemeClr>
+            </a:gs>
+            <a:gs pos="100000">
+              <a:schemeClr val="phClr">
+                <a:shade val="20000"/>
+                <a:satMod val="255000"/>
+              </a:schemeClr>
+            </a:gs>
+          </a:gsLst>
+          <a:path path="circle">
+            <a:fillToRect l="50000" t="-80000" r="50000" b="180000"/>
+          </a:path>
+        </a:gradFill>
+        <a:gradFill rotWithShape="1">
+          <a:gsLst>
+            <a:gs pos="0">
+              <a:schemeClr val="phClr">
+                <a:tint val="80000"/>
+                <a:satMod val="300000"/>
+              </a:schemeClr>
+            </a:gs>
+            <a:gs pos="100000">
+              <a:schemeClr val="phClr">
+                <a:shade val="30000"/>
+                <a:satMod val="200000"/>
+              </a:schemeClr>
+            </a:gs>
+          </a:gsLst>
+          <a:path path="circle">
+            <a:fillToRect l="50000" t="50000" r="50000" b="50000"/>
+          </a:path>
+        </a:gradFill>
+      </a:bgFillStyleLst>
+    </a:fmtScheme>
+  </a:themeElements>
+</a:theme>
+</file>
+
+<file path=ppt/theme/theme2.xml><?xml version="1.0" encoding="utf-8"?>
+<a:theme xmlns:a="http://schemas.openxmlformats.org/drawingml/2006/main" xmlns:r="http://schemas.openxmlformats.org/officeDocument/2006/relationships" name="Simple Light">
   <a:themeElements>
     <a:clrScheme name="Simple Light">
       <a:dk1>
@@ -6651,288 +6793,5 @@
       </a:bgFillStyleLst>
     </a:fmtScheme>
   </a:themeElements>
-  <a:objectDefaults/>
-  <a:extraClrSchemeLst/>
-</a:theme>
-</file>
-
-<file path=ppt/theme/theme2.xml><?xml version="1.0" encoding="utf-8"?>
-<a:theme xmlns:a="http://schemas.openxmlformats.org/drawingml/2006/main">
-  <a:themeElements>
-    <a:clrScheme name="Default">
-      <a:dk1>
-        <a:srgbClr val="000000"/>
-      </a:dk1>
-      <a:lt1>
-        <a:srgbClr val="FFFFFF"/>
-      </a:lt1>
-      <a:dk2>
-        <a:srgbClr val="158158"/>
-      </a:dk2>
-      <a:lt2>
-        <a:srgbClr val="F3F3F3"/>
-      </a:lt2>
-      <a:accent1>
-        <a:srgbClr val="058DC7"/>
-      </a:accent1>
-      <a:accent2>
-        <a:srgbClr val="50B432"/>
-      </a:accent2>
-      <a:accent3>
-        <a:srgbClr val="ED561B"/>
-      </a:accent3>
-      <a:accent4>
-        <a:srgbClr val="EDEF00"/>
-      </a:accent4>
-      <a:accent5>
-        <a:srgbClr val="24CBE5"/>
-      </a:accent5>
-      <a:accent6>
-        <a:srgbClr val="64E572"/>
-      </a:accent6>
-      <a:hlink>
-        <a:srgbClr val="2200CC"/>
-      </a:hlink>
-      <a:folHlink>
-        <a:srgbClr val="551A8B"/>
-      </a:folHlink>
-    </a:clrScheme>
-    <a:fontScheme name="Office">
-      <a:majorFont>
-        <a:latin typeface="Arial"/>
-        <a:ea typeface=""/>
-        <a:cs typeface=""/>
-        <a:font script="Jpan" typeface="ＭＳ Ｐゴシック"/>
-        <a:font script="Hang" typeface="맑은 고딕"/>
-        <a:font script="Hans" typeface="宋体"/>
-        <a:font script="Hant" typeface="新細明體"/>
-        <a:font script="Arab" typeface="Times New Roman"/>
-        <a:font script="Hebr" typeface="Times New Roman"/>
-        <a:font script="Thai" typeface="Angsana New"/>
-        <a:font script="Ethi" typeface="Nyala"/>
-        <a:font script="Beng" typeface="Vrinda"/>
-        <a:font script="Gujr" typeface="Shruti"/>
-        <a:font script="Khmr" typeface="MoolBoran"/>
-        <a:font script="Knda" typeface="Tunga"/>
-        <a:font script="Guru" typeface="Raavi"/>
-        <a:font script="Cans" typeface="Euphemia"/>
-        <a:font script="Cher" typeface="Plantagenet Cherokee"/>
-        <a:font script="Yiii" typeface="Microsoft Yi Baiti"/>
-        <a:font script="Tibt" typeface="Microsoft Himalaya"/>
-        <a:font script="Thaa" typeface="MV Boli"/>
-        <a:font script="Deva" typeface="Mangal"/>
-        <a:font script="Telu" typeface="Gautami"/>
-        <a:font script="Taml" typeface="Latha"/>
-        <a:font script="Syrc" typeface="Estrangelo Edessa"/>
-        <a:font script="Orya" typeface="Kalinga"/>
-        <a:font script="Mlym" typeface="Kartika"/>
-        <a:font script="Laoo" typeface="DokChampa"/>
-        <a:font script="Sinh" typeface="Iskoola Pota"/>
-        <a:font script="Mong" typeface="Mongolian Baiti"/>
-        <a:font script="Viet" typeface="Times New Roman"/>
-        <a:font script="Uigh" typeface="Microsoft Uighur"/>
-        <a:font script="Geor" typeface="Sylfaen"/>
-      </a:majorFont>
-      <a:minorFont>
-        <a:latin typeface="Arial"/>
-        <a:ea typeface=""/>
-        <a:cs typeface=""/>
-        <a:font script="Jpan" typeface="ＭＳ Ｐゴシック"/>
-        <a:font script="Hang" typeface="맑은 고딕"/>
-        <a:font script="Hans" typeface="宋体"/>
-        <a:font script="Hant" typeface="新細明體"/>
-        <a:font script="Arab" typeface="Arial"/>
-        <a:font script="Hebr" typeface="Arial"/>
-        <a:font script="Thai" typeface="Cordia New"/>
-        <a:font script="Ethi" typeface="Nyala"/>
-        <a:font script="Beng" typeface="Vrinda"/>
-        <a:font script="Gujr" typeface="Shruti"/>
-        <a:font script="Khmr" typeface="DaunPenh"/>
-        <a:font script="Knda" typeface="Tunga"/>
-        <a:font script="Guru" typeface="Raavi"/>
-        <a:font script="Cans" typeface="Euphemia"/>
-        <a:font script="Cher" typeface="Plantagenet Cherokee"/>
-        <a:font script="Yiii" typeface="Microsoft Yi Baiti"/>
-        <a:font script="Tibt" typeface="Microsoft Himalaya"/>
-        <a:font script="Thaa" typeface="MV Boli"/>
-        <a:font script="Deva" typeface="Mangal"/>
-        <a:font script="Telu" typeface="Gautami"/>
-        <a:font script="Taml" typeface="Latha"/>
-        <a:font script="Syrc" typeface="Estrangelo Edessa"/>
-        <a:font script="Orya" typeface="Kalinga"/>
-        <a:font script="Mlym" typeface="Kartika"/>
-        <a:font script="Laoo" typeface="DokChampa"/>
-        <a:font script="Sinh" typeface="Iskoola Pota"/>
-        <a:font script="Mong" typeface="Mongolian Baiti"/>
-        <a:font script="Viet" typeface="Arial"/>
-        <a:font script="Uigh" typeface="Microsoft Uighur"/>
-        <a:font script="Geor" typeface="Sylfaen"/>
-      </a:minorFont>
-    </a:fontScheme>
-    <a:fmtScheme name="Office">
-      <a:fillStyleLst>
-        <a:solidFill>
-          <a:schemeClr val="phClr"/>
-        </a:solidFill>
-        <a:gradFill rotWithShape="1">
-          <a:gsLst>
-            <a:gs pos="0">
-              <a:schemeClr val="phClr">
-                <a:tint val="50000"/>
-                <a:satMod val="300000"/>
-              </a:schemeClr>
-            </a:gs>
-            <a:gs pos="35000">
-              <a:schemeClr val="phClr">
-                <a:tint val="37000"/>
-                <a:satMod val="300000"/>
-              </a:schemeClr>
-            </a:gs>
-            <a:gs pos="100000">
-              <a:schemeClr val="phClr">
-                <a:tint val="15000"/>
-                <a:satMod val="350000"/>
-              </a:schemeClr>
-            </a:gs>
-          </a:gsLst>
-          <a:lin ang="16200000" scaled="1"/>
-        </a:gradFill>
-        <a:gradFill rotWithShape="1">
-          <a:gsLst>
-            <a:gs pos="0">
-              <a:schemeClr val="phClr">
-                <a:tint val="100000"/>
-                <a:shade val="100000"/>
-                <a:satMod val="130000"/>
-              </a:schemeClr>
-            </a:gs>
-            <a:gs pos="100000">
-              <a:schemeClr val="phClr">
-                <a:tint val="50000"/>
-                <a:shade val="100000"/>
-                <a:satMod val="350000"/>
-              </a:schemeClr>
-            </a:gs>
-          </a:gsLst>
-          <a:lin ang="16200000" scaled="0"/>
-        </a:gradFill>
-      </a:fillStyleLst>
-      <a:lnStyleLst>
-        <a:ln w="9525" cap="flat" cmpd="sng" algn="ctr">
-          <a:solidFill>
-            <a:schemeClr val="phClr">
-              <a:shade val="95000"/>
-              <a:satMod val="105000"/>
-            </a:schemeClr>
-          </a:solidFill>
-          <a:prstDash val="solid"/>
-        </a:ln>
-        <a:ln w="25400" cap="flat" cmpd="sng" algn="ctr">
-          <a:solidFill>
-            <a:schemeClr val="phClr"/>
-          </a:solidFill>
-          <a:prstDash val="solid"/>
-        </a:ln>
-        <a:ln w="38100" cap="flat" cmpd="sng" algn="ctr">
-          <a:solidFill>
-            <a:schemeClr val="phClr"/>
-          </a:solidFill>
-          <a:prstDash val="solid"/>
-        </a:ln>
-      </a:lnStyleLst>
-      <a:effectStyleLst>
-        <a:effectStyle>
-          <a:effectLst>
-            <a:outerShdw blurRad="40000" dist="20000" dir="5400000" rotWithShape="0">
-              <a:srgbClr val="000000">
-                <a:alpha val="38000"/>
-              </a:srgbClr>
-            </a:outerShdw>
-          </a:effectLst>
-        </a:effectStyle>
-        <a:effectStyle>
-          <a:effectLst>
-            <a:outerShdw blurRad="40000" dist="23000" dir="5400000" rotWithShape="0">
-              <a:srgbClr val="000000">
-                <a:alpha val="35000"/>
-              </a:srgbClr>
-            </a:outerShdw>
-          </a:effectLst>
-        </a:effectStyle>
-        <a:effectStyle>
-          <a:effectLst>
-            <a:outerShdw blurRad="40000" dist="23000" dir="5400000" rotWithShape="0">
-              <a:srgbClr val="000000">
-                <a:alpha val="35000"/>
-              </a:srgbClr>
-            </a:outerShdw>
-          </a:effectLst>
-          <a:scene3d>
-            <a:camera prst="orthographicFront">
-              <a:rot lat="0" lon="0" rev="0"/>
-            </a:camera>
-            <a:lightRig rig="threePt" dir="t">
-              <a:rot lat="0" lon="0" rev="1200000"/>
-            </a:lightRig>
-          </a:scene3d>
-          <a:sp3d>
-            <a:bevelT w="63500" h="25400"/>
-          </a:sp3d>
-        </a:effectStyle>
-      </a:effectStyleLst>
-      <a:bgFillStyleLst>
-        <a:solidFill>
-          <a:schemeClr val="phClr"/>
-        </a:solidFill>
-        <a:gradFill rotWithShape="1">
-          <a:gsLst>
-            <a:gs pos="0">
-              <a:schemeClr val="phClr">
-                <a:tint val="40000"/>
-                <a:satMod val="350000"/>
-              </a:schemeClr>
-            </a:gs>
-            <a:gs pos="40000">
-              <a:schemeClr val="phClr">
-                <a:tint val="45000"/>
-                <a:shade val="99000"/>
-                <a:satMod val="350000"/>
-              </a:schemeClr>
-            </a:gs>
-            <a:gs pos="100000">
-              <a:schemeClr val="phClr">
-                <a:shade val="20000"/>
-                <a:satMod val="255000"/>
-              </a:schemeClr>
-            </a:gs>
-          </a:gsLst>
-          <a:path path="circle">
-            <a:fillToRect l="50000" t="-80000" r="50000" b="180000"/>
-          </a:path>
-        </a:gradFill>
-        <a:gradFill rotWithShape="1">
-          <a:gsLst>
-            <a:gs pos="0">
-              <a:schemeClr val="phClr">
-                <a:tint val="80000"/>
-                <a:satMod val="300000"/>
-              </a:schemeClr>
-            </a:gs>
-            <a:gs pos="100000">
-              <a:schemeClr val="phClr">
-                <a:shade val="30000"/>
-                <a:satMod val="200000"/>
-              </a:schemeClr>
-            </a:gs>
-          </a:gsLst>
-          <a:path path="circle">
-            <a:fillToRect l="50000" t="50000" r="50000" b="50000"/>
-          </a:path>
-        </a:gradFill>
-      </a:bgFillStyleLst>
-    </a:fmtScheme>
-  </a:themeElements>
-  <a:objectDefaults/>
-  <a:extraClrSchemeLst/>
 </a:theme>
 </file>
</xml_diff>

<commit_message>
TTM4 - Updated team shapes after experimenting with a number of layouts
Darkened the color, increased the weight and added dashes to the interaction mode outlines.
Made the X-as-a-Service interaction transparent
Added guidance around the use of asterisks to provide clarity of interaction
</commit_message>
<xml_diff>
--- a/powerpoint/Team Topologies Template for modelling - PowerPoint.pptx
+++ b/powerpoint/Team Topologies Template for modelling - PowerPoint.pptx
@@ -1,28 +1,28 @@
 
 <file path=ppt/presentation.xml><?xml version="1.0" encoding="utf-8"?>
-<p:presentation xmlns:a="http://schemas.openxmlformats.org/drawingml/2006/main" xmlns:r="http://schemas.openxmlformats.org/officeDocument/2006/relationships" xmlns:mc="http://schemas.openxmlformats.org/markup-compatibility/2006" xmlns:mv="urn:schemas-microsoft-com:mac:vml" xmlns:p="http://schemas.openxmlformats.org/presentationml/2006/main" xmlns:c="http://schemas.openxmlformats.org/drawingml/2006/chart" xmlns:dgm="http://schemas.openxmlformats.org/drawingml/2006/diagram" xmlns:o="urn:schemas-microsoft-com:office:office" xmlns:v="urn:schemas-microsoft-com:vml" xmlns:pvml="urn:schemas-microsoft-com:office:powerpoint" xmlns:com="http://schemas.openxmlformats.org/drawingml/2006/compatibility" xmlns:p14="http://schemas.microsoft.com/office/powerpoint/2010/main" xmlns:p15="http://schemas.microsoft.com/office/powerpoint/2012/main" xmlns:ahyp="http://schemas.microsoft.com/office/drawing/2018/hyperlinkcolor" autoCompressPictures="0" embedTrueTypeFonts="1" strictFirstAndLastChars="0" saveSubsetFonts="1">
+<p:presentation xmlns:a="http://schemas.openxmlformats.org/drawingml/2006/main" xmlns:r="http://schemas.openxmlformats.org/officeDocument/2006/relationships" xmlns:p="http://schemas.openxmlformats.org/presentationml/2006/main" strictFirstAndLastChars="0" embedTrueTypeFonts="1" saveSubsetFonts="1" autoCompressPictures="0">
   <p:sldMasterIdLst>
-    <p:sldMasterId id="2147483659" r:id="rId4"/>
+    <p:sldMasterId id="2147483659" r:id="rId1"/>
   </p:sldMasterIdLst>
   <p:notesMasterIdLst>
-    <p:notesMasterId r:id="rId5"/>
+    <p:notesMasterId r:id="rId3"/>
   </p:notesMasterIdLst>
   <p:sldIdLst>
-    <p:sldId id="256" r:id="rId6"/>
+    <p:sldId id="256" r:id="rId2"/>
   </p:sldIdLst>
-  <p:sldSz cy="5143500" cx="9144000"/>
+  <p:sldSz cx="9144000" cy="5143500" type="screen16x9"/>
   <p:notesSz cx="6858000" cy="9144000"/>
   <p:embeddedFontLst>
     <p:embeddedFont>
-      <p:font typeface="Open Sans"/>
-      <p:regular r:id="rId7"/>
-      <p:bold r:id="rId8"/>
-      <p:italic r:id="rId9"/>
-      <p:boldItalic r:id="rId10"/>
+      <p:font typeface="Open Sans" panose="020B0604020202020204" charset="0"/>
+      <p:regular r:id="rId4"/>
+      <p:bold r:id="rId5"/>
+      <p:italic r:id="rId6"/>
+      <p:boldItalic r:id="rId7"/>
     </p:embeddedFont>
   </p:embeddedFontLst>
   <p:defaultTextStyle>
-    <a:defPPr lvl="0" marR="0" rtl="0" algn="l">
+    <a:defPPr marR="0" lvl="0" algn="l" rtl="0">
       <a:lnSpc>
         <a:spcPct val="100000"/>
       </a:lnSpc>
@@ -33,7 +33,7 @@
         <a:spcPts val="0"/>
       </a:spcAft>
     </a:defPPr>
-    <a:lvl1pPr lvl="0" marR="0" rtl="0" algn="l">
+    <a:lvl1pPr marR="0" lvl="0" algn="l" rtl="0">
       <a:lnSpc>
         <a:spcPct val="100000"/>
       </a:lnSpc>
@@ -47,7 +47,7 @@
         <a:srgbClr val="000000"/>
       </a:buClr>
       <a:buFont typeface="Arial"/>
-      <a:defRPr b="0" i="0" sz="1400" u="none" cap="none" strike="noStrike">
+      <a:defRPr sz="1400" b="0" i="0" u="none" strike="noStrike" cap="none">
         <a:solidFill>
           <a:srgbClr val="000000"/>
         </a:solidFill>
@@ -57,7 +57,7 @@
         <a:sym typeface="Arial"/>
       </a:defRPr>
     </a:lvl1pPr>
-    <a:lvl2pPr lvl="1" marR="0" rtl="0" algn="l">
+    <a:lvl2pPr marR="0" lvl="1" algn="l" rtl="0">
       <a:lnSpc>
         <a:spcPct val="100000"/>
       </a:lnSpc>
@@ -71,7 +71,7 @@
         <a:srgbClr val="000000"/>
       </a:buClr>
       <a:buFont typeface="Arial"/>
-      <a:defRPr b="0" i="0" sz="1400" u="none" cap="none" strike="noStrike">
+      <a:defRPr sz="1400" b="0" i="0" u="none" strike="noStrike" cap="none">
         <a:solidFill>
           <a:srgbClr val="000000"/>
         </a:solidFill>
@@ -81,7 +81,7 @@
         <a:sym typeface="Arial"/>
       </a:defRPr>
     </a:lvl2pPr>
-    <a:lvl3pPr lvl="2" marR="0" rtl="0" algn="l">
+    <a:lvl3pPr marR="0" lvl="2" algn="l" rtl="0">
       <a:lnSpc>
         <a:spcPct val="100000"/>
       </a:lnSpc>
@@ -95,7 +95,7 @@
         <a:srgbClr val="000000"/>
       </a:buClr>
       <a:buFont typeface="Arial"/>
-      <a:defRPr b="0" i="0" sz="1400" u="none" cap="none" strike="noStrike">
+      <a:defRPr sz="1400" b="0" i="0" u="none" strike="noStrike" cap="none">
         <a:solidFill>
           <a:srgbClr val="000000"/>
         </a:solidFill>
@@ -105,7 +105,7 @@
         <a:sym typeface="Arial"/>
       </a:defRPr>
     </a:lvl3pPr>
-    <a:lvl4pPr lvl="3" marR="0" rtl="0" algn="l">
+    <a:lvl4pPr marR="0" lvl="3" algn="l" rtl="0">
       <a:lnSpc>
         <a:spcPct val="100000"/>
       </a:lnSpc>
@@ -119,7 +119,7 @@
         <a:srgbClr val="000000"/>
       </a:buClr>
       <a:buFont typeface="Arial"/>
-      <a:defRPr b="0" i="0" sz="1400" u="none" cap="none" strike="noStrike">
+      <a:defRPr sz="1400" b="0" i="0" u="none" strike="noStrike" cap="none">
         <a:solidFill>
           <a:srgbClr val="000000"/>
         </a:solidFill>
@@ -129,7 +129,7 @@
         <a:sym typeface="Arial"/>
       </a:defRPr>
     </a:lvl4pPr>
-    <a:lvl5pPr lvl="4" marR="0" rtl="0" algn="l">
+    <a:lvl5pPr marR="0" lvl="4" algn="l" rtl="0">
       <a:lnSpc>
         <a:spcPct val="100000"/>
       </a:lnSpc>
@@ -143,7 +143,7 @@
         <a:srgbClr val="000000"/>
       </a:buClr>
       <a:buFont typeface="Arial"/>
-      <a:defRPr b="0" i="0" sz="1400" u="none" cap="none" strike="noStrike">
+      <a:defRPr sz="1400" b="0" i="0" u="none" strike="noStrike" cap="none">
         <a:solidFill>
           <a:srgbClr val="000000"/>
         </a:solidFill>
@@ -153,7 +153,7 @@
         <a:sym typeface="Arial"/>
       </a:defRPr>
     </a:lvl5pPr>
-    <a:lvl6pPr lvl="5" marR="0" rtl="0" algn="l">
+    <a:lvl6pPr marR="0" lvl="5" algn="l" rtl="0">
       <a:lnSpc>
         <a:spcPct val="100000"/>
       </a:lnSpc>
@@ -167,7 +167,7 @@
         <a:srgbClr val="000000"/>
       </a:buClr>
       <a:buFont typeface="Arial"/>
-      <a:defRPr b="0" i="0" sz="1400" u="none" cap="none" strike="noStrike">
+      <a:defRPr sz="1400" b="0" i="0" u="none" strike="noStrike" cap="none">
         <a:solidFill>
           <a:srgbClr val="000000"/>
         </a:solidFill>
@@ -177,7 +177,7 @@
         <a:sym typeface="Arial"/>
       </a:defRPr>
     </a:lvl6pPr>
-    <a:lvl7pPr lvl="6" marR="0" rtl="0" algn="l">
+    <a:lvl7pPr marR="0" lvl="6" algn="l" rtl="0">
       <a:lnSpc>
         <a:spcPct val="100000"/>
       </a:lnSpc>
@@ -191,7 +191,7 @@
         <a:srgbClr val="000000"/>
       </a:buClr>
       <a:buFont typeface="Arial"/>
-      <a:defRPr b="0" i="0" sz="1400" u="none" cap="none" strike="noStrike">
+      <a:defRPr sz="1400" b="0" i="0" u="none" strike="noStrike" cap="none">
         <a:solidFill>
           <a:srgbClr val="000000"/>
         </a:solidFill>
@@ -201,7 +201,7 @@
         <a:sym typeface="Arial"/>
       </a:defRPr>
     </a:lvl7pPr>
-    <a:lvl8pPr lvl="7" marR="0" rtl="0" algn="l">
+    <a:lvl8pPr marR="0" lvl="7" algn="l" rtl="0">
       <a:lnSpc>
         <a:spcPct val="100000"/>
       </a:lnSpc>
@@ -215,7 +215,7 @@
         <a:srgbClr val="000000"/>
       </a:buClr>
       <a:buFont typeface="Arial"/>
-      <a:defRPr b="0" i="0" sz="1400" u="none" cap="none" strike="noStrike">
+      <a:defRPr sz="1400" b="0" i="0" u="none" strike="noStrike" cap="none">
         <a:solidFill>
           <a:srgbClr val="000000"/>
         </a:solidFill>
@@ -225,7 +225,7 @@
         <a:sym typeface="Arial"/>
       </a:defRPr>
     </a:lvl8pPr>
-    <a:lvl9pPr lvl="8" marR="0" rtl="0" algn="l">
+    <a:lvl9pPr marR="0" lvl="8" algn="l" rtl="0">
       <a:lnSpc>
         <a:spcPct val="100000"/>
       </a:lnSpc>
@@ -239,7 +239,7 @@
         <a:srgbClr val="000000"/>
       </a:buClr>
       <a:buFont typeface="Arial"/>
-      <a:defRPr b="0" i="0" sz="1400" u="none" cap="none" strike="noStrike">
+      <a:defRPr sz="1400" b="0" i="0" u="none" strike="noStrike" cap="none">
         <a:solidFill>
           <a:srgbClr val="000000"/>
         </a:solidFill>
@@ -252,7 +252,7 @@
   </p:defaultTextStyle>
   <p:extLst>
     <p:ext uri="{EFAFB233-063F-42B5-8137-9DF3F51BA10A}">
-      <p15:sldGuideLst>
+      <p15:sldGuideLst xmlns:p15="http://schemas.microsoft.com/office/powerpoint/2012/main">
         <p15:guide id="1" orient="horz" pos="1620">
           <p15:clr>
             <a:srgbClr val="A4A3A4"/>
@@ -270,11 +270,16 @@
 </file>
 
 <file path=ppt/notesMasters/notesMaster1.xml><?xml version="1.0" encoding="utf-8"?>
-<p:notesMaster xmlns:a="http://schemas.openxmlformats.org/drawingml/2006/main" xmlns:r="http://schemas.openxmlformats.org/officeDocument/2006/relationships" xmlns:mc="http://schemas.openxmlformats.org/markup-compatibility/2006" xmlns:mv="urn:schemas-microsoft-com:mac:vml" xmlns:p="http://schemas.openxmlformats.org/presentationml/2006/main" xmlns:c="http://schemas.openxmlformats.org/drawingml/2006/chart" xmlns:dgm="http://schemas.openxmlformats.org/drawingml/2006/diagram" xmlns:o="urn:schemas-microsoft-com:office:office" xmlns:v="urn:schemas-microsoft-com:vml" xmlns:pvml="urn:schemas-microsoft-com:office:powerpoint" xmlns:com="http://schemas.openxmlformats.org/drawingml/2006/compatibility" xmlns:p14="http://schemas.microsoft.com/office/powerpoint/2010/main" xmlns:p15="http://schemas.microsoft.com/office/powerpoint/2012/main" xmlns:ahyp="http://schemas.microsoft.com/office/drawing/2018/hyperlinkcolor">
+<p:notesMaster xmlns:a="http://schemas.openxmlformats.org/drawingml/2006/main" xmlns:r="http://schemas.openxmlformats.org/officeDocument/2006/relationships" xmlns:p="http://schemas.openxmlformats.org/presentationml/2006/main">
   <p:cSld>
+    <p:bg>
+      <p:bgRef idx="1001">
+        <a:schemeClr val="bg1"/>
+      </p:bgRef>
+    </p:bg>
     <p:spTree>
       <p:nvGrpSpPr>
-        <p:cNvPr id="2" name="Shape 2"/>
+        <p:cNvPr id="1" name="Shape 2"/>
         <p:cNvGrpSpPr/>
         <p:nvPr/>
       </p:nvGrpSpPr>
@@ -289,9 +294,11 @@
       <p:sp>
         <p:nvSpPr>
           <p:cNvPr id="3" name="Google Shape;3;n"/>
-          <p:cNvSpPr/>
+          <p:cNvSpPr>
+            <a:spLocks noGrp="1" noRot="1" noChangeAspect="1"/>
+          </p:cNvSpPr>
           <p:nvPr>
-            <p:ph idx="2" type="sldImg"/>
+            <p:ph type="sldImg" idx="2"/>
           </p:nvPr>
         </p:nvSpPr>
         <p:spPr>
@@ -300,9 +307,13 @@
             <a:ext cx="6096075" cy="3429000"/>
           </a:xfrm>
           <a:custGeom>
-            <a:rect b="b" l="l" r="r" t="t"/>
+            <a:avLst/>
+            <a:gdLst/>
+            <a:ahLst/>
+            <a:cxnLst/>
+            <a:rect l="l" t="t" r="r" b="b"/>
             <a:pathLst>
-              <a:path extrusionOk="0" h="120000" w="120000">
+              <a:path w="120000" h="120000" extrusionOk="0">
                 <a:moveTo>
                   <a:pt x="0" y="0"/>
                 </a:moveTo>
@@ -320,23 +331,25 @@
             </a:pathLst>
           </a:custGeom>
           <a:noFill/>
-          <a:ln cap="flat" cmpd="sng" w="9525">
+          <a:ln w="9525" cap="flat" cmpd="sng">
             <a:solidFill>
               <a:srgbClr val="000000"/>
             </a:solidFill>
             <a:prstDash val="solid"/>
             <a:round/>
-            <a:headEnd len="sm" w="sm" type="none"/>
-            <a:tailEnd len="sm" w="sm" type="none"/>
+            <a:headEnd type="none" w="sm" len="sm"/>
+            <a:tailEnd type="none" w="sm" len="sm"/>
           </a:ln>
         </p:spPr>
       </p:sp>
       <p:sp>
         <p:nvSpPr>
           <p:cNvPr id="4" name="Google Shape;4;n"/>
-          <p:cNvSpPr txBox="1"/>
+          <p:cNvSpPr txBox="1">
+            <a:spLocks noGrp="1"/>
+          </p:cNvSpPr>
           <p:nvPr>
-            <p:ph idx="1" type="body"/>
+            <p:ph type="body" idx="1"/>
           </p:nvPr>
         </p:nvSpPr>
         <p:spPr>
@@ -353,11 +366,11 @@
           </a:ln>
         </p:spPr>
         <p:txBody>
-          <a:bodyPr anchorCtr="0" anchor="t" bIns="91425" lIns="91425" spcFirstLastPara="1" rIns="91425" wrap="square" tIns="91425">
+          <a:bodyPr spcFirstLastPara="1" wrap="square" lIns="91425" tIns="91425" rIns="91425" bIns="91425" anchor="t" anchorCtr="0">
             <a:noAutofit/>
           </a:bodyPr>
           <a:lstStyle>
-            <a:lvl1pPr indent="-298450" lvl="0" marL="457200">
+            <a:lvl1pPr marL="457200" lvl="0" indent="-298450">
               <a:spcBef>
                 <a:spcPts val="0"/>
               </a:spcBef>
@@ -368,7 +381,7 @@
               <a:buChar char="●"/>
               <a:defRPr sz="1100"/>
             </a:lvl1pPr>
-            <a:lvl2pPr indent="-298450" lvl="1" marL="914400">
+            <a:lvl2pPr marL="914400" lvl="1" indent="-298450">
               <a:spcBef>
                 <a:spcPts val="0"/>
               </a:spcBef>
@@ -379,7 +392,7 @@
               <a:buChar char="○"/>
               <a:defRPr sz="1100"/>
             </a:lvl2pPr>
-            <a:lvl3pPr indent="-298450" lvl="2" marL="1371600">
+            <a:lvl3pPr marL="1371600" lvl="2" indent="-298450">
               <a:spcBef>
                 <a:spcPts val="0"/>
               </a:spcBef>
@@ -390,7 +403,7 @@
               <a:buChar char="■"/>
               <a:defRPr sz="1100"/>
             </a:lvl3pPr>
-            <a:lvl4pPr indent="-298450" lvl="3" marL="1828800">
+            <a:lvl4pPr marL="1828800" lvl="3" indent="-298450">
               <a:spcBef>
                 <a:spcPts val="0"/>
               </a:spcBef>
@@ -401,7 +414,7 @@
               <a:buChar char="●"/>
               <a:defRPr sz="1100"/>
             </a:lvl4pPr>
-            <a:lvl5pPr indent="-298450" lvl="4" marL="2286000">
+            <a:lvl5pPr marL="2286000" lvl="4" indent="-298450">
               <a:spcBef>
                 <a:spcPts val="0"/>
               </a:spcBef>
@@ -412,7 +425,7 @@
               <a:buChar char="○"/>
               <a:defRPr sz="1100"/>
             </a:lvl5pPr>
-            <a:lvl6pPr indent="-298450" lvl="5" marL="2743200">
+            <a:lvl6pPr marL="2743200" lvl="5" indent="-298450">
               <a:spcBef>
                 <a:spcPts val="0"/>
               </a:spcBef>
@@ -423,7 +436,7 @@
               <a:buChar char="■"/>
               <a:defRPr sz="1100"/>
             </a:lvl6pPr>
-            <a:lvl7pPr indent="-298450" lvl="6" marL="3200400">
+            <a:lvl7pPr marL="3200400" lvl="6" indent="-298450">
               <a:spcBef>
                 <a:spcPts val="0"/>
               </a:spcBef>
@@ -434,7 +447,7 @@
               <a:buChar char="●"/>
               <a:defRPr sz="1100"/>
             </a:lvl7pPr>
-            <a:lvl8pPr indent="-298450" lvl="7" marL="3657600">
+            <a:lvl8pPr marL="3657600" lvl="7" indent="-298450">
               <a:spcBef>
                 <a:spcPts val="0"/>
               </a:spcBef>
@@ -445,7 +458,7 @@
               <a:buChar char="○"/>
               <a:defRPr sz="1100"/>
             </a:lvl8pPr>
-            <a:lvl9pPr indent="-298450" lvl="8" marL="4114800">
+            <a:lvl9pPr marL="4114800" lvl="8" indent="-298450">
               <a:spcBef>
                 <a:spcPts val="0"/>
               </a:spcBef>
@@ -457,14 +470,16 @@
               <a:defRPr sz="1100"/>
             </a:lvl9pPr>
           </a:lstStyle>
-          <a:p/>
+          <a:p>
+            <a:endParaRPr/>
+          </a:p>
         </p:txBody>
       </p:sp>
     </p:spTree>
   </p:cSld>
-  <p:clrMap accent1="accent1" accent2="accent2" accent3="accent3" accent4="accent4" accent5="accent5" accent6="accent6" bg1="lt1" bg2="dk2" tx1="dk1" tx2="lt2" folHlink="folHlink" hlink="hlink"/>
+  <p:clrMap bg1="lt1" tx1="dk1" bg2="dk2" tx2="lt2" accent1="accent1" accent2="accent2" accent3="accent3" accent4="accent4" accent5="accent5" accent6="accent6" hlink="hlink" folHlink="folHlink"/>
   <p:notesStyle>
-    <a:defPPr lvl="0" marR="0" rtl="0" algn="l">
+    <a:defPPr marR="0" lvl="0" algn="l" rtl="0">
       <a:lnSpc>
         <a:spcPct val="100000"/>
       </a:lnSpc>
@@ -475,7 +490,7 @@
         <a:spcPts val="0"/>
       </a:spcAft>
     </a:defPPr>
-    <a:lvl1pPr lvl="0" marR="0" rtl="0" algn="l">
+    <a:lvl1pPr marR="0" lvl="0" algn="l" rtl="0">
       <a:lnSpc>
         <a:spcPct val="100000"/>
       </a:lnSpc>
@@ -489,7 +504,7 @@
         <a:srgbClr val="000000"/>
       </a:buClr>
       <a:buFont typeface="Arial"/>
-      <a:defRPr b="0" i="0" sz="1400" u="none" cap="none" strike="noStrike">
+      <a:defRPr sz="1400" b="0" i="0" u="none" strike="noStrike" cap="none">
         <a:solidFill>
           <a:srgbClr val="000000"/>
         </a:solidFill>
@@ -499,7 +514,7 @@
         <a:sym typeface="Arial"/>
       </a:defRPr>
     </a:lvl1pPr>
-    <a:lvl2pPr lvl="1" marR="0" rtl="0" algn="l">
+    <a:lvl2pPr marR="0" lvl="1" algn="l" rtl="0">
       <a:lnSpc>
         <a:spcPct val="100000"/>
       </a:lnSpc>
@@ -513,7 +528,7 @@
         <a:srgbClr val="000000"/>
       </a:buClr>
       <a:buFont typeface="Arial"/>
-      <a:defRPr b="0" i="0" sz="1400" u="none" cap="none" strike="noStrike">
+      <a:defRPr sz="1400" b="0" i="0" u="none" strike="noStrike" cap="none">
         <a:solidFill>
           <a:srgbClr val="000000"/>
         </a:solidFill>
@@ -523,7 +538,7 @@
         <a:sym typeface="Arial"/>
       </a:defRPr>
     </a:lvl2pPr>
-    <a:lvl3pPr lvl="2" marR="0" rtl="0" algn="l">
+    <a:lvl3pPr marR="0" lvl="2" algn="l" rtl="0">
       <a:lnSpc>
         <a:spcPct val="100000"/>
       </a:lnSpc>
@@ -537,7 +552,7 @@
         <a:srgbClr val="000000"/>
       </a:buClr>
       <a:buFont typeface="Arial"/>
-      <a:defRPr b="0" i="0" sz="1400" u="none" cap="none" strike="noStrike">
+      <a:defRPr sz="1400" b="0" i="0" u="none" strike="noStrike" cap="none">
         <a:solidFill>
           <a:srgbClr val="000000"/>
         </a:solidFill>
@@ -547,7 +562,7 @@
         <a:sym typeface="Arial"/>
       </a:defRPr>
     </a:lvl3pPr>
-    <a:lvl4pPr lvl="3" marR="0" rtl="0" algn="l">
+    <a:lvl4pPr marR="0" lvl="3" algn="l" rtl="0">
       <a:lnSpc>
         <a:spcPct val="100000"/>
       </a:lnSpc>
@@ -561,7 +576,7 @@
         <a:srgbClr val="000000"/>
       </a:buClr>
       <a:buFont typeface="Arial"/>
-      <a:defRPr b="0" i="0" sz="1400" u="none" cap="none" strike="noStrike">
+      <a:defRPr sz="1400" b="0" i="0" u="none" strike="noStrike" cap="none">
         <a:solidFill>
           <a:srgbClr val="000000"/>
         </a:solidFill>
@@ -571,7 +586,7 @@
         <a:sym typeface="Arial"/>
       </a:defRPr>
     </a:lvl4pPr>
-    <a:lvl5pPr lvl="4" marR="0" rtl="0" algn="l">
+    <a:lvl5pPr marR="0" lvl="4" algn="l" rtl="0">
       <a:lnSpc>
         <a:spcPct val="100000"/>
       </a:lnSpc>
@@ -585,7 +600,7 @@
         <a:srgbClr val="000000"/>
       </a:buClr>
       <a:buFont typeface="Arial"/>
-      <a:defRPr b="0" i="0" sz="1400" u="none" cap="none" strike="noStrike">
+      <a:defRPr sz="1400" b="0" i="0" u="none" strike="noStrike" cap="none">
         <a:solidFill>
           <a:srgbClr val="000000"/>
         </a:solidFill>
@@ -595,7 +610,7 @@
         <a:sym typeface="Arial"/>
       </a:defRPr>
     </a:lvl5pPr>
-    <a:lvl6pPr lvl="5" marR="0" rtl="0" algn="l">
+    <a:lvl6pPr marR="0" lvl="5" algn="l" rtl="0">
       <a:lnSpc>
         <a:spcPct val="100000"/>
       </a:lnSpc>
@@ -609,7 +624,7 @@
         <a:srgbClr val="000000"/>
       </a:buClr>
       <a:buFont typeface="Arial"/>
-      <a:defRPr b="0" i="0" sz="1400" u="none" cap="none" strike="noStrike">
+      <a:defRPr sz="1400" b="0" i="0" u="none" strike="noStrike" cap="none">
         <a:solidFill>
           <a:srgbClr val="000000"/>
         </a:solidFill>
@@ -619,7 +634,7 @@
         <a:sym typeface="Arial"/>
       </a:defRPr>
     </a:lvl6pPr>
-    <a:lvl7pPr lvl="6" marR="0" rtl="0" algn="l">
+    <a:lvl7pPr marR="0" lvl="6" algn="l" rtl="0">
       <a:lnSpc>
         <a:spcPct val="100000"/>
       </a:lnSpc>
@@ -633,7 +648,7 @@
         <a:srgbClr val="000000"/>
       </a:buClr>
       <a:buFont typeface="Arial"/>
-      <a:defRPr b="0" i="0" sz="1400" u="none" cap="none" strike="noStrike">
+      <a:defRPr sz="1400" b="0" i="0" u="none" strike="noStrike" cap="none">
         <a:solidFill>
           <a:srgbClr val="000000"/>
         </a:solidFill>
@@ -643,7 +658,7 @@
         <a:sym typeface="Arial"/>
       </a:defRPr>
     </a:lvl7pPr>
-    <a:lvl8pPr lvl="7" marR="0" rtl="0" algn="l">
+    <a:lvl8pPr marR="0" lvl="7" algn="l" rtl="0">
       <a:lnSpc>
         <a:spcPct val="100000"/>
       </a:lnSpc>
@@ -657,7 +672,7 @@
         <a:srgbClr val="000000"/>
       </a:buClr>
       <a:buFont typeface="Arial"/>
-      <a:defRPr b="0" i="0" sz="1400" u="none" cap="none" strike="noStrike">
+      <a:defRPr sz="1400" b="0" i="0" u="none" strike="noStrike" cap="none">
         <a:solidFill>
           <a:srgbClr val="000000"/>
         </a:solidFill>
@@ -667,7 +682,7 @@
         <a:sym typeface="Arial"/>
       </a:defRPr>
     </a:lvl8pPr>
-    <a:lvl9pPr lvl="8" marR="0" rtl="0" algn="l">
+    <a:lvl9pPr marR="0" lvl="8" algn="l" rtl="0">
       <a:lnSpc>
         <a:spcPct val="100000"/>
       </a:lnSpc>
@@ -681,7 +696,7 @@
         <a:srgbClr val="000000"/>
       </a:buClr>
       <a:buFont typeface="Arial"/>
-      <a:defRPr b="0" i="0" sz="1400" u="none" cap="none" strike="noStrike">
+      <a:defRPr sz="1400" b="0" i="0" u="none" strike="noStrike" cap="none">
         <a:solidFill>
           <a:srgbClr val="000000"/>
         </a:solidFill>
@@ -696,11 +711,11 @@
 </file>
 
 <file path=ppt/notesSlides/notesSlide1.xml><?xml version="1.0" encoding="utf-8"?>
-<p:notes xmlns:a="http://schemas.openxmlformats.org/drawingml/2006/main" xmlns:r="http://schemas.openxmlformats.org/officeDocument/2006/relationships" xmlns:mc="http://schemas.openxmlformats.org/markup-compatibility/2006" xmlns:mv="urn:schemas-microsoft-com:mac:vml" xmlns:p="http://schemas.openxmlformats.org/presentationml/2006/main" xmlns:c="http://schemas.openxmlformats.org/drawingml/2006/chart" xmlns:dgm="http://schemas.openxmlformats.org/drawingml/2006/diagram" xmlns:o="urn:schemas-microsoft-com:office:office" xmlns:v="urn:schemas-microsoft-com:vml" xmlns:pvml="urn:schemas-microsoft-com:office:powerpoint" xmlns:com="http://schemas.openxmlformats.org/drawingml/2006/compatibility" xmlns:p14="http://schemas.microsoft.com/office/powerpoint/2010/main" xmlns:p15="http://schemas.microsoft.com/office/powerpoint/2012/main" xmlns:ahyp="http://schemas.microsoft.com/office/drawing/2018/hyperlinkcolor" showMasterPhAnim="0" showMasterSp="0">
+<p:notes xmlns:a="http://schemas.openxmlformats.org/drawingml/2006/main" xmlns:r="http://schemas.openxmlformats.org/officeDocument/2006/relationships" xmlns:p="http://schemas.openxmlformats.org/presentationml/2006/main" showMasterSp="0" showMasterPhAnim="0">
   <p:cSld>
     <p:spTree>
       <p:nvGrpSpPr>
-        <p:cNvPr id="50" name="Shape 50"/>
+        <p:cNvPr id="1" name="Shape 50"/>
         <p:cNvGrpSpPr/>
         <p:nvPr/>
       </p:nvGrpSpPr>
@@ -715,20 +730,26 @@
       <p:sp>
         <p:nvSpPr>
           <p:cNvPr id="51" name="Google Shape;51;p:notes"/>
-          <p:cNvSpPr/>
+          <p:cNvSpPr>
+            <a:spLocks noGrp="1" noRot="1" noChangeAspect="1"/>
+          </p:cNvSpPr>
           <p:nvPr>
-            <p:ph idx="2" type="sldImg"/>
+            <p:ph type="sldImg" idx="2"/>
           </p:nvPr>
         </p:nvSpPr>
         <p:spPr>
           <a:xfrm>
-            <a:off x="381300" y="685800"/>
-            <a:ext cx="6096075" cy="3429000"/>
+            <a:off x="381000" y="685800"/>
+            <a:ext cx="6096000" cy="3429000"/>
           </a:xfrm>
           <a:custGeom>
-            <a:rect b="b" l="l" r="r" t="t"/>
+            <a:avLst/>
+            <a:gdLst/>
+            <a:ahLst/>
+            <a:cxnLst/>
+            <a:rect l="l" t="t" r="r" b="b"/>
             <a:pathLst>
-              <a:path extrusionOk="0" h="120000" w="120000">
+              <a:path w="120000" h="120000" extrusionOk="0">
                 <a:moveTo>
                   <a:pt x="0" y="0"/>
                 </a:moveTo>
@@ -750,9 +771,11 @@
       <p:sp>
         <p:nvSpPr>
           <p:cNvPr id="52" name="Google Shape;52;p:notes"/>
-          <p:cNvSpPr txBox="1"/>
+          <p:cNvSpPr txBox="1">
+            <a:spLocks noGrp="1"/>
+          </p:cNvSpPr>
           <p:nvPr>
-            <p:ph idx="1" type="body"/>
+            <p:ph type="body" idx="1"/>
           </p:nvPr>
         </p:nvSpPr>
         <p:spPr>
@@ -765,12 +788,12 @@
           </a:prstGeom>
         </p:spPr>
         <p:txBody>
-          <a:bodyPr anchorCtr="0" anchor="t" bIns="91425" lIns="91425" spcFirstLastPara="1" rIns="91425" wrap="square" tIns="91425">
+          <a:bodyPr spcFirstLastPara="1" wrap="square" lIns="91425" tIns="91425" rIns="91425" bIns="91425" anchor="t" anchorCtr="0">
             <a:noAutofit/>
           </a:bodyPr>
           <a:lstStyle/>
           <a:p>
-            <a:pPr indent="0" lvl="0" marL="0" rtl="0" algn="l">
+            <a:pPr marL="0" lvl="0" indent="0" algn="l" rtl="0">
               <a:spcBef>
                 <a:spcPts val="0"/>
               </a:spcBef>
@@ -779,9 +802,6 @@
               </a:spcAft>
               <a:buNone/>
             </a:pPr>
-            <a:r>
-              <a:t/>
-            </a:r>
             <a:endParaRPr/>
           </a:p>
         </p:txBody>
@@ -795,11 +815,11 @@
 </file>
 
 <file path=ppt/slideLayouts/slideLayout1.xml><?xml version="1.0" encoding="utf-8"?>
-<p:sldLayout xmlns:a="http://schemas.openxmlformats.org/drawingml/2006/main" xmlns:r="http://schemas.openxmlformats.org/officeDocument/2006/relationships" xmlns:mc="http://schemas.openxmlformats.org/markup-compatibility/2006" xmlns:mv="urn:schemas-microsoft-com:mac:vml" xmlns:p="http://schemas.openxmlformats.org/presentationml/2006/main" xmlns:c="http://schemas.openxmlformats.org/drawingml/2006/chart" xmlns:dgm="http://schemas.openxmlformats.org/drawingml/2006/diagram" xmlns:o="urn:schemas-microsoft-com:office:office" xmlns:v="urn:schemas-microsoft-com:vml" xmlns:pvml="urn:schemas-microsoft-com:office:powerpoint" xmlns:com="http://schemas.openxmlformats.org/drawingml/2006/compatibility" xmlns:p14="http://schemas.microsoft.com/office/powerpoint/2010/main" xmlns:p15="http://schemas.microsoft.com/office/powerpoint/2012/main" xmlns:ahyp="http://schemas.microsoft.com/office/drawing/2018/hyperlinkcolor" matchingName="Title slide" type="title">
+<p:sldLayout xmlns:a="http://schemas.openxmlformats.org/drawingml/2006/main" xmlns:r="http://schemas.openxmlformats.org/officeDocument/2006/relationships" xmlns:p="http://schemas.openxmlformats.org/presentationml/2006/main" matchingName="Title slide" type="title">
   <p:cSld name="TITLE">
     <p:spTree>
       <p:nvGrpSpPr>
-        <p:cNvPr id="9" name="Shape 9"/>
+        <p:cNvPr id="1" name="Shape 9"/>
         <p:cNvGrpSpPr/>
         <p:nvPr/>
       </p:nvGrpSpPr>
@@ -814,7 +834,9 @@
       <p:sp>
         <p:nvSpPr>
           <p:cNvPr id="10" name="Google Shape;10;p2"/>
-          <p:cNvSpPr txBox="1"/>
+          <p:cNvSpPr txBox="1">
+            <a:spLocks noGrp="1"/>
+          </p:cNvSpPr>
           <p:nvPr>
             <p:ph type="ctrTitle"/>
           </p:nvPr>
@@ -829,7 +851,7 @@
           </a:prstGeom>
         </p:spPr>
         <p:txBody>
-          <a:bodyPr anchorCtr="0" anchor="b" bIns="91425" lIns="91425" spcFirstLastPara="1" rIns="91425" wrap="square" tIns="91425">
+          <a:bodyPr spcFirstLastPara="1" wrap="square" lIns="91425" tIns="91425" rIns="91425" bIns="91425" anchor="b" anchorCtr="0">
             <a:normAutofit/>
           </a:bodyPr>
           <a:lstStyle>
@@ -933,15 +955,19 @@
               <a:defRPr sz="5200"/>
             </a:lvl9pPr>
           </a:lstStyle>
-          <a:p/>
+          <a:p>
+            <a:endParaRPr/>
+          </a:p>
         </p:txBody>
       </p:sp>
       <p:sp>
         <p:nvSpPr>
           <p:cNvPr id="11" name="Google Shape;11;p2"/>
-          <p:cNvSpPr txBox="1"/>
+          <p:cNvSpPr txBox="1">
+            <a:spLocks noGrp="1"/>
+          </p:cNvSpPr>
           <p:nvPr>
-            <p:ph idx="1" type="subTitle"/>
+            <p:ph type="subTitle" idx="1"/>
           </p:nvPr>
         </p:nvSpPr>
         <p:spPr>
@@ -954,7 +980,7 @@
           </a:prstGeom>
         </p:spPr>
         <p:txBody>
-          <a:bodyPr anchorCtr="0" anchor="t" bIns="91425" lIns="91425" spcFirstLastPara="1" rIns="91425" wrap="square" tIns="91425">
+          <a:bodyPr spcFirstLastPara="1" wrap="square" lIns="91425" tIns="91425" rIns="91425" bIns="91425" anchor="t" anchorCtr="0">
             <a:normAutofit/>
           </a:bodyPr>
           <a:lstStyle>
@@ -1085,15 +1111,19 @@
               <a:defRPr sz="2800"/>
             </a:lvl9pPr>
           </a:lstStyle>
-          <a:p/>
+          <a:p>
+            <a:endParaRPr/>
+          </a:p>
         </p:txBody>
       </p:sp>
       <p:sp>
         <p:nvSpPr>
           <p:cNvPr id="12" name="Google Shape;12;p2"/>
-          <p:cNvSpPr txBox="1"/>
+          <p:cNvSpPr txBox="1">
+            <a:spLocks noGrp="1"/>
+          </p:cNvSpPr>
           <p:nvPr>
-            <p:ph idx="12" type="sldNum"/>
+            <p:ph type="sldNum" idx="12"/>
           </p:nvPr>
         </p:nvSpPr>
         <p:spPr>
@@ -1106,7 +1136,7 @@
           </a:prstGeom>
         </p:spPr>
         <p:txBody>
-          <a:bodyPr anchorCtr="0" anchor="ctr" bIns="91425" lIns="91425" spcFirstLastPara="1" rIns="91425" wrap="square" tIns="91425">
+          <a:bodyPr spcFirstLastPara="1" wrap="square" lIns="91425" tIns="91425" rIns="91425" bIns="91425" anchor="ctr" anchorCtr="0">
             <a:normAutofit/>
           </a:bodyPr>
           <a:lstStyle>
@@ -1148,7 +1178,7 @@
             </a:lvl9pPr>
           </a:lstStyle>
           <a:p>
-            <a:pPr indent="0" lvl="0" marL="0" rtl="0" algn="r">
+            <a:pPr marL="0" lvl="0" indent="0" algn="r" rtl="0">
               <a:spcBef>
                 <a:spcPts val="0"/>
               </a:spcBef>
@@ -1174,11 +1204,11 @@
 </file>
 
 <file path=ppt/slideLayouts/slideLayout10.xml><?xml version="1.0" encoding="utf-8"?>
-<p:sldLayout xmlns:a="http://schemas.openxmlformats.org/drawingml/2006/main" xmlns:r="http://schemas.openxmlformats.org/officeDocument/2006/relationships" xmlns:mc="http://schemas.openxmlformats.org/markup-compatibility/2006" xmlns:mv="urn:schemas-microsoft-com:mac:vml" xmlns:p="http://schemas.openxmlformats.org/presentationml/2006/main" xmlns:c="http://schemas.openxmlformats.org/drawingml/2006/chart" xmlns:dgm="http://schemas.openxmlformats.org/drawingml/2006/diagram" xmlns:o="urn:schemas-microsoft-com:office:office" xmlns:v="urn:schemas-microsoft-com:vml" xmlns:pvml="urn:schemas-microsoft-com:office:powerpoint" xmlns:com="http://schemas.openxmlformats.org/drawingml/2006/compatibility" xmlns:p14="http://schemas.microsoft.com/office/powerpoint/2010/main" xmlns:p15="http://schemas.microsoft.com/office/powerpoint/2012/main" xmlns:ahyp="http://schemas.microsoft.com/office/drawing/2018/hyperlinkcolor" matchingName="Big number">
+<p:sldLayout xmlns:a="http://schemas.openxmlformats.org/drawingml/2006/main" xmlns:r="http://schemas.openxmlformats.org/officeDocument/2006/relationships" xmlns:p="http://schemas.openxmlformats.org/presentationml/2006/main" matchingName="Big number">
   <p:cSld name="BIG_NUMBER">
     <p:spTree>
       <p:nvGrpSpPr>
-        <p:cNvPr id="44" name="Shape 44"/>
+        <p:cNvPr id="1" name="Shape 44"/>
         <p:cNvGrpSpPr/>
         <p:nvPr/>
       </p:nvGrpSpPr>
@@ -1193,9 +1223,11 @@
       <p:sp>
         <p:nvSpPr>
           <p:cNvPr id="45" name="Google Shape;45;p11"/>
-          <p:cNvSpPr txBox="1"/>
+          <p:cNvSpPr txBox="1">
+            <a:spLocks noGrp="1"/>
+          </p:cNvSpPr>
           <p:nvPr>
-            <p:ph hasCustomPrompt="1" type="title"/>
+            <p:ph type="title" hasCustomPrompt="1"/>
           </p:nvPr>
         </p:nvSpPr>
         <p:spPr>
@@ -1208,7 +1240,7 @@
           </a:prstGeom>
         </p:spPr>
         <p:txBody>
-          <a:bodyPr anchorCtr="0" anchor="b" bIns="91425" lIns="91425" spcFirstLastPara="1" rIns="91425" wrap="square" tIns="91425">
+          <a:bodyPr spcFirstLastPara="1" wrap="square" lIns="91425" tIns="91425" rIns="91425" bIns="91425" anchor="b" anchorCtr="0">
             <a:normAutofit/>
           </a:bodyPr>
           <a:lstStyle>
@@ -1322,9 +1354,11 @@
       <p:sp>
         <p:nvSpPr>
           <p:cNvPr id="46" name="Google Shape;46;p11"/>
-          <p:cNvSpPr txBox="1"/>
+          <p:cNvSpPr txBox="1">
+            <a:spLocks noGrp="1"/>
+          </p:cNvSpPr>
           <p:nvPr>
-            <p:ph idx="1" type="body"/>
+            <p:ph type="body" idx="1"/>
           </p:nvPr>
         </p:nvSpPr>
         <p:spPr>
@@ -1337,11 +1371,11 @@
           </a:prstGeom>
         </p:spPr>
         <p:txBody>
-          <a:bodyPr anchorCtr="0" anchor="t" bIns="91425" lIns="91425" spcFirstLastPara="1" rIns="91425" wrap="square" tIns="91425">
+          <a:bodyPr spcFirstLastPara="1" wrap="square" lIns="91425" tIns="91425" rIns="91425" bIns="91425" anchor="t" anchorCtr="0">
             <a:normAutofit/>
           </a:bodyPr>
           <a:lstStyle>
-            <a:lvl1pPr indent="-342900" lvl="0" marL="457200" algn="ctr">
+            <a:lvl1pPr marL="457200" lvl="0" indent="-342900" algn="ctr">
               <a:spcBef>
                 <a:spcPts val="0"/>
               </a:spcBef>
@@ -1352,7 +1386,7 @@
               <a:buChar char="●"/>
               <a:defRPr/>
             </a:lvl1pPr>
-            <a:lvl2pPr indent="-317500" lvl="1" marL="914400" algn="ctr">
+            <a:lvl2pPr marL="914400" lvl="1" indent="-317500" algn="ctr">
               <a:spcBef>
                 <a:spcPts val="0"/>
               </a:spcBef>
@@ -1363,7 +1397,7 @@
               <a:buChar char="○"/>
               <a:defRPr/>
             </a:lvl2pPr>
-            <a:lvl3pPr indent="-317500" lvl="2" marL="1371600" algn="ctr">
+            <a:lvl3pPr marL="1371600" lvl="2" indent="-317500" algn="ctr">
               <a:spcBef>
                 <a:spcPts val="0"/>
               </a:spcBef>
@@ -1374,7 +1408,7 @@
               <a:buChar char="■"/>
               <a:defRPr/>
             </a:lvl3pPr>
-            <a:lvl4pPr indent="-317500" lvl="3" marL="1828800" algn="ctr">
+            <a:lvl4pPr marL="1828800" lvl="3" indent="-317500" algn="ctr">
               <a:spcBef>
                 <a:spcPts val="0"/>
               </a:spcBef>
@@ -1385,7 +1419,7 @@
               <a:buChar char="●"/>
               <a:defRPr/>
             </a:lvl4pPr>
-            <a:lvl5pPr indent="-317500" lvl="4" marL="2286000" algn="ctr">
+            <a:lvl5pPr marL="2286000" lvl="4" indent="-317500" algn="ctr">
               <a:spcBef>
                 <a:spcPts val="0"/>
               </a:spcBef>
@@ -1396,7 +1430,7 @@
               <a:buChar char="○"/>
               <a:defRPr/>
             </a:lvl5pPr>
-            <a:lvl6pPr indent="-317500" lvl="5" marL="2743200" algn="ctr">
+            <a:lvl6pPr marL="2743200" lvl="5" indent="-317500" algn="ctr">
               <a:spcBef>
                 <a:spcPts val="0"/>
               </a:spcBef>
@@ -1407,7 +1441,7 @@
               <a:buChar char="■"/>
               <a:defRPr/>
             </a:lvl6pPr>
-            <a:lvl7pPr indent="-317500" lvl="6" marL="3200400" algn="ctr">
+            <a:lvl7pPr marL="3200400" lvl="6" indent="-317500" algn="ctr">
               <a:spcBef>
                 <a:spcPts val="0"/>
               </a:spcBef>
@@ -1418,7 +1452,7 @@
               <a:buChar char="●"/>
               <a:defRPr/>
             </a:lvl7pPr>
-            <a:lvl8pPr indent="-317500" lvl="7" marL="3657600" algn="ctr">
+            <a:lvl8pPr marL="3657600" lvl="7" indent="-317500" algn="ctr">
               <a:spcBef>
                 <a:spcPts val="0"/>
               </a:spcBef>
@@ -1429,7 +1463,7 @@
               <a:buChar char="○"/>
               <a:defRPr/>
             </a:lvl8pPr>
-            <a:lvl9pPr indent="-317500" lvl="8" marL="4114800" algn="ctr">
+            <a:lvl9pPr marL="4114800" lvl="8" indent="-317500" algn="ctr">
               <a:spcBef>
                 <a:spcPts val="0"/>
               </a:spcBef>
@@ -1441,15 +1475,19 @@
               <a:defRPr/>
             </a:lvl9pPr>
           </a:lstStyle>
-          <a:p/>
+          <a:p>
+            <a:endParaRPr/>
+          </a:p>
         </p:txBody>
       </p:sp>
       <p:sp>
         <p:nvSpPr>
           <p:cNvPr id="47" name="Google Shape;47;p11"/>
-          <p:cNvSpPr txBox="1"/>
+          <p:cNvSpPr txBox="1">
+            <a:spLocks noGrp="1"/>
+          </p:cNvSpPr>
           <p:nvPr>
-            <p:ph idx="12" type="sldNum"/>
+            <p:ph type="sldNum" idx="12"/>
           </p:nvPr>
         </p:nvSpPr>
         <p:spPr>
@@ -1462,7 +1500,7 @@
           </a:prstGeom>
         </p:spPr>
         <p:txBody>
-          <a:bodyPr anchorCtr="0" anchor="ctr" bIns="91425" lIns="91425" spcFirstLastPara="1" rIns="91425" wrap="square" tIns="91425">
+          <a:bodyPr spcFirstLastPara="1" wrap="square" lIns="91425" tIns="91425" rIns="91425" bIns="91425" anchor="ctr" anchorCtr="0">
             <a:normAutofit/>
           </a:bodyPr>
           <a:lstStyle>
@@ -1504,7 +1542,7 @@
             </a:lvl9pPr>
           </a:lstStyle>
           <a:p>
-            <a:pPr indent="0" lvl="0" marL="0" rtl="0" algn="r">
+            <a:pPr marL="0" lvl="0" indent="0" algn="r" rtl="0">
               <a:spcBef>
                 <a:spcPts val="0"/>
               </a:spcBef>
@@ -1530,11 +1568,11 @@
 </file>
 
 <file path=ppt/slideLayouts/slideLayout11.xml><?xml version="1.0" encoding="utf-8"?>
-<p:sldLayout xmlns:a="http://schemas.openxmlformats.org/drawingml/2006/main" xmlns:r="http://schemas.openxmlformats.org/officeDocument/2006/relationships" xmlns:mc="http://schemas.openxmlformats.org/markup-compatibility/2006" xmlns:mv="urn:schemas-microsoft-com:mac:vml" xmlns:p="http://schemas.openxmlformats.org/presentationml/2006/main" xmlns:c="http://schemas.openxmlformats.org/drawingml/2006/chart" xmlns:dgm="http://schemas.openxmlformats.org/drawingml/2006/diagram" xmlns:o="urn:schemas-microsoft-com:office:office" xmlns:v="urn:schemas-microsoft-com:vml" xmlns:pvml="urn:schemas-microsoft-com:office:powerpoint" xmlns:com="http://schemas.openxmlformats.org/drawingml/2006/compatibility" xmlns:p14="http://schemas.microsoft.com/office/powerpoint/2010/main" xmlns:p15="http://schemas.microsoft.com/office/powerpoint/2012/main" xmlns:ahyp="http://schemas.microsoft.com/office/drawing/2018/hyperlinkcolor" matchingName="Blank" type="blank">
+<p:sldLayout xmlns:a="http://schemas.openxmlformats.org/drawingml/2006/main" xmlns:r="http://schemas.openxmlformats.org/officeDocument/2006/relationships" xmlns:p="http://schemas.openxmlformats.org/presentationml/2006/main" matchingName="Blank" type="blank">
   <p:cSld name="BLANK">
     <p:spTree>
       <p:nvGrpSpPr>
-        <p:cNvPr id="48" name="Shape 48"/>
+        <p:cNvPr id="1" name="Shape 48"/>
         <p:cNvGrpSpPr/>
         <p:nvPr/>
       </p:nvGrpSpPr>
@@ -1549,9 +1587,11 @@
       <p:sp>
         <p:nvSpPr>
           <p:cNvPr id="49" name="Google Shape;49;p12"/>
-          <p:cNvSpPr txBox="1"/>
+          <p:cNvSpPr txBox="1">
+            <a:spLocks noGrp="1"/>
+          </p:cNvSpPr>
           <p:nvPr>
-            <p:ph idx="12" type="sldNum"/>
+            <p:ph type="sldNum" idx="12"/>
           </p:nvPr>
         </p:nvSpPr>
         <p:spPr>
@@ -1564,7 +1604,7 @@
           </a:prstGeom>
         </p:spPr>
         <p:txBody>
-          <a:bodyPr anchorCtr="0" anchor="ctr" bIns="91425" lIns="91425" spcFirstLastPara="1" rIns="91425" wrap="square" tIns="91425">
+          <a:bodyPr spcFirstLastPara="1" wrap="square" lIns="91425" tIns="91425" rIns="91425" bIns="91425" anchor="ctr" anchorCtr="0">
             <a:normAutofit/>
           </a:bodyPr>
           <a:lstStyle>
@@ -1606,7 +1646,7 @@
             </a:lvl9pPr>
           </a:lstStyle>
           <a:p>
-            <a:pPr indent="0" lvl="0" marL="0" rtl="0" algn="r">
+            <a:pPr marL="0" lvl="0" indent="0" algn="r" rtl="0">
               <a:spcBef>
                 <a:spcPts val="0"/>
               </a:spcBef>
@@ -1632,11 +1672,11 @@
 </file>
 
 <file path=ppt/slideLayouts/slideLayout2.xml><?xml version="1.0" encoding="utf-8"?>
-<p:sldLayout xmlns:a="http://schemas.openxmlformats.org/drawingml/2006/main" xmlns:r="http://schemas.openxmlformats.org/officeDocument/2006/relationships" xmlns:mc="http://schemas.openxmlformats.org/markup-compatibility/2006" xmlns:mv="urn:schemas-microsoft-com:mac:vml" xmlns:p="http://schemas.openxmlformats.org/presentationml/2006/main" xmlns:c="http://schemas.openxmlformats.org/drawingml/2006/chart" xmlns:dgm="http://schemas.openxmlformats.org/drawingml/2006/diagram" xmlns:o="urn:schemas-microsoft-com:office:office" xmlns:v="urn:schemas-microsoft-com:vml" xmlns:pvml="urn:schemas-microsoft-com:office:powerpoint" xmlns:com="http://schemas.openxmlformats.org/drawingml/2006/compatibility" xmlns:p14="http://schemas.microsoft.com/office/powerpoint/2010/main" xmlns:p15="http://schemas.microsoft.com/office/powerpoint/2012/main" xmlns:ahyp="http://schemas.microsoft.com/office/drawing/2018/hyperlinkcolor" matchingName="Section header" type="secHead">
+<p:sldLayout xmlns:a="http://schemas.openxmlformats.org/drawingml/2006/main" xmlns:r="http://schemas.openxmlformats.org/officeDocument/2006/relationships" xmlns:p="http://schemas.openxmlformats.org/presentationml/2006/main" matchingName="Section header" type="secHead">
   <p:cSld name="SECTION_HEADER">
     <p:spTree>
       <p:nvGrpSpPr>
-        <p:cNvPr id="13" name="Shape 13"/>
+        <p:cNvPr id="1" name="Shape 13"/>
         <p:cNvGrpSpPr/>
         <p:nvPr/>
       </p:nvGrpSpPr>
@@ -1651,7 +1691,9 @@
       <p:sp>
         <p:nvSpPr>
           <p:cNvPr id="14" name="Google Shape;14;p3"/>
-          <p:cNvSpPr txBox="1"/>
+          <p:cNvSpPr txBox="1">
+            <a:spLocks noGrp="1"/>
+          </p:cNvSpPr>
           <p:nvPr>
             <p:ph type="title"/>
           </p:nvPr>
@@ -1666,7 +1708,7 @@
           </a:prstGeom>
         </p:spPr>
         <p:txBody>
-          <a:bodyPr anchorCtr="0" anchor="ctr" bIns="91425" lIns="91425" spcFirstLastPara="1" rIns="91425" wrap="square" tIns="91425">
+          <a:bodyPr spcFirstLastPara="1" wrap="square" lIns="91425" tIns="91425" rIns="91425" bIns="91425" anchor="ctr" anchorCtr="0">
             <a:normAutofit/>
           </a:bodyPr>
           <a:lstStyle>
@@ -1770,15 +1812,19 @@
               <a:defRPr sz="3600"/>
             </a:lvl9pPr>
           </a:lstStyle>
-          <a:p/>
+          <a:p>
+            <a:endParaRPr/>
+          </a:p>
         </p:txBody>
       </p:sp>
       <p:sp>
         <p:nvSpPr>
           <p:cNvPr id="15" name="Google Shape;15;p3"/>
-          <p:cNvSpPr txBox="1"/>
+          <p:cNvSpPr txBox="1">
+            <a:spLocks noGrp="1"/>
+          </p:cNvSpPr>
           <p:nvPr>
-            <p:ph idx="12" type="sldNum"/>
+            <p:ph type="sldNum" idx="12"/>
           </p:nvPr>
         </p:nvSpPr>
         <p:spPr>
@@ -1791,7 +1837,7 @@
           </a:prstGeom>
         </p:spPr>
         <p:txBody>
-          <a:bodyPr anchorCtr="0" anchor="ctr" bIns="91425" lIns="91425" spcFirstLastPara="1" rIns="91425" wrap="square" tIns="91425">
+          <a:bodyPr spcFirstLastPara="1" wrap="square" lIns="91425" tIns="91425" rIns="91425" bIns="91425" anchor="ctr" anchorCtr="0">
             <a:normAutofit/>
           </a:bodyPr>
           <a:lstStyle>
@@ -1833,7 +1879,7 @@
             </a:lvl9pPr>
           </a:lstStyle>
           <a:p>
-            <a:pPr indent="0" lvl="0" marL="0" rtl="0" algn="r">
+            <a:pPr marL="0" lvl="0" indent="0" algn="r" rtl="0">
               <a:spcBef>
                 <a:spcPts val="0"/>
               </a:spcBef>
@@ -1859,11 +1905,11 @@
 </file>
 
 <file path=ppt/slideLayouts/slideLayout3.xml><?xml version="1.0" encoding="utf-8"?>
-<p:sldLayout xmlns:a="http://schemas.openxmlformats.org/drawingml/2006/main" xmlns:r="http://schemas.openxmlformats.org/officeDocument/2006/relationships" xmlns:mc="http://schemas.openxmlformats.org/markup-compatibility/2006" xmlns:mv="urn:schemas-microsoft-com:mac:vml" xmlns:p="http://schemas.openxmlformats.org/presentationml/2006/main" xmlns:c="http://schemas.openxmlformats.org/drawingml/2006/chart" xmlns:dgm="http://schemas.openxmlformats.org/drawingml/2006/diagram" xmlns:o="urn:schemas-microsoft-com:office:office" xmlns:v="urn:schemas-microsoft-com:vml" xmlns:pvml="urn:schemas-microsoft-com:office:powerpoint" xmlns:com="http://schemas.openxmlformats.org/drawingml/2006/compatibility" xmlns:p14="http://schemas.microsoft.com/office/powerpoint/2010/main" xmlns:p15="http://schemas.microsoft.com/office/powerpoint/2012/main" xmlns:ahyp="http://schemas.microsoft.com/office/drawing/2018/hyperlinkcolor" matchingName="Title and body" type="tx">
+<p:sldLayout xmlns:a="http://schemas.openxmlformats.org/drawingml/2006/main" xmlns:r="http://schemas.openxmlformats.org/officeDocument/2006/relationships" xmlns:p="http://schemas.openxmlformats.org/presentationml/2006/main" matchingName="Title and body" type="tx">
   <p:cSld name="TITLE_AND_BODY">
     <p:spTree>
       <p:nvGrpSpPr>
-        <p:cNvPr id="16" name="Shape 16"/>
+        <p:cNvPr id="1" name="Shape 16"/>
         <p:cNvGrpSpPr/>
         <p:nvPr/>
       </p:nvGrpSpPr>
@@ -1878,7 +1924,9 @@
       <p:sp>
         <p:nvSpPr>
           <p:cNvPr id="17" name="Google Shape;17;p4"/>
-          <p:cNvSpPr txBox="1"/>
+          <p:cNvSpPr txBox="1">
+            <a:spLocks noGrp="1"/>
+          </p:cNvSpPr>
           <p:nvPr>
             <p:ph type="title"/>
           </p:nvPr>
@@ -1893,7 +1941,7 @@
           </a:prstGeom>
         </p:spPr>
         <p:txBody>
-          <a:bodyPr anchorCtr="0" anchor="t" bIns="91425" lIns="91425" spcFirstLastPara="1" rIns="91425" wrap="square" tIns="91425">
+          <a:bodyPr spcFirstLastPara="1" wrap="square" lIns="91425" tIns="91425" rIns="91425" bIns="91425" anchor="t" anchorCtr="0">
             <a:normAutofit/>
           </a:bodyPr>
           <a:lstStyle>
@@ -1997,15 +2045,19 @@
               <a:defRPr/>
             </a:lvl9pPr>
           </a:lstStyle>
-          <a:p/>
+          <a:p>
+            <a:endParaRPr/>
+          </a:p>
         </p:txBody>
       </p:sp>
       <p:sp>
         <p:nvSpPr>
           <p:cNvPr id="18" name="Google Shape;18;p4"/>
-          <p:cNvSpPr txBox="1"/>
+          <p:cNvSpPr txBox="1">
+            <a:spLocks noGrp="1"/>
+          </p:cNvSpPr>
           <p:nvPr>
-            <p:ph idx="1" type="body"/>
+            <p:ph type="body" idx="1"/>
           </p:nvPr>
         </p:nvSpPr>
         <p:spPr>
@@ -2018,11 +2070,11 @@
           </a:prstGeom>
         </p:spPr>
         <p:txBody>
-          <a:bodyPr anchorCtr="0" anchor="t" bIns="91425" lIns="91425" spcFirstLastPara="1" rIns="91425" wrap="square" tIns="91425">
+          <a:bodyPr spcFirstLastPara="1" wrap="square" lIns="91425" tIns="91425" rIns="91425" bIns="91425" anchor="t" anchorCtr="0">
             <a:normAutofit/>
           </a:bodyPr>
           <a:lstStyle>
-            <a:lvl1pPr indent="-342900" lvl="0" marL="457200">
+            <a:lvl1pPr marL="457200" lvl="0" indent="-342900">
               <a:spcBef>
                 <a:spcPts val="0"/>
               </a:spcBef>
@@ -2033,7 +2085,7 @@
               <a:buChar char="●"/>
               <a:defRPr/>
             </a:lvl1pPr>
-            <a:lvl2pPr indent="-317500" lvl="1" marL="914400">
+            <a:lvl2pPr marL="914400" lvl="1" indent="-317500">
               <a:spcBef>
                 <a:spcPts val="0"/>
               </a:spcBef>
@@ -2044,7 +2096,7 @@
               <a:buChar char="○"/>
               <a:defRPr/>
             </a:lvl2pPr>
-            <a:lvl3pPr indent="-317500" lvl="2" marL="1371600">
+            <a:lvl3pPr marL="1371600" lvl="2" indent="-317500">
               <a:spcBef>
                 <a:spcPts val="0"/>
               </a:spcBef>
@@ -2055,7 +2107,7 @@
               <a:buChar char="■"/>
               <a:defRPr/>
             </a:lvl3pPr>
-            <a:lvl4pPr indent="-317500" lvl="3" marL="1828800">
+            <a:lvl4pPr marL="1828800" lvl="3" indent="-317500">
               <a:spcBef>
                 <a:spcPts val="0"/>
               </a:spcBef>
@@ -2066,7 +2118,7 @@
               <a:buChar char="●"/>
               <a:defRPr/>
             </a:lvl4pPr>
-            <a:lvl5pPr indent="-317500" lvl="4" marL="2286000">
+            <a:lvl5pPr marL="2286000" lvl="4" indent="-317500">
               <a:spcBef>
                 <a:spcPts val="0"/>
               </a:spcBef>
@@ -2077,7 +2129,7 @@
               <a:buChar char="○"/>
               <a:defRPr/>
             </a:lvl5pPr>
-            <a:lvl6pPr indent="-317500" lvl="5" marL="2743200">
+            <a:lvl6pPr marL="2743200" lvl="5" indent="-317500">
               <a:spcBef>
                 <a:spcPts val="0"/>
               </a:spcBef>
@@ -2088,7 +2140,7 @@
               <a:buChar char="■"/>
               <a:defRPr/>
             </a:lvl6pPr>
-            <a:lvl7pPr indent="-317500" lvl="6" marL="3200400">
+            <a:lvl7pPr marL="3200400" lvl="6" indent="-317500">
               <a:spcBef>
                 <a:spcPts val="0"/>
               </a:spcBef>
@@ -2099,7 +2151,7 @@
               <a:buChar char="●"/>
               <a:defRPr/>
             </a:lvl7pPr>
-            <a:lvl8pPr indent="-317500" lvl="7" marL="3657600">
+            <a:lvl8pPr marL="3657600" lvl="7" indent="-317500">
               <a:spcBef>
                 <a:spcPts val="0"/>
               </a:spcBef>
@@ -2110,7 +2162,7 @@
               <a:buChar char="○"/>
               <a:defRPr/>
             </a:lvl8pPr>
-            <a:lvl9pPr indent="-317500" lvl="8" marL="4114800">
+            <a:lvl9pPr marL="4114800" lvl="8" indent="-317500">
               <a:spcBef>
                 <a:spcPts val="0"/>
               </a:spcBef>
@@ -2122,15 +2174,19 @@
               <a:defRPr/>
             </a:lvl9pPr>
           </a:lstStyle>
-          <a:p/>
+          <a:p>
+            <a:endParaRPr/>
+          </a:p>
         </p:txBody>
       </p:sp>
       <p:sp>
         <p:nvSpPr>
           <p:cNvPr id="19" name="Google Shape;19;p4"/>
-          <p:cNvSpPr txBox="1"/>
+          <p:cNvSpPr txBox="1">
+            <a:spLocks noGrp="1"/>
+          </p:cNvSpPr>
           <p:nvPr>
-            <p:ph idx="12" type="sldNum"/>
+            <p:ph type="sldNum" idx="12"/>
           </p:nvPr>
         </p:nvSpPr>
         <p:spPr>
@@ -2143,7 +2199,7 @@
           </a:prstGeom>
         </p:spPr>
         <p:txBody>
-          <a:bodyPr anchorCtr="0" anchor="ctr" bIns="91425" lIns="91425" spcFirstLastPara="1" rIns="91425" wrap="square" tIns="91425">
+          <a:bodyPr spcFirstLastPara="1" wrap="square" lIns="91425" tIns="91425" rIns="91425" bIns="91425" anchor="ctr" anchorCtr="0">
             <a:normAutofit/>
           </a:bodyPr>
           <a:lstStyle>
@@ -2185,7 +2241,7 @@
             </a:lvl9pPr>
           </a:lstStyle>
           <a:p>
-            <a:pPr indent="0" lvl="0" marL="0" rtl="0" algn="r">
+            <a:pPr marL="0" lvl="0" indent="0" algn="r" rtl="0">
               <a:spcBef>
                 <a:spcPts val="0"/>
               </a:spcBef>
@@ -2211,11 +2267,11 @@
 </file>
 
 <file path=ppt/slideLayouts/slideLayout4.xml><?xml version="1.0" encoding="utf-8"?>
-<p:sldLayout xmlns:a="http://schemas.openxmlformats.org/drawingml/2006/main" xmlns:r="http://schemas.openxmlformats.org/officeDocument/2006/relationships" xmlns:mc="http://schemas.openxmlformats.org/markup-compatibility/2006" xmlns:mv="urn:schemas-microsoft-com:mac:vml" xmlns:p="http://schemas.openxmlformats.org/presentationml/2006/main" xmlns:c="http://schemas.openxmlformats.org/drawingml/2006/chart" xmlns:dgm="http://schemas.openxmlformats.org/drawingml/2006/diagram" xmlns:o="urn:schemas-microsoft-com:office:office" xmlns:v="urn:schemas-microsoft-com:vml" xmlns:pvml="urn:schemas-microsoft-com:office:powerpoint" xmlns:com="http://schemas.openxmlformats.org/drawingml/2006/compatibility" xmlns:p14="http://schemas.microsoft.com/office/powerpoint/2010/main" xmlns:p15="http://schemas.microsoft.com/office/powerpoint/2012/main" xmlns:ahyp="http://schemas.microsoft.com/office/drawing/2018/hyperlinkcolor" matchingName="Title and two columns" type="twoColTx">
+<p:sldLayout xmlns:a="http://schemas.openxmlformats.org/drawingml/2006/main" xmlns:r="http://schemas.openxmlformats.org/officeDocument/2006/relationships" xmlns:p="http://schemas.openxmlformats.org/presentationml/2006/main" matchingName="Title and two columns" type="twoColTx">
   <p:cSld name="TITLE_AND_TWO_COLUMNS">
     <p:spTree>
       <p:nvGrpSpPr>
-        <p:cNvPr id="20" name="Shape 20"/>
+        <p:cNvPr id="1" name="Shape 20"/>
         <p:cNvGrpSpPr/>
         <p:nvPr/>
       </p:nvGrpSpPr>
@@ -2230,7 +2286,9 @@
       <p:sp>
         <p:nvSpPr>
           <p:cNvPr id="21" name="Google Shape;21;p5"/>
-          <p:cNvSpPr txBox="1"/>
+          <p:cNvSpPr txBox="1">
+            <a:spLocks noGrp="1"/>
+          </p:cNvSpPr>
           <p:nvPr>
             <p:ph type="title"/>
           </p:nvPr>
@@ -2245,7 +2303,7 @@
           </a:prstGeom>
         </p:spPr>
         <p:txBody>
-          <a:bodyPr anchorCtr="0" anchor="t" bIns="91425" lIns="91425" spcFirstLastPara="1" rIns="91425" wrap="square" tIns="91425">
+          <a:bodyPr spcFirstLastPara="1" wrap="square" lIns="91425" tIns="91425" rIns="91425" bIns="91425" anchor="t" anchorCtr="0">
             <a:normAutofit/>
           </a:bodyPr>
           <a:lstStyle>
@@ -2349,15 +2407,19 @@
               <a:defRPr/>
             </a:lvl9pPr>
           </a:lstStyle>
-          <a:p/>
+          <a:p>
+            <a:endParaRPr/>
+          </a:p>
         </p:txBody>
       </p:sp>
       <p:sp>
         <p:nvSpPr>
           <p:cNvPr id="22" name="Google Shape;22;p5"/>
-          <p:cNvSpPr txBox="1"/>
+          <p:cNvSpPr txBox="1">
+            <a:spLocks noGrp="1"/>
+          </p:cNvSpPr>
           <p:nvPr>
-            <p:ph idx="1" type="body"/>
+            <p:ph type="body" idx="1"/>
           </p:nvPr>
         </p:nvSpPr>
         <p:spPr>
@@ -2370,11 +2432,11 @@
           </a:prstGeom>
         </p:spPr>
         <p:txBody>
-          <a:bodyPr anchorCtr="0" anchor="t" bIns="91425" lIns="91425" spcFirstLastPara="1" rIns="91425" wrap="square" tIns="91425">
+          <a:bodyPr spcFirstLastPara="1" wrap="square" lIns="91425" tIns="91425" rIns="91425" bIns="91425" anchor="t" anchorCtr="0">
             <a:normAutofit/>
           </a:bodyPr>
           <a:lstStyle>
-            <a:lvl1pPr indent="-317500" lvl="0" marL="457200">
+            <a:lvl1pPr marL="457200" lvl="0" indent="-317500">
               <a:spcBef>
                 <a:spcPts val="0"/>
               </a:spcBef>
@@ -2385,7 +2447,7 @@
               <a:buChar char="●"/>
               <a:defRPr sz="1400"/>
             </a:lvl1pPr>
-            <a:lvl2pPr indent="-304800" lvl="1" marL="914400">
+            <a:lvl2pPr marL="914400" lvl="1" indent="-304800">
               <a:spcBef>
                 <a:spcPts val="0"/>
               </a:spcBef>
@@ -2396,7 +2458,7 @@
               <a:buChar char="○"/>
               <a:defRPr sz="1200"/>
             </a:lvl2pPr>
-            <a:lvl3pPr indent="-304800" lvl="2" marL="1371600">
+            <a:lvl3pPr marL="1371600" lvl="2" indent="-304800">
               <a:spcBef>
                 <a:spcPts val="0"/>
               </a:spcBef>
@@ -2407,7 +2469,7 @@
               <a:buChar char="■"/>
               <a:defRPr sz="1200"/>
             </a:lvl3pPr>
-            <a:lvl4pPr indent="-304800" lvl="3" marL="1828800">
+            <a:lvl4pPr marL="1828800" lvl="3" indent="-304800">
               <a:spcBef>
                 <a:spcPts val="0"/>
               </a:spcBef>
@@ -2418,7 +2480,7 @@
               <a:buChar char="●"/>
               <a:defRPr sz="1200"/>
             </a:lvl4pPr>
-            <a:lvl5pPr indent="-304800" lvl="4" marL="2286000">
+            <a:lvl5pPr marL="2286000" lvl="4" indent="-304800">
               <a:spcBef>
                 <a:spcPts val="0"/>
               </a:spcBef>
@@ -2429,7 +2491,7 @@
               <a:buChar char="○"/>
               <a:defRPr sz="1200"/>
             </a:lvl5pPr>
-            <a:lvl6pPr indent="-304800" lvl="5" marL="2743200">
+            <a:lvl6pPr marL="2743200" lvl="5" indent="-304800">
               <a:spcBef>
                 <a:spcPts val="0"/>
               </a:spcBef>
@@ -2440,7 +2502,7 @@
               <a:buChar char="■"/>
               <a:defRPr sz="1200"/>
             </a:lvl6pPr>
-            <a:lvl7pPr indent="-304800" lvl="6" marL="3200400">
+            <a:lvl7pPr marL="3200400" lvl="6" indent="-304800">
               <a:spcBef>
                 <a:spcPts val="0"/>
               </a:spcBef>
@@ -2451,7 +2513,7 @@
               <a:buChar char="●"/>
               <a:defRPr sz="1200"/>
             </a:lvl7pPr>
-            <a:lvl8pPr indent="-304800" lvl="7" marL="3657600">
+            <a:lvl8pPr marL="3657600" lvl="7" indent="-304800">
               <a:spcBef>
                 <a:spcPts val="0"/>
               </a:spcBef>
@@ -2462,7 +2524,7 @@
               <a:buChar char="○"/>
               <a:defRPr sz="1200"/>
             </a:lvl8pPr>
-            <a:lvl9pPr indent="-304800" lvl="8" marL="4114800">
+            <a:lvl9pPr marL="4114800" lvl="8" indent="-304800">
               <a:spcBef>
                 <a:spcPts val="0"/>
               </a:spcBef>
@@ -2474,15 +2536,19 @@
               <a:defRPr sz="1200"/>
             </a:lvl9pPr>
           </a:lstStyle>
-          <a:p/>
+          <a:p>
+            <a:endParaRPr/>
+          </a:p>
         </p:txBody>
       </p:sp>
       <p:sp>
         <p:nvSpPr>
           <p:cNvPr id="23" name="Google Shape;23;p5"/>
-          <p:cNvSpPr txBox="1"/>
+          <p:cNvSpPr txBox="1">
+            <a:spLocks noGrp="1"/>
+          </p:cNvSpPr>
           <p:nvPr>
-            <p:ph idx="2" type="body"/>
+            <p:ph type="body" idx="2"/>
           </p:nvPr>
         </p:nvSpPr>
         <p:spPr>
@@ -2495,11 +2561,11 @@
           </a:prstGeom>
         </p:spPr>
         <p:txBody>
-          <a:bodyPr anchorCtr="0" anchor="t" bIns="91425" lIns="91425" spcFirstLastPara="1" rIns="91425" wrap="square" tIns="91425">
+          <a:bodyPr spcFirstLastPara="1" wrap="square" lIns="91425" tIns="91425" rIns="91425" bIns="91425" anchor="t" anchorCtr="0">
             <a:normAutofit/>
           </a:bodyPr>
           <a:lstStyle>
-            <a:lvl1pPr indent="-317500" lvl="0" marL="457200">
+            <a:lvl1pPr marL="457200" lvl="0" indent="-317500">
               <a:spcBef>
                 <a:spcPts val="0"/>
               </a:spcBef>
@@ -2510,7 +2576,7 @@
               <a:buChar char="●"/>
               <a:defRPr sz="1400"/>
             </a:lvl1pPr>
-            <a:lvl2pPr indent="-304800" lvl="1" marL="914400">
+            <a:lvl2pPr marL="914400" lvl="1" indent="-304800">
               <a:spcBef>
                 <a:spcPts val="0"/>
               </a:spcBef>
@@ -2521,7 +2587,7 @@
               <a:buChar char="○"/>
               <a:defRPr sz="1200"/>
             </a:lvl2pPr>
-            <a:lvl3pPr indent="-304800" lvl="2" marL="1371600">
+            <a:lvl3pPr marL="1371600" lvl="2" indent="-304800">
               <a:spcBef>
                 <a:spcPts val="0"/>
               </a:spcBef>
@@ -2532,7 +2598,7 @@
               <a:buChar char="■"/>
               <a:defRPr sz="1200"/>
             </a:lvl3pPr>
-            <a:lvl4pPr indent="-304800" lvl="3" marL="1828800">
+            <a:lvl4pPr marL="1828800" lvl="3" indent="-304800">
               <a:spcBef>
                 <a:spcPts val="0"/>
               </a:spcBef>
@@ -2543,7 +2609,7 @@
               <a:buChar char="●"/>
               <a:defRPr sz="1200"/>
             </a:lvl4pPr>
-            <a:lvl5pPr indent="-304800" lvl="4" marL="2286000">
+            <a:lvl5pPr marL="2286000" lvl="4" indent="-304800">
               <a:spcBef>
                 <a:spcPts val="0"/>
               </a:spcBef>
@@ -2554,7 +2620,7 @@
               <a:buChar char="○"/>
               <a:defRPr sz="1200"/>
             </a:lvl5pPr>
-            <a:lvl6pPr indent="-304800" lvl="5" marL="2743200">
+            <a:lvl6pPr marL="2743200" lvl="5" indent="-304800">
               <a:spcBef>
                 <a:spcPts val="0"/>
               </a:spcBef>
@@ -2565,7 +2631,7 @@
               <a:buChar char="■"/>
               <a:defRPr sz="1200"/>
             </a:lvl6pPr>
-            <a:lvl7pPr indent="-304800" lvl="6" marL="3200400">
+            <a:lvl7pPr marL="3200400" lvl="6" indent="-304800">
               <a:spcBef>
                 <a:spcPts val="0"/>
               </a:spcBef>
@@ -2576,7 +2642,7 @@
               <a:buChar char="●"/>
               <a:defRPr sz="1200"/>
             </a:lvl7pPr>
-            <a:lvl8pPr indent="-304800" lvl="7" marL="3657600">
+            <a:lvl8pPr marL="3657600" lvl="7" indent="-304800">
               <a:spcBef>
                 <a:spcPts val="0"/>
               </a:spcBef>
@@ -2587,7 +2653,7 @@
               <a:buChar char="○"/>
               <a:defRPr sz="1200"/>
             </a:lvl8pPr>
-            <a:lvl9pPr indent="-304800" lvl="8" marL="4114800">
+            <a:lvl9pPr marL="4114800" lvl="8" indent="-304800">
               <a:spcBef>
                 <a:spcPts val="0"/>
               </a:spcBef>
@@ -2599,15 +2665,19 @@
               <a:defRPr sz="1200"/>
             </a:lvl9pPr>
           </a:lstStyle>
-          <a:p/>
+          <a:p>
+            <a:endParaRPr/>
+          </a:p>
         </p:txBody>
       </p:sp>
       <p:sp>
         <p:nvSpPr>
           <p:cNvPr id="24" name="Google Shape;24;p5"/>
-          <p:cNvSpPr txBox="1"/>
+          <p:cNvSpPr txBox="1">
+            <a:spLocks noGrp="1"/>
+          </p:cNvSpPr>
           <p:nvPr>
-            <p:ph idx="12" type="sldNum"/>
+            <p:ph type="sldNum" idx="12"/>
           </p:nvPr>
         </p:nvSpPr>
         <p:spPr>
@@ -2620,7 +2690,7 @@
           </a:prstGeom>
         </p:spPr>
         <p:txBody>
-          <a:bodyPr anchorCtr="0" anchor="ctr" bIns="91425" lIns="91425" spcFirstLastPara="1" rIns="91425" wrap="square" tIns="91425">
+          <a:bodyPr spcFirstLastPara="1" wrap="square" lIns="91425" tIns="91425" rIns="91425" bIns="91425" anchor="ctr" anchorCtr="0">
             <a:normAutofit/>
           </a:bodyPr>
           <a:lstStyle>
@@ -2662,7 +2732,7 @@
             </a:lvl9pPr>
           </a:lstStyle>
           <a:p>
-            <a:pPr indent="0" lvl="0" marL="0" rtl="0" algn="r">
+            <a:pPr marL="0" lvl="0" indent="0" algn="r" rtl="0">
               <a:spcBef>
                 <a:spcPts val="0"/>
               </a:spcBef>
@@ -2688,11 +2758,11 @@
 </file>
 
 <file path=ppt/slideLayouts/slideLayout5.xml><?xml version="1.0" encoding="utf-8"?>
-<p:sldLayout xmlns:a="http://schemas.openxmlformats.org/drawingml/2006/main" xmlns:r="http://schemas.openxmlformats.org/officeDocument/2006/relationships" xmlns:mc="http://schemas.openxmlformats.org/markup-compatibility/2006" xmlns:mv="urn:schemas-microsoft-com:mac:vml" xmlns:p="http://schemas.openxmlformats.org/presentationml/2006/main" xmlns:c="http://schemas.openxmlformats.org/drawingml/2006/chart" xmlns:dgm="http://schemas.openxmlformats.org/drawingml/2006/diagram" xmlns:o="urn:schemas-microsoft-com:office:office" xmlns:v="urn:schemas-microsoft-com:vml" xmlns:pvml="urn:schemas-microsoft-com:office:powerpoint" xmlns:com="http://schemas.openxmlformats.org/drawingml/2006/compatibility" xmlns:p14="http://schemas.microsoft.com/office/powerpoint/2010/main" xmlns:p15="http://schemas.microsoft.com/office/powerpoint/2012/main" xmlns:ahyp="http://schemas.microsoft.com/office/drawing/2018/hyperlinkcolor" matchingName="Title only" type="titleOnly">
+<p:sldLayout xmlns:a="http://schemas.openxmlformats.org/drawingml/2006/main" xmlns:r="http://schemas.openxmlformats.org/officeDocument/2006/relationships" xmlns:p="http://schemas.openxmlformats.org/presentationml/2006/main" matchingName="Title only" type="titleOnly">
   <p:cSld name="TITLE_ONLY">
     <p:spTree>
       <p:nvGrpSpPr>
-        <p:cNvPr id="25" name="Shape 25"/>
+        <p:cNvPr id="1" name="Shape 25"/>
         <p:cNvGrpSpPr/>
         <p:nvPr/>
       </p:nvGrpSpPr>
@@ -2707,7 +2777,9 @@
       <p:sp>
         <p:nvSpPr>
           <p:cNvPr id="26" name="Google Shape;26;p6"/>
-          <p:cNvSpPr txBox="1"/>
+          <p:cNvSpPr txBox="1">
+            <a:spLocks noGrp="1"/>
+          </p:cNvSpPr>
           <p:nvPr>
             <p:ph type="title"/>
           </p:nvPr>
@@ -2722,7 +2794,7 @@
           </a:prstGeom>
         </p:spPr>
         <p:txBody>
-          <a:bodyPr anchorCtr="0" anchor="t" bIns="91425" lIns="91425" spcFirstLastPara="1" rIns="91425" wrap="square" tIns="91425">
+          <a:bodyPr spcFirstLastPara="1" wrap="square" lIns="91425" tIns="91425" rIns="91425" bIns="91425" anchor="t" anchorCtr="0">
             <a:normAutofit/>
           </a:bodyPr>
           <a:lstStyle>
@@ -2826,15 +2898,19 @@
               <a:defRPr/>
             </a:lvl9pPr>
           </a:lstStyle>
-          <a:p/>
+          <a:p>
+            <a:endParaRPr/>
+          </a:p>
         </p:txBody>
       </p:sp>
       <p:sp>
         <p:nvSpPr>
           <p:cNvPr id="27" name="Google Shape;27;p6"/>
-          <p:cNvSpPr txBox="1"/>
+          <p:cNvSpPr txBox="1">
+            <a:spLocks noGrp="1"/>
+          </p:cNvSpPr>
           <p:nvPr>
-            <p:ph idx="12" type="sldNum"/>
+            <p:ph type="sldNum" idx="12"/>
           </p:nvPr>
         </p:nvSpPr>
         <p:spPr>
@@ -2847,7 +2923,7 @@
           </a:prstGeom>
         </p:spPr>
         <p:txBody>
-          <a:bodyPr anchorCtr="0" anchor="ctr" bIns="91425" lIns="91425" spcFirstLastPara="1" rIns="91425" wrap="square" tIns="91425">
+          <a:bodyPr spcFirstLastPara="1" wrap="square" lIns="91425" tIns="91425" rIns="91425" bIns="91425" anchor="ctr" anchorCtr="0">
             <a:normAutofit/>
           </a:bodyPr>
           <a:lstStyle>
@@ -2889,7 +2965,7 @@
             </a:lvl9pPr>
           </a:lstStyle>
           <a:p>
-            <a:pPr indent="0" lvl="0" marL="0" rtl="0" algn="r">
+            <a:pPr marL="0" lvl="0" indent="0" algn="r" rtl="0">
               <a:spcBef>
                 <a:spcPts val="0"/>
               </a:spcBef>
@@ -2915,11 +2991,11 @@
 </file>
 
 <file path=ppt/slideLayouts/slideLayout6.xml><?xml version="1.0" encoding="utf-8"?>
-<p:sldLayout xmlns:a="http://schemas.openxmlformats.org/drawingml/2006/main" xmlns:r="http://schemas.openxmlformats.org/officeDocument/2006/relationships" xmlns:mc="http://schemas.openxmlformats.org/markup-compatibility/2006" xmlns:mv="urn:schemas-microsoft-com:mac:vml" xmlns:p="http://schemas.openxmlformats.org/presentationml/2006/main" xmlns:c="http://schemas.openxmlformats.org/drawingml/2006/chart" xmlns:dgm="http://schemas.openxmlformats.org/drawingml/2006/diagram" xmlns:o="urn:schemas-microsoft-com:office:office" xmlns:v="urn:schemas-microsoft-com:vml" xmlns:pvml="urn:schemas-microsoft-com:office:powerpoint" xmlns:com="http://schemas.openxmlformats.org/drawingml/2006/compatibility" xmlns:p14="http://schemas.microsoft.com/office/powerpoint/2010/main" xmlns:p15="http://schemas.microsoft.com/office/powerpoint/2012/main" xmlns:ahyp="http://schemas.microsoft.com/office/drawing/2018/hyperlinkcolor" matchingName="One column text">
+<p:sldLayout xmlns:a="http://schemas.openxmlformats.org/drawingml/2006/main" xmlns:r="http://schemas.openxmlformats.org/officeDocument/2006/relationships" xmlns:p="http://schemas.openxmlformats.org/presentationml/2006/main" matchingName="One column text">
   <p:cSld name="ONE_COLUMN_TEXT">
     <p:spTree>
       <p:nvGrpSpPr>
-        <p:cNvPr id="28" name="Shape 28"/>
+        <p:cNvPr id="1" name="Shape 28"/>
         <p:cNvGrpSpPr/>
         <p:nvPr/>
       </p:nvGrpSpPr>
@@ -2934,7 +3010,9 @@
       <p:sp>
         <p:nvSpPr>
           <p:cNvPr id="29" name="Google Shape;29;p7"/>
-          <p:cNvSpPr txBox="1"/>
+          <p:cNvSpPr txBox="1">
+            <a:spLocks noGrp="1"/>
+          </p:cNvSpPr>
           <p:nvPr>
             <p:ph type="title"/>
           </p:nvPr>
@@ -2949,7 +3027,7 @@
           </a:prstGeom>
         </p:spPr>
         <p:txBody>
-          <a:bodyPr anchorCtr="0" anchor="b" bIns="91425" lIns="91425" spcFirstLastPara="1" rIns="91425" wrap="square" tIns="91425">
+          <a:bodyPr spcFirstLastPara="1" wrap="square" lIns="91425" tIns="91425" rIns="91425" bIns="91425" anchor="b" anchorCtr="0">
             <a:normAutofit/>
           </a:bodyPr>
           <a:lstStyle>
@@ -3053,15 +3131,19 @@
               <a:defRPr sz="2400"/>
             </a:lvl9pPr>
           </a:lstStyle>
-          <a:p/>
+          <a:p>
+            <a:endParaRPr/>
+          </a:p>
         </p:txBody>
       </p:sp>
       <p:sp>
         <p:nvSpPr>
           <p:cNvPr id="30" name="Google Shape;30;p7"/>
-          <p:cNvSpPr txBox="1"/>
+          <p:cNvSpPr txBox="1">
+            <a:spLocks noGrp="1"/>
+          </p:cNvSpPr>
           <p:nvPr>
-            <p:ph idx="1" type="body"/>
+            <p:ph type="body" idx="1"/>
           </p:nvPr>
         </p:nvSpPr>
         <p:spPr>
@@ -3074,11 +3156,11 @@
           </a:prstGeom>
         </p:spPr>
         <p:txBody>
-          <a:bodyPr anchorCtr="0" anchor="t" bIns="91425" lIns="91425" spcFirstLastPara="1" rIns="91425" wrap="square" tIns="91425">
+          <a:bodyPr spcFirstLastPara="1" wrap="square" lIns="91425" tIns="91425" rIns="91425" bIns="91425" anchor="t" anchorCtr="0">
             <a:normAutofit/>
           </a:bodyPr>
           <a:lstStyle>
-            <a:lvl1pPr indent="-304800" lvl="0" marL="457200">
+            <a:lvl1pPr marL="457200" lvl="0" indent="-304800">
               <a:spcBef>
                 <a:spcPts val="0"/>
               </a:spcBef>
@@ -3089,7 +3171,7 @@
               <a:buChar char="●"/>
               <a:defRPr sz="1200"/>
             </a:lvl1pPr>
-            <a:lvl2pPr indent="-304800" lvl="1" marL="914400">
+            <a:lvl2pPr marL="914400" lvl="1" indent="-304800">
               <a:spcBef>
                 <a:spcPts val="0"/>
               </a:spcBef>
@@ -3100,7 +3182,7 @@
               <a:buChar char="○"/>
               <a:defRPr sz="1200"/>
             </a:lvl2pPr>
-            <a:lvl3pPr indent="-304800" lvl="2" marL="1371600">
+            <a:lvl3pPr marL="1371600" lvl="2" indent="-304800">
               <a:spcBef>
                 <a:spcPts val="0"/>
               </a:spcBef>
@@ -3111,7 +3193,7 @@
               <a:buChar char="■"/>
               <a:defRPr sz="1200"/>
             </a:lvl3pPr>
-            <a:lvl4pPr indent="-304800" lvl="3" marL="1828800">
+            <a:lvl4pPr marL="1828800" lvl="3" indent="-304800">
               <a:spcBef>
                 <a:spcPts val="0"/>
               </a:spcBef>
@@ -3122,7 +3204,7 @@
               <a:buChar char="●"/>
               <a:defRPr sz="1200"/>
             </a:lvl4pPr>
-            <a:lvl5pPr indent="-304800" lvl="4" marL="2286000">
+            <a:lvl5pPr marL="2286000" lvl="4" indent="-304800">
               <a:spcBef>
                 <a:spcPts val="0"/>
               </a:spcBef>
@@ -3133,7 +3215,7 @@
               <a:buChar char="○"/>
               <a:defRPr sz="1200"/>
             </a:lvl5pPr>
-            <a:lvl6pPr indent="-304800" lvl="5" marL="2743200">
+            <a:lvl6pPr marL="2743200" lvl="5" indent="-304800">
               <a:spcBef>
                 <a:spcPts val="0"/>
               </a:spcBef>
@@ -3144,7 +3226,7 @@
               <a:buChar char="■"/>
               <a:defRPr sz="1200"/>
             </a:lvl6pPr>
-            <a:lvl7pPr indent="-304800" lvl="6" marL="3200400">
+            <a:lvl7pPr marL="3200400" lvl="6" indent="-304800">
               <a:spcBef>
                 <a:spcPts val="0"/>
               </a:spcBef>
@@ -3155,7 +3237,7 @@
               <a:buChar char="●"/>
               <a:defRPr sz="1200"/>
             </a:lvl7pPr>
-            <a:lvl8pPr indent="-304800" lvl="7" marL="3657600">
+            <a:lvl8pPr marL="3657600" lvl="7" indent="-304800">
               <a:spcBef>
                 <a:spcPts val="0"/>
               </a:spcBef>
@@ -3166,7 +3248,7 @@
               <a:buChar char="○"/>
               <a:defRPr sz="1200"/>
             </a:lvl8pPr>
-            <a:lvl9pPr indent="-304800" lvl="8" marL="4114800">
+            <a:lvl9pPr marL="4114800" lvl="8" indent="-304800">
               <a:spcBef>
                 <a:spcPts val="0"/>
               </a:spcBef>
@@ -3178,15 +3260,19 @@
               <a:defRPr sz="1200"/>
             </a:lvl9pPr>
           </a:lstStyle>
-          <a:p/>
+          <a:p>
+            <a:endParaRPr/>
+          </a:p>
         </p:txBody>
       </p:sp>
       <p:sp>
         <p:nvSpPr>
           <p:cNvPr id="31" name="Google Shape;31;p7"/>
-          <p:cNvSpPr txBox="1"/>
+          <p:cNvSpPr txBox="1">
+            <a:spLocks noGrp="1"/>
+          </p:cNvSpPr>
           <p:nvPr>
-            <p:ph idx="12" type="sldNum"/>
+            <p:ph type="sldNum" idx="12"/>
           </p:nvPr>
         </p:nvSpPr>
         <p:spPr>
@@ -3199,7 +3285,7 @@
           </a:prstGeom>
         </p:spPr>
         <p:txBody>
-          <a:bodyPr anchorCtr="0" anchor="ctr" bIns="91425" lIns="91425" spcFirstLastPara="1" rIns="91425" wrap="square" tIns="91425">
+          <a:bodyPr spcFirstLastPara="1" wrap="square" lIns="91425" tIns="91425" rIns="91425" bIns="91425" anchor="ctr" anchorCtr="0">
             <a:normAutofit/>
           </a:bodyPr>
           <a:lstStyle>
@@ -3241,7 +3327,7 @@
             </a:lvl9pPr>
           </a:lstStyle>
           <a:p>
-            <a:pPr indent="0" lvl="0" marL="0" rtl="0" algn="r">
+            <a:pPr marL="0" lvl="0" indent="0" algn="r" rtl="0">
               <a:spcBef>
                 <a:spcPts val="0"/>
               </a:spcBef>
@@ -3267,11 +3353,11 @@
 </file>
 
 <file path=ppt/slideLayouts/slideLayout7.xml><?xml version="1.0" encoding="utf-8"?>
-<p:sldLayout xmlns:a="http://schemas.openxmlformats.org/drawingml/2006/main" xmlns:r="http://schemas.openxmlformats.org/officeDocument/2006/relationships" xmlns:mc="http://schemas.openxmlformats.org/markup-compatibility/2006" xmlns:mv="urn:schemas-microsoft-com:mac:vml" xmlns:p="http://schemas.openxmlformats.org/presentationml/2006/main" xmlns:c="http://schemas.openxmlformats.org/drawingml/2006/chart" xmlns:dgm="http://schemas.openxmlformats.org/drawingml/2006/diagram" xmlns:o="urn:schemas-microsoft-com:office:office" xmlns:v="urn:schemas-microsoft-com:vml" xmlns:pvml="urn:schemas-microsoft-com:office:powerpoint" xmlns:com="http://schemas.openxmlformats.org/drawingml/2006/compatibility" xmlns:p14="http://schemas.microsoft.com/office/powerpoint/2010/main" xmlns:p15="http://schemas.microsoft.com/office/powerpoint/2012/main" xmlns:ahyp="http://schemas.microsoft.com/office/drawing/2018/hyperlinkcolor" matchingName="Main point">
+<p:sldLayout xmlns:a="http://schemas.openxmlformats.org/drawingml/2006/main" xmlns:r="http://schemas.openxmlformats.org/officeDocument/2006/relationships" xmlns:p="http://schemas.openxmlformats.org/presentationml/2006/main" matchingName="Main point">
   <p:cSld name="MAIN_POINT">
     <p:spTree>
       <p:nvGrpSpPr>
-        <p:cNvPr id="32" name="Shape 32"/>
+        <p:cNvPr id="1" name="Shape 32"/>
         <p:cNvGrpSpPr/>
         <p:nvPr/>
       </p:nvGrpSpPr>
@@ -3286,7 +3372,9 @@
       <p:sp>
         <p:nvSpPr>
           <p:cNvPr id="33" name="Google Shape;33;p8"/>
-          <p:cNvSpPr txBox="1"/>
+          <p:cNvSpPr txBox="1">
+            <a:spLocks noGrp="1"/>
+          </p:cNvSpPr>
           <p:nvPr>
             <p:ph type="title"/>
           </p:nvPr>
@@ -3301,7 +3389,7 @@
           </a:prstGeom>
         </p:spPr>
         <p:txBody>
-          <a:bodyPr anchorCtr="0" anchor="ctr" bIns="91425" lIns="91425" spcFirstLastPara="1" rIns="91425" wrap="square" tIns="91425">
+          <a:bodyPr spcFirstLastPara="1" wrap="square" lIns="91425" tIns="91425" rIns="91425" bIns="91425" anchor="ctr" anchorCtr="0">
             <a:normAutofit/>
           </a:bodyPr>
           <a:lstStyle>
@@ -3405,15 +3493,19 @@
               <a:defRPr sz="4800"/>
             </a:lvl9pPr>
           </a:lstStyle>
-          <a:p/>
+          <a:p>
+            <a:endParaRPr/>
+          </a:p>
         </p:txBody>
       </p:sp>
       <p:sp>
         <p:nvSpPr>
           <p:cNvPr id="34" name="Google Shape;34;p8"/>
-          <p:cNvSpPr txBox="1"/>
+          <p:cNvSpPr txBox="1">
+            <a:spLocks noGrp="1"/>
+          </p:cNvSpPr>
           <p:nvPr>
-            <p:ph idx="12" type="sldNum"/>
+            <p:ph type="sldNum" idx="12"/>
           </p:nvPr>
         </p:nvSpPr>
         <p:spPr>
@@ -3426,7 +3518,7 @@
           </a:prstGeom>
         </p:spPr>
         <p:txBody>
-          <a:bodyPr anchorCtr="0" anchor="ctr" bIns="91425" lIns="91425" spcFirstLastPara="1" rIns="91425" wrap="square" tIns="91425">
+          <a:bodyPr spcFirstLastPara="1" wrap="square" lIns="91425" tIns="91425" rIns="91425" bIns="91425" anchor="ctr" anchorCtr="0">
             <a:normAutofit/>
           </a:bodyPr>
           <a:lstStyle>
@@ -3468,7 +3560,7 @@
             </a:lvl9pPr>
           </a:lstStyle>
           <a:p>
-            <a:pPr indent="0" lvl="0" marL="0" rtl="0" algn="r">
+            <a:pPr marL="0" lvl="0" indent="0" algn="r" rtl="0">
               <a:spcBef>
                 <a:spcPts val="0"/>
               </a:spcBef>
@@ -3494,11 +3586,11 @@
 </file>
 
 <file path=ppt/slideLayouts/slideLayout8.xml><?xml version="1.0" encoding="utf-8"?>
-<p:sldLayout xmlns:a="http://schemas.openxmlformats.org/drawingml/2006/main" xmlns:r="http://schemas.openxmlformats.org/officeDocument/2006/relationships" xmlns:mc="http://schemas.openxmlformats.org/markup-compatibility/2006" xmlns:mv="urn:schemas-microsoft-com:mac:vml" xmlns:p="http://schemas.openxmlformats.org/presentationml/2006/main" xmlns:c="http://schemas.openxmlformats.org/drawingml/2006/chart" xmlns:dgm="http://schemas.openxmlformats.org/drawingml/2006/diagram" xmlns:o="urn:schemas-microsoft-com:office:office" xmlns:v="urn:schemas-microsoft-com:vml" xmlns:pvml="urn:schemas-microsoft-com:office:powerpoint" xmlns:com="http://schemas.openxmlformats.org/drawingml/2006/compatibility" xmlns:p14="http://schemas.microsoft.com/office/powerpoint/2010/main" xmlns:p15="http://schemas.microsoft.com/office/powerpoint/2012/main" xmlns:ahyp="http://schemas.microsoft.com/office/drawing/2018/hyperlinkcolor" matchingName="Section title and description">
+<p:sldLayout xmlns:a="http://schemas.openxmlformats.org/drawingml/2006/main" xmlns:r="http://schemas.openxmlformats.org/officeDocument/2006/relationships" xmlns:p="http://schemas.openxmlformats.org/presentationml/2006/main" matchingName="Section title and description">
   <p:cSld name="SECTION_TITLE_AND_DESCRIPTION">
     <p:spTree>
       <p:nvGrpSpPr>
-        <p:cNvPr id="35" name="Shape 35"/>
+        <p:cNvPr id="1" name="Shape 35"/>
         <p:cNvGrpSpPr/>
         <p:nvPr/>
       </p:nvGrpSpPr>
@@ -3532,12 +3624,12 @@
           </a:ln>
         </p:spPr>
         <p:txBody>
-          <a:bodyPr anchorCtr="0" anchor="ctr" bIns="91425" lIns="91425" spcFirstLastPara="1" rIns="91425" wrap="square" tIns="91425">
+          <a:bodyPr spcFirstLastPara="1" wrap="square" lIns="91425" tIns="91425" rIns="91425" bIns="91425" anchor="ctr" anchorCtr="0">
             <a:noAutofit/>
           </a:bodyPr>
           <a:lstStyle/>
           <a:p>
-            <a:pPr indent="0" lvl="0" marL="0" rtl="0" algn="l">
+            <a:pPr marL="0" lvl="0" indent="0" algn="l" rtl="0">
               <a:spcBef>
                 <a:spcPts val="0"/>
               </a:spcBef>
@@ -3546,9 +3638,6 @@
               </a:spcAft>
               <a:buNone/>
             </a:pPr>
-            <a:r>
-              <a:t/>
-            </a:r>
             <a:endParaRPr/>
           </a:p>
         </p:txBody>
@@ -3556,7 +3645,9 @@
       <p:sp>
         <p:nvSpPr>
           <p:cNvPr id="37" name="Google Shape;37;p9"/>
-          <p:cNvSpPr txBox="1"/>
+          <p:cNvSpPr txBox="1">
+            <a:spLocks noGrp="1"/>
+          </p:cNvSpPr>
           <p:nvPr>
             <p:ph type="title"/>
           </p:nvPr>
@@ -3571,7 +3662,7 @@
           </a:prstGeom>
         </p:spPr>
         <p:txBody>
-          <a:bodyPr anchorCtr="0" anchor="b" bIns="91425" lIns="91425" spcFirstLastPara="1" rIns="91425" wrap="square" tIns="91425">
+          <a:bodyPr spcFirstLastPara="1" wrap="square" lIns="91425" tIns="91425" rIns="91425" bIns="91425" anchor="b" anchorCtr="0">
             <a:normAutofit/>
           </a:bodyPr>
           <a:lstStyle>
@@ -3675,15 +3766,19 @@
               <a:defRPr sz="4200"/>
             </a:lvl9pPr>
           </a:lstStyle>
-          <a:p/>
+          <a:p>
+            <a:endParaRPr/>
+          </a:p>
         </p:txBody>
       </p:sp>
       <p:sp>
         <p:nvSpPr>
           <p:cNvPr id="38" name="Google Shape;38;p9"/>
-          <p:cNvSpPr txBox="1"/>
+          <p:cNvSpPr txBox="1">
+            <a:spLocks noGrp="1"/>
+          </p:cNvSpPr>
           <p:nvPr>
-            <p:ph idx="1" type="subTitle"/>
+            <p:ph type="subTitle" idx="1"/>
           </p:nvPr>
         </p:nvSpPr>
         <p:spPr>
@@ -3696,7 +3791,7 @@
           </a:prstGeom>
         </p:spPr>
         <p:txBody>
-          <a:bodyPr anchorCtr="0" anchor="t" bIns="91425" lIns="91425" spcFirstLastPara="1" rIns="91425" wrap="square" tIns="91425">
+          <a:bodyPr spcFirstLastPara="1" wrap="square" lIns="91425" tIns="91425" rIns="91425" bIns="91425" anchor="t" anchorCtr="0">
             <a:normAutofit/>
           </a:bodyPr>
           <a:lstStyle>
@@ -3827,15 +3922,19 @@
               <a:defRPr sz="2100"/>
             </a:lvl9pPr>
           </a:lstStyle>
-          <a:p/>
+          <a:p>
+            <a:endParaRPr/>
+          </a:p>
         </p:txBody>
       </p:sp>
       <p:sp>
         <p:nvSpPr>
           <p:cNvPr id="39" name="Google Shape;39;p9"/>
-          <p:cNvSpPr txBox="1"/>
+          <p:cNvSpPr txBox="1">
+            <a:spLocks noGrp="1"/>
+          </p:cNvSpPr>
           <p:nvPr>
-            <p:ph idx="2" type="body"/>
+            <p:ph type="body" idx="2"/>
           </p:nvPr>
         </p:nvSpPr>
         <p:spPr>
@@ -3848,11 +3947,11 @@
           </a:prstGeom>
         </p:spPr>
         <p:txBody>
-          <a:bodyPr anchorCtr="0" anchor="ctr" bIns="91425" lIns="91425" spcFirstLastPara="1" rIns="91425" wrap="square" tIns="91425">
+          <a:bodyPr spcFirstLastPara="1" wrap="square" lIns="91425" tIns="91425" rIns="91425" bIns="91425" anchor="ctr" anchorCtr="0">
             <a:normAutofit/>
           </a:bodyPr>
           <a:lstStyle>
-            <a:lvl1pPr indent="-342900" lvl="0" marL="457200">
+            <a:lvl1pPr marL="457200" lvl="0" indent="-342900">
               <a:spcBef>
                 <a:spcPts val="0"/>
               </a:spcBef>
@@ -3863,7 +3962,7 @@
               <a:buChar char="●"/>
               <a:defRPr/>
             </a:lvl1pPr>
-            <a:lvl2pPr indent="-317500" lvl="1" marL="914400">
+            <a:lvl2pPr marL="914400" lvl="1" indent="-317500">
               <a:spcBef>
                 <a:spcPts val="0"/>
               </a:spcBef>
@@ -3874,7 +3973,7 @@
               <a:buChar char="○"/>
               <a:defRPr/>
             </a:lvl2pPr>
-            <a:lvl3pPr indent="-317500" lvl="2" marL="1371600">
+            <a:lvl3pPr marL="1371600" lvl="2" indent="-317500">
               <a:spcBef>
                 <a:spcPts val="0"/>
               </a:spcBef>
@@ -3885,7 +3984,7 @@
               <a:buChar char="■"/>
               <a:defRPr/>
             </a:lvl3pPr>
-            <a:lvl4pPr indent="-317500" lvl="3" marL="1828800">
+            <a:lvl4pPr marL="1828800" lvl="3" indent="-317500">
               <a:spcBef>
                 <a:spcPts val="0"/>
               </a:spcBef>
@@ -3896,7 +3995,7 @@
               <a:buChar char="●"/>
               <a:defRPr/>
             </a:lvl4pPr>
-            <a:lvl5pPr indent="-317500" lvl="4" marL="2286000">
+            <a:lvl5pPr marL="2286000" lvl="4" indent="-317500">
               <a:spcBef>
                 <a:spcPts val="0"/>
               </a:spcBef>
@@ -3907,7 +4006,7 @@
               <a:buChar char="○"/>
               <a:defRPr/>
             </a:lvl5pPr>
-            <a:lvl6pPr indent="-317500" lvl="5" marL="2743200">
+            <a:lvl6pPr marL="2743200" lvl="5" indent="-317500">
               <a:spcBef>
                 <a:spcPts val="0"/>
               </a:spcBef>
@@ -3918,7 +4017,7 @@
               <a:buChar char="■"/>
               <a:defRPr/>
             </a:lvl6pPr>
-            <a:lvl7pPr indent="-317500" lvl="6" marL="3200400">
+            <a:lvl7pPr marL="3200400" lvl="6" indent="-317500">
               <a:spcBef>
                 <a:spcPts val="0"/>
               </a:spcBef>
@@ -3929,7 +4028,7 @@
               <a:buChar char="●"/>
               <a:defRPr/>
             </a:lvl7pPr>
-            <a:lvl8pPr indent="-317500" lvl="7" marL="3657600">
+            <a:lvl8pPr marL="3657600" lvl="7" indent="-317500">
               <a:spcBef>
                 <a:spcPts val="0"/>
               </a:spcBef>
@@ -3940,7 +4039,7 @@
               <a:buChar char="○"/>
               <a:defRPr/>
             </a:lvl8pPr>
-            <a:lvl9pPr indent="-317500" lvl="8" marL="4114800">
+            <a:lvl9pPr marL="4114800" lvl="8" indent="-317500">
               <a:spcBef>
                 <a:spcPts val="0"/>
               </a:spcBef>
@@ -3952,15 +4051,19 @@
               <a:defRPr/>
             </a:lvl9pPr>
           </a:lstStyle>
-          <a:p/>
+          <a:p>
+            <a:endParaRPr/>
+          </a:p>
         </p:txBody>
       </p:sp>
       <p:sp>
         <p:nvSpPr>
           <p:cNvPr id="40" name="Google Shape;40;p9"/>
-          <p:cNvSpPr txBox="1"/>
+          <p:cNvSpPr txBox="1">
+            <a:spLocks noGrp="1"/>
+          </p:cNvSpPr>
           <p:nvPr>
-            <p:ph idx="12" type="sldNum"/>
+            <p:ph type="sldNum" idx="12"/>
           </p:nvPr>
         </p:nvSpPr>
         <p:spPr>
@@ -3973,7 +4076,7 @@
           </a:prstGeom>
         </p:spPr>
         <p:txBody>
-          <a:bodyPr anchorCtr="0" anchor="ctr" bIns="91425" lIns="91425" spcFirstLastPara="1" rIns="91425" wrap="square" tIns="91425">
+          <a:bodyPr spcFirstLastPara="1" wrap="square" lIns="91425" tIns="91425" rIns="91425" bIns="91425" anchor="ctr" anchorCtr="0">
             <a:normAutofit/>
           </a:bodyPr>
           <a:lstStyle>
@@ -4015,7 +4118,7 @@
             </a:lvl9pPr>
           </a:lstStyle>
           <a:p>
-            <a:pPr indent="0" lvl="0" marL="0" rtl="0" algn="r">
+            <a:pPr marL="0" lvl="0" indent="0" algn="r" rtl="0">
               <a:spcBef>
                 <a:spcPts val="0"/>
               </a:spcBef>
@@ -4041,11 +4144,11 @@
 </file>
 
 <file path=ppt/slideLayouts/slideLayout9.xml><?xml version="1.0" encoding="utf-8"?>
-<p:sldLayout xmlns:a="http://schemas.openxmlformats.org/drawingml/2006/main" xmlns:r="http://schemas.openxmlformats.org/officeDocument/2006/relationships" xmlns:mc="http://schemas.openxmlformats.org/markup-compatibility/2006" xmlns:mv="urn:schemas-microsoft-com:mac:vml" xmlns:p="http://schemas.openxmlformats.org/presentationml/2006/main" xmlns:c="http://schemas.openxmlformats.org/drawingml/2006/chart" xmlns:dgm="http://schemas.openxmlformats.org/drawingml/2006/diagram" xmlns:o="urn:schemas-microsoft-com:office:office" xmlns:v="urn:schemas-microsoft-com:vml" xmlns:pvml="urn:schemas-microsoft-com:office:powerpoint" xmlns:com="http://schemas.openxmlformats.org/drawingml/2006/compatibility" xmlns:p14="http://schemas.microsoft.com/office/powerpoint/2010/main" xmlns:p15="http://schemas.microsoft.com/office/powerpoint/2012/main" xmlns:ahyp="http://schemas.microsoft.com/office/drawing/2018/hyperlinkcolor" matchingName="Caption">
+<p:sldLayout xmlns:a="http://schemas.openxmlformats.org/drawingml/2006/main" xmlns:r="http://schemas.openxmlformats.org/officeDocument/2006/relationships" xmlns:p="http://schemas.openxmlformats.org/presentationml/2006/main" matchingName="Caption">
   <p:cSld name="CAPTION_ONLY">
     <p:spTree>
       <p:nvGrpSpPr>
-        <p:cNvPr id="41" name="Shape 41"/>
+        <p:cNvPr id="1" name="Shape 41"/>
         <p:cNvGrpSpPr/>
         <p:nvPr/>
       </p:nvGrpSpPr>
@@ -4060,9 +4163,11 @@
       <p:sp>
         <p:nvSpPr>
           <p:cNvPr id="42" name="Google Shape;42;p10"/>
-          <p:cNvSpPr txBox="1"/>
+          <p:cNvSpPr txBox="1">
+            <a:spLocks noGrp="1"/>
+          </p:cNvSpPr>
           <p:nvPr>
-            <p:ph idx="1" type="body"/>
+            <p:ph type="body" idx="1"/>
           </p:nvPr>
         </p:nvSpPr>
         <p:spPr>
@@ -4075,11 +4180,11 @@
           </a:prstGeom>
         </p:spPr>
         <p:txBody>
-          <a:bodyPr anchorCtr="0" anchor="ctr" bIns="91425" lIns="91425" spcFirstLastPara="1" rIns="91425" wrap="square" tIns="91425">
+          <a:bodyPr spcFirstLastPara="1" wrap="square" lIns="91425" tIns="91425" rIns="91425" bIns="91425" anchor="ctr" anchorCtr="0">
             <a:normAutofit/>
           </a:bodyPr>
           <a:lstStyle>
-            <a:lvl1pPr indent="-228600" lvl="0" marL="457200">
+            <a:lvl1pPr marL="457200" lvl="0" indent="-228600">
               <a:lnSpc>
                 <a:spcPct val="100000"/>
               </a:lnSpc>
@@ -4094,15 +4199,19 @@
               <a:defRPr/>
             </a:lvl1pPr>
           </a:lstStyle>
-          <a:p/>
+          <a:p>
+            <a:endParaRPr/>
+          </a:p>
         </p:txBody>
       </p:sp>
       <p:sp>
         <p:nvSpPr>
           <p:cNvPr id="43" name="Google Shape;43;p10"/>
-          <p:cNvSpPr txBox="1"/>
+          <p:cNvSpPr txBox="1">
+            <a:spLocks noGrp="1"/>
+          </p:cNvSpPr>
           <p:nvPr>
-            <p:ph idx="12" type="sldNum"/>
+            <p:ph type="sldNum" idx="12"/>
           </p:nvPr>
         </p:nvSpPr>
         <p:spPr>
@@ -4115,7 +4224,7 @@
           </a:prstGeom>
         </p:spPr>
         <p:txBody>
-          <a:bodyPr anchorCtr="0" anchor="ctr" bIns="91425" lIns="91425" spcFirstLastPara="1" rIns="91425" wrap="square" tIns="91425">
+          <a:bodyPr spcFirstLastPara="1" wrap="square" lIns="91425" tIns="91425" rIns="91425" bIns="91425" anchor="ctr" anchorCtr="0">
             <a:normAutofit/>
           </a:bodyPr>
           <a:lstStyle>
@@ -4157,7 +4266,7 @@
             </a:lvl9pPr>
           </a:lstStyle>
           <a:p>
-            <a:pPr indent="0" lvl="0" marL="0" rtl="0" algn="r">
+            <a:pPr marL="0" lvl="0" indent="0" algn="r" rtl="0">
               <a:spcBef>
                 <a:spcPts val="0"/>
               </a:spcBef>
@@ -4183,18 +4292,19 @@
 </file>
 
 <file path=ppt/slideMasters/slideMaster1.xml><?xml version="1.0" encoding="utf-8"?>
-<p:sldMaster xmlns:a="http://schemas.openxmlformats.org/drawingml/2006/main" xmlns:r="http://schemas.openxmlformats.org/officeDocument/2006/relationships" xmlns:mc="http://schemas.openxmlformats.org/markup-compatibility/2006" xmlns:mv="urn:schemas-microsoft-com:mac:vml" xmlns:p="http://schemas.openxmlformats.org/presentationml/2006/main" xmlns:c="http://schemas.openxmlformats.org/drawingml/2006/chart" xmlns:dgm="http://schemas.openxmlformats.org/drawingml/2006/diagram" xmlns:o="urn:schemas-microsoft-com:office:office" xmlns:v="urn:schemas-microsoft-com:vml" xmlns:pvml="urn:schemas-microsoft-com:office:powerpoint" xmlns:com="http://schemas.openxmlformats.org/drawingml/2006/compatibility" xmlns:p14="http://schemas.microsoft.com/office/powerpoint/2010/main" xmlns:p15="http://schemas.microsoft.com/office/powerpoint/2012/main" xmlns:ahyp="http://schemas.microsoft.com/office/drawing/2018/hyperlinkcolor">
+<p:sldMaster xmlns:a="http://schemas.openxmlformats.org/drawingml/2006/main" xmlns:r="http://schemas.openxmlformats.org/officeDocument/2006/relationships" xmlns:p="http://schemas.openxmlformats.org/presentationml/2006/main">
   <p:cSld name="simple-light-2">
     <p:bg>
       <p:bgPr>
         <a:solidFill>
           <a:schemeClr val="lt1"/>
         </a:solidFill>
+        <a:effectLst/>
       </p:bgPr>
     </p:bg>
     <p:spTree>
       <p:nvGrpSpPr>
-        <p:cNvPr id="5" name="Shape 5"/>
+        <p:cNvPr id="1" name="Shape 5"/>
         <p:cNvGrpSpPr/>
         <p:nvPr/>
       </p:nvGrpSpPr>
@@ -4209,7 +4319,9 @@
       <p:sp>
         <p:nvSpPr>
           <p:cNvPr id="6" name="Google Shape;6;p1"/>
-          <p:cNvSpPr txBox="1"/>
+          <p:cNvSpPr txBox="1">
+            <a:spLocks noGrp="1"/>
+          </p:cNvSpPr>
           <p:nvPr>
             <p:ph type="title"/>
           </p:nvPr>
@@ -4228,7 +4340,7 @@
           </a:ln>
         </p:spPr>
         <p:txBody>
-          <a:bodyPr anchorCtr="0" anchor="t" bIns="91425" lIns="91425" spcFirstLastPara="1" rIns="91425" wrap="square" tIns="91425">
+          <a:bodyPr spcFirstLastPara="1" wrap="square" lIns="91425" tIns="91425" rIns="91425" bIns="91425" anchor="t" anchorCtr="0">
             <a:normAutofit/>
           </a:bodyPr>
           <a:lstStyle>
@@ -4395,15 +4507,19 @@
               </a:defRPr>
             </a:lvl9pPr>
           </a:lstStyle>
-          <a:p/>
+          <a:p>
+            <a:endParaRPr/>
+          </a:p>
         </p:txBody>
       </p:sp>
       <p:sp>
         <p:nvSpPr>
           <p:cNvPr id="7" name="Google Shape;7;p1"/>
-          <p:cNvSpPr txBox="1"/>
+          <p:cNvSpPr txBox="1">
+            <a:spLocks noGrp="1"/>
+          </p:cNvSpPr>
           <p:nvPr>
-            <p:ph idx="1" type="body"/>
+            <p:ph type="body" idx="1"/>
           </p:nvPr>
         </p:nvSpPr>
         <p:spPr>
@@ -4420,11 +4536,11 @@
           </a:ln>
         </p:spPr>
         <p:txBody>
-          <a:bodyPr anchorCtr="0" anchor="t" bIns="91425" lIns="91425" spcFirstLastPara="1" rIns="91425" wrap="square" tIns="91425">
+          <a:bodyPr spcFirstLastPara="1" wrap="square" lIns="91425" tIns="91425" rIns="91425" bIns="91425" anchor="t" anchorCtr="0">
             <a:normAutofit/>
           </a:bodyPr>
           <a:lstStyle>
-            <a:lvl1pPr indent="-342900" lvl="0" marL="457200">
+            <a:lvl1pPr marL="457200" lvl="0" indent="-342900">
               <a:lnSpc>
                 <a:spcPct val="115000"/>
               </a:lnSpc>
@@ -4445,7 +4561,7 @@
                 </a:solidFill>
               </a:defRPr>
             </a:lvl1pPr>
-            <a:lvl2pPr indent="-317500" lvl="1" marL="914400">
+            <a:lvl2pPr marL="914400" lvl="1" indent="-317500">
               <a:lnSpc>
                 <a:spcPct val="115000"/>
               </a:lnSpc>
@@ -4466,7 +4582,7 @@
                 </a:solidFill>
               </a:defRPr>
             </a:lvl2pPr>
-            <a:lvl3pPr indent="-317500" lvl="2" marL="1371600">
+            <a:lvl3pPr marL="1371600" lvl="2" indent="-317500">
               <a:lnSpc>
                 <a:spcPct val="115000"/>
               </a:lnSpc>
@@ -4487,7 +4603,7 @@
                 </a:solidFill>
               </a:defRPr>
             </a:lvl3pPr>
-            <a:lvl4pPr indent="-317500" lvl="3" marL="1828800">
+            <a:lvl4pPr marL="1828800" lvl="3" indent="-317500">
               <a:lnSpc>
                 <a:spcPct val="115000"/>
               </a:lnSpc>
@@ -4508,7 +4624,7 @@
                 </a:solidFill>
               </a:defRPr>
             </a:lvl4pPr>
-            <a:lvl5pPr indent="-317500" lvl="4" marL="2286000">
+            <a:lvl5pPr marL="2286000" lvl="4" indent="-317500">
               <a:lnSpc>
                 <a:spcPct val="115000"/>
               </a:lnSpc>
@@ -4529,7 +4645,7 @@
                 </a:solidFill>
               </a:defRPr>
             </a:lvl5pPr>
-            <a:lvl6pPr indent="-317500" lvl="5" marL="2743200">
+            <a:lvl6pPr marL="2743200" lvl="5" indent="-317500">
               <a:lnSpc>
                 <a:spcPct val="115000"/>
               </a:lnSpc>
@@ -4550,7 +4666,7 @@
                 </a:solidFill>
               </a:defRPr>
             </a:lvl6pPr>
-            <a:lvl7pPr indent="-317500" lvl="6" marL="3200400">
+            <a:lvl7pPr marL="3200400" lvl="6" indent="-317500">
               <a:lnSpc>
                 <a:spcPct val="115000"/>
               </a:lnSpc>
@@ -4571,7 +4687,7 @@
                 </a:solidFill>
               </a:defRPr>
             </a:lvl7pPr>
-            <a:lvl8pPr indent="-317500" lvl="7" marL="3657600">
+            <a:lvl8pPr marL="3657600" lvl="7" indent="-317500">
               <a:lnSpc>
                 <a:spcPct val="115000"/>
               </a:lnSpc>
@@ -4592,7 +4708,7 @@
                 </a:solidFill>
               </a:defRPr>
             </a:lvl8pPr>
-            <a:lvl9pPr indent="-317500" lvl="8" marL="4114800">
+            <a:lvl9pPr marL="4114800" lvl="8" indent="-317500">
               <a:lnSpc>
                 <a:spcPct val="115000"/>
               </a:lnSpc>
@@ -4614,15 +4730,19 @@
               </a:defRPr>
             </a:lvl9pPr>
           </a:lstStyle>
-          <a:p/>
+          <a:p>
+            <a:endParaRPr/>
+          </a:p>
         </p:txBody>
       </p:sp>
       <p:sp>
         <p:nvSpPr>
           <p:cNvPr id="8" name="Google Shape;8;p1"/>
-          <p:cNvSpPr txBox="1"/>
+          <p:cNvSpPr txBox="1">
+            <a:spLocks noGrp="1"/>
+          </p:cNvSpPr>
           <p:nvPr>
-            <p:ph idx="12" type="sldNum"/>
+            <p:ph type="sldNum" idx="12"/>
           </p:nvPr>
         </p:nvSpPr>
         <p:spPr>
@@ -4639,7 +4759,7 @@
           </a:ln>
         </p:spPr>
         <p:txBody>
-          <a:bodyPr anchorCtr="0" anchor="ctr" bIns="91425" lIns="91425" spcFirstLastPara="1" rIns="91425" wrap="square" tIns="91425">
+          <a:bodyPr spcFirstLastPara="1" wrap="square" lIns="91425" tIns="91425" rIns="91425" bIns="91425" anchor="ctr" anchorCtr="0">
             <a:normAutofit/>
           </a:bodyPr>
           <a:lstStyle>
@@ -4717,7 +4837,7 @@
             </a:lvl9pPr>
           </a:lstStyle>
           <a:p>
-            <a:pPr indent="0" lvl="0" marL="0" rtl="0" algn="r">
+            <a:pPr marL="0" lvl="0" indent="0" algn="r" rtl="0">
               <a:spcBef>
                 <a:spcPts val="0"/>
               </a:spcBef>
@@ -4736,7 +4856,7 @@
       </p:sp>
     </p:spTree>
   </p:cSld>
-  <p:clrMap accent1="accent1" accent2="accent2" accent3="accent3" accent4="accent4" accent5="accent5" accent6="accent6" bg1="lt1" bg2="dk2" tx1="dk1" tx2="lt2" folHlink="folHlink" hlink="hlink"/>
+  <p:clrMap bg1="lt1" tx1="dk1" bg2="dk2" tx2="lt2" accent1="accent1" accent2="accent2" accent3="accent3" accent4="accent4" accent5="accent5" accent6="accent6" hlink="hlink" folHlink="folHlink"/>
   <p:sldLayoutIdLst>
     <p:sldLayoutId id="2147483648" r:id="rId1"/>
     <p:sldLayoutId id="2147483649" r:id="rId2"/>
@@ -4750,10 +4870,10 @@
     <p:sldLayoutId id="2147483657" r:id="rId10"/>
     <p:sldLayoutId id="2147483658" r:id="rId11"/>
   </p:sldLayoutIdLst>
-  <p:hf dt="0" ftr="0" hdr="0" sldNum="0"/>
+  <p:hf sldNum="0" hdr="0" ftr="0" dt="0"/>
   <p:txStyles>
     <p:titleStyle>
-      <a:defPPr lvl="0" marR="0" rtl="0" algn="l">
+      <a:defPPr marR="0" lvl="0" algn="l" rtl="0">
         <a:lnSpc>
           <a:spcPct val="100000"/>
         </a:lnSpc>
@@ -4764,7 +4884,7 @@
           <a:spcPts val="0"/>
         </a:spcAft>
       </a:defPPr>
-      <a:lvl1pPr lvl="0" marR="0" rtl="0" algn="l">
+      <a:lvl1pPr marR="0" lvl="0" algn="l" rtl="0">
         <a:lnSpc>
           <a:spcPct val="100000"/>
         </a:lnSpc>
@@ -4778,7 +4898,7 @@
           <a:srgbClr val="000000"/>
         </a:buClr>
         <a:buFont typeface="Arial"/>
-        <a:defRPr b="0" i="0" sz="1400" u="none" cap="none" strike="noStrike">
+        <a:defRPr sz="1400" b="0" i="0" u="none" strike="noStrike" cap="none">
           <a:solidFill>
             <a:srgbClr val="000000"/>
           </a:solidFill>
@@ -4788,7 +4908,7 @@
           <a:sym typeface="Arial"/>
         </a:defRPr>
       </a:lvl1pPr>
-      <a:lvl2pPr lvl="1" marR="0" rtl="0" algn="l">
+      <a:lvl2pPr marR="0" lvl="1" algn="l" rtl="0">
         <a:lnSpc>
           <a:spcPct val="100000"/>
         </a:lnSpc>
@@ -4802,7 +4922,7 @@
           <a:srgbClr val="000000"/>
         </a:buClr>
         <a:buFont typeface="Arial"/>
-        <a:defRPr b="0" i="0" sz="1400" u="none" cap="none" strike="noStrike">
+        <a:defRPr sz="1400" b="0" i="0" u="none" strike="noStrike" cap="none">
           <a:solidFill>
             <a:srgbClr val="000000"/>
           </a:solidFill>
@@ -4812,7 +4932,7 @@
           <a:sym typeface="Arial"/>
         </a:defRPr>
       </a:lvl2pPr>
-      <a:lvl3pPr lvl="2" marR="0" rtl="0" algn="l">
+      <a:lvl3pPr marR="0" lvl="2" algn="l" rtl="0">
         <a:lnSpc>
           <a:spcPct val="100000"/>
         </a:lnSpc>
@@ -4826,7 +4946,7 @@
           <a:srgbClr val="000000"/>
         </a:buClr>
         <a:buFont typeface="Arial"/>
-        <a:defRPr b="0" i="0" sz="1400" u="none" cap="none" strike="noStrike">
+        <a:defRPr sz="1400" b="0" i="0" u="none" strike="noStrike" cap="none">
           <a:solidFill>
             <a:srgbClr val="000000"/>
           </a:solidFill>
@@ -4836,7 +4956,7 @@
           <a:sym typeface="Arial"/>
         </a:defRPr>
       </a:lvl3pPr>
-      <a:lvl4pPr lvl="3" marR="0" rtl="0" algn="l">
+      <a:lvl4pPr marR="0" lvl="3" algn="l" rtl="0">
         <a:lnSpc>
           <a:spcPct val="100000"/>
         </a:lnSpc>
@@ -4850,7 +4970,7 @@
           <a:srgbClr val="000000"/>
         </a:buClr>
         <a:buFont typeface="Arial"/>
-        <a:defRPr b="0" i="0" sz="1400" u="none" cap="none" strike="noStrike">
+        <a:defRPr sz="1400" b="0" i="0" u="none" strike="noStrike" cap="none">
           <a:solidFill>
             <a:srgbClr val="000000"/>
           </a:solidFill>
@@ -4860,7 +4980,7 @@
           <a:sym typeface="Arial"/>
         </a:defRPr>
       </a:lvl4pPr>
-      <a:lvl5pPr lvl="4" marR="0" rtl="0" algn="l">
+      <a:lvl5pPr marR="0" lvl="4" algn="l" rtl="0">
         <a:lnSpc>
           <a:spcPct val="100000"/>
         </a:lnSpc>
@@ -4874,7 +4994,7 @@
           <a:srgbClr val="000000"/>
         </a:buClr>
         <a:buFont typeface="Arial"/>
-        <a:defRPr b="0" i="0" sz="1400" u="none" cap="none" strike="noStrike">
+        <a:defRPr sz="1400" b="0" i="0" u="none" strike="noStrike" cap="none">
           <a:solidFill>
             <a:srgbClr val="000000"/>
           </a:solidFill>
@@ -4884,7 +5004,7 @@
           <a:sym typeface="Arial"/>
         </a:defRPr>
       </a:lvl5pPr>
-      <a:lvl6pPr lvl="5" marR="0" rtl="0" algn="l">
+      <a:lvl6pPr marR="0" lvl="5" algn="l" rtl="0">
         <a:lnSpc>
           <a:spcPct val="100000"/>
         </a:lnSpc>
@@ -4898,7 +5018,7 @@
           <a:srgbClr val="000000"/>
         </a:buClr>
         <a:buFont typeface="Arial"/>
-        <a:defRPr b="0" i="0" sz="1400" u="none" cap="none" strike="noStrike">
+        <a:defRPr sz="1400" b="0" i="0" u="none" strike="noStrike" cap="none">
           <a:solidFill>
             <a:srgbClr val="000000"/>
           </a:solidFill>
@@ -4908,7 +5028,7 @@
           <a:sym typeface="Arial"/>
         </a:defRPr>
       </a:lvl6pPr>
-      <a:lvl7pPr lvl="6" marR="0" rtl="0" algn="l">
+      <a:lvl7pPr marR="0" lvl="6" algn="l" rtl="0">
         <a:lnSpc>
           <a:spcPct val="100000"/>
         </a:lnSpc>
@@ -4922,7 +5042,7 @@
           <a:srgbClr val="000000"/>
         </a:buClr>
         <a:buFont typeface="Arial"/>
-        <a:defRPr b="0" i="0" sz="1400" u="none" cap="none" strike="noStrike">
+        <a:defRPr sz="1400" b="0" i="0" u="none" strike="noStrike" cap="none">
           <a:solidFill>
             <a:srgbClr val="000000"/>
           </a:solidFill>
@@ -4932,7 +5052,7 @@
           <a:sym typeface="Arial"/>
         </a:defRPr>
       </a:lvl7pPr>
-      <a:lvl8pPr lvl="7" marR="0" rtl="0" algn="l">
+      <a:lvl8pPr marR="0" lvl="7" algn="l" rtl="0">
         <a:lnSpc>
           <a:spcPct val="100000"/>
         </a:lnSpc>
@@ -4946,7 +5066,7 @@
           <a:srgbClr val="000000"/>
         </a:buClr>
         <a:buFont typeface="Arial"/>
-        <a:defRPr b="0" i="0" sz="1400" u="none" cap="none" strike="noStrike">
+        <a:defRPr sz="1400" b="0" i="0" u="none" strike="noStrike" cap="none">
           <a:solidFill>
             <a:srgbClr val="000000"/>
           </a:solidFill>
@@ -4956,7 +5076,7 @@
           <a:sym typeface="Arial"/>
         </a:defRPr>
       </a:lvl8pPr>
-      <a:lvl9pPr lvl="8" marR="0" rtl="0" algn="l">
+      <a:lvl9pPr marR="0" lvl="8" algn="l" rtl="0">
         <a:lnSpc>
           <a:spcPct val="100000"/>
         </a:lnSpc>
@@ -4970,7 +5090,7 @@
           <a:srgbClr val="000000"/>
         </a:buClr>
         <a:buFont typeface="Arial"/>
-        <a:defRPr b="0" i="0" sz="1400" u="none" cap="none" strike="noStrike">
+        <a:defRPr sz="1400" b="0" i="0" u="none" strike="noStrike" cap="none">
           <a:solidFill>
             <a:srgbClr val="000000"/>
           </a:solidFill>
@@ -4982,7 +5102,7 @@
       </a:lvl9pPr>
     </p:titleStyle>
     <p:bodyStyle>
-      <a:defPPr lvl="0" marR="0" rtl="0" algn="l">
+      <a:defPPr marR="0" lvl="0" algn="l" rtl="0">
         <a:lnSpc>
           <a:spcPct val="100000"/>
         </a:lnSpc>
@@ -4993,7 +5113,7 @@
           <a:spcPts val="0"/>
         </a:spcAft>
       </a:defPPr>
-      <a:lvl1pPr lvl="0" marR="0" rtl="0" algn="l">
+      <a:lvl1pPr marR="0" lvl="0" algn="l" rtl="0">
         <a:lnSpc>
           <a:spcPct val="100000"/>
         </a:lnSpc>
@@ -5007,7 +5127,7 @@
           <a:srgbClr val="000000"/>
         </a:buClr>
         <a:buFont typeface="Arial"/>
-        <a:defRPr b="0" i="0" sz="1400" u="none" cap="none" strike="noStrike">
+        <a:defRPr sz="1400" b="0" i="0" u="none" strike="noStrike" cap="none">
           <a:solidFill>
             <a:srgbClr val="000000"/>
           </a:solidFill>
@@ -5017,7 +5137,7 @@
           <a:sym typeface="Arial"/>
         </a:defRPr>
       </a:lvl1pPr>
-      <a:lvl2pPr lvl="1" marR="0" rtl="0" algn="l">
+      <a:lvl2pPr marR="0" lvl="1" algn="l" rtl="0">
         <a:lnSpc>
           <a:spcPct val="100000"/>
         </a:lnSpc>
@@ -5031,7 +5151,7 @@
           <a:srgbClr val="000000"/>
         </a:buClr>
         <a:buFont typeface="Arial"/>
-        <a:defRPr b="0" i="0" sz="1400" u="none" cap="none" strike="noStrike">
+        <a:defRPr sz="1400" b="0" i="0" u="none" strike="noStrike" cap="none">
           <a:solidFill>
             <a:srgbClr val="000000"/>
           </a:solidFill>
@@ -5041,7 +5161,7 @@
           <a:sym typeface="Arial"/>
         </a:defRPr>
       </a:lvl2pPr>
-      <a:lvl3pPr lvl="2" marR="0" rtl="0" algn="l">
+      <a:lvl3pPr marR="0" lvl="2" algn="l" rtl="0">
         <a:lnSpc>
           <a:spcPct val="100000"/>
         </a:lnSpc>
@@ -5055,7 +5175,7 @@
           <a:srgbClr val="000000"/>
         </a:buClr>
         <a:buFont typeface="Arial"/>
-        <a:defRPr b="0" i="0" sz="1400" u="none" cap="none" strike="noStrike">
+        <a:defRPr sz="1400" b="0" i="0" u="none" strike="noStrike" cap="none">
           <a:solidFill>
             <a:srgbClr val="000000"/>
           </a:solidFill>
@@ -5065,7 +5185,7 @@
           <a:sym typeface="Arial"/>
         </a:defRPr>
       </a:lvl3pPr>
-      <a:lvl4pPr lvl="3" marR="0" rtl="0" algn="l">
+      <a:lvl4pPr marR="0" lvl="3" algn="l" rtl="0">
         <a:lnSpc>
           <a:spcPct val="100000"/>
         </a:lnSpc>
@@ -5079,7 +5199,7 @@
           <a:srgbClr val="000000"/>
         </a:buClr>
         <a:buFont typeface="Arial"/>
-        <a:defRPr b="0" i="0" sz="1400" u="none" cap="none" strike="noStrike">
+        <a:defRPr sz="1400" b="0" i="0" u="none" strike="noStrike" cap="none">
           <a:solidFill>
             <a:srgbClr val="000000"/>
           </a:solidFill>
@@ -5089,7 +5209,7 @@
           <a:sym typeface="Arial"/>
         </a:defRPr>
       </a:lvl4pPr>
-      <a:lvl5pPr lvl="4" marR="0" rtl="0" algn="l">
+      <a:lvl5pPr marR="0" lvl="4" algn="l" rtl="0">
         <a:lnSpc>
           <a:spcPct val="100000"/>
         </a:lnSpc>
@@ -5103,7 +5223,7 @@
           <a:srgbClr val="000000"/>
         </a:buClr>
         <a:buFont typeface="Arial"/>
-        <a:defRPr b="0" i="0" sz="1400" u="none" cap="none" strike="noStrike">
+        <a:defRPr sz="1400" b="0" i="0" u="none" strike="noStrike" cap="none">
           <a:solidFill>
             <a:srgbClr val="000000"/>
           </a:solidFill>
@@ -5113,7 +5233,7 @@
           <a:sym typeface="Arial"/>
         </a:defRPr>
       </a:lvl5pPr>
-      <a:lvl6pPr lvl="5" marR="0" rtl="0" algn="l">
+      <a:lvl6pPr marR="0" lvl="5" algn="l" rtl="0">
         <a:lnSpc>
           <a:spcPct val="100000"/>
         </a:lnSpc>
@@ -5127,7 +5247,7 @@
           <a:srgbClr val="000000"/>
         </a:buClr>
         <a:buFont typeface="Arial"/>
-        <a:defRPr b="0" i="0" sz="1400" u="none" cap="none" strike="noStrike">
+        <a:defRPr sz="1400" b="0" i="0" u="none" strike="noStrike" cap="none">
           <a:solidFill>
             <a:srgbClr val="000000"/>
           </a:solidFill>
@@ -5137,7 +5257,7 @@
           <a:sym typeface="Arial"/>
         </a:defRPr>
       </a:lvl6pPr>
-      <a:lvl7pPr lvl="6" marR="0" rtl="0" algn="l">
+      <a:lvl7pPr marR="0" lvl="6" algn="l" rtl="0">
         <a:lnSpc>
           <a:spcPct val="100000"/>
         </a:lnSpc>
@@ -5151,7 +5271,7 @@
           <a:srgbClr val="000000"/>
         </a:buClr>
         <a:buFont typeface="Arial"/>
-        <a:defRPr b="0" i="0" sz="1400" u="none" cap="none" strike="noStrike">
+        <a:defRPr sz="1400" b="0" i="0" u="none" strike="noStrike" cap="none">
           <a:solidFill>
             <a:srgbClr val="000000"/>
           </a:solidFill>
@@ -5161,7 +5281,7 @@
           <a:sym typeface="Arial"/>
         </a:defRPr>
       </a:lvl7pPr>
-      <a:lvl8pPr lvl="7" marR="0" rtl="0" algn="l">
+      <a:lvl8pPr marR="0" lvl="7" algn="l" rtl="0">
         <a:lnSpc>
           <a:spcPct val="100000"/>
         </a:lnSpc>
@@ -5175,7 +5295,7 @@
           <a:srgbClr val="000000"/>
         </a:buClr>
         <a:buFont typeface="Arial"/>
-        <a:defRPr b="0" i="0" sz="1400" u="none" cap="none" strike="noStrike">
+        <a:defRPr sz="1400" b="0" i="0" u="none" strike="noStrike" cap="none">
           <a:solidFill>
             <a:srgbClr val="000000"/>
           </a:solidFill>
@@ -5185,7 +5305,7 @@
           <a:sym typeface="Arial"/>
         </a:defRPr>
       </a:lvl8pPr>
-      <a:lvl9pPr lvl="8" marR="0" rtl="0" algn="l">
+      <a:lvl9pPr marR="0" lvl="8" algn="l" rtl="0">
         <a:lnSpc>
           <a:spcPct val="100000"/>
         </a:lnSpc>
@@ -5199,7 +5319,7 @@
           <a:srgbClr val="000000"/>
         </a:buClr>
         <a:buFont typeface="Arial"/>
-        <a:defRPr b="0" i="0" sz="1400" u="none" cap="none" strike="noStrike">
+        <a:defRPr sz="1400" b="0" i="0" u="none" strike="noStrike" cap="none">
           <a:solidFill>
             <a:srgbClr val="000000"/>
           </a:solidFill>
@@ -5211,7 +5331,7 @@
       </a:lvl9pPr>
     </p:bodyStyle>
     <p:otherStyle>
-      <a:defPPr lvl="0" marR="0" rtl="0" algn="l">
+      <a:defPPr marR="0" lvl="0" algn="l" rtl="0">
         <a:lnSpc>
           <a:spcPct val="100000"/>
         </a:lnSpc>
@@ -5222,7 +5342,7 @@
           <a:spcPts val="0"/>
         </a:spcAft>
       </a:defPPr>
-      <a:lvl1pPr lvl="0" marR="0" rtl="0" algn="l">
+      <a:lvl1pPr marR="0" lvl="0" algn="l" rtl="0">
         <a:lnSpc>
           <a:spcPct val="100000"/>
         </a:lnSpc>
@@ -5236,7 +5356,7 @@
           <a:srgbClr val="000000"/>
         </a:buClr>
         <a:buFont typeface="Arial"/>
-        <a:defRPr b="0" i="0" sz="1400" u="none" cap="none" strike="noStrike">
+        <a:defRPr sz="1400" b="0" i="0" u="none" strike="noStrike" cap="none">
           <a:solidFill>
             <a:srgbClr val="000000"/>
           </a:solidFill>
@@ -5246,7 +5366,7 @@
           <a:sym typeface="Arial"/>
         </a:defRPr>
       </a:lvl1pPr>
-      <a:lvl2pPr lvl="1" marR="0" rtl="0" algn="l">
+      <a:lvl2pPr marR="0" lvl="1" algn="l" rtl="0">
         <a:lnSpc>
           <a:spcPct val="100000"/>
         </a:lnSpc>
@@ -5260,7 +5380,7 @@
           <a:srgbClr val="000000"/>
         </a:buClr>
         <a:buFont typeface="Arial"/>
-        <a:defRPr b="0" i="0" sz="1400" u="none" cap="none" strike="noStrike">
+        <a:defRPr sz="1400" b="0" i="0" u="none" strike="noStrike" cap="none">
           <a:solidFill>
             <a:srgbClr val="000000"/>
           </a:solidFill>
@@ -5270,7 +5390,7 @@
           <a:sym typeface="Arial"/>
         </a:defRPr>
       </a:lvl2pPr>
-      <a:lvl3pPr lvl="2" marR="0" rtl="0" algn="l">
+      <a:lvl3pPr marR="0" lvl="2" algn="l" rtl="0">
         <a:lnSpc>
           <a:spcPct val="100000"/>
         </a:lnSpc>
@@ -5284,7 +5404,7 @@
           <a:srgbClr val="000000"/>
         </a:buClr>
         <a:buFont typeface="Arial"/>
-        <a:defRPr b="0" i="0" sz="1400" u="none" cap="none" strike="noStrike">
+        <a:defRPr sz="1400" b="0" i="0" u="none" strike="noStrike" cap="none">
           <a:solidFill>
             <a:srgbClr val="000000"/>
           </a:solidFill>
@@ -5294,7 +5414,7 @@
           <a:sym typeface="Arial"/>
         </a:defRPr>
       </a:lvl3pPr>
-      <a:lvl4pPr lvl="3" marR="0" rtl="0" algn="l">
+      <a:lvl4pPr marR="0" lvl="3" algn="l" rtl="0">
         <a:lnSpc>
           <a:spcPct val="100000"/>
         </a:lnSpc>
@@ -5308,7 +5428,7 @@
           <a:srgbClr val="000000"/>
         </a:buClr>
         <a:buFont typeface="Arial"/>
-        <a:defRPr b="0" i="0" sz="1400" u="none" cap="none" strike="noStrike">
+        <a:defRPr sz="1400" b="0" i="0" u="none" strike="noStrike" cap="none">
           <a:solidFill>
             <a:srgbClr val="000000"/>
           </a:solidFill>
@@ -5318,7 +5438,7 @@
           <a:sym typeface="Arial"/>
         </a:defRPr>
       </a:lvl4pPr>
-      <a:lvl5pPr lvl="4" marR="0" rtl="0" algn="l">
+      <a:lvl5pPr marR="0" lvl="4" algn="l" rtl="0">
         <a:lnSpc>
           <a:spcPct val="100000"/>
         </a:lnSpc>
@@ -5332,7 +5452,7 @@
           <a:srgbClr val="000000"/>
         </a:buClr>
         <a:buFont typeface="Arial"/>
-        <a:defRPr b="0" i="0" sz="1400" u="none" cap="none" strike="noStrike">
+        <a:defRPr sz="1400" b="0" i="0" u="none" strike="noStrike" cap="none">
           <a:solidFill>
             <a:srgbClr val="000000"/>
           </a:solidFill>
@@ -5342,7 +5462,7 @@
           <a:sym typeface="Arial"/>
         </a:defRPr>
       </a:lvl5pPr>
-      <a:lvl6pPr lvl="5" marR="0" rtl="0" algn="l">
+      <a:lvl6pPr marR="0" lvl="5" algn="l" rtl="0">
         <a:lnSpc>
           <a:spcPct val="100000"/>
         </a:lnSpc>
@@ -5356,7 +5476,7 @@
           <a:srgbClr val="000000"/>
         </a:buClr>
         <a:buFont typeface="Arial"/>
-        <a:defRPr b="0" i="0" sz="1400" u="none" cap="none" strike="noStrike">
+        <a:defRPr sz="1400" b="0" i="0" u="none" strike="noStrike" cap="none">
           <a:solidFill>
             <a:srgbClr val="000000"/>
           </a:solidFill>
@@ -5366,7 +5486,7 @@
           <a:sym typeface="Arial"/>
         </a:defRPr>
       </a:lvl6pPr>
-      <a:lvl7pPr lvl="6" marR="0" rtl="0" algn="l">
+      <a:lvl7pPr marR="0" lvl="6" algn="l" rtl="0">
         <a:lnSpc>
           <a:spcPct val="100000"/>
         </a:lnSpc>
@@ -5380,7 +5500,7 @@
           <a:srgbClr val="000000"/>
         </a:buClr>
         <a:buFont typeface="Arial"/>
-        <a:defRPr b="0" i="0" sz="1400" u="none" cap="none" strike="noStrike">
+        <a:defRPr sz="1400" b="0" i="0" u="none" strike="noStrike" cap="none">
           <a:solidFill>
             <a:srgbClr val="000000"/>
           </a:solidFill>
@@ -5390,7 +5510,7 @@
           <a:sym typeface="Arial"/>
         </a:defRPr>
       </a:lvl7pPr>
-      <a:lvl8pPr lvl="7" marR="0" rtl="0" algn="l">
+      <a:lvl8pPr marR="0" lvl="7" algn="l" rtl="0">
         <a:lnSpc>
           <a:spcPct val="100000"/>
         </a:lnSpc>
@@ -5404,7 +5524,7 @@
           <a:srgbClr val="000000"/>
         </a:buClr>
         <a:buFont typeface="Arial"/>
-        <a:defRPr b="0" i="0" sz="1400" u="none" cap="none" strike="noStrike">
+        <a:defRPr sz="1400" b="0" i="0" u="none" strike="noStrike" cap="none">
           <a:solidFill>
             <a:srgbClr val="000000"/>
           </a:solidFill>
@@ -5414,7 +5534,7 @@
           <a:sym typeface="Arial"/>
         </a:defRPr>
       </a:lvl8pPr>
-      <a:lvl9pPr lvl="8" marR="0" rtl="0" algn="l">
+      <a:lvl9pPr marR="0" lvl="8" algn="l" rtl="0">
         <a:lnSpc>
           <a:spcPct val="100000"/>
         </a:lnSpc>
@@ -5428,7 +5548,7 @@
           <a:srgbClr val="000000"/>
         </a:buClr>
         <a:buFont typeface="Arial"/>
-        <a:defRPr b="0" i="0" sz="1400" u="none" cap="none" strike="noStrike">
+        <a:defRPr sz="1400" b="0" i="0" u="none" strike="noStrike" cap="none">
           <a:solidFill>
             <a:srgbClr val="000000"/>
           </a:solidFill>
@@ -5444,11 +5564,11 @@
 </file>
 
 <file path=ppt/slides/slide1.xml><?xml version="1.0" encoding="utf-8"?>
-<p:sld xmlns:a="http://schemas.openxmlformats.org/drawingml/2006/main" xmlns:r="http://schemas.openxmlformats.org/officeDocument/2006/relationships" xmlns:mc="http://schemas.openxmlformats.org/markup-compatibility/2006" xmlns:mv="urn:schemas-microsoft-com:mac:vml" xmlns:p="http://schemas.openxmlformats.org/presentationml/2006/main" xmlns:c="http://schemas.openxmlformats.org/drawingml/2006/chart" xmlns:dgm="http://schemas.openxmlformats.org/drawingml/2006/diagram" xmlns:o="urn:schemas-microsoft-com:office:office" xmlns:v="urn:schemas-microsoft-com:vml" xmlns:pvml="urn:schemas-microsoft-com:office:powerpoint" xmlns:com="http://schemas.openxmlformats.org/drawingml/2006/compatibility" xmlns:p14="http://schemas.microsoft.com/office/powerpoint/2010/main" xmlns:p15="http://schemas.microsoft.com/office/powerpoint/2012/main" xmlns:ahyp="http://schemas.microsoft.com/office/drawing/2018/hyperlinkcolor">
+<p:sld xmlns:a="http://schemas.openxmlformats.org/drawingml/2006/main" xmlns:r="http://schemas.openxmlformats.org/officeDocument/2006/relationships" xmlns:p="http://schemas.openxmlformats.org/presentationml/2006/main">
   <p:cSld>
     <p:spTree>
       <p:nvGrpSpPr>
-        <p:cNvPr id="53" name="Shape 53"/>
+        <p:cNvPr id="1" name="Shape 53"/>
         <p:cNvGrpSpPr/>
         <p:nvPr/>
       </p:nvGrpSpPr>
@@ -5473,29 +5593,29 @@
           </a:xfrm>
           <a:prstGeom prst="roundRect">
             <a:avLst>
-              <a:gd fmla="val 16667" name="adj"/>
+              <a:gd name="adj" fmla="val 16667"/>
             </a:avLst>
           </a:prstGeom>
           <a:solidFill>
             <a:srgbClr val="FFEDB8"/>
           </a:solidFill>
-          <a:ln cap="flat" cmpd="sng" w="19050">
+          <a:ln w="19050" cap="flat" cmpd="sng">
             <a:solidFill>
               <a:srgbClr val="FFD966"/>
             </a:solidFill>
             <a:prstDash val="solid"/>
             <a:round/>
-            <a:headEnd len="sm" w="sm" type="none"/>
-            <a:tailEnd len="sm" w="sm" type="none"/>
+            <a:headEnd type="none" w="sm" len="sm"/>
+            <a:tailEnd type="none" w="sm" len="sm"/>
           </a:ln>
         </p:spPr>
         <p:txBody>
-          <a:bodyPr anchorCtr="0" anchor="ctr" bIns="91425" lIns="91425" spcFirstLastPara="1" rIns="91425" wrap="square" tIns="91425">
+          <a:bodyPr spcFirstLastPara="1" wrap="square" lIns="91425" tIns="91425" rIns="91425" bIns="91425" anchor="ctr" anchorCtr="0">
             <a:noAutofit/>
           </a:bodyPr>
           <a:lstStyle/>
           <a:p>
-            <a:pPr indent="0" lvl="0" marL="0" rtl="0" algn="ctr">
+            <a:pPr marL="0" lvl="0" indent="0" algn="ctr" rtl="0">
               <a:spcBef>
                 <a:spcPts val="0"/>
               </a:spcBef>
@@ -5535,29 +5655,29 @@
           </a:xfrm>
           <a:prstGeom prst="roundRect">
             <a:avLst>
-              <a:gd fmla="val 0" name="adj"/>
+              <a:gd name="adj" fmla="val 0"/>
             </a:avLst>
           </a:prstGeom>
           <a:solidFill>
             <a:srgbClr val="B7CDF1"/>
           </a:solidFill>
-          <a:ln cap="flat" cmpd="sng" w="19050">
+          <a:ln w="19050" cap="flat" cmpd="sng">
             <a:solidFill>
               <a:srgbClr val="6D9EEB"/>
             </a:solidFill>
             <a:prstDash val="solid"/>
             <a:round/>
-            <a:headEnd len="sm" w="sm" type="none"/>
-            <a:tailEnd len="sm" w="sm" type="none"/>
+            <a:headEnd type="none" w="sm" len="sm"/>
+            <a:tailEnd type="none" w="sm" len="sm"/>
           </a:ln>
         </p:spPr>
         <p:txBody>
-          <a:bodyPr anchorCtr="0" anchor="ctr" bIns="91425" lIns="91425" spcFirstLastPara="1" rIns="91425" wrap="square" tIns="91425">
+          <a:bodyPr spcFirstLastPara="1" wrap="square" lIns="91425" tIns="91425" rIns="91425" bIns="91425" anchor="ctr" anchorCtr="0">
             <a:noAutofit/>
           </a:bodyPr>
           <a:lstStyle/>
           <a:p>
-            <a:pPr indent="0" lvl="0" marL="0" rtl="0" algn="ctr">
+            <a:pPr marL="0" lvl="0" indent="0" algn="ctr" rtl="0">
               <a:spcBef>
                 <a:spcPts val="0"/>
               </a:spcBef>
@@ -5597,29 +5717,29 @@
           </a:xfrm>
           <a:prstGeom prst="roundRect">
             <a:avLst>
-              <a:gd fmla="val 16667" name="adj"/>
+              <a:gd name="adj" fmla="val 16667"/>
             </a:avLst>
           </a:prstGeom>
           <a:solidFill>
             <a:srgbClr val="DFBDCF"/>
           </a:solidFill>
-          <a:ln cap="flat" cmpd="sng" w="19050">
+          <a:ln w="19050" cap="flat" cmpd="sng">
             <a:solidFill>
               <a:srgbClr val="D09CB7"/>
             </a:solidFill>
             <a:prstDash val="solid"/>
             <a:round/>
-            <a:headEnd len="sm" w="sm" type="none"/>
-            <a:tailEnd len="sm" w="sm" type="none"/>
+            <a:headEnd type="none" w="sm" len="sm"/>
+            <a:tailEnd type="none" w="sm" len="sm"/>
           </a:ln>
         </p:spPr>
         <p:txBody>
-          <a:bodyPr anchorCtr="0" anchor="ctr" bIns="91425" lIns="91425" spcFirstLastPara="1" rIns="91425" wrap="square" tIns="91425">
+          <a:bodyPr spcFirstLastPara="1" wrap="square" lIns="91425" tIns="91425" rIns="91425" bIns="91425" anchor="ctr" anchorCtr="0">
             <a:noAutofit/>
           </a:bodyPr>
           <a:lstStyle/>
           <a:p>
-            <a:pPr indent="0" lvl="0" marL="0" rtl="0" algn="ctr">
+            <a:pPr marL="0" lvl="0" indent="0" algn="ctr" rtl="0">
               <a:spcBef>
                 <a:spcPts val="0"/>
               </a:spcBef>
@@ -5659,29 +5779,29 @@
           </a:xfrm>
           <a:prstGeom prst="octagon">
             <a:avLst>
-              <a:gd fmla="val 29289" name="adj"/>
+              <a:gd name="adj" fmla="val 29289"/>
             </a:avLst>
           </a:prstGeom>
           <a:solidFill>
             <a:srgbClr val="FFC08B"/>
           </a:solidFill>
-          <a:ln cap="flat" cmpd="sng" w="19050">
+          <a:ln w="19050" cap="flat" cmpd="sng">
             <a:solidFill>
               <a:srgbClr val="E88814"/>
             </a:solidFill>
             <a:prstDash val="solid"/>
             <a:round/>
-            <a:headEnd len="sm" w="sm" type="none"/>
-            <a:tailEnd len="sm" w="sm" type="none"/>
+            <a:headEnd type="none" w="sm" len="sm"/>
+            <a:tailEnd type="none" w="sm" len="sm"/>
           </a:ln>
         </p:spPr>
         <p:txBody>
-          <a:bodyPr anchorCtr="0" anchor="ctr" bIns="91425" lIns="91425" spcFirstLastPara="1" rIns="91425" wrap="square" tIns="91425">
+          <a:bodyPr spcFirstLastPara="1" wrap="square" lIns="91425" tIns="91425" rIns="91425" bIns="91425" anchor="ctr" anchorCtr="0">
             <a:noAutofit/>
           </a:bodyPr>
           <a:lstStyle/>
           <a:p>
-            <a:pPr indent="0" lvl="0" marL="0" rtl="0" algn="ctr">
+            <a:pPr marL="0" lvl="0" indent="0" algn="ctr" rtl="0">
               <a:spcBef>
                 <a:spcPts val="0"/>
               </a:spcBef>
@@ -5728,12 +5848,12 @@
           </a:ln>
         </p:spPr>
         <p:txBody>
-          <a:bodyPr anchorCtr="0" anchor="t" bIns="91425" lIns="91425" spcFirstLastPara="1" rIns="91425" wrap="square" tIns="91425">
+          <a:bodyPr spcFirstLastPara="1" wrap="square" lIns="91425" tIns="91425" rIns="91425" bIns="91425" anchor="t" anchorCtr="0">
             <a:noAutofit/>
           </a:bodyPr>
           <a:lstStyle/>
           <a:p>
-            <a:pPr indent="0" lvl="0" marL="0" rtl="0" algn="l">
+            <a:pPr marL="0" lvl="0" indent="0" algn="l" rtl="0">
               <a:lnSpc>
                 <a:spcPct val="115000"/>
               </a:lnSpc>
@@ -5772,7 +5892,7 @@
                 <a:hlinkClick r:id="rId3">
                   <a:extLst>
                     <a:ext uri="{A12FA001-AC4F-418D-AE19-62706E023703}">
-                      <ahyp:hlinkClr val="tx"/>
+                      <ahyp:hlinkClr xmlns:ahyp="http://schemas.microsoft.com/office/drawing/2018/hyperlinkcolor" val="tx"/>
                     </a:ext>
                   </a:extLst>
                 </a:hlinkClick>
@@ -5788,10 +5908,10 @@
                 <a:ea typeface="Open Sans"/>
                 <a:cs typeface="Open Sans"/>
                 <a:sym typeface="Open Sans"/>
-                <a:hlinkClick r:id="rId4">
+                <a:hlinkClick r:id="rId3">
                   <a:extLst>
                     <a:ext uri="{A12FA001-AC4F-418D-AE19-62706E023703}">
-                      <ahyp:hlinkClr val="tx"/>
+                      <ahyp:hlinkClr xmlns:ahyp="http://schemas.microsoft.com/office/drawing/2018/hyperlinkcolor" val="tx"/>
                     </a:ext>
                   </a:extLst>
                 </a:hlinkClick>
@@ -5841,23 +5961,23 @@
               <a:alpha val="54490"/>
             </a:srgbClr>
           </a:solidFill>
-          <a:ln cap="flat" cmpd="sng" w="9525">
+          <a:ln w="19050" cap="flat" cmpd="sng">
             <a:solidFill>
-              <a:srgbClr val="C3B6EF"/>
+              <a:srgbClr val="967EE2"/>
             </a:solidFill>
-            <a:prstDash val="solid"/>
+            <a:prstDash val="dash"/>
             <a:round/>
-            <a:headEnd len="sm" w="sm" type="none"/>
-            <a:tailEnd len="sm" w="sm" type="none"/>
+            <a:headEnd type="none" w="sm" len="sm"/>
+            <a:tailEnd type="none" w="sm" len="sm"/>
           </a:ln>
         </p:spPr>
         <p:txBody>
-          <a:bodyPr anchorCtr="0" anchor="ctr" bIns="91425" lIns="91425" spcFirstLastPara="1" rIns="91425" wrap="square" tIns="91425">
+          <a:bodyPr spcFirstLastPara="1" wrap="square" lIns="91425" tIns="91425" rIns="91425" bIns="91425" anchor="ctr" anchorCtr="0">
             <a:noAutofit/>
           </a:bodyPr>
           <a:lstStyle/>
           <a:p>
-            <a:pPr indent="0" lvl="0" marL="0" rtl="0" algn="ctr">
+            <a:pPr marL="0" lvl="0" indent="0" algn="ctr" rtl="0">
               <a:spcBef>
                 <a:spcPts val="0"/>
               </a:spcBef>
@@ -5904,12 +6024,12 @@
           </a:ln>
         </p:spPr>
         <p:txBody>
-          <a:bodyPr anchorCtr="0" anchor="t" bIns="91425" lIns="91425" spcFirstLastPara="1" rIns="91425" wrap="square" tIns="91425">
+          <a:bodyPr spcFirstLastPara="1" wrap="square" lIns="91425" tIns="91425" rIns="91425" bIns="91425" anchor="t" anchorCtr="0">
             <a:noAutofit/>
           </a:bodyPr>
           <a:lstStyle/>
           <a:p>
-            <a:pPr indent="0" lvl="0" marL="0" rtl="0" algn="ctr">
+            <a:pPr marL="0" lvl="0" indent="0" algn="ctr" rtl="0">
               <a:spcBef>
                 <a:spcPts val="0"/>
               </a:spcBef>
@@ -5919,7 +6039,7 @@
               <a:buNone/>
             </a:pPr>
             <a:r>
-              <a:rPr b="1" lang="en-GB" sz="1050" u="sng">
+              <a:rPr lang="en-GB" sz="1050" b="1" u="sng">
                 <a:solidFill>
                   <a:srgbClr val="1A1A1A"/>
                 </a:solidFill>
@@ -5959,12 +6079,12 @@
           </a:ln>
         </p:spPr>
         <p:txBody>
-          <a:bodyPr anchorCtr="0" anchor="t" bIns="91425" lIns="91425" spcFirstLastPara="1" rIns="91425" wrap="square" tIns="91425">
+          <a:bodyPr spcFirstLastPara="1" wrap="square" lIns="91425" tIns="91425" rIns="91425" bIns="91425" anchor="t" anchorCtr="0">
             <a:noAutofit/>
           </a:bodyPr>
           <a:lstStyle/>
           <a:p>
-            <a:pPr indent="0" lvl="0" marL="0" rtl="0" algn="ctr">
+            <a:pPr marL="0" lvl="0" indent="0" algn="ctr" rtl="0">
               <a:spcBef>
                 <a:spcPts val="0"/>
               </a:spcBef>
@@ -5974,7 +6094,7 @@
               <a:buNone/>
             </a:pPr>
             <a:r>
-              <a:rPr b="1" lang="en-GB" sz="1050" u="sng">
+              <a:rPr lang="en-GB" sz="1050" b="1" u="sng">
                 <a:solidFill>
                   <a:srgbClr val="1A1A1A"/>
                 </a:solidFill>
@@ -6007,29 +6127,31 @@
           </a:xfrm>
           <a:prstGeom prst="triangle">
             <a:avLst>
-              <a:gd fmla="val 50000" name="adj"/>
+              <a:gd name="adj" fmla="val 50000"/>
             </a:avLst>
           </a:prstGeom>
           <a:solidFill>
-            <a:srgbClr val="B4B4B4"/>
+            <a:srgbClr val="B4B4B4">
+              <a:alpha val="50196"/>
+            </a:srgbClr>
           </a:solidFill>
-          <a:ln cap="flat" cmpd="sng" w="9525">
+          <a:ln w="19050" cap="flat" cmpd="sng">
             <a:solidFill>
               <a:srgbClr val="999696"/>
             </a:solidFill>
-            <a:prstDash val="solid"/>
+            <a:prstDash val="dash"/>
             <a:round/>
-            <a:headEnd len="sm" w="sm" type="none"/>
-            <a:tailEnd len="sm" w="sm" type="none"/>
+            <a:headEnd type="none" w="sm" len="sm"/>
+            <a:tailEnd type="none" w="sm" len="sm"/>
           </a:ln>
         </p:spPr>
         <p:txBody>
-          <a:bodyPr anchorCtr="0" anchor="ctr" bIns="91425" lIns="91425" spcFirstLastPara="1" rIns="91425" wrap="square" tIns="91425">
+          <a:bodyPr spcFirstLastPara="1" wrap="square" lIns="91425" tIns="91425" rIns="91425" bIns="91425" anchor="ctr" anchorCtr="0">
             <a:noAutofit/>
           </a:bodyPr>
           <a:lstStyle/>
           <a:p>
-            <a:pPr indent="0" lvl="0" marL="0" rtl="0" algn="ctr">
+            <a:pPr marL="0" lvl="0" indent="0" algn="ctr" rtl="0">
               <a:spcBef>
                 <a:spcPts val="0"/>
               </a:spcBef>
@@ -6075,23 +6197,23 @@
               <a:alpha val="51120"/>
             </a:srgbClr>
           </a:solidFill>
-          <a:ln cap="flat" cmpd="sng" w="9525">
+          <a:ln w="19050" cap="flat" cmpd="sng">
             <a:solidFill>
-              <a:srgbClr val="CCD8C7"/>
+              <a:srgbClr val="78996B"/>
             </a:solidFill>
-            <a:prstDash val="solid"/>
+            <a:prstDash val="dash"/>
             <a:round/>
-            <a:headEnd len="sm" w="sm" type="none"/>
-            <a:tailEnd len="sm" w="sm" type="none"/>
+            <a:headEnd type="none" w="sm" len="sm"/>
+            <a:tailEnd type="none" w="sm" len="sm"/>
           </a:ln>
         </p:spPr>
         <p:txBody>
-          <a:bodyPr anchorCtr="0" anchor="ctr" bIns="91425" lIns="91425" spcFirstLastPara="1" rIns="91425" wrap="square" tIns="91425">
+          <a:bodyPr spcFirstLastPara="1" wrap="square" lIns="91425" tIns="91425" rIns="91425" bIns="91425" anchor="ctr" anchorCtr="0">
             <a:noAutofit/>
           </a:bodyPr>
           <a:lstStyle/>
           <a:p>
-            <a:pPr indent="0" lvl="0" marL="0" rtl="0" algn="ctr">
+            <a:pPr marL="0" lvl="0" indent="0" algn="ctr" rtl="0">
               <a:spcBef>
                 <a:spcPts val="0"/>
               </a:spcBef>
@@ -6138,12 +6260,12 @@
           </a:ln>
         </p:spPr>
         <p:txBody>
-          <a:bodyPr anchorCtr="0" anchor="t" bIns="91425" lIns="91425" spcFirstLastPara="1" rIns="91425" wrap="square" tIns="91425">
+          <a:bodyPr spcFirstLastPara="1" wrap="square" lIns="91425" tIns="91425" rIns="91425" bIns="91425" anchor="t" anchorCtr="0">
             <a:spAutoFit/>
           </a:bodyPr>
           <a:lstStyle/>
           <a:p>
-            <a:pPr indent="0" lvl="0" marL="0" rtl="0" algn="l">
+            <a:pPr marL="0" lvl="0" indent="0" algn="l" rtl="0">
               <a:spcBef>
                 <a:spcPts val="0"/>
               </a:spcBef>
@@ -6153,7 +6275,7 @@
               <a:buNone/>
             </a:pPr>
             <a:r>
-              <a:rPr b="1" lang="en-GB">
+              <a:rPr lang="en-GB" b="1">
                 <a:latin typeface="Open Sans"/>
                 <a:ea typeface="Open Sans"/>
                 <a:cs typeface="Open Sans"/>
@@ -6192,28 +6314,28 @@
           </a:xfrm>
           <a:prstGeom prst="rightArrow">
             <a:avLst>
-              <a:gd fmla="val 57171" name="adj1"/>
-              <a:gd fmla="val 70330" name="adj2"/>
+              <a:gd name="adj1" fmla="val 57171"/>
+              <a:gd name="adj2" fmla="val 70330"/>
             </a:avLst>
           </a:prstGeom>
           <a:noFill/>
-          <a:ln cap="flat" cmpd="sng" w="9525">
+          <a:ln w="9525" cap="flat" cmpd="sng">
             <a:solidFill>
               <a:schemeClr val="dk2"/>
             </a:solidFill>
             <a:prstDash val="dash"/>
             <a:round/>
-            <a:headEnd len="sm" w="sm" type="none"/>
-            <a:tailEnd len="sm" w="sm" type="none"/>
+            <a:headEnd type="none" w="sm" len="sm"/>
+            <a:tailEnd type="none" w="sm" len="sm"/>
           </a:ln>
         </p:spPr>
         <p:txBody>
-          <a:bodyPr anchorCtr="0" anchor="ctr" bIns="91425" lIns="91425" spcFirstLastPara="1" rIns="91425" wrap="square" tIns="91425">
+          <a:bodyPr spcFirstLastPara="1" wrap="square" lIns="91425" tIns="91425" rIns="91425" bIns="91425" anchor="ctr" anchorCtr="0">
             <a:noAutofit/>
           </a:bodyPr>
           <a:lstStyle/>
           <a:p>
-            <a:pPr indent="0" lvl="0" marL="0" rtl="0" algn="ctr">
+            <a:pPr marL="0" lvl="0" indent="0" algn="ctr" rtl="0">
               <a:spcBef>
                 <a:spcPts val="0"/>
               </a:spcBef>
@@ -6239,7 +6361,288 @@
 </file>
 
 <file path=ppt/theme/theme1.xml><?xml version="1.0" encoding="utf-8"?>
-<a:theme xmlns:a="http://schemas.openxmlformats.org/drawingml/2006/main" xmlns:r="http://schemas.openxmlformats.org/officeDocument/2006/relationships">
+<a:theme xmlns:a="http://schemas.openxmlformats.org/drawingml/2006/main" name="Simple Light">
+  <a:themeElements>
+    <a:clrScheme name="Simple Light">
+      <a:dk1>
+        <a:srgbClr val="000000"/>
+      </a:dk1>
+      <a:lt1>
+        <a:srgbClr val="FFFFFF"/>
+      </a:lt1>
+      <a:dk2>
+        <a:srgbClr val="595959"/>
+      </a:dk2>
+      <a:lt2>
+        <a:srgbClr val="EEEEEE"/>
+      </a:lt2>
+      <a:accent1>
+        <a:srgbClr val="4285F4"/>
+      </a:accent1>
+      <a:accent2>
+        <a:srgbClr val="212121"/>
+      </a:accent2>
+      <a:accent3>
+        <a:srgbClr val="78909C"/>
+      </a:accent3>
+      <a:accent4>
+        <a:srgbClr val="FFAB40"/>
+      </a:accent4>
+      <a:accent5>
+        <a:srgbClr val="0097A7"/>
+      </a:accent5>
+      <a:accent6>
+        <a:srgbClr val="EEFF41"/>
+      </a:accent6>
+      <a:hlink>
+        <a:srgbClr val="0097A7"/>
+      </a:hlink>
+      <a:folHlink>
+        <a:srgbClr val="0097A7"/>
+      </a:folHlink>
+    </a:clrScheme>
+    <a:fontScheme name="Office">
+      <a:majorFont>
+        <a:latin typeface="Arial"/>
+        <a:ea typeface=""/>
+        <a:cs typeface=""/>
+        <a:font script="Jpan" typeface="ＭＳ Ｐゴシック"/>
+        <a:font script="Hang" typeface="맑은 고딕"/>
+        <a:font script="Hans" typeface="宋体"/>
+        <a:font script="Hant" typeface="新細明體"/>
+        <a:font script="Arab" typeface="Times New Roman"/>
+        <a:font script="Hebr" typeface="Times New Roman"/>
+        <a:font script="Thai" typeface="Angsana New"/>
+        <a:font script="Ethi" typeface="Nyala"/>
+        <a:font script="Beng" typeface="Vrinda"/>
+        <a:font script="Gujr" typeface="Shruti"/>
+        <a:font script="Khmr" typeface="MoolBoran"/>
+        <a:font script="Knda" typeface="Tunga"/>
+        <a:font script="Guru" typeface="Raavi"/>
+        <a:font script="Cans" typeface="Euphemia"/>
+        <a:font script="Cher" typeface="Plantagenet Cherokee"/>
+        <a:font script="Yiii" typeface="Microsoft Yi Baiti"/>
+        <a:font script="Tibt" typeface="Microsoft Himalaya"/>
+        <a:font script="Thaa" typeface="MV Boli"/>
+        <a:font script="Deva" typeface="Mangal"/>
+        <a:font script="Telu" typeface="Gautami"/>
+        <a:font script="Taml" typeface="Latha"/>
+        <a:font script="Syrc" typeface="Estrangelo Edessa"/>
+        <a:font script="Orya" typeface="Kalinga"/>
+        <a:font script="Mlym" typeface="Kartika"/>
+        <a:font script="Laoo" typeface="DokChampa"/>
+        <a:font script="Sinh" typeface="Iskoola Pota"/>
+        <a:font script="Mong" typeface="Mongolian Baiti"/>
+        <a:font script="Viet" typeface="Times New Roman"/>
+        <a:font script="Uigh" typeface="Microsoft Uighur"/>
+        <a:font script="Geor" typeface="Sylfaen"/>
+      </a:majorFont>
+      <a:minorFont>
+        <a:latin typeface="Arial"/>
+        <a:ea typeface=""/>
+        <a:cs typeface=""/>
+        <a:font script="Jpan" typeface="ＭＳ Ｐゴシック"/>
+        <a:font script="Hang" typeface="맑은 고딕"/>
+        <a:font script="Hans" typeface="宋体"/>
+        <a:font script="Hant" typeface="新細明體"/>
+        <a:font script="Arab" typeface="Arial"/>
+        <a:font script="Hebr" typeface="Arial"/>
+        <a:font script="Thai" typeface="Cordia New"/>
+        <a:font script="Ethi" typeface="Nyala"/>
+        <a:font script="Beng" typeface="Vrinda"/>
+        <a:font script="Gujr" typeface="Shruti"/>
+        <a:font script="Khmr" typeface="DaunPenh"/>
+        <a:font script="Knda" typeface="Tunga"/>
+        <a:font script="Guru" typeface="Raavi"/>
+        <a:font script="Cans" typeface="Euphemia"/>
+        <a:font script="Cher" typeface="Plantagenet Cherokee"/>
+        <a:font script="Yiii" typeface="Microsoft Yi Baiti"/>
+        <a:font script="Tibt" typeface="Microsoft Himalaya"/>
+        <a:font script="Thaa" typeface="MV Boli"/>
+        <a:font script="Deva" typeface="Mangal"/>
+        <a:font script="Telu" typeface="Gautami"/>
+        <a:font script="Taml" typeface="Latha"/>
+        <a:font script="Syrc" typeface="Estrangelo Edessa"/>
+        <a:font script="Orya" typeface="Kalinga"/>
+        <a:font script="Mlym" typeface="Kartika"/>
+        <a:font script="Laoo" typeface="DokChampa"/>
+        <a:font script="Sinh" typeface="Iskoola Pota"/>
+        <a:font script="Mong" typeface="Mongolian Baiti"/>
+        <a:font script="Viet" typeface="Arial"/>
+        <a:font script="Uigh" typeface="Microsoft Uighur"/>
+        <a:font script="Geor" typeface="Sylfaen"/>
+      </a:minorFont>
+    </a:fontScheme>
+    <a:fmtScheme name="Office">
+      <a:fillStyleLst>
+        <a:solidFill>
+          <a:schemeClr val="phClr"/>
+        </a:solidFill>
+        <a:gradFill rotWithShape="1">
+          <a:gsLst>
+            <a:gs pos="0">
+              <a:schemeClr val="phClr">
+                <a:tint val="50000"/>
+                <a:satMod val="300000"/>
+              </a:schemeClr>
+            </a:gs>
+            <a:gs pos="35000">
+              <a:schemeClr val="phClr">
+                <a:tint val="37000"/>
+                <a:satMod val="300000"/>
+              </a:schemeClr>
+            </a:gs>
+            <a:gs pos="100000">
+              <a:schemeClr val="phClr">
+                <a:tint val="15000"/>
+                <a:satMod val="350000"/>
+              </a:schemeClr>
+            </a:gs>
+          </a:gsLst>
+          <a:lin ang="16200000" scaled="1"/>
+        </a:gradFill>
+        <a:gradFill rotWithShape="1">
+          <a:gsLst>
+            <a:gs pos="0">
+              <a:schemeClr val="phClr">
+                <a:tint val="100000"/>
+                <a:shade val="100000"/>
+                <a:satMod val="130000"/>
+              </a:schemeClr>
+            </a:gs>
+            <a:gs pos="100000">
+              <a:schemeClr val="phClr">
+                <a:tint val="50000"/>
+                <a:shade val="100000"/>
+                <a:satMod val="350000"/>
+              </a:schemeClr>
+            </a:gs>
+          </a:gsLst>
+          <a:lin ang="16200000" scaled="0"/>
+        </a:gradFill>
+      </a:fillStyleLst>
+      <a:lnStyleLst>
+        <a:ln w="9525" cap="flat" cmpd="sng" algn="ctr">
+          <a:solidFill>
+            <a:schemeClr val="phClr">
+              <a:shade val="95000"/>
+              <a:satMod val="105000"/>
+            </a:schemeClr>
+          </a:solidFill>
+          <a:prstDash val="solid"/>
+        </a:ln>
+        <a:ln w="25400" cap="flat" cmpd="sng" algn="ctr">
+          <a:solidFill>
+            <a:schemeClr val="phClr"/>
+          </a:solidFill>
+          <a:prstDash val="solid"/>
+        </a:ln>
+        <a:ln w="38100" cap="flat" cmpd="sng" algn="ctr">
+          <a:solidFill>
+            <a:schemeClr val="phClr"/>
+          </a:solidFill>
+          <a:prstDash val="solid"/>
+        </a:ln>
+      </a:lnStyleLst>
+      <a:effectStyleLst>
+        <a:effectStyle>
+          <a:effectLst>
+            <a:outerShdw blurRad="40000" dist="20000" dir="5400000" rotWithShape="0">
+              <a:srgbClr val="000000">
+                <a:alpha val="38000"/>
+              </a:srgbClr>
+            </a:outerShdw>
+          </a:effectLst>
+        </a:effectStyle>
+        <a:effectStyle>
+          <a:effectLst>
+            <a:outerShdw blurRad="40000" dist="23000" dir="5400000" rotWithShape="0">
+              <a:srgbClr val="000000">
+                <a:alpha val="35000"/>
+              </a:srgbClr>
+            </a:outerShdw>
+          </a:effectLst>
+        </a:effectStyle>
+        <a:effectStyle>
+          <a:effectLst>
+            <a:outerShdw blurRad="40000" dist="23000" dir="5400000" rotWithShape="0">
+              <a:srgbClr val="000000">
+                <a:alpha val="35000"/>
+              </a:srgbClr>
+            </a:outerShdw>
+          </a:effectLst>
+          <a:scene3d>
+            <a:camera prst="orthographicFront">
+              <a:rot lat="0" lon="0" rev="0"/>
+            </a:camera>
+            <a:lightRig rig="threePt" dir="t">
+              <a:rot lat="0" lon="0" rev="1200000"/>
+            </a:lightRig>
+          </a:scene3d>
+          <a:sp3d>
+            <a:bevelT w="63500" h="25400"/>
+          </a:sp3d>
+        </a:effectStyle>
+      </a:effectStyleLst>
+      <a:bgFillStyleLst>
+        <a:solidFill>
+          <a:schemeClr val="phClr"/>
+        </a:solidFill>
+        <a:gradFill rotWithShape="1">
+          <a:gsLst>
+            <a:gs pos="0">
+              <a:schemeClr val="phClr">
+                <a:tint val="40000"/>
+                <a:satMod val="350000"/>
+              </a:schemeClr>
+            </a:gs>
+            <a:gs pos="40000">
+              <a:schemeClr val="phClr">
+                <a:tint val="45000"/>
+                <a:shade val="99000"/>
+                <a:satMod val="350000"/>
+              </a:schemeClr>
+            </a:gs>
+            <a:gs pos="100000">
+              <a:schemeClr val="phClr">
+                <a:shade val="20000"/>
+                <a:satMod val="255000"/>
+              </a:schemeClr>
+            </a:gs>
+          </a:gsLst>
+          <a:path path="circle">
+            <a:fillToRect l="50000" t="-80000" r="50000" b="180000"/>
+          </a:path>
+        </a:gradFill>
+        <a:gradFill rotWithShape="1">
+          <a:gsLst>
+            <a:gs pos="0">
+              <a:schemeClr val="phClr">
+                <a:tint val="80000"/>
+                <a:satMod val="300000"/>
+              </a:schemeClr>
+            </a:gs>
+            <a:gs pos="100000">
+              <a:schemeClr val="phClr">
+                <a:shade val="30000"/>
+                <a:satMod val="200000"/>
+              </a:schemeClr>
+            </a:gs>
+          </a:gsLst>
+          <a:path path="circle">
+            <a:fillToRect l="50000" t="50000" r="50000" b="50000"/>
+          </a:path>
+        </a:gradFill>
+      </a:bgFillStyleLst>
+    </a:fmtScheme>
+  </a:themeElements>
+  <a:objectDefaults/>
+  <a:extraClrSchemeLst/>
+</a:theme>
+</file>
+
+<file path=ppt/theme/theme2.xml><?xml version="1.0" encoding="utf-8"?>
+<a:theme xmlns:a="http://schemas.openxmlformats.org/drawingml/2006/main">
   <a:themeElements>
     <a:clrScheme name="Default">
       <a:dk1>
@@ -6514,284 +6917,7 @@
       </a:bgFillStyleLst>
     </a:fmtScheme>
   </a:themeElements>
-</a:theme>
-</file>
-
-<file path=ppt/theme/theme2.xml><?xml version="1.0" encoding="utf-8"?>
-<a:theme xmlns:a="http://schemas.openxmlformats.org/drawingml/2006/main" xmlns:r="http://schemas.openxmlformats.org/officeDocument/2006/relationships" name="Simple Light">
-  <a:themeElements>
-    <a:clrScheme name="Simple Light">
-      <a:dk1>
-        <a:srgbClr val="000000"/>
-      </a:dk1>
-      <a:lt1>
-        <a:srgbClr val="FFFFFF"/>
-      </a:lt1>
-      <a:dk2>
-        <a:srgbClr val="595959"/>
-      </a:dk2>
-      <a:lt2>
-        <a:srgbClr val="EEEEEE"/>
-      </a:lt2>
-      <a:accent1>
-        <a:srgbClr val="4285F4"/>
-      </a:accent1>
-      <a:accent2>
-        <a:srgbClr val="212121"/>
-      </a:accent2>
-      <a:accent3>
-        <a:srgbClr val="78909C"/>
-      </a:accent3>
-      <a:accent4>
-        <a:srgbClr val="FFAB40"/>
-      </a:accent4>
-      <a:accent5>
-        <a:srgbClr val="0097A7"/>
-      </a:accent5>
-      <a:accent6>
-        <a:srgbClr val="EEFF41"/>
-      </a:accent6>
-      <a:hlink>
-        <a:srgbClr val="0097A7"/>
-      </a:hlink>
-      <a:folHlink>
-        <a:srgbClr val="0097A7"/>
-      </a:folHlink>
-    </a:clrScheme>
-    <a:fontScheme name="Office">
-      <a:majorFont>
-        <a:latin typeface="Arial"/>
-        <a:ea typeface=""/>
-        <a:cs typeface=""/>
-        <a:font script="Jpan" typeface="ＭＳ Ｐゴシック"/>
-        <a:font script="Hang" typeface="맑은 고딕"/>
-        <a:font script="Hans" typeface="宋体"/>
-        <a:font script="Hant" typeface="新細明體"/>
-        <a:font script="Arab" typeface="Times New Roman"/>
-        <a:font script="Hebr" typeface="Times New Roman"/>
-        <a:font script="Thai" typeface="Angsana New"/>
-        <a:font script="Ethi" typeface="Nyala"/>
-        <a:font script="Beng" typeface="Vrinda"/>
-        <a:font script="Gujr" typeface="Shruti"/>
-        <a:font script="Khmr" typeface="MoolBoran"/>
-        <a:font script="Knda" typeface="Tunga"/>
-        <a:font script="Guru" typeface="Raavi"/>
-        <a:font script="Cans" typeface="Euphemia"/>
-        <a:font script="Cher" typeface="Plantagenet Cherokee"/>
-        <a:font script="Yiii" typeface="Microsoft Yi Baiti"/>
-        <a:font script="Tibt" typeface="Microsoft Himalaya"/>
-        <a:font script="Thaa" typeface="MV Boli"/>
-        <a:font script="Deva" typeface="Mangal"/>
-        <a:font script="Telu" typeface="Gautami"/>
-        <a:font script="Taml" typeface="Latha"/>
-        <a:font script="Syrc" typeface="Estrangelo Edessa"/>
-        <a:font script="Orya" typeface="Kalinga"/>
-        <a:font script="Mlym" typeface="Kartika"/>
-        <a:font script="Laoo" typeface="DokChampa"/>
-        <a:font script="Sinh" typeface="Iskoola Pota"/>
-        <a:font script="Mong" typeface="Mongolian Baiti"/>
-        <a:font script="Viet" typeface="Times New Roman"/>
-        <a:font script="Uigh" typeface="Microsoft Uighur"/>
-        <a:font script="Geor" typeface="Sylfaen"/>
-      </a:majorFont>
-      <a:minorFont>
-        <a:latin typeface="Arial"/>
-        <a:ea typeface=""/>
-        <a:cs typeface=""/>
-        <a:font script="Jpan" typeface="ＭＳ Ｐゴシック"/>
-        <a:font script="Hang" typeface="맑은 고딕"/>
-        <a:font script="Hans" typeface="宋体"/>
-        <a:font script="Hant" typeface="新細明體"/>
-        <a:font script="Arab" typeface="Arial"/>
-        <a:font script="Hebr" typeface="Arial"/>
-        <a:font script="Thai" typeface="Cordia New"/>
-        <a:font script="Ethi" typeface="Nyala"/>
-        <a:font script="Beng" typeface="Vrinda"/>
-        <a:font script="Gujr" typeface="Shruti"/>
-        <a:font script="Khmr" typeface="DaunPenh"/>
-        <a:font script="Knda" typeface="Tunga"/>
-        <a:font script="Guru" typeface="Raavi"/>
-        <a:font script="Cans" typeface="Euphemia"/>
-        <a:font script="Cher" typeface="Plantagenet Cherokee"/>
-        <a:font script="Yiii" typeface="Microsoft Yi Baiti"/>
-        <a:font script="Tibt" typeface="Microsoft Himalaya"/>
-        <a:font script="Thaa" typeface="MV Boli"/>
-        <a:font script="Deva" typeface="Mangal"/>
-        <a:font script="Telu" typeface="Gautami"/>
-        <a:font script="Taml" typeface="Latha"/>
-        <a:font script="Syrc" typeface="Estrangelo Edessa"/>
-        <a:font script="Orya" typeface="Kalinga"/>
-        <a:font script="Mlym" typeface="Kartika"/>
-        <a:font script="Laoo" typeface="DokChampa"/>
-        <a:font script="Sinh" typeface="Iskoola Pota"/>
-        <a:font script="Mong" typeface="Mongolian Baiti"/>
-        <a:font script="Viet" typeface="Arial"/>
-        <a:font script="Uigh" typeface="Microsoft Uighur"/>
-        <a:font script="Geor" typeface="Sylfaen"/>
-      </a:minorFont>
-    </a:fontScheme>
-    <a:fmtScheme name="Office">
-      <a:fillStyleLst>
-        <a:solidFill>
-          <a:schemeClr val="phClr"/>
-        </a:solidFill>
-        <a:gradFill rotWithShape="1">
-          <a:gsLst>
-            <a:gs pos="0">
-              <a:schemeClr val="phClr">
-                <a:tint val="50000"/>
-                <a:satMod val="300000"/>
-              </a:schemeClr>
-            </a:gs>
-            <a:gs pos="35000">
-              <a:schemeClr val="phClr">
-                <a:tint val="37000"/>
-                <a:satMod val="300000"/>
-              </a:schemeClr>
-            </a:gs>
-            <a:gs pos="100000">
-              <a:schemeClr val="phClr">
-                <a:tint val="15000"/>
-                <a:satMod val="350000"/>
-              </a:schemeClr>
-            </a:gs>
-          </a:gsLst>
-          <a:lin ang="16200000" scaled="1"/>
-        </a:gradFill>
-        <a:gradFill rotWithShape="1">
-          <a:gsLst>
-            <a:gs pos="0">
-              <a:schemeClr val="phClr">
-                <a:tint val="100000"/>
-                <a:shade val="100000"/>
-                <a:satMod val="130000"/>
-              </a:schemeClr>
-            </a:gs>
-            <a:gs pos="100000">
-              <a:schemeClr val="phClr">
-                <a:tint val="50000"/>
-                <a:shade val="100000"/>
-                <a:satMod val="350000"/>
-              </a:schemeClr>
-            </a:gs>
-          </a:gsLst>
-          <a:lin ang="16200000" scaled="0"/>
-        </a:gradFill>
-      </a:fillStyleLst>
-      <a:lnStyleLst>
-        <a:ln w="9525" cap="flat" cmpd="sng" algn="ctr">
-          <a:solidFill>
-            <a:schemeClr val="phClr">
-              <a:shade val="95000"/>
-              <a:satMod val="105000"/>
-            </a:schemeClr>
-          </a:solidFill>
-          <a:prstDash val="solid"/>
-        </a:ln>
-        <a:ln w="25400" cap="flat" cmpd="sng" algn="ctr">
-          <a:solidFill>
-            <a:schemeClr val="phClr"/>
-          </a:solidFill>
-          <a:prstDash val="solid"/>
-        </a:ln>
-        <a:ln w="38100" cap="flat" cmpd="sng" algn="ctr">
-          <a:solidFill>
-            <a:schemeClr val="phClr"/>
-          </a:solidFill>
-          <a:prstDash val="solid"/>
-        </a:ln>
-      </a:lnStyleLst>
-      <a:effectStyleLst>
-        <a:effectStyle>
-          <a:effectLst>
-            <a:outerShdw blurRad="40000" dist="20000" dir="5400000" rotWithShape="0">
-              <a:srgbClr val="000000">
-                <a:alpha val="38000"/>
-              </a:srgbClr>
-            </a:outerShdw>
-          </a:effectLst>
-        </a:effectStyle>
-        <a:effectStyle>
-          <a:effectLst>
-            <a:outerShdw blurRad="40000" dist="23000" dir="5400000" rotWithShape="0">
-              <a:srgbClr val="000000">
-                <a:alpha val="35000"/>
-              </a:srgbClr>
-            </a:outerShdw>
-          </a:effectLst>
-        </a:effectStyle>
-        <a:effectStyle>
-          <a:effectLst>
-            <a:outerShdw blurRad="40000" dist="23000" dir="5400000" rotWithShape="0">
-              <a:srgbClr val="000000">
-                <a:alpha val="35000"/>
-              </a:srgbClr>
-            </a:outerShdw>
-          </a:effectLst>
-          <a:scene3d>
-            <a:camera prst="orthographicFront">
-              <a:rot lat="0" lon="0" rev="0"/>
-            </a:camera>
-            <a:lightRig rig="threePt" dir="t">
-              <a:rot lat="0" lon="0" rev="1200000"/>
-            </a:lightRig>
-          </a:scene3d>
-          <a:sp3d>
-            <a:bevelT w="63500" h="25400"/>
-          </a:sp3d>
-        </a:effectStyle>
-      </a:effectStyleLst>
-      <a:bgFillStyleLst>
-        <a:solidFill>
-          <a:schemeClr val="phClr"/>
-        </a:solidFill>
-        <a:gradFill rotWithShape="1">
-          <a:gsLst>
-            <a:gs pos="0">
-              <a:schemeClr val="phClr">
-                <a:tint val="40000"/>
-                <a:satMod val="350000"/>
-              </a:schemeClr>
-            </a:gs>
-            <a:gs pos="40000">
-              <a:schemeClr val="phClr">
-                <a:tint val="45000"/>
-                <a:shade val="99000"/>
-                <a:satMod val="350000"/>
-              </a:schemeClr>
-            </a:gs>
-            <a:gs pos="100000">
-              <a:schemeClr val="phClr">
-                <a:shade val="20000"/>
-                <a:satMod val="255000"/>
-              </a:schemeClr>
-            </a:gs>
-          </a:gsLst>
-          <a:path path="circle">
-            <a:fillToRect l="50000" t="-80000" r="50000" b="180000"/>
-          </a:path>
-        </a:gradFill>
-        <a:gradFill rotWithShape="1">
-          <a:gsLst>
-            <a:gs pos="0">
-              <a:schemeClr val="phClr">
-                <a:tint val="80000"/>
-                <a:satMod val="300000"/>
-              </a:schemeClr>
-            </a:gs>
-            <a:gs pos="100000">
-              <a:schemeClr val="phClr">
-                <a:shade val="30000"/>
-                <a:satMod val="200000"/>
-              </a:schemeClr>
-            </a:gs>
-          </a:gsLst>
-          <a:path path="circle">
-            <a:fillToRect l="50000" t="50000" r="50000" b="50000"/>
-          </a:path>
-        </a:gradFill>
-      </a:bgFillStyleLst>
-    </a:fmtScheme>
-  </a:themeElements>
+  <a:objectDefaults/>
+  <a:extraClrSchemeLst/>
 </a:theme>
 </file>
</xml_diff>

<commit_message>
Update Team to No Team Type
</commit_message>
<xml_diff>
--- a/powerpoint/Team Topologies Template for modelling - PowerPoint.pptx
+++ b/powerpoint/Team Topologies Template for modelling - PowerPoint.pptx
@@ -14,7 +14,7 @@
   <p:notesSz cx="6858000" cy="9144000"/>
   <p:embeddedFontLst>
     <p:embeddedFont>
-      <p:font typeface="Open Sans" panose="020B0604020202020204" charset="0"/>
+      <p:font typeface="Open Sans" panose="020B0606030504020204" pitchFamily="34" charset="0"/>
       <p:regular r:id="rId4"/>
       <p:bold r:id="rId5"/>
       <p:italic r:id="rId6"/>
@@ -5588,8 +5588,8 @@
         </p:nvSpPr>
         <p:spPr>
           <a:xfrm>
-            <a:off x="1117400" y="1303200"/>
-            <a:ext cx="3001500" cy="326400"/>
+            <a:off x="1397957" y="1120250"/>
+            <a:ext cx="2985473" cy="307399"/>
           </a:xfrm>
           <a:prstGeom prst="roundRect">
             <a:avLst>
@@ -5625,7 +5625,7 @@
               <a:buNone/>
             </a:pPr>
             <a:r>
-              <a:rPr lang="en-GB" sz="800">
+              <a:rPr lang="en-GB" sz="800" dirty="0">
                 <a:latin typeface="Open Sans"/>
                 <a:ea typeface="Open Sans"/>
                 <a:cs typeface="Open Sans"/>
@@ -5633,7 +5633,7 @@
               </a:rPr>
               <a:t>Stream-aligned team</a:t>
             </a:r>
-            <a:endParaRPr sz="800">
+            <a:endParaRPr sz="800" dirty="0">
               <a:latin typeface="Open Sans"/>
               <a:ea typeface="Open Sans"/>
               <a:cs typeface="Open Sans"/>
@@ -5650,8 +5650,8 @@
         </p:nvSpPr>
         <p:spPr>
           <a:xfrm>
-            <a:off x="987800" y="3768849"/>
-            <a:ext cx="3260700" cy="480300"/>
+            <a:off x="1322178" y="3334481"/>
+            <a:ext cx="3132813" cy="347968"/>
           </a:xfrm>
           <a:prstGeom prst="roundRect">
             <a:avLst>
@@ -5687,7 +5687,7 @@
               <a:buNone/>
             </a:pPr>
             <a:r>
-              <a:rPr lang="en-GB" sz="800">
+              <a:rPr lang="en-GB" sz="800" dirty="0">
                 <a:latin typeface="Open Sans"/>
                 <a:ea typeface="Open Sans"/>
                 <a:cs typeface="Open Sans"/>
@@ -5695,7 +5695,7 @@
               </a:rPr>
               <a:t>Platform team</a:t>
             </a:r>
-            <a:endParaRPr sz="800">
+            <a:endParaRPr sz="800" dirty="0">
               <a:latin typeface="Open Sans"/>
               <a:ea typeface="Open Sans"/>
               <a:cs typeface="Open Sans"/>
@@ -5712,8 +5712,8 @@
         </p:nvSpPr>
         <p:spPr>
           <a:xfrm>
-            <a:off x="2275850" y="1794901"/>
-            <a:ext cx="684600" cy="878100"/>
+            <a:off x="2575157" y="1566211"/>
+            <a:ext cx="687139" cy="762400"/>
           </a:xfrm>
           <a:prstGeom prst="roundRect">
             <a:avLst>
@@ -5749,7 +5749,7 @@
               <a:buNone/>
             </a:pPr>
             <a:r>
-              <a:rPr lang="en-GB" sz="800">
+              <a:rPr lang="en-GB" sz="800" dirty="0">
                 <a:latin typeface="Open Sans"/>
                 <a:ea typeface="Open Sans"/>
                 <a:cs typeface="Open Sans"/>
@@ -5757,7 +5757,7 @@
               </a:rPr>
               <a:t>Enabling team</a:t>
             </a:r>
-            <a:endParaRPr sz="800">
+            <a:endParaRPr sz="800" dirty="0">
               <a:latin typeface="Open Sans"/>
               <a:ea typeface="Open Sans"/>
               <a:cs typeface="Open Sans"/>
@@ -5774,7 +5774,7 @@
         </p:nvSpPr>
         <p:spPr>
           <a:xfrm>
-            <a:off x="2024249" y="2871113"/>
+            <a:off x="2337925" y="2467173"/>
             <a:ext cx="1161600" cy="699600"/>
           </a:xfrm>
           <a:prstGeom prst="octagon">
@@ -5811,7 +5811,7 @@
               <a:buNone/>
             </a:pPr>
             <a:r>
-              <a:rPr lang="en-GB" sz="800">
+              <a:rPr lang="en-GB" sz="800" dirty="0">
                 <a:latin typeface="Open Sans"/>
                 <a:ea typeface="Open Sans"/>
                 <a:cs typeface="Open Sans"/>
@@ -5819,7 +5819,7 @@
               </a:rPr>
               <a:t>Complicated Subsystem team</a:t>
             </a:r>
-            <a:endParaRPr sz="800">
+            <a:endParaRPr sz="800" dirty="0">
               <a:latin typeface="Open Sans"/>
               <a:ea typeface="Open Sans"/>
               <a:cs typeface="Open Sans"/>
@@ -5836,8 +5836,8 @@
         </p:nvSpPr>
         <p:spPr>
           <a:xfrm>
-            <a:off x="2294600" y="136000"/>
-            <a:ext cx="6539100" cy="943500"/>
+            <a:off x="2575156" y="88961"/>
+            <a:ext cx="5927049" cy="943500"/>
           </a:xfrm>
           <a:prstGeom prst="rect">
             <a:avLst/>
@@ -5866,7 +5866,7 @@
               <a:buNone/>
             </a:pPr>
             <a:r>
-              <a:rPr lang="en-GB" sz="1000">
+              <a:rPr lang="en-GB" sz="900" dirty="0">
                 <a:solidFill>
                   <a:srgbClr val="434343"/>
                 </a:solidFill>
@@ -5875,10 +5875,10 @@
                 <a:cs typeface="Open Sans"/>
                 <a:sym typeface="Open Sans"/>
               </a:rPr>
-              <a:t>These shapes can be used as copy/paste templates for modeling organization design and team interactions based on the ideas in Team Topologies. See</a:t>
+              <a:t>These shapes can be used as copy/paste templates for modelling organization design and team interactions based on the ideas in Team Topologies. See</a:t>
             </a:r>
             <a:r>
-              <a:rPr lang="en-GB" sz="1000">
+              <a:rPr lang="en-GB" sz="900" dirty="0">
                 <a:solidFill>
                   <a:srgbClr val="434343"/>
                 </a:solidFill>
@@ -5900,7 +5900,7 @@
               <a:t> </a:t>
             </a:r>
             <a:r>
-              <a:rPr lang="en-GB" sz="1000" u="sng">
+              <a:rPr lang="en-GB" sz="900" u="sng" dirty="0">
                 <a:solidFill>
                   <a:srgbClr val="434343"/>
                 </a:solidFill>
@@ -5919,7 +5919,7 @@
               <a:t>teamtopologies.com</a:t>
             </a:r>
             <a:r>
-              <a:rPr lang="en-GB" sz="1000">
+              <a:rPr lang="en-GB" sz="900" dirty="0">
                 <a:solidFill>
                   <a:srgbClr val="434343"/>
                 </a:solidFill>
@@ -5930,7 +5930,7 @@
               </a:rPr>
               <a:t> for more details. We have tried to make the shapes match as closely as possible to those in the book, but some shapes are slightly different.</a:t>
             </a:r>
-            <a:endParaRPr sz="1000">
+            <a:endParaRPr sz="900" dirty="0">
               <a:solidFill>
                 <a:srgbClr val="434343"/>
               </a:solidFill>
@@ -5950,7 +5950,7 @@
         </p:nvSpPr>
         <p:spPr>
           <a:xfrm>
-            <a:off x="5664338" y="1379850"/>
+            <a:off x="5942019" y="1135846"/>
             <a:ext cx="1403825" cy="515013"/>
           </a:xfrm>
           <a:prstGeom prst="flowChartInputOutput">
@@ -5987,7 +5987,7 @@
               <a:buNone/>
             </a:pPr>
             <a:r>
-              <a:rPr lang="en-GB" sz="800">
+              <a:rPr lang="en-GB" sz="800" dirty="0">
                 <a:latin typeface="Open Sans"/>
                 <a:ea typeface="Open Sans"/>
                 <a:cs typeface="Open Sans"/>
@@ -5995,7 +5995,7 @@
               </a:rPr>
               <a:t>Collaboration</a:t>
             </a:r>
-            <a:endParaRPr sz="800">
+            <a:endParaRPr sz="800" dirty="0">
               <a:latin typeface="Open Sans"/>
               <a:ea typeface="Open Sans"/>
               <a:cs typeface="Open Sans"/>
@@ -6012,7 +6012,7 @@
         </p:nvSpPr>
         <p:spPr>
           <a:xfrm>
-            <a:off x="1499600" y="861300"/>
+            <a:off x="1780157" y="724046"/>
             <a:ext cx="2237100" cy="276600"/>
           </a:xfrm>
           <a:prstGeom prst="rect">
@@ -6039,7 +6039,7 @@
               <a:buNone/>
             </a:pPr>
             <a:r>
-              <a:rPr lang="en-GB" sz="1050" b="1" u="sng">
+              <a:rPr lang="en-GB" sz="1000" b="1" u="sng" dirty="0">
                 <a:solidFill>
                   <a:srgbClr val="1A1A1A"/>
                 </a:solidFill>
@@ -6050,7 +6050,7 @@
               </a:rPr>
               <a:t>Fundamental Team Types</a:t>
             </a:r>
-            <a:endParaRPr>
+            <a:endParaRPr sz="1000" dirty="0">
               <a:latin typeface="Open Sans"/>
               <a:ea typeface="Open Sans"/>
               <a:cs typeface="Open Sans"/>
@@ -6067,7 +6067,7 @@
         </p:nvSpPr>
         <p:spPr>
           <a:xfrm>
-            <a:off x="5146876" y="881650"/>
+            <a:off x="5422855" y="719085"/>
             <a:ext cx="2433000" cy="276600"/>
           </a:xfrm>
           <a:prstGeom prst="rect">
@@ -6094,7 +6094,7 @@
               <a:buNone/>
             </a:pPr>
             <a:r>
-              <a:rPr lang="en-GB" sz="1050" b="1" u="sng">
+              <a:rPr lang="en-GB" sz="1000" b="1" u="sng" dirty="0">
                 <a:solidFill>
                   <a:srgbClr val="1A1A1A"/>
                 </a:solidFill>
@@ -6105,7 +6105,7 @@
               </a:rPr>
               <a:t>Team Interaction Modes</a:t>
             </a:r>
-            <a:endParaRPr>
+            <a:endParaRPr sz="1000" dirty="0">
               <a:latin typeface="Open Sans"/>
               <a:ea typeface="Open Sans"/>
               <a:cs typeface="Open Sans"/>
@@ -6122,7 +6122,7 @@
         </p:nvSpPr>
         <p:spPr>
           <a:xfrm>
-            <a:off x="5905876" y="2125412"/>
+            <a:off x="6181855" y="1777841"/>
             <a:ext cx="915000" cy="804300"/>
           </a:xfrm>
           <a:prstGeom prst="triangle">
@@ -6186,7 +6186,7 @@
         </p:nvSpPr>
         <p:spPr>
           <a:xfrm>
-            <a:off x="5865075" y="3160250"/>
+            <a:off x="6141055" y="2770723"/>
             <a:ext cx="996600" cy="1008000"/>
           </a:xfrm>
           <a:prstGeom prst="ellipse">
@@ -6223,7 +6223,7 @@
               <a:buNone/>
             </a:pPr>
             <a:r>
-              <a:rPr lang="en-GB" sz="800">
+              <a:rPr lang="en-GB" sz="800" dirty="0">
                 <a:latin typeface="Open Sans"/>
                 <a:ea typeface="Open Sans"/>
                 <a:cs typeface="Open Sans"/>
@@ -6231,7 +6231,7 @@
               </a:rPr>
               <a:t>Facilitating</a:t>
             </a:r>
-            <a:endParaRPr sz="800">
+            <a:endParaRPr sz="800" dirty="0">
               <a:latin typeface="Open Sans"/>
               <a:ea typeface="Open Sans"/>
               <a:cs typeface="Open Sans"/>
@@ -6248,8 +6248,8 @@
         </p:nvSpPr>
         <p:spPr>
           <a:xfrm>
-            <a:off x="262700" y="171275"/>
-            <a:ext cx="2031900" cy="615600"/>
+            <a:off x="543257" y="97773"/>
+            <a:ext cx="2031900" cy="553968"/>
           </a:xfrm>
           <a:prstGeom prst="rect">
             <a:avLst/>
@@ -6275,7 +6275,7 @@
               <a:buNone/>
             </a:pPr>
             <a:r>
-              <a:rPr lang="en-GB" b="1">
+              <a:rPr lang="en-GB" sz="1200" b="1" dirty="0">
                 <a:latin typeface="Open Sans"/>
                 <a:ea typeface="Open Sans"/>
                 <a:cs typeface="Open Sans"/>
@@ -6284,7 +6284,7 @@
               <a:t>Team Topologies </a:t>
             </a:r>
             <a:r>
-              <a:rPr lang="en-GB">
+              <a:rPr lang="en-GB" sz="1200" dirty="0">
                 <a:latin typeface="Open Sans"/>
                 <a:ea typeface="Open Sans"/>
                 <a:cs typeface="Open Sans"/>
@@ -6292,7 +6292,7 @@
               </a:rPr>
               <a:t>team shapes template</a:t>
             </a:r>
-            <a:endParaRPr>
+            <a:endParaRPr sz="1200" dirty="0">
               <a:latin typeface="Open Sans"/>
               <a:ea typeface="Open Sans"/>
               <a:cs typeface="Open Sans"/>
@@ -6309,7 +6309,7 @@
         </p:nvSpPr>
         <p:spPr>
           <a:xfrm>
-            <a:off x="784750" y="4363437"/>
+            <a:off x="969141" y="4340807"/>
             <a:ext cx="6971700" cy="576600"/>
           </a:xfrm>
           <a:prstGeom prst="rightArrow">
@@ -6345,13 +6345,106 @@
               <a:buNone/>
             </a:pPr>
             <a:r>
-              <a:rPr lang="en-GB" sz="800"/>
+              <a:rPr lang="en-GB" sz="800" dirty="0"/>
               <a:t>Flow of change</a:t>
             </a:r>
-            <a:endParaRPr sz="800"/>
+            <a:endParaRPr sz="800" dirty="0"/>
           </a:p>
         </p:txBody>
       </p:sp>
+      <p:grpSp>
+        <p:nvGrpSpPr>
+          <p:cNvPr id="5" name="Group 4">
+            <a:extLst>
+              <a:ext uri="{FF2B5EF4-FFF2-40B4-BE49-F238E27FC236}">
+                <a16:creationId xmlns:a16="http://schemas.microsoft.com/office/drawing/2014/main" id="{B0B7A22E-1CD1-684B-B2B1-38F1A5B57D98}"/>
+              </a:ext>
+            </a:extLst>
+          </p:cNvPr>
+          <p:cNvGrpSpPr/>
+          <p:nvPr/>
+        </p:nvGrpSpPr>
+        <p:grpSpPr>
+          <a:xfrm>
+            <a:off x="1322178" y="3862709"/>
+            <a:ext cx="3132813" cy="398915"/>
+            <a:chOff x="1041621" y="3758799"/>
+            <a:chExt cx="3132813" cy="398915"/>
+          </a:xfrm>
+        </p:grpSpPr>
+        <p:pic>
+          <p:nvPicPr>
+            <p:cNvPr id="3" name="Graphic 2">
+              <a:extLst>
+                <a:ext uri="{FF2B5EF4-FFF2-40B4-BE49-F238E27FC236}">
+                  <a16:creationId xmlns:a16="http://schemas.microsoft.com/office/drawing/2014/main" id="{A98A8545-9DE1-9345-A5E4-0302CA02559A}"/>
+                </a:ext>
+              </a:extLst>
+            </p:cNvPr>
+            <p:cNvPicPr>
+              <a:picLocks noChangeAspect="1"/>
+            </p:cNvPicPr>
+            <p:nvPr/>
+          </p:nvPicPr>
+          <p:blipFill>
+            <a:blip r:embed="rId4">
+              <a:extLst>
+                <a:ext uri="{96DAC541-7B7A-43D3-8B79-37D633B846F1}">
+                  <asvg:svgBlip xmlns:asvg="http://schemas.microsoft.com/office/drawing/2016/SVG/main" r:embed="rId5"/>
+                </a:ext>
+              </a:extLst>
+            </a:blip>
+            <a:stretch>
+              <a:fillRect/>
+            </a:stretch>
+          </p:blipFill>
+          <p:spPr>
+            <a:xfrm>
+              <a:off x="1041621" y="3758799"/>
+              <a:ext cx="3132813" cy="398915"/>
+            </a:xfrm>
+            <a:prstGeom prst="rect">
+              <a:avLst/>
+            </a:prstGeom>
+          </p:spPr>
+        </p:pic>
+        <p:sp>
+          <p:nvSpPr>
+            <p:cNvPr id="4" name="TextBox 3">
+              <a:extLst>
+                <a:ext uri="{FF2B5EF4-FFF2-40B4-BE49-F238E27FC236}">
+                  <a16:creationId xmlns:a16="http://schemas.microsoft.com/office/drawing/2014/main" id="{72F828F6-042B-F940-B643-961706018CC6}"/>
+                </a:ext>
+              </a:extLst>
+            </p:cNvPr>
+            <p:cNvSpPr txBox="1"/>
+            <p:nvPr/>
+          </p:nvSpPr>
+          <p:spPr>
+            <a:xfrm>
+              <a:off x="2210314" y="3858337"/>
+              <a:ext cx="798617" cy="215444"/>
+            </a:xfrm>
+            <a:prstGeom prst="rect">
+              <a:avLst/>
+            </a:prstGeom>
+            <a:noFill/>
+          </p:spPr>
+          <p:txBody>
+            <a:bodyPr wrap="none" rtlCol="0">
+              <a:spAutoFit/>
+            </a:bodyPr>
+            <a:lstStyle/>
+            <a:p>
+              <a:r>
+                <a:rPr lang="en-AU" sz="800" dirty="0"/>
+                <a:t>No team type</a:t>
+              </a:r>
+              <a:endParaRPr lang="en-US" sz="800" dirty="0"/>
+            </a:p>
+          </p:txBody>
+        </p:sp>
+      </p:grpSp>
     </p:spTree>
   </p:cSld>
   <p:clrMapOvr>

</xml_diff>

<commit_message>
Changed No team type back to Team
</commit_message>
<xml_diff>
--- a/powerpoint/Team Topologies Template for modelling - PowerPoint.pptx
+++ b/powerpoint/Team Topologies Template for modelling - PowerPoint.pptx
@@ -6422,8 +6422,8 @@
           </p:nvSpPr>
           <p:spPr>
             <a:xfrm>
-              <a:off x="2210314" y="3858337"/>
-              <a:ext cx="798617" cy="215444"/>
+              <a:off x="2394371" y="3850534"/>
+              <a:ext cx="447558" cy="215444"/>
             </a:xfrm>
             <a:prstGeom prst="rect">
               <a:avLst/>
@@ -6438,7 +6438,7 @@
             <a:p>
               <a:r>
                 <a:rPr lang="en-AU" sz="800" dirty="0"/>
-                <a:t>No team type</a:t>
+                <a:t>Team</a:t>
               </a:r>
               <a:endParaRPr lang="en-US" sz="800" dirty="0"/>
             </a:p>

</xml_diff>

<commit_message>
Suggested change to introduce a Undefined Team Type (#20)
* Changes to include undefined team type shape

This shape is used to represent a team that has not yet been classified as one of the four fundamental team types.
</commit_message>
<xml_diff>
--- a/powerpoint/Team Topologies Template for modelling - PowerPoint.pptx
+++ b/powerpoint/Team Topologies Template for modelling - PowerPoint.pptx
@@ -14,7 +14,7 @@
   <p:notesSz cx="6858000" cy="9144000"/>
   <p:embeddedFontLst>
     <p:embeddedFont>
-      <p:font typeface="Open Sans" panose="020B0604020202020204" charset="0"/>
+      <p:font typeface="Open Sans" panose="020B0606030504020204" pitchFamily="34" charset="0"/>
       <p:regular r:id="rId4"/>
       <p:bold r:id="rId5"/>
       <p:italic r:id="rId6"/>
@@ -5588,8 +5588,8 @@
         </p:nvSpPr>
         <p:spPr>
           <a:xfrm>
-            <a:off x="1117400" y="1303200"/>
-            <a:ext cx="3001500" cy="326400"/>
+            <a:off x="475612" y="1207711"/>
+            <a:ext cx="2985473" cy="307399"/>
           </a:xfrm>
           <a:prstGeom prst="roundRect">
             <a:avLst>
@@ -5625,7 +5625,7 @@
               <a:buNone/>
             </a:pPr>
             <a:r>
-              <a:rPr lang="en-GB" sz="800">
+              <a:rPr lang="en-GB" sz="800" dirty="0">
                 <a:latin typeface="Open Sans"/>
                 <a:ea typeface="Open Sans"/>
                 <a:cs typeface="Open Sans"/>
@@ -5633,7 +5633,7 @@
               </a:rPr>
               <a:t>Stream-aligned team</a:t>
             </a:r>
-            <a:endParaRPr sz="800">
+            <a:endParaRPr sz="800" dirty="0">
               <a:latin typeface="Open Sans"/>
               <a:ea typeface="Open Sans"/>
               <a:cs typeface="Open Sans"/>
@@ -5650,8 +5650,8 @@
         </p:nvSpPr>
         <p:spPr>
           <a:xfrm>
-            <a:off x="987800" y="3768849"/>
-            <a:ext cx="3260700" cy="480300"/>
+            <a:off x="399833" y="3469648"/>
+            <a:ext cx="3132813" cy="347968"/>
           </a:xfrm>
           <a:prstGeom prst="roundRect">
             <a:avLst>
@@ -5687,7 +5687,7 @@
               <a:buNone/>
             </a:pPr>
             <a:r>
-              <a:rPr lang="en-GB" sz="800">
+              <a:rPr lang="en-GB" sz="800" dirty="0">
                 <a:latin typeface="Open Sans"/>
                 <a:ea typeface="Open Sans"/>
                 <a:cs typeface="Open Sans"/>
@@ -5695,7 +5695,7 @@
               </a:rPr>
               <a:t>Platform team</a:t>
             </a:r>
-            <a:endParaRPr sz="800">
+            <a:endParaRPr sz="800" dirty="0">
               <a:latin typeface="Open Sans"/>
               <a:ea typeface="Open Sans"/>
               <a:cs typeface="Open Sans"/>
@@ -5712,8 +5712,8 @@
         </p:nvSpPr>
         <p:spPr>
           <a:xfrm>
-            <a:off x="2275850" y="1794901"/>
-            <a:ext cx="684600" cy="878100"/>
+            <a:off x="1652812" y="1661623"/>
+            <a:ext cx="687139" cy="762400"/>
           </a:xfrm>
           <a:prstGeom prst="roundRect">
             <a:avLst>
@@ -5749,7 +5749,7 @@
               <a:buNone/>
             </a:pPr>
             <a:r>
-              <a:rPr lang="en-GB" sz="800">
+              <a:rPr lang="en-GB" sz="800" dirty="0">
                 <a:latin typeface="Open Sans"/>
                 <a:ea typeface="Open Sans"/>
                 <a:cs typeface="Open Sans"/>
@@ -5757,7 +5757,7 @@
               </a:rPr>
               <a:t>Enabling team</a:t>
             </a:r>
-            <a:endParaRPr sz="800">
+            <a:endParaRPr sz="800" dirty="0">
               <a:latin typeface="Open Sans"/>
               <a:ea typeface="Open Sans"/>
               <a:cs typeface="Open Sans"/>
@@ -5774,7 +5774,7 @@
         </p:nvSpPr>
         <p:spPr>
           <a:xfrm>
-            <a:off x="2024249" y="2871113"/>
+            <a:off x="1415580" y="2586438"/>
             <a:ext cx="1161600" cy="699600"/>
           </a:xfrm>
           <a:prstGeom prst="octagon">
@@ -5811,7 +5811,7 @@
               <a:buNone/>
             </a:pPr>
             <a:r>
-              <a:rPr lang="en-GB" sz="800">
+              <a:rPr lang="en-GB" sz="800" dirty="0">
                 <a:latin typeface="Open Sans"/>
                 <a:ea typeface="Open Sans"/>
                 <a:cs typeface="Open Sans"/>
@@ -5819,7 +5819,7 @@
               </a:rPr>
               <a:t>Complicated Subsystem team</a:t>
             </a:r>
-            <a:endParaRPr sz="800">
+            <a:endParaRPr sz="800" dirty="0">
               <a:latin typeface="Open Sans"/>
               <a:ea typeface="Open Sans"/>
               <a:cs typeface="Open Sans"/>
@@ -5836,8 +5836,8 @@
         </p:nvSpPr>
         <p:spPr>
           <a:xfrm>
-            <a:off x="2294600" y="136000"/>
-            <a:ext cx="6539100" cy="943500"/>
+            <a:off x="2575156" y="88961"/>
+            <a:ext cx="5927049" cy="943500"/>
           </a:xfrm>
           <a:prstGeom prst="rect">
             <a:avLst/>
@@ -5866,7 +5866,7 @@
               <a:buNone/>
             </a:pPr>
             <a:r>
-              <a:rPr lang="en-GB" sz="1000">
+              <a:rPr lang="en-GB" sz="900" dirty="0">
                 <a:solidFill>
                   <a:srgbClr val="434343"/>
                 </a:solidFill>
@@ -5875,10 +5875,10 @@
                 <a:cs typeface="Open Sans"/>
                 <a:sym typeface="Open Sans"/>
               </a:rPr>
-              <a:t>These shapes can be used as copy/paste templates for modeling organization design and team interactions based on the ideas in Team Topologies. See</a:t>
+              <a:t>These shapes can be used as copy/paste templates for modelling organization design and team interactions based on the ideas in Team Topologies. See</a:t>
             </a:r>
             <a:r>
-              <a:rPr lang="en-GB" sz="1000">
+              <a:rPr lang="en-GB" sz="900" dirty="0">
                 <a:solidFill>
                   <a:srgbClr val="434343"/>
                 </a:solidFill>
@@ -5900,7 +5900,7 @@
               <a:t> </a:t>
             </a:r>
             <a:r>
-              <a:rPr lang="en-GB" sz="1000" u="sng">
+              <a:rPr lang="en-GB" sz="900" u="sng" dirty="0">
                 <a:solidFill>
                   <a:srgbClr val="434343"/>
                 </a:solidFill>
@@ -5919,7 +5919,7 @@
               <a:t>teamtopologies.com</a:t>
             </a:r>
             <a:r>
-              <a:rPr lang="en-GB" sz="1000">
+              <a:rPr lang="en-GB" sz="900" dirty="0">
                 <a:solidFill>
                   <a:srgbClr val="434343"/>
                 </a:solidFill>
@@ -5930,7 +5930,7 @@
               </a:rPr>
               <a:t> for more details. We have tried to make the shapes match as closely as possible to those in the book, but some shapes are slightly different.</a:t>
             </a:r>
-            <a:endParaRPr sz="1000">
+            <a:endParaRPr sz="900" dirty="0">
               <a:solidFill>
                 <a:srgbClr val="434343"/>
               </a:solidFill>
@@ -5950,7 +5950,7 @@
         </p:nvSpPr>
         <p:spPr>
           <a:xfrm>
-            <a:off x="5664338" y="1379850"/>
+            <a:off x="4160929" y="1207405"/>
             <a:ext cx="1403825" cy="515013"/>
           </a:xfrm>
           <a:prstGeom prst="flowChartInputOutput">
@@ -5987,7 +5987,7 @@
               <a:buNone/>
             </a:pPr>
             <a:r>
-              <a:rPr lang="en-GB" sz="800">
+              <a:rPr lang="en-GB" sz="800" dirty="0">
                 <a:latin typeface="Open Sans"/>
                 <a:ea typeface="Open Sans"/>
                 <a:cs typeface="Open Sans"/>
@@ -5995,7 +5995,7 @@
               </a:rPr>
               <a:t>Collaboration</a:t>
             </a:r>
-            <a:endParaRPr sz="800">
+            <a:endParaRPr sz="800" dirty="0">
               <a:latin typeface="Open Sans"/>
               <a:ea typeface="Open Sans"/>
               <a:cs typeface="Open Sans"/>
@@ -6012,7 +6012,7 @@
         </p:nvSpPr>
         <p:spPr>
           <a:xfrm>
-            <a:off x="1499600" y="861300"/>
+            <a:off x="857812" y="795605"/>
             <a:ext cx="2237100" cy="276600"/>
           </a:xfrm>
           <a:prstGeom prst="rect">
@@ -6039,7 +6039,7 @@
               <a:buNone/>
             </a:pPr>
             <a:r>
-              <a:rPr lang="en-GB" sz="1050" b="1" u="sng">
+              <a:rPr lang="en-GB" sz="1000" b="1" u="sng" dirty="0">
                 <a:solidFill>
                   <a:srgbClr val="1A1A1A"/>
                 </a:solidFill>
@@ -6050,7 +6050,7 @@
               </a:rPr>
               <a:t>Fundamental Team Types</a:t>
             </a:r>
-            <a:endParaRPr>
+            <a:endParaRPr sz="1000" dirty="0">
               <a:latin typeface="Open Sans"/>
               <a:ea typeface="Open Sans"/>
               <a:cs typeface="Open Sans"/>
@@ -6067,7 +6067,7 @@
         </p:nvSpPr>
         <p:spPr>
           <a:xfrm>
-            <a:off x="5146876" y="881650"/>
+            <a:off x="3641765" y="790644"/>
             <a:ext cx="2433000" cy="276600"/>
           </a:xfrm>
           <a:prstGeom prst="rect">
@@ -6094,7 +6094,7 @@
               <a:buNone/>
             </a:pPr>
             <a:r>
-              <a:rPr lang="en-GB" sz="1050" b="1" u="sng">
+              <a:rPr lang="en-GB" sz="1000" b="1" u="sng" dirty="0">
                 <a:solidFill>
                   <a:srgbClr val="1A1A1A"/>
                 </a:solidFill>
@@ -6105,7 +6105,7 @@
               </a:rPr>
               <a:t>Team Interaction Modes</a:t>
             </a:r>
-            <a:endParaRPr>
+            <a:endParaRPr sz="1000" dirty="0">
               <a:latin typeface="Open Sans"/>
               <a:ea typeface="Open Sans"/>
               <a:cs typeface="Open Sans"/>
@@ -6122,7 +6122,7 @@
         </p:nvSpPr>
         <p:spPr>
           <a:xfrm>
-            <a:off x="5905876" y="2125412"/>
+            <a:off x="4400765" y="1849400"/>
             <a:ext cx="915000" cy="804300"/>
           </a:xfrm>
           <a:prstGeom prst="triangle">
@@ -6186,7 +6186,7 @@
         </p:nvSpPr>
         <p:spPr>
           <a:xfrm>
-            <a:off x="5865075" y="3160250"/>
+            <a:off x="4359965" y="2842282"/>
             <a:ext cx="996600" cy="1008000"/>
           </a:xfrm>
           <a:prstGeom prst="ellipse">
@@ -6223,7 +6223,7 @@
               <a:buNone/>
             </a:pPr>
             <a:r>
-              <a:rPr lang="en-GB" sz="800">
+              <a:rPr lang="en-GB" sz="800" dirty="0">
                 <a:latin typeface="Open Sans"/>
                 <a:ea typeface="Open Sans"/>
                 <a:cs typeface="Open Sans"/>
@@ -6231,7 +6231,7 @@
               </a:rPr>
               <a:t>Facilitating</a:t>
             </a:r>
-            <a:endParaRPr sz="800">
+            <a:endParaRPr sz="800" dirty="0">
               <a:latin typeface="Open Sans"/>
               <a:ea typeface="Open Sans"/>
               <a:cs typeface="Open Sans"/>
@@ -6248,8 +6248,8 @@
         </p:nvSpPr>
         <p:spPr>
           <a:xfrm>
-            <a:off x="262700" y="171275"/>
-            <a:ext cx="2031900" cy="615600"/>
+            <a:off x="543257" y="97773"/>
+            <a:ext cx="2031900" cy="553968"/>
           </a:xfrm>
           <a:prstGeom prst="rect">
             <a:avLst/>
@@ -6275,7 +6275,7 @@
               <a:buNone/>
             </a:pPr>
             <a:r>
-              <a:rPr lang="en-GB" b="1">
+              <a:rPr lang="en-GB" sz="1200" b="1" dirty="0">
                 <a:latin typeface="Open Sans"/>
                 <a:ea typeface="Open Sans"/>
                 <a:cs typeface="Open Sans"/>
@@ -6284,7 +6284,7 @@
               <a:t>Team Topologies </a:t>
             </a:r>
             <a:r>
-              <a:rPr lang="en-GB">
+              <a:rPr lang="en-GB" sz="1200" dirty="0">
                 <a:latin typeface="Open Sans"/>
                 <a:ea typeface="Open Sans"/>
                 <a:cs typeface="Open Sans"/>
@@ -6292,7 +6292,7 @@
               </a:rPr>
               <a:t>team shapes template</a:t>
             </a:r>
-            <a:endParaRPr>
+            <a:endParaRPr sz="1200" dirty="0">
               <a:latin typeface="Open Sans"/>
               <a:ea typeface="Open Sans"/>
               <a:cs typeface="Open Sans"/>
@@ -6309,7 +6309,7 @@
         </p:nvSpPr>
         <p:spPr>
           <a:xfrm>
-            <a:off x="784750" y="4363437"/>
+            <a:off x="969141" y="4086362"/>
             <a:ext cx="6971700" cy="576600"/>
           </a:xfrm>
           <a:prstGeom prst="rightArrow">
@@ -6345,10 +6345,163 @@
               <a:buNone/>
             </a:pPr>
             <a:r>
-              <a:rPr lang="en-GB" sz="800"/>
+              <a:rPr lang="en-GB" sz="800" dirty="0"/>
               <a:t>Flow of change</a:t>
             </a:r>
-            <a:endParaRPr sz="800"/>
+            <a:endParaRPr sz="800" dirty="0"/>
+          </a:p>
+        </p:txBody>
+      </p:sp>
+      <p:grpSp>
+        <p:nvGrpSpPr>
+          <p:cNvPr id="5" name="Group 4">
+            <a:extLst>
+              <a:ext uri="{FF2B5EF4-FFF2-40B4-BE49-F238E27FC236}">
+                <a16:creationId xmlns:a16="http://schemas.microsoft.com/office/drawing/2014/main" id="{B0B7A22E-1CD1-684B-B2B1-38F1A5B57D98}"/>
+              </a:ext>
+            </a:extLst>
+          </p:cNvPr>
+          <p:cNvGrpSpPr/>
+          <p:nvPr/>
+        </p:nvGrpSpPr>
+        <p:grpSpPr>
+          <a:xfrm>
+            <a:off x="6049008" y="1230413"/>
+            <a:ext cx="2669296" cy="398915"/>
+            <a:chOff x="1011391" y="3758799"/>
+            <a:chExt cx="3132813" cy="398915"/>
+          </a:xfrm>
+        </p:grpSpPr>
+        <p:pic>
+          <p:nvPicPr>
+            <p:cNvPr id="3" name="Graphic 2">
+              <a:extLst>
+                <a:ext uri="{FF2B5EF4-FFF2-40B4-BE49-F238E27FC236}">
+                  <a16:creationId xmlns:a16="http://schemas.microsoft.com/office/drawing/2014/main" id="{A98A8545-9DE1-9345-A5E4-0302CA02559A}"/>
+                </a:ext>
+              </a:extLst>
+            </p:cNvPr>
+            <p:cNvPicPr>
+              <a:picLocks noChangeAspect="1"/>
+            </p:cNvPicPr>
+            <p:nvPr/>
+          </p:nvPicPr>
+          <p:blipFill>
+            <a:blip r:embed="rId4">
+              <a:extLst>
+                <a:ext uri="{96DAC541-7B7A-43D3-8B79-37D633B846F1}">
+                  <asvg:svgBlip xmlns:asvg="http://schemas.microsoft.com/office/drawing/2016/SVG/main" r:embed="rId5"/>
+                </a:ext>
+              </a:extLst>
+            </a:blip>
+            <a:stretch>
+              <a:fillRect/>
+            </a:stretch>
+          </p:blipFill>
+          <p:spPr>
+            <a:xfrm>
+              <a:off x="1011391" y="3758799"/>
+              <a:ext cx="3132813" cy="398915"/>
+            </a:xfrm>
+            <a:prstGeom prst="rect">
+              <a:avLst/>
+            </a:prstGeom>
+          </p:spPr>
+        </p:pic>
+        <p:sp>
+          <p:nvSpPr>
+            <p:cNvPr id="4" name="TextBox 3">
+              <a:extLst>
+                <a:ext uri="{FF2B5EF4-FFF2-40B4-BE49-F238E27FC236}">
+                  <a16:creationId xmlns:a16="http://schemas.microsoft.com/office/drawing/2014/main" id="{72F828F6-042B-F940-B643-961706018CC6}"/>
+                </a:ext>
+              </a:extLst>
+            </p:cNvPr>
+            <p:cNvSpPr txBox="1"/>
+            <p:nvPr/>
+          </p:nvSpPr>
+          <p:spPr>
+            <a:xfrm>
+              <a:off x="1870217" y="3850534"/>
+              <a:ext cx="1415160" cy="215444"/>
+            </a:xfrm>
+            <a:prstGeom prst="rect">
+              <a:avLst/>
+            </a:prstGeom>
+            <a:noFill/>
+          </p:spPr>
+          <p:txBody>
+            <a:bodyPr wrap="none" rtlCol="0">
+              <a:spAutoFit/>
+            </a:bodyPr>
+            <a:lstStyle/>
+            <a:p>
+              <a:r>
+                <a:rPr lang="en-US" sz="800" dirty="0"/>
+                <a:t>Undefined Team Type</a:t>
+              </a:r>
+            </a:p>
+          </p:txBody>
+        </p:sp>
+      </p:grpSp>
+      <p:sp>
+        <p:nvSpPr>
+          <p:cNvPr id="17" name="Google Shape;60;p13">
+            <a:extLst>
+              <a:ext uri="{FF2B5EF4-FFF2-40B4-BE49-F238E27FC236}">
+                <a16:creationId xmlns:a16="http://schemas.microsoft.com/office/drawing/2014/main" id="{375340AE-F0EC-3145-BD9D-2FA5853FB29E}"/>
+              </a:ext>
+            </a:extLst>
+          </p:cNvPr>
+          <p:cNvSpPr txBox="1"/>
+          <p:nvPr/>
+        </p:nvSpPr>
+        <p:spPr>
+          <a:xfrm>
+            <a:off x="6265106" y="790644"/>
+            <a:ext cx="2237100" cy="276600"/>
+          </a:xfrm>
+          <a:prstGeom prst="rect">
+            <a:avLst/>
+          </a:prstGeom>
+          <a:noFill/>
+          <a:ln>
+            <a:noFill/>
+          </a:ln>
+        </p:spPr>
+        <p:txBody>
+          <a:bodyPr spcFirstLastPara="1" wrap="square" lIns="91425" tIns="91425" rIns="91425" bIns="91425" anchor="t" anchorCtr="0">
+            <a:noAutofit/>
+          </a:bodyPr>
+          <a:lstStyle/>
+          <a:p>
+            <a:pPr marL="0" lvl="0" indent="0" algn="ctr" rtl="0">
+              <a:spcBef>
+                <a:spcPts val="0"/>
+              </a:spcBef>
+              <a:spcAft>
+                <a:spcPts val="0"/>
+              </a:spcAft>
+              <a:buNone/>
+            </a:pPr>
+            <a:r>
+              <a:rPr lang="en-GB" sz="1000" b="1" u="sng" dirty="0">
+                <a:solidFill>
+                  <a:srgbClr val="1A1A1A"/>
+                </a:solidFill>
+                <a:latin typeface="Open Sans"/>
+                <a:ea typeface="Open Sans"/>
+                <a:cs typeface="Open Sans"/>
+                <a:sym typeface="Open Sans"/>
+              </a:rPr>
+              <a:t>Supplementary Team Types</a:t>
+            </a:r>
+            <a:endParaRPr sz="1000" dirty="0">
+              <a:latin typeface="Open Sans"/>
+              <a:ea typeface="Open Sans"/>
+              <a:cs typeface="Open Sans"/>
+              <a:sym typeface="Open Sans"/>
+            </a:endParaRPr>
           </a:p>
         </p:txBody>
       </p:sp>

</xml_diff>